<commit_message>
Update QR and short URL
</commit_message>
<xml_diff>
--- a/best_practices_for_data_science_on_hpc.pptx
+++ b/best_practices_for_data_science_on_hpc.pptx
@@ -410,7 +410,7 @@
           <a:p>
             <a:fld id="{2C83C82C-4DDC-4393-B222-DB7E9965CB13}" type="datetimeFigureOut">
               <a:rPr lang="LID4096" smtClean="0"/>
-              <a:t>02/03/2025</a:t>
+              <a:t>05/21/2025</a:t>
             </a:fld>
             <a:endParaRPr lang="LID4096"/>
           </a:p>
@@ -610,7 +610,7 @@
           <a:p>
             <a:fld id="{2C83C82C-4DDC-4393-B222-DB7E9965CB13}" type="datetimeFigureOut">
               <a:rPr lang="LID4096" smtClean="0"/>
-              <a:t>02/03/2025</a:t>
+              <a:t>05/21/2025</a:t>
             </a:fld>
             <a:endParaRPr lang="LID4096"/>
           </a:p>
@@ -820,7 +820,7 @@
           <a:p>
             <a:fld id="{2C83C82C-4DDC-4393-B222-DB7E9965CB13}" type="datetimeFigureOut">
               <a:rPr lang="LID4096" smtClean="0"/>
-              <a:t>02/03/2025</a:t>
+              <a:t>05/21/2025</a:t>
             </a:fld>
             <a:endParaRPr lang="LID4096"/>
           </a:p>
@@ -1020,7 +1020,7 @@
           <a:p>
             <a:fld id="{2C83C82C-4DDC-4393-B222-DB7E9965CB13}" type="datetimeFigureOut">
               <a:rPr lang="LID4096" smtClean="0"/>
-              <a:t>02/03/2025</a:t>
+              <a:t>05/21/2025</a:t>
             </a:fld>
             <a:endParaRPr lang="LID4096"/>
           </a:p>
@@ -1296,7 +1296,7 @@
           <a:p>
             <a:fld id="{2C83C82C-4DDC-4393-B222-DB7E9965CB13}" type="datetimeFigureOut">
               <a:rPr lang="LID4096" smtClean="0"/>
-              <a:t>02/03/2025</a:t>
+              <a:t>05/21/2025</a:t>
             </a:fld>
             <a:endParaRPr lang="LID4096"/>
           </a:p>
@@ -1564,7 +1564,7 @@
           <a:p>
             <a:fld id="{2C83C82C-4DDC-4393-B222-DB7E9965CB13}" type="datetimeFigureOut">
               <a:rPr lang="LID4096" smtClean="0"/>
-              <a:t>02/03/2025</a:t>
+              <a:t>05/21/2025</a:t>
             </a:fld>
             <a:endParaRPr lang="LID4096"/>
           </a:p>
@@ -1979,7 +1979,7 @@
           <a:p>
             <a:fld id="{2C83C82C-4DDC-4393-B222-DB7E9965CB13}" type="datetimeFigureOut">
               <a:rPr lang="LID4096" smtClean="0"/>
-              <a:t>02/03/2025</a:t>
+              <a:t>05/21/2025</a:t>
             </a:fld>
             <a:endParaRPr lang="LID4096"/>
           </a:p>
@@ -2121,7 +2121,7 @@
           <a:p>
             <a:fld id="{2C83C82C-4DDC-4393-B222-DB7E9965CB13}" type="datetimeFigureOut">
               <a:rPr lang="LID4096" smtClean="0"/>
-              <a:t>02/03/2025</a:t>
+              <a:t>05/21/2025</a:t>
             </a:fld>
             <a:endParaRPr lang="LID4096"/>
           </a:p>
@@ -2234,7 +2234,7 @@
           <a:p>
             <a:fld id="{2C83C82C-4DDC-4393-B222-DB7E9965CB13}" type="datetimeFigureOut">
               <a:rPr lang="LID4096" smtClean="0"/>
-              <a:t>02/03/2025</a:t>
+              <a:t>05/21/2025</a:t>
             </a:fld>
             <a:endParaRPr lang="LID4096"/>
           </a:p>
@@ -2547,7 +2547,7 @@
           <a:p>
             <a:fld id="{2C83C82C-4DDC-4393-B222-DB7E9965CB13}" type="datetimeFigureOut">
               <a:rPr lang="LID4096" smtClean="0"/>
-              <a:t>02/03/2025</a:t>
+              <a:t>05/21/2025</a:t>
             </a:fld>
             <a:endParaRPr lang="LID4096"/>
           </a:p>
@@ -2836,7 +2836,7 @@
           <a:p>
             <a:fld id="{2C83C82C-4DDC-4393-B222-DB7E9965CB13}" type="datetimeFigureOut">
               <a:rPr lang="LID4096" smtClean="0"/>
-              <a:t>02/03/2025</a:t>
+              <a:t>05/21/2025</a:t>
             </a:fld>
             <a:endParaRPr lang="LID4096"/>
           </a:p>
@@ -3079,7 +3079,7 @@
           <a:p>
             <a:fld id="{2C83C82C-4DDC-4393-B222-DB7E9965CB13}" type="datetimeFigureOut">
               <a:rPr lang="LID4096" smtClean="0"/>
-              <a:t>02/03/2025</a:t>
+              <a:t>05/21/2025</a:t>
             </a:fld>
             <a:endParaRPr lang="LID4096"/>
           </a:p>
@@ -3513,7 +3513,7 @@
           <a:p>
             <a:r>
               <a:rPr lang="en-US" dirty="0"/>
-              <a:t>Training title</a:t>
+              <a:t>Best practices for data science on HPC</a:t>
             </a:r>
           </a:p>
         </p:txBody>
@@ -3745,8 +3745,8 @@
         </p:nvSpPr>
         <p:spPr>
           <a:xfrm>
-            <a:off x="3860836" y="5445224"/>
-            <a:ext cx="4779963" cy="707886"/>
+            <a:off x="3066751" y="5445224"/>
+            <a:ext cx="5765681" cy="707886"/>
           </a:xfrm>
           <a:prstGeom prst="rect">
             <a:avLst/>
@@ -3763,7 +3763,7 @@
               <a:rPr lang="en-US" sz="4000" dirty="0">
                 <a:hlinkClick r:id="rId2"/>
               </a:rPr>
-              <a:t>http://bit.ly/33Vx1T9</a:t>
+              <a:t>https://shorturl.at/Rb4Ni</a:t>
             </a:r>
             <a:r>
               <a:rPr lang="en-US" sz="4000" dirty="0"/>
@@ -3774,10 +3774,10 @@
       </p:sp>
       <p:pic>
         <p:nvPicPr>
-          <p:cNvPr id="5" name="Picture 4">
-            <a:extLst>
-              <a:ext uri="{FF2B5EF4-FFF2-40B4-BE49-F238E27FC236}">
-                <a16:creationId xmlns:a16="http://schemas.microsoft.com/office/drawing/2014/main" id="{3D905B4A-0AEC-4423-BF6A-5561652C3F29}"/>
+          <p:cNvPr id="3" name="Picture 2">
+            <a:extLst>
+              <a:ext uri="{FF2B5EF4-FFF2-40B4-BE49-F238E27FC236}">
+                <a16:creationId xmlns:a16="http://schemas.microsoft.com/office/drawing/2014/main" id="{16679C85-91D9-5467-5CA3-F1BD3EAAF104}"/>
               </a:ext>
             </a:extLst>
           </p:cNvPr>
@@ -3787,21 +3787,15 @@
           <p:nvPr/>
         </p:nvPicPr>
         <p:blipFill>
-          <a:blip r:embed="rId3">
-            <a:extLst>
-              <a:ext uri="{28A0092B-C50C-407E-A947-70E740481C1C}">
-                <a14:useLocalDpi xmlns:a14="http://schemas.microsoft.com/office/drawing/2010/main" val="0"/>
-              </a:ext>
-            </a:extLst>
-          </a:blip>
+          <a:blip r:embed="rId3"/>
           <a:stretch>
             <a:fillRect/>
           </a:stretch>
         </p:blipFill>
         <p:spPr>
           <a:xfrm>
-            <a:off x="4049477" y="980729"/>
-            <a:ext cx="4093046" cy="4093046"/>
+            <a:off x="3952875" y="1285875"/>
+            <a:ext cx="4286250" cy="4286250"/>
           </a:xfrm>
           <a:prstGeom prst="rect">
             <a:avLst/>

</xml_diff>

<commit_message>
Add slides on modules
</commit_message>
<xml_diff>
--- a/best_practices_for_data_science_on_hpc.pptx
+++ b/best_practices_for_data_science_on_hpc.pptx
@@ -4,12 +4,22 @@
   <p:sldMasterIdLst>
     <p:sldMasterId id="2147483648" r:id="rId1"/>
   </p:sldMasterIdLst>
+  <p:notesMasterIdLst>
+    <p:notesMasterId r:id="rId14"/>
+  </p:notesMasterIdLst>
   <p:sldIdLst>
     <p:sldId id="257" r:id="rId2"/>
     <p:sldId id="355" r:id="rId3"/>
     <p:sldId id="357" r:id="rId4"/>
     <p:sldId id="353" r:id="rId5"/>
     <p:sldId id="348" r:id="rId6"/>
+    <p:sldId id="358" r:id="rId7"/>
+    <p:sldId id="359" r:id="rId8"/>
+    <p:sldId id="360" r:id="rId9"/>
+    <p:sldId id="361" r:id="rId10"/>
+    <p:sldId id="362" r:id="rId11"/>
+    <p:sldId id="364" r:id="rId12"/>
+    <p:sldId id="365" r:id="rId13"/>
   </p:sldIdLst>
   <p:sldSz cx="12192000" cy="6858000"/>
   <p:notesSz cx="6858000" cy="9144000"/>
@@ -261,6 +271,356 @@
 </pc:chgInfo>
 </file>
 
+<file path=ppt/notesMasters/notesMaster1.xml><?xml version="1.0" encoding="utf-8"?>
+<p:notesMaster xmlns:a="http://schemas.openxmlformats.org/drawingml/2006/main" xmlns:r="http://schemas.openxmlformats.org/officeDocument/2006/relationships" xmlns:p="http://schemas.openxmlformats.org/presentationml/2006/main">
+  <p:cSld>
+    <p:bg>
+      <p:bgRef idx="1001">
+        <a:schemeClr val="bg1"/>
+      </p:bgRef>
+    </p:bg>
+    <p:spTree>
+      <p:nvGrpSpPr>
+        <p:cNvPr id="1" name=""/>
+        <p:cNvGrpSpPr/>
+        <p:nvPr/>
+      </p:nvGrpSpPr>
+      <p:grpSpPr>
+        <a:xfrm>
+          <a:off x="0" y="0"/>
+          <a:ext cx="0" cy="0"/>
+          <a:chOff x="0" y="0"/>
+          <a:chExt cx="0" cy="0"/>
+        </a:xfrm>
+      </p:grpSpPr>
+      <p:sp>
+        <p:nvSpPr>
+          <p:cNvPr id="2" name="Header Placeholder 1"/>
+          <p:cNvSpPr>
+            <a:spLocks noGrp="1"/>
+          </p:cNvSpPr>
+          <p:nvPr>
+            <p:ph type="hdr" sz="quarter"/>
+          </p:nvPr>
+        </p:nvSpPr>
+        <p:spPr>
+          <a:xfrm>
+            <a:off x="0" y="0"/>
+            <a:ext cx="2971800" cy="458788"/>
+          </a:xfrm>
+          <a:prstGeom prst="rect">
+            <a:avLst/>
+          </a:prstGeom>
+        </p:spPr>
+        <p:txBody>
+          <a:bodyPr vert="horz" lIns="91440" tIns="45720" rIns="91440" bIns="45720" rtlCol="0"/>
+          <a:lstStyle>
+            <a:lvl1pPr algn="l">
+              <a:defRPr sz="1200"/>
+            </a:lvl1pPr>
+          </a:lstStyle>
+          <a:p>
+            <a:endParaRPr lang="LID4096"/>
+          </a:p>
+        </p:txBody>
+      </p:sp>
+      <p:sp>
+        <p:nvSpPr>
+          <p:cNvPr id="3" name="Date Placeholder 2"/>
+          <p:cNvSpPr>
+            <a:spLocks noGrp="1"/>
+          </p:cNvSpPr>
+          <p:nvPr>
+            <p:ph type="dt" idx="1"/>
+          </p:nvPr>
+        </p:nvSpPr>
+        <p:spPr>
+          <a:xfrm>
+            <a:off x="3884613" y="0"/>
+            <a:ext cx="2971800" cy="458788"/>
+          </a:xfrm>
+          <a:prstGeom prst="rect">
+            <a:avLst/>
+          </a:prstGeom>
+        </p:spPr>
+        <p:txBody>
+          <a:bodyPr vert="horz" lIns="91440" tIns="45720" rIns="91440" bIns="45720" rtlCol="0"/>
+          <a:lstStyle>
+            <a:lvl1pPr algn="r">
+              <a:defRPr sz="1200"/>
+            </a:lvl1pPr>
+          </a:lstStyle>
+          <a:p>
+            <a:fld id="{AFA0CAC4-3EE0-4DC7-ABD6-D3D6E5AAAB9D}" type="datetimeFigureOut">
+              <a:rPr lang="LID4096" smtClean="0"/>
+              <a:t>05/21/2025</a:t>
+            </a:fld>
+            <a:endParaRPr lang="LID4096"/>
+          </a:p>
+        </p:txBody>
+      </p:sp>
+      <p:sp>
+        <p:nvSpPr>
+          <p:cNvPr id="4" name="Slide Image Placeholder 3"/>
+          <p:cNvSpPr>
+            <a:spLocks noGrp="1" noRot="1" noChangeAspect="1"/>
+          </p:cNvSpPr>
+          <p:nvPr>
+            <p:ph type="sldImg" idx="2"/>
+          </p:nvPr>
+        </p:nvSpPr>
+        <p:spPr>
+          <a:xfrm>
+            <a:off x="685800" y="1143000"/>
+            <a:ext cx="5486400" cy="3086100"/>
+          </a:xfrm>
+          <a:prstGeom prst="rect">
+            <a:avLst/>
+          </a:prstGeom>
+          <a:noFill/>
+          <a:ln w="12700">
+            <a:solidFill>
+              <a:prstClr val="black"/>
+            </a:solidFill>
+          </a:ln>
+        </p:spPr>
+        <p:txBody>
+          <a:bodyPr vert="horz" lIns="91440" tIns="45720" rIns="91440" bIns="45720" rtlCol="0" anchor="ctr"/>
+          <a:lstStyle/>
+          <a:p>
+            <a:endParaRPr lang="LID4096"/>
+          </a:p>
+        </p:txBody>
+      </p:sp>
+      <p:sp>
+        <p:nvSpPr>
+          <p:cNvPr id="5" name="Notes Placeholder 4"/>
+          <p:cNvSpPr>
+            <a:spLocks noGrp="1"/>
+          </p:cNvSpPr>
+          <p:nvPr>
+            <p:ph type="body" sz="quarter" idx="3"/>
+          </p:nvPr>
+        </p:nvSpPr>
+        <p:spPr>
+          <a:xfrm>
+            <a:off x="685800" y="4400550"/>
+            <a:ext cx="5486400" cy="3600450"/>
+          </a:xfrm>
+          <a:prstGeom prst="rect">
+            <a:avLst/>
+          </a:prstGeom>
+        </p:spPr>
+        <p:txBody>
+          <a:bodyPr vert="horz" lIns="91440" tIns="45720" rIns="91440" bIns="45720" rtlCol="0"/>
+          <a:lstStyle/>
+          <a:p>
+            <a:pPr lvl="0"/>
+            <a:r>
+              <a:rPr lang="en-US"/>
+              <a:t>Click to edit Master text styles</a:t>
+            </a:r>
+          </a:p>
+          <a:p>
+            <a:pPr lvl="1"/>
+            <a:r>
+              <a:rPr lang="en-US"/>
+              <a:t>Second level</a:t>
+            </a:r>
+          </a:p>
+          <a:p>
+            <a:pPr lvl="2"/>
+            <a:r>
+              <a:rPr lang="en-US"/>
+              <a:t>Third level</a:t>
+            </a:r>
+          </a:p>
+          <a:p>
+            <a:pPr lvl="3"/>
+            <a:r>
+              <a:rPr lang="en-US"/>
+              <a:t>Fourth level</a:t>
+            </a:r>
+          </a:p>
+          <a:p>
+            <a:pPr lvl="4"/>
+            <a:r>
+              <a:rPr lang="en-US"/>
+              <a:t>Fifth level</a:t>
+            </a:r>
+            <a:endParaRPr lang="LID4096"/>
+          </a:p>
+        </p:txBody>
+      </p:sp>
+      <p:sp>
+        <p:nvSpPr>
+          <p:cNvPr id="6" name="Footer Placeholder 5"/>
+          <p:cNvSpPr>
+            <a:spLocks noGrp="1"/>
+          </p:cNvSpPr>
+          <p:nvPr>
+            <p:ph type="ftr" sz="quarter" idx="4"/>
+          </p:nvPr>
+        </p:nvSpPr>
+        <p:spPr>
+          <a:xfrm>
+            <a:off x="0" y="8685213"/>
+            <a:ext cx="2971800" cy="458787"/>
+          </a:xfrm>
+          <a:prstGeom prst="rect">
+            <a:avLst/>
+          </a:prstGeom>
+        </p:spPr>
+        <p:txBody>
+          <a:bodyPr vert="horz" lIns="91440" tIns="45720" rIns="91440" bIns="45720" rtlCol="0" anchor="b"/>
+          <a:lstStyle>
+            <a:lvl1pPr algn="l">
+              <a:defRPr sz="1200"/>
+            </a:lvl1pPr>
+          </a:lstStyle>
+          <a:p>
+            <a:endParaRPr lang="LID4096"/>
+          </a:p>
+        </p:txBody>
+      </p:sp>
+      <p:sp>
+        <p:nvSpPr>
+          <p:cNvPr id="7" name="Slide Number Placeholder 6"/>
+          <p:cNvSpPr>
+            <a:spLocks noGrp="1"/>
+          </p:cNvSpPr>
+          <p:nvPr>
+            <p:ph type="sldNum" sz="quarter" idx="5"/>
+          </p:nvPr>
+        </p:nvSpPr>
+        <p:spPr>
+          <a:xfrm>
+            <a:off x="3884613" y="8685213"/>
+            <a:ext cx="2971800" cy="458787"/>
+          </a:xfrm>
+          <a:prstGeom prst="rect">
+            <a:avLst/>
+          </a:prstGeom>
+        </p:spPr>
+        <p:txBody>
+          <a:bodyPr vert="horz" lIns="91440" tIns="45720" rIns="91440" bIns="45720" rtlCol="0" anchor="b"/>
+          <a:lstStyle>
+            <a:lvl1pPr algn="r">
+              <a:defRPr sz="1200"/>
+            </a:lvl1pPr>
+          </a:lstStyle>
+          <a:p>
+            <a:fld id="{68056895-410F-405D-84A2-D17CA4EE9077}" type="slidenum">
+              <a:rPr lang="LID4096" smtClean="0"/>
+              <a:t>‹#›</a:t>
+            </a:fld>
+            <a:endParaRPr lang="LID4096"/>
+          </a:p>
+        </p:txBody>
+      </p:sp>
+    </p:spTree>
+    <p:extLst>
+      <p:ext uri="{BB962C8B-B14F-4D97-AF65-F5344CB8AC3E}">
+        <p14:creationId xmlns:p14="http://schemas.microsoft.com/office/powerpoint/2010/main" val="144990426"/>
+      </p:ext>
+    </p:extLst>
+  </p:cSld>
+  <p:clrMap bg1="lt1" tx1="dk1" bg2="lt2" tx2="dk2" accent1="accent1" accent2="accent2" accent3="accent3" accent4="accent4" accent5="accent5" accent6="accent6" hlink="hlink" folHlink="folHlink"/>
+  <p:notesStyle>
+    <a:lvl1pPr marL="0" algn="l" defTabSz="914400" rtl="0" eaLnBrk="1" latinLnBrk="0" hangingPunct="1">
+      <a:defRPr sz="1200" kern="1200">
+        <a:solidFill>
+          <a:schemeClr val="tx1"/>
+        </a:solidFill>
+        <a:latin typeface="+mn-lt"/>
+        <a:ea typeface="+mn-ea"/>
+        <a:cs typeface="+mn-cs"/>
+      </a:defRPr>
+    </a:lvl1pPr>
+    <a:lvl2pPr marL="457200" algn="l" defTabSz="914400" rtl="0" eaLnBrk="1" latinLnBrk="0" hangingPunct="1">
+      <a:defRPr sz="1200" kern="1200">
+        <a:solidFill>
+          <a:schemeClr val="tx1"/>
+        </a:solidFill>
+        <a:latin typeface="+mn-lt"/>
+        <a:ea typeface="+mn-ea"/>
+        <a:cs typeface="+mn-cs"/>
+      </a:defRPr>
+    </a:lvl2pPr>
+    <a:lvl3pPr marL="914400" algn="l" defTabSz="914400" rtl="0" eaLnBrk="1" latinLnBrk="0" hangingPunct="1">
+      <a:defRPr sz="1200" kern="1200">
+        <a:solidFill>
+          <a:schemeClr val="tx1"/>
+        </a:solidFill>
+        <a:latin typeface="+mn-lt"/>
+        <a:ea typeface="+mn-ea"/>
+        <a:cs typeface="+mn-cs"/>
+      </a:defRPr>
+    </a:lvl3pPr>
+    <a:lvl4pPr marL="1371600" algn="l" defTabSz="914400" rtl="0" eaLnBrk="1" latinLnBrk="0" hangingPunct="1">
+      <a:defRPr sz="1200" kern="1200">
+        <a:solidFill>
+          <a:schemeClr val="tx1"/>
+        </a:solidFill>
+        <a:latin typeface="+mn-lt"/>
+        <a:ea typeface="+mn-ea"/>
+        <a:cs typeface="+mn-cs"/>
+      </a:defRPr>
+    </a:lvl4pPr>
+    <a:lvl5pPr marL="1828800" algn="l" defTabSz="914400" rtl="0" eaLnBrk="1" latinLnBrk="0" hangingPunct="1">
+      <a:defRPr sz="1200" kern="1200">
+        <a:solidFill>
+          <a:schemeClr val="tx1"/>
+        </a:solidFill>
+        <a:latin typeface="+mn-lt"/>
+        <a:ea typeface="+mn-ea"/>
+        <a:cs typeface="+mn-cs"/>
+      </a:defRPr>
+    </a:lvl5pPr>
+    <a:lvl6pPr marL="2286000" algn="l" defTabSz="914400" rtl="0" eaLnBrk="1" latinLnBrk="0" hangingPunct="1">
+      <a:defRPr sz="1200" kern="1200">
+        <a:solidFill>
+          <a:schemeClr val="tx1"/>
+        </a:solidFill>
+        <a:latin typeface="+mn-lt"/>
+        <a:ea typeface="+mn-ea"/>
+        <a:cs typeface="+mn-cs"/>
+      </a:defRPr>
+    </a:lvl6pPr>
+    <a:lvl7pPr marL="2743200" algn="l" defTabSz="914400" rtl="0" eaLnBrk="1" latinLnBrk="0" hangingPunct="1">
+      <a:defRPr sz="1200" kern="1200">
+        <a:solidFill>
+          <a:schemeClr val="tx1"/>
+        </a:solidFill>
+        <a:latin typeface="+mn-lt"/>
+        <a:ea typeface="+mn-ea"/>
+        <a:cs typeface="+mn-cs"/>
+      </a:defRPr>
+    </a:lvl7pPr>
+    <a:lvl8pPr marL="3200400" algn="l" defTabSz="914400" rtl="0" eaLnBrk="1" latinLnBrk="0" hangingPunct="1">
+      <a:defRPr sz="1200" kern="1200">
+        <a:solidFill>
+          <a:schemeClr val="tx1"/>
+        </a:solidFill>
+        <a:latin typeface="+mn-lt"/>
+        <a:ea typeface="+mn-ea"/>
+        <a:cs typeface="+mn-cs"/>
+      </a:defRPr>
+    </a:lvl8pPr>
+    <a:lvl9pPr marL="3657600" algn="l" defTabSz="914400" rtl="0" eaLnBrk="1" latinLnBrk="0" hangingPunct="1">
+      <a:defRPr sz="1200" kern="1200">
+        <a:solidFill>
+          <a:schemeClr val="tx1"/>
+        </a:solidFill>
+        <a:latin typeface="+mn-lt"/>
+        <a:ea typeface="+mn-ea"/>
+        <a:cs typeface="+mn-cs"/>
+      </a:defRPr>
+    </a:lvl9pPr>
+  </p:notesStyle>
+</p:notesMaster>
+</file>
+
 <file path=ppt/slideLayouts/slideLayout1.xml><?xml version="1.0" encoding="utf-8"?>
 <p:sldLayout xmlns:a="http://schemas.openxmlformats.org/drawingml/2006/main" xmlns:r="http://schemas.openxmlformats.org/officeDocument/2006/relationships" xmlns:p="http://schemas.openxmlformats.org/presentationml/2006/main" type="title" preserve="1">
   <p:cSld name="Title Slide">
@@ -408,7 +768,7 @@
           <a:bodyPr/>
           <a:lstStyle/>
           <a:p>
-            <a:fld id="{2C83C82C-4DDC-4393-B222-DB7E9965CB13}" type="datetimeFigureOut">
+            <a:fld id="{D44F87C4-D0FF-4ABC-B333-BDD4A889DCA1}" type="datetime1">
               <a:rPr lang="LID4096" smtClean="0"/>
               <a:t>05/21/2025</a:t>
             </a:fld>
@@ -608,7 +968,7 @@
           <a:bodyPr/>
           <a:lstStyle/>
           <a:p>
-            <a:fld id="{2C83C82C-4DDC-4393-B222-DB7E9965CB13}" type="datetimeFigureOut">
+            <a:fld id="{C798A9AB-7D13-4A1F-BEC7-C733FF8E3B84}" type="datetime1">
               <a:rPr lang="LID4096" smtClean="0"/>
               <a:t>05/21/2025</a:t>
             </a:fld>
@@ -818,7 +1178,7 @@
           <a:bodyPr/>
           <a:lstStyle/>
           <a:p>
-            <a:fld id="{2C83C82C-4DDC-4393-B222-DB7E9965CB13}" type="datetimeFigureOut">
+            <a:fld id="{DB9488E1-5B48-4482-9C1F-FB8A64529493}" type="datetime1">
               <a:rPr lang="LID4096" smtClean="0"/>
               <a:t>05/21/2025</a:t>
             </a:fld>
@@ -1018,7 +1378,7 @@
           <a:bodyPr/>
           <a:lstStyle/>
           <a:p>
-            <a:fld id="{2C83C82C-4DDC-4393-B222-DB7E9965CB13}" type="datetimeFigureOut">
+            <a:fld id="{02E48E22-1479-48C4-B746-780F47AD5EC9}" type="datetime1">
               <a:rPr lang="LID4096" smtClean="0"/>
               <a:t>05/21/2025</a:t>
             </a:fld>
@@ -1294,7 +1654,7 @@
           <a:bodyPr/>
           <a:lstStyle/>
           <a:p>
-            <a:fld id="{2C83C82C-4DDC-4393-B222-DB7E9965CB13}" type="datetimeFigureOut">
+            <a:fld id="{ACFA5FA8-46CB-46C5-AAB0-0D899A830AB1}" type="datetime1">
               <a:rPr lang="LID4096" smtClean="0"/>
               <a:t>05/21/2025</a:t>
             </a:fld>
@@ -1562,7 +1922,7 @@
           <a:bodyPr/>
           <a:lstStyle/>
           <a:p>
-            <a:fld id="{2C83C82C-4DDC-4393-B222-DB7E9965CB13}" type="datetimeFigureOut">
+            <a:fld id="{C8250588-C4C6-4E7A-B27D-46BD5B8159A8}" type="datetime1">
               <a:rPr lang="LID4096" smtClean="0"/>
               <a:t>05/21/2025</a:t>
             </a:fld>
@@ -1977,7 +2337,7 @@
           <a:bodyPr/>
           <a:lstStyle/>
           <a:p>
-            <a:fld id="{2C83C82C-4DDC-4393-B222-DB7E9965CB13}" type="datetimeFigureOut">
+            <a:fld id="{72985A48-4465-48A8-AAD4-B9BEB580B31E}" type="datetime1">
               <a:rPr lang="LID4096" smtClean="0"/>
               <a:t>05/21/2025</a:t>
             </a:fld>
@@ -2119,7 +2479,7 @@
           <a:bodyPr/>
           <a:lstStyle/>
           <a:p>
-            <a:fld id="{2C83C82C-4DDC-4393-B222-DB7E9965CB13}" type="datetimeFigureOut">
+            <a:fld id="{566EFD7D-974A-4FEA-9103-2A0F722D35E4}" type="datetime1">
               <a:rPr lang="LID4096" smtClean="0"/>
               <a:t>05/21/2025</a:t>
             </a:fld>
@@ -2232,7 +2592,7 @@
           <a:bodyPr/>
           <a:lstStyle/>
           <a:p>
-            <a:fld id="{2C83C82C-4DDC-4393-B222-DB7E9965CB13}" type="datetimeFigureOut">
+            <a:fld id="{4601B35C-61E9-41E8-9D04-B075C63E69AD}" type="datetime1">
               <a:rPr lang="LID4096" smtClean="0"/>
               <a:t>05/21/2025</a:t>
             </a:fld>
@@ -2545,7 +2905,7 @@
           <a:bodyPr/>
           <a:lstStyle/>
           <a:p>
-            <a:fld id="{2C83C82C-4DDC-4393-B222-DB7E9965CB13}" type="datetimeFigureOut">
+            <a:fld id="{69A9A7E0-60EF-4A8E-B5EF-6F8166A81BDD}" type="datetime1">
               <a:rPr lang="LID4096" smtClean="0"/>
               <a:t>05/21/2025</a:t>
             </a:fld>
@@ -2834,7 +3194,7 @@
           <a:bodyPr/>
           <a:lstStyle/>
           <a:p>
-            <a:fld id="{2C83C82C-4DDC-4393-B222-DB7E9965CB13}" type="datetimeFigureOut">
+            <a:fld id="{437CDF53-035C-4F7E-91D9-70126BA0C501}" type="datetime1">
               <a:rPr lang="LID4096" smtClean="0"/>
               <a:t>05/21/2025</a:t>
             </a:fld>
@@ -3077,7 +3437,7 @@
             </a:lvl1pPr>
           </a:lstStyle>
           <a:p>
-            <a:fld id="{2C83C82C-4DDC-4393-B222-DB7E9965CB13}" type="datetimeFigureOut">
+            <a:fld id="{C4428A7A-D2AE-4E58-ACE6-968F47E7F9F9}" type="datetime1">
               <a:rPr lang="LID4096" smtClean="0"/>
               <a:t>05/21/2025</a:t>
             </a:fld>
@@ -3196,6 +3556,7 @@
     <p:sldLayoutId id="2147483658" r:id="rId10"/>
     <p:sldLayoutId id="2147483659" r:id="rId11"/>
   </p:sldLayoutIdLst>
+  <p:hf hdr="0" ftr="0" dt="0"/>
   <p:txStyles>
     <p:titleStyle>
       <a:lvl1pPr algn="l" defTabSz="914400" rtl="0" eaLnBrk="1" latinLnBrk="0" hangingPunct="1">
@@ -3684,10 +4045,1392 @@
           </a:extLst>
         </p:spPr>
       </p:pic>
+      <p:sp>
+        <p:nvSpPr>
+          <p:cNvPr id="7" name="Slide Number Placeholder 6">
+            <a:extLst>
+              <a:ext uri="{FF2B5EF4-FFF2-40B4-BE49-F238E27FC236}">
+                <a16:creationId xmlns:a16="http://schemas.microsoft.com/office/drawing/2014/main" id="{3272EFE9-E781-1682-D32E-9ABD249DD8DE}"/>
+              </a:ext>
+            </a:extLst>
+          </p:cNvPr>
+          <p:cNvSpPr>
+            <a:spLocks noGrp="1"/>
+          </p:cNvSpPr>
+          <p:nvPr>
+            <p:ph type="sldNum" sz="quarter" idx="12"/>
+          </p:nvPr>
+        </p:nvSpPr>
+        <p:spPr/>
+        <p:txBody>
+          <a:bodyPr/>
+          <a:lstStyle/>
+          <a:p>
+            <a:fld id="{9C7CE217-4467-4B8D-A735-B008FA7C4816}" type="slidenum">
+              <a:rPr lang="LID4096" smtClean="0"/>
+              <a:t>1</a:t>
+            </a:fld>
+            <a:endParaRPr lang="LID4096"/>
+          </a:p>
+        </p:txBody>
+      </p:sp>
     </p:spTree>
     <p:extLst>
       <p:ext uri="{BB962C8B-B14F-4D97-AF65-F5344CB8AC3E}">
         <p14:creationId xmlns:p14="http://schemas.microsoft.com/office/powerpoint/2010/main" val="695502024"/>
+      </p:ext>
+    </p:extLst>
+  </p:cSld>
+  <p:clrMapOvr>
+    <a:masterClrMapping/>
+  </p:clrMapOvr>
+</p:sld>
+</file>
+
+<file path=ppt/slides/slide10.xml><?xml version="1.0" encoding="utf-8"?>
+<p:sld xmlns:a="http://schemas.openxmlformats.org/drawingml/2006/main" xmlns:r="http://schemas.openxmlformats.org/officeDocument/2006/relationships" xmlns:p="http://schemas.openxmlformats.org/presentationml/2006/main">
+  <p:cSld>
+    <p:spTree>
+      <p:nvGrpSpPr>
+        <p:cNvPr id="1" name=""/>
+        <p:cNvGrpSpPr/>
+        <p:nvPr/>
+      </p:nvGrpSpPr>
+      <p:grpSpPr>
+        <a:xfrm>
+          <a:off x="0" y="0"/>
+          <a:ext cx="0" cy="0"/>
+          <a:chOff x="0" y="0"/>
+          <a:chExt cx="0" cy="0"/>
+        </a:xfrm>
+      </p:grpSpPr>
+      <p:sp>
+        <p:nvSpPr>
+          <p:cNvPr id="2" name="Title 1">
+            <a:extLst>
+              <a:ext uri="{FF2B5EF4-FFF2-40B4-BE49-F238E27FC236}">
+                <a16:creationId xmlns:a16="http://schemas.microsoft.com/office/drawing/2014/main" id="{51C54AE1-8F19-0BC8-9FFD-ABC1F221F7A8}"/>
+              </a:ext>
+            </a:extLst>
+          </p:cNvPr>
+          <p:cNvSpPr>
+            <a:spLocks noGrp="1"/>
+          </p:cNvSpPr>
+          <p:nvPr>
+            <p:ph type="title"/>
+          </p:nvPr>
+        </p:nvSpPr>
+        <p:spPr/>
+        <p:txBody>
+          <a:bodyPr/>
+          <a:lstStyle/>
+          <a:p>
+            <a:r>
+              <a:rPr lang="en-US" dirty="0"/>
+              <a:t>Data science software stack</a:t>
+            </a:r>
+            <a:endParaRPr lang="LID4096" dirty="0"/>
+          </a:p>
+        </p:txBody>
+      </p:sp>
+      <p:sp>
+        <p:nvSpPr>
+          <p:cNvPr id="3" name="Content Placeholder 2">
+            <a:extLst>
+              <a:ext uri="{FF2B5EF4-FFF2-40B4-BE49-F238E27FC236}">
+                <a16:creationId xmlns:a16="http://schemas.microsoft.com/office/drawing/2014/main" id="{68A5979B-7245-76AE-729B-7DD383F8A5E3}"/>
+              </a:ext>
+            </a:extLst>
+          </p:cNvPr>
+          <p:cNvSpPr>
+            <a:spLocks noGrp="1"/>
+          </p:cNvSpPr>
+          <p:nvPr>
+            <p:ph idx="1"/>
+          </p:nvPr>
+        </p:nvSpPr>
+        <p:spPr/>
+        <p:txBody>
+          <a:bodyPr/>
+          <a:lstStyle/>
+          <a:p>
+            <a:r>
+              <a:rPr lang="en-US" dirty="0"/>
+              <a:t>Mainly</a:t>
+            </a:r>
+          </a:p>
+          <a:p>
+            <a:pPr lvl="1"/>
+            <a:r>
+              <a:rPr lang="en-US" dirty="0"/>
+              <a:t>Python</a:t>
+            </a:r>
+          </a:p>
+          <a:p>
+            <a:pPr lvl="1"/>
+            <a:r>
+              <a:rPr lang="en-US" dirty="0"/>
+              <a:t>R</a:t>
+            </a:r>
+          </a:p>
+          <a:p>
+            <a:r>
+              <a:rPr lang="en-US" dirty="0"/>
+              <a:t>Packages</a:t>
+            </a:r>
+            <a:r>
+              <a:rPr lang="en-US" dirty="0">
+                <a:sym typeface="Symbol" panose="05050102010706020507" pitchFamily="18" charset="2"/>
+              </a:rPr>
+              <a:t></a:t>
+            </a:r>
+            <a:r>
+              <a:rPr lang="en-US" dirty="0"/>
+              <a:t> many packages</a:t>
+            </a:r>
+            <a:r>
+              <a:rPr lang="en-US" dirty="0">
+                <a:sym typeface="Symbol" panose="05050102010706020507" pitchFamily="18" charset="2"/>
+              </a:rPr>
+              <a:t> </a:t>
+            </a:r>
+            <a:r>
+              <a:rPr lang="en-US" dirty="0"/>
+              <a:t> more packages</a:t>
+            </a:r>
+          </a:p>
+          <a:p>
+            <a:r>
+              <a:rPr lang="en-US" dirty="0"/>
+              <a:t>Not exactly</a:t>
+            </a:r>
+          </a:p>
+          <a:p>
+            <a:pPr lvl="1"/>
+            <a:r>
+              <a:rPr lang="en-US" dirty="0"/>
+              <a:t>HPC-ready</a:t>
+            </a:r>
+          </a:p>
+          <a:p>
+            <a:pPr lvl="1"/>
+            <a:r>
+              <a:rPr lang="en-US" dirty="0"/>
+              <a:t>HPC-friendly</a:t>
+            </a:r>
+          </a:p>
+          <a:p>
+            <a:endParaRPr lang="LID4096" dirty="0"/>
+          </a:p>
+        </p:txBody>
+      </p:sp>
+      <p:sp>
+        <p:nvSpPr>
+          <p:cNvPr id="4" name="Slide Number Placeholder 3">
+            <a:extLst>
+              <a:ext uri="{FF2B5EF4-FFF2-40B4-BE49-F238E27FC236}">
+                <a16:creationId xmlns:a16="http://schemas.microsoft.com/office/drawing/2014/main" id="{5F1F2A22-E79B-6C24-A5B4-75169E4A4E52}"/>
+              </a:ext>
+            </a:extLst>
+          </p:cNvPr>
+          <p:cNvSpPr>
+            <a:spLocks noGrp="1"/>
+          </p:cNvSpPr>
+          <p:nvPr>
+            <p:ph type="sldNum" sz="quarter" idx="12"/>
+          </p:nvPr>
+        </p:nvSpPr>
+        <p:spPr/>
+        <p:txBody>
+          <a:bodyPr/>
+          <a:lstStyle/>
+          <a:p>
+            <a:fld id="{9C7CE217-4467-4B8D-A735-B008FA7C4816}" type="slidenum">
+              <a:rPr lang="LID4096" smtClean="0"/>
+              <a:t>10</a:t>
+            </a:fld>
+            <a:endParaRPr lang="LID4096"/>
+          </a:p>
+        </p:txBody>
+      </p:sp>
+    </p:spTree>
+    <p:extLst>
+      <p:ext uri="{BB962C8B-B14F-4D97-AF65-F5344CB8AC3E}">
+        <p14:creationId xmlns:p14="http://schemas.microsoft.com/office/powerpoint/2010/main" val="2548978445"/>
+      </p:ext>
+    </p:extLst>
+  </p:cSld>
+  <p:clrMapOvr>
+    <a:masterClrMapping/>
+  </p:clrMapOvr>
+</p:sld>
+</file>
+
+<file path=ppt/slides/slide11.xml><?xml version="1.0" encoding="utf-8"?>
+<p:sld xmlns:a="http://schemas.openxmlformats.org/drawingml/2006/main" xmlns:r="http://schemas.openxmlformats.org/officeDocument/2006/relationships" xmlns:p="http://schemas.openxmlformats.org/presentationml/2006/main">
+  <p:cSld>
+    <p:spTree>
+      <p:nvGrpSpPr>
+        <p:cNvPr id="1" name=""/>
+        <p:cNvGrpSpPr/>
+        <p:nvPr/>
+      </p:nvGrpSpPr>
+      <p:grpSpPr>
+        <a:xfrm>
+          <a:off x="0" y="0"/>
+          <a:ext cx="0" cy="0"/>
+          <a:chOff x="0" y="0"/>
+          <a:chExt cx="0" cy="0"/>
+        </a:xfrm>
+      </p:grpSpPr>
+      <p:sp>
+        <p:nvSpPr>
+          <p:cNvPr id="2" name="Title 1">
+            <a:extLst>
+              <a:ext uri="{FF2B5EF4-FFF2-40B4-BE49-F238E27FC236}">
+                <a16:creationId xmlns:a16="http://schemas.microsoft.com/office/drawing/2014/main" id="{6A4E4FB0-D4D9-8C9A-CCA8-4E1049D53ED5}"/>
+              </a:ext>
+            </a:extLst>
+          </p:cNvPr>
+          <p:cNvSpPr>
+            <a:spLocks noGrp="1"/>
+          </p:cNvSpPr>
+          <p:nvPr>
+            <p:ph type="title"/>
+          </p:nvPr>
+        </p:nvSpPr>
+        <p:spPr/>
+        <p:txBody>
+          <a:bodyPr/>
+          <a:lstStyle/>
+          <a:p>
+            <a:r>
+              <a:rPr lang="en-US" dirty="0"/>
+              <a:t>Modules</a:t>
+            </a:r>
+            <a:endParaRPr lang="LID4096" dirty="0"/>
+          </a:p>
+        </p:txBody>
+      </p:sp>
+      <p:sp>
+        <p:nvSpPr>
+          <p:cNvPr id="3" name="Content Placeholder 2">
+            <a:extLst>
+              <a:ext uri="{FF2B5EF4-FFF2-40B4-BE49-F238E27FC236}">
+                <a16:creationId xmlns:a16="http://schemas.microsoft.com/office/drawing/2014/main" id="{B8BC8460-3442-3102-41FB-3742F191148F}"/>
+              </a:ext>
+            </a:extLst>
+          </p:cNvPr>
+          <p:cNvSpPr>
+            <a:spLocks noGrp="1"/>
+          </p:cNvSpPr>
+          <p:nvPr>
+            <p:ph idx="1"/>
+          </p:nvPr>
+        </p:nvSpPr>
+        <p:spPr/>
+        <p:txBody>
+          <a:bodyPr/>
+          <a:lstStyle/>
+          <a:p>
+            <a:r>
+              <a:rPr lang="en-US" dirty="0"/>
+              <a:t>Use installed modules, when possible, e.g.,</a:t>
+            </a:r>
+          </a:p>
+          <a:p>
+            <a:pPr lvl="1"/>
+            <a:r>
+              <a:rPr lang="fr-BE" dirty="0">
+                <a:latin typeface="Courier New" panose="02070309020205020404" pitchFamily="49" charset="0"/>
+                <a:cs typeface="Courier New" panose="02070309020205020404" pitchFamily="49" charset="0"/>
+              </a:rPr>
+              <a:t>R/4.4.0-gfbf-2023a</a:t>
+            </a:r>
+          </a:p>
+          <a:p>
+            <a:pPr lvl="1"/>
+            <a:r>
+              <a:rPr lang="en-US" dirty="0">
+                <a:latin typeface="Courier New" panose="02070309020205020404" pitchFamily="49" charset="0"/>
+                <a:cs typeface="Courier New" panose="02070309020205020404" pitchFamily="49" charset="0"/>
+              </a:rPr>
+              <a:t>Python/3.12.3-GCCcore-13.3.0</a:t>
+            </a:r>
+          </a:p>
+          <a:p>
+            <a:r>
+              <a:rPr lang="en-US" dirty="0"/>
+              <a:t>Use package bundles, e.g.,</a:t>
+            </a:r>
+          </a:p>
+          <a:p>
+            <a:pPr lvl="1"/>
+            <a:r>
+              <a:rPr lang="fr-BE" dirty="0">
+                <a:latin typeface="Courier New" panose="02070309020205020404" pitchFamily="49" charset="0"/>
+                <a:cs typeface="Courier New" panose="02070309020205020404" pitchFamily="49" charset="0"/>
+              </a:rPr>
+              <a:t>R-bundle-CRAN/2023.12-foss-2023a</a:t>
+            </a:r>
+          </a:p>
+          <a:p>
+            <a:pPr lvl="1"/>
+            <a:r>
+              <a:rPr lang="en-US" dirty="0">
+                <a:latin typeface="Courier New" panose="02070309020205020404" pitchFamily="49" charset="0"/>
+                <a:cs typeface="Courier New" panose="02070309020205020404" pitchFamily="49" charset="0"/>
+              </a:rPr>
+              <a:t>SciPy-bundle/2024.05-gfbf-2024a</a:t>
+            </a:r>
+          </a:p>
+          <a:p>
+            <a:r>
+              <a:rPr lang="en-US" dirty="0"/>
+              <a:t>Use additional modules, e.g.,</a:t>
+            </a:r>
+          </a:p>
+          <a:p>
+            <a:pPr lvl="1"/>
+            <a:r>
+              <a:rPr lang="en-US" dirty="0">
+                <a:latin typeface="Courier New" panose="02070309020205020404" pitchFamily="49" charset="0"/>
+                <a:cs typeface="Courier New" panose="02070309020205020404" pitchFamily="49" charset="0"/>
+              </a:rPr>
+              <a:t>TensorFlow/2.15.1-foss-2023a-CUDA-12.1.1</a:t>
+            </a:r>
+          </a:p>
+          <a:p>
+            <a:pPr lvl="1"/>
+            <a:r>
+              <a:rPr lang="en-US" dirty="0">
+                <a:latin typeface="Courier New" panose="02070309020205020404" pitchFamily="49" charset="0"/>
+                <a:cs typeface="Courier New" panose="02070309020205020404" pitchFamily="49" charset="0"/>
+              </a:rPr>
+              <a:t>matplotlib/3.9.2-gfbf-2024a</a:t>
+            </a:r>
+          </a:p>
+        </p:txBody>
+      </p:sp>
+      <p:sp>
+        <p:nvSpPr>
+          <p:cNvPr id="4" name="TextBox 3">
+            <a:extLst>
+              <a:ext uri="{FF2B5EF4-FFF2-40B4-BE49-F238E27FC236}">
+                <a16:creationId xmlns:a16="http://schemas.microsoft.com/office/drawing/2014/main" id="{36EC73E5-41E2-D442-7611-AC0633BD9D89}"/>
+              </a:ext>
+            </a:extLst>
+          </p:cNvPr>
+          <p:cNvSpPr txBox="1"/>
+          <p:nvPr/>
+        </p:nvSpPr>
+        <p:spPr>
+          <a:xfrm rot="1009166">
+            <a:off x="8382909" y="2890390"/>
+            <a:ext cx="2960875" cy="1077218"/>
+          </a:xfrm>
+          <a:prstGeom prst="rect">
+            <a:avLst/>
+          </a:prstGeom>
+          <a:solidFill>
+            <a:srgbClr val="EBBE83"/>
+          </a:solidFill>
+          <a:ln>
+            <a:solidFill>
+              <a:schemeClr val="tx1"/>
+            </a:solidFill>
+          </a:ln>
+          <a:effectLst>
+            <a:outerShdw blurRad="50800" dist="38100" dir="2700000" algn="tl" rotWithShape="0">
+              <a:prstClr val="black">
+                <a:alpha val="40000"/>
+              </a:prstClr>
+            </a:outerShdw>
+          </a:effectLst>
+        </p:spPr>
+        <p:txBody>
+          <a:bodyPr wrap="none" rtlCol="0">
+            <a:spAutoFit/>
+          </a:bodyPr>
+          <a:lstStyle/>
+          <a:p>
+            <a:r>
+              <a:rPr lang="en-US" sz="3200" dirty="0"/>
+              <a:t>Much, but likely</a:t>
+            </a:r>
+            <a:br>
+              <a:rPr lang="en-US" sz="3200" dirty="0"/>
+            </a:br>
+            <a:r>
+              <a:rPr lang="en-US" sz="3200" dirty="0"/>
+              <a:t>not all</a:t>
+            </a:r>
+            <a:endParaRPr lang="LID4096" sz="3200" dirty="0"/>
+          </a:p>
+        </p:txBody>
+      </p:sp>
+      <p:sp>
+        <p:nvSpPr>
+          <p:cNvPr id="5" name="Slide Number Placeholder 4">
+            <a:extLst>
+              <a:ext uri="{FF2B5EF4-FFF2-40B4-BE49-F238E27FC236}">
+                <a16:creationId xmlns:a16="http://schemas.microsoft.com/office/drawing/2014/main" id="{AEFBEE10-594A-0164-043D-803AEE126DC3}"/>
+              </a:ext>
+            </a:extLst>
+          </p:cNvPr>
+          <p:cNvSpPr>
+            <a:spLocks noGrp="1"/>
+          </p:cNvSpPr>
+          <p:nvPr>
+            <p:ph type="sldNum" sz="quarter" idx="12"/>
+          </p:nvPr>
+        </p:nvSpPr>
+        <p:spPr/>
+        <p:txBody>
+          <a:bodyPr/>
+          <a:lstStyle/>
+          <a:p>
+            <a:fld id="{9C7CE217-4467-4B8D-A735-B008FA7C4816}" type="slidenum">
+              <a:rPr lang="LID4096" smtClean="0"/>
+              <a:t>11</a:t>
+            </a:fld>
+            <a:endParaRPr lang="LID4096"/>
+          </a:p>
+        </p:txBody>
+      </p:sp>
+    </p:spTree>
+    <p:extLst>
+      <p:ext uri="{BB962C8B-B14F-4D97-AF65-F5344CB8AC3E}">
+        <p14:creationId xmlns:p14="http://schemas.microsoft.com/office/powerpoint/2010/main" val="81425153"/>
+      </p:ext>
+    </p:extLst>
+  </p:cSld>
+  <p:clrMapOvr>
+    <a:masterClrMapping/>
+  </p:clrMapOvr>
+</p:sld>
+</file>
+
+<file path=ppt/slides/slide12.xml><?xml version="1.0" encoding="utf-8"?>
+<p:sld xmlns:a="http://schemas.openxmlformats.org/drawingml/2006/main" xmlns:r="http://schemas.openxmlformats.org/officeDocument/2006/relationships" xmlns:p="http://schemas.openxmlformats.org/presentationml/2006/main">
+  <p:cSld>
+    <p:spTree>
+      <p:nvGrpSpPr>
+        <p:cNvPr id="1" name=""/>
+        <p:cNvGrpSpPr/>
+        <p:nvPr/>
+      </p:nvGrpSpPr>
+      <p:grpSpPr>
+        <a:xfrm>
+          <a:off x="0" y="0"/>
+          <a:ext cx="0" cy="0"/>
+          <a:chOff x="0" y="0"/>
+          <a:chExt cx="0" cy="0"/>
+        </a:xfrm>
+      </p:grpSpPr>
+      <p:sp>
+        <p:nvSpPr>
+          <p:cNvPr id="2" name="Title 1">
+            <a:extLst>
+              <a:ext uri="{FF2B5EF4-FFF2-40B4-BE49-F238E27FC236}">
+                <a16:creationId xmlns:a16="http://schemas.microsoft.com/office/drawing/2014/main" id="{B92D361E-5725-81AD-1613-A54CB4F70245}"/>
+              </a:ext>
+            </a:extLst>
+          </p:cNvPr>
+          <p:cNvSpPr>
+            <a:spLocks noGrp="1"/>
+          </p:cNvSpPr>
+          <p:nvPr>
+            <p:ph type="title"/>
+          </p:nvPr>
+        </p:nvSpPr>
+        <p:spPr/>
+        <p:txBody>
+          <a:bodyPr/>
+          <a:lstStyle/>
+          <a:p>
+            <a:r>
+              <a:rPr lang="en-US" dirty="0"/>
+              <a:t>Job script modules best practices</a:t>
+            </a:r>
+            <a:endParaRPr lang="LID4096" dirty="0"/>
+          </a:p>
+        </p:txBody>
+      </p:sp>
+      <p:grpSp>
+        <p:nvGrpSpPr>
+          <p:cNvPr id="5" name="Group 4">
+            <a:extLst>
+              <a:ext uri="{FF2B5EF4-FFF2-40B4-BE49-F238E27FC236}">
+                <a16:creationId xmlns:a16="http://schemas.microsoft.com/office/drawing/2014/main" id="{F09ED52B-3ACD-0A4C-4132-EFF7655D1CD1}"/>
+              </a:ext>
+            </a:extLst>
+          </p:cNvPr>
+          <p:cNvGrpSpPr/>
+          <p:nvPr/>
+        </p:nvGrpSpPr>
+        <p:grpSpPr>
+          <a:xfrm>
+            <a:off x="1415143" y="1997839"/>
+            <a:ext cx="8795657" cy="3416320"/>
+            <a:chOff x="1055914" y="2169659"/>
+            <a:chExt cx="8795657" cy="3416320"/>
+          </a:xfrm>
+        </p:grpSpPr>
+        <p:sp>
+          <p:nvSpPr>
+            <p:cNvPr id="3" name="TextBox 2">
+              <a:extLst>
+                <a:ext uri="{FF2B5EF4-FFF2-40B4-BE49-F238E27FC236}">
+                  <a16:creationId xmlns:a16="http://schemas.microsoft.com/office/drawing/2014/main" id="{0BEA7CB0-AAB9-88B7-C0B4-690F2AC8B245}"/>
+                </a:ext>
+              </a:extLst>
+            </p:cNvPr>
+            <p:cNvSpPr txBox="1"/>
+            <p:nvPr/>
+          </p:nvSpPr>
+          <p:spPr>
+            <a:xfrm>
+              <a:off x="1055914" y="2169659"/>
+              <a:ext cx="8795657" cy="3416320"/>
+            </a:xfrm>
+            <a:prstGeom prst="rect">
+              <a:avLst/>
+            </a:prstGeom>
+            <a:solidFill>
+              <a:schemeClr val="bg1">
+                <a:lumMod val="85000"/>
+              </a:schemeClr>
+            </a:solidFill>
+            <a:ln>
+              <a:solidFill>
+                <a:schemeClr val="tx1"/>
+              </a:solidFill>
+            </a:ln>
+          </p:spPr>
+          <p:txBody>
+            <a:bodyPr wrap="square" rtlCol="0">
+              <a:spAutoFit/>
+            </a:bodyPr>
+            <a:lstStyle/>
+            <a:p>
+              <a:pPr lvl="0">
+                <a:defRPr/>
+              </a:pPr>
+              <a:r>
+                <a:rPr lang="en-US" dirty="0">
+                  <a:solidFill>
+                    <a:prstClr val="black"/>
+                  </a:solidFill>
+                  <a:latin typeface="Courier New" pitchFamily="49" charset="0"/>
+                  <a:cs typeface="Courier New" pitchFamily="49" charset="0"/>
+                </a:rPr>
+                <a:t>#!/usr/bin/env -S bash -l</a:t>
+              </a:r>
+            </a:p>
+            <a:p>
+              <a:pPr lvl="0">
+                <a:defRPr/>
+              </a:pPr>
+              <a:r>
+                <a:rPr lang="en-US" dirty="0">
+                  <a:solidFill>
+                    <a:prstClr val="black"/>
+                  </a:solidFill>
+                  <a:latin typeface="Courier New" pitchFamily="49" charset="0"/>
+                  <a:cs typeface="Courier New" pitchFamily="49" charset="0"/>
+                </a:rPr>
+                <a:t>#SBATCH --account=&lt;</a:t>
+              </a:r>
+              <a:r>
+                <a:rPr lang="en-US" dirty="0" err="1">
+                  <a:solidFill>
+                    <a:prstClr val="black"/>
+                  </a:solidFill>
+                  <a:latin typeface="Courier New" pitchFamily="49" charset="0"/>
+                  <a:cs typeface="Courier New" pitchFamily="49" charset="0"/>
+                </a:rPr>
+                <a:t>your_account</a:t>
+              </a:r>
+              <a:r>
+                <a:rPr lang="en-US" dirty="0">
+                  <a:solidFill>
+                    <a:prstClr val="black"/>
+                  </a:solidFill>
+                  <a:latin typeface="Courier New" pitchFamily="49" charset="0"/>
+                  <a:cs typeface="Courier New" pitchFamily="49" charset="0"/>
+                </a:rPr>
+                <a:t>&gt;</a:t>
+              </a:r>
+            </a:p>
+            <a:p>
+              <a:pPr lvl="0">
+                <a:defRPr/>
+              </a:pPr>
+              <a:r>
+                <a:rPr lang="en-US" dirty="0">
+                  <a:solidFill>
+                    <a:prstClr val="black"/>
+                  </a:solidFill>
+                  <a:latin typeface="Courier New" pitchFamily="49" charset="0"/>
+                  <a:cs typeface="Courier New" pitchFamily="49" charset="0"/>
+                </a:rPr>
+                <a:t>#SBATCH --cluster=&lt;</a:t>
+              </a:r>
+              <a:r>
+                <a:rPr lang="en-US" dirty="0" err="1">
+                  <a:solidFill>
+                    <a:prstClr val="black"/>
+                  </a:solidFill>
+                  <a:latin typeface="Courier New" pitchFamily="49" charset="0"/>
+                  <a:cs typeface="Courier New" pitchFamily="49" charset="0"/>
+                </a:rPr>
+                <a:t>your_cluster</a:t>
+              </a:r>
+              <a:r>
+                <a:rPr lang="en-US" dirty="0">
+                  <a:solidFill>
+                    <a:prstClr val="black"/>
+                  </a:solidFill>
+                  <a:latin typeface="Courier New" pitchFamily="49" charset="0"/>
+                  <a:cs typeface="Courier New" pitchFamily="49" charset="0"/>
+                </a:rPr>
+                <a:t>&gt;</a:t>
+              </a:r>
+            </a:p>
+            <a:p>
+              <a:pPr lvl="0">
+                <a:defRPr/>
+              </a:pPr>
+              <a:r>
+                <a:rPr lang="en-US" dirty="0">
+                  <a:solidFill>
+                    <a:prstClr val="black"/>
+                  </a:solidFill>
+                  <a:latin typeface="Courier New" pitchFamily="49" charset="0"/>
+                  <a:cs typeface="Courier New" pitchFamily="49" charset="0"/>
+                </a:rPr>
+                <a:t>#SBATCH --time=00:02:00</a:t>
+              </a:r>
+            </a:p>
+            <a:p>
+              <a:pPr lvl="0">
+                <a:defRPr/>
+              </a:pPr>
+              <a:r>
+                <a:rPr lang="en-US" dirty="0">
+                  <a:solidFill>
+                    <a:prstClr val="black"/>
+                  </a:solidFill>
+                  <a:latin typeface="Courier New" pitchFamily="49" charset="0"/>
+                  <a:cs typeface="Courier New" pitchFamily="49" charset="0"/>
+                  <a:sym typeface="Symbol" panose="05050102010706020507" pitchFamily="18" charset="2"/>
+                </a:rPr>
+                <a:t></a:t>
+              </a:r>
+              <a:endParaRPr lang="en-US" dirty="0">
+                <a:solidFill>
+                  <a:prstClr val="black"/>
+                </a:solidFill>
+                <a:latin typeface="Courier New" pitchFamily="49" charset="0"/>
+                <a:cs typeface="Courier New" pitchFamily="49" charset="0"/>
+              </a:endParaRPr>
+            </a:p>
+            <a:p>
+              <a:pPr lvl="0">
+                <a:defRPr/>
+              </a:pPr>
+              <a:endParaRPr lang="en-US" dirty="0">
+                <a:solidFill>
+                  <a:prstClr val="black"/>
+                </a:solidFill>
+                <a:latin typeface="Courier New" pitchFamily="49" charset="0"/>
+                <a:cs typeface="Courier New" pitchFamily="49" charset="0"/>
+              </a:endParaRPr>
+            </a:p>
+            <a:p>
+              <a:pPr lvl="0">
+                <a:defRPr/>
+              </a:pPr>
+              <a:r>
+                <a:rPr lang="en-US" dirty="0">
+                  <a:solidFill>
+                    <a:prstClr val="black"/>
+                  </a:solidFill>
+                  <a:latin typeface="Courier New" pitchFamily="49" charset="0"/>
+                  <a:cs typeface="Courier New" pitchFamily="49" charset="0"/>
+                </a:rPr>
+                <a:t># first clean up your environment</a:t>
+              </a:r>
+            </a:p>
+            <a:p>
+              <a:pPr lvl="0">
+                <a:defRPr/>
+              </a:pPr>
+              <a:r>
+                <a:rPr lang="en-US" dirty="0">
+                  <a:solidFill>
+                    <a:prstClr val="black"/>
+                  </a:solidFill>
+                  <a:latin typeface="Courier New" pitchFamily="49" charset="0"/>
+                  <a:cs typeface="Courier New" pitchFamily="49" charset="0"/>
+                </a:rPr>
+                <a:t>module purge &amp;&gt; /dev/null</a:t>
+              </a:r>
+            </a:p>
+            <a:p>
+              <a:pPr lvl="0">
+                <a:defRPr/>
+              </a:pPr>
+              <a:endParaRPr lang="en-US" dirty="0">
+                <a:solidFill>
+                  <a:prstClr val="black"/>
+                </a:solidFill>
+                <a:latin typeface="Courier New" pitchFamily="49" charset="0"/>
+                <a:cs typeface="Courier New" pitchFamily="49" charset="0"/>
+              </a:endParaRPr>
+            </a:p>
+            <a:p>
+              <a:pPr lvl="0">
+                <a:defRPr/>
+              </a:pPr>
+              <a:r>
+                <a:rPr lang="en-US" dirty="0">
+                  <a:solidFill>
+                    <a:prstClr val="black"/>
+                  </a:solidFill>
+                  <a:latin typeface="Courier New" pitchFamily="49" charset="0"/>
+                  <a:cs typeface="Courier New" pitchFamily="49" charset="0"/>
+                </a:rPr>
+                <a:t># load </a:t>
+              </a:r>
+              <a:r>
+                <a:rPr lang="en-US" b="1" dirty="0">
+                  <a:solidFill>
+                    <a:prstClr val="black"/>
+                  </a:solidFill>
+                  <a:latin typeface="Courier New" pitchFamily="49" charset="0"/>
+                  <a:cs typeface="Courier New" pitchFamily="49" charset="0"/>
+                </a:rPr>
+                <a:t>only</a:t>
+              </a:r>
+              <a:r>
+                <a:rPr lang="en-US" dirty="0">
+                  <a:solidFill>
+                    <a:prstClr val="black"/>
+                  </a:solidFill>
+                  <a:latin typeface="Courier New" pitchFamily="49" charset="0"/>
+                  <a:cs typeface="Courier New" pitchFamily="49" charset="0"/>
+                </a:rPr>
+                <a:t> the modules you need</a:t>
+              </a:r>
+            </a:p>
+            <a:p>
+              <a:pPr lvl="0">
+                <a:defRPr/>
+              </a:pPr>
+              <a:r>
+                <a:rPr lang="en-US" dirty="0">
+                  <a:solidFill>
+                    <a:prstClr val="black"/>
+                  </a:solidFill>
+                  <a:latin typeface="Courier New" pitchFamily="49" charset="0"/>
+                  <a:cs typeface="Courier New" pitchFamily="49" charset="0"/>
+                </a:rPr>
+                <a:t>module load </a:t>
+              </a:r>
+              <a:r>
+                <a:rPr lang="fr-BE" dirty="0">
+                  <a:latin typeface="Courier New" panose="02070309020205020404" pitchFamily="49" charset="0"/>
+                  <a:cs typeface="Courier New" panose="02070309020205020404" pitchFamily="49" charset="0"/>
+                </a:rPr>
+                <a:t>R-bundle-CRAN/2023.12-foss-2023a</a:t>
+              </a:r>
+            </a:p>
+            <a:p>
+              <a:pPr lvl="0">
+                <a:defRPr/>
+              </a:pPr>
+              <a:r>
+                <a:rPr lang="en-US" dirty="0">
+                  <a:solidFill>
+                    <a:prstClr val="black"/>
+                  </a:solidFill>
+                  <a:latin typeface="Courier New" pitchFamily="49" charset="0"/>
+                  <a:cs typeface="Courier New" pitchFamily="49" charset="0"/>
+                  <a:sym typeface="Symbol" panose="05050102010706020507" pitchFamily="18" charset="2"/>
+                </a:rPr>
+                <a:t></a:t>
+              </a:r>
+              <a:endParaRPr lang="en-US" dirty="0">
+                <a:solidFill>
+                  <a:prstClr val="black"/>
+                </a:solidFill>
+                <a:latin typeface="Courier New" pitchFamily="49" charset="0"/>
+                <a:cs typeface="Courier New" pitchFamily="49" charset="0"/>
+              </a:endParaRPr>
+            </a:p>
+          </p:txBody>
+        </p:sp>
+        <p:sp>
+          <p:nvSpPr>
+            <p:cNvPr id="4" name="TextBox 3">
+              <a:extLst>
+                <a:ext uri="{FF2B5EF4-FFF2-40B4-BE49-F238E27FC236}">
+                  <a16:creationId xmlns:a16="http://schemas.microsoft.com/office/drawing/2014/main" id="{77AFADC8-4BDD-F70C-16C0-6AA4905CCC70}"/>
+                </a:ext>
+              </a:extLst>
+            </p:cNvPr>
+            <p:cNvSpPr txBox="1"/>
+            <p:nvPr/>
+          </p:nvSpPr>
+          <p:spPr>
+            <a:xfrm>
+              <a:off x="7815436" y="2169659"/>
+              <a:ext cx="2036135" cy="338554"/>
+            </a:xfrm>
+            <a:prstGeom prst="rect">
+              <a:avLst/>
+            </a:prstGeom>
+            <a:solidFill>
+              <a:schemeClr val="bg1"/>
+            </a:solidFill>
+            <a:ln>
+              <a:solidFill>
+                <a:schemeClr val="tx1"/>
+              </a:solidFill>
+            </a:ln>
+          </p:spPr>
+          <p:txBody>
+            <a:bodyPr wrap="none" rtlCol="0">
+              <a:spAutoFit/>
+            </a:bodyPr>
+            <a:lstStyle/>
+            <a:p>
+              <a:r>
+                <a:rPr lang="en-US" sz="1600" dirty="0" err="1">
+                  <a:latin typeface="Courier New" panose="02070309020205020404" pitchFamily="49" charset="0"/>
+                  <a:cs typeface="Courier New" panose="02070309020205020404" pitchFamily="49" charset="0"/>
+                </a:rPr>
+                <a:t>jobscript.slurm</a:t>
+              </a:r>
+              <a:endParaRPr lang="LID4096" sz="1600" dirty="0">
+                <a:latin typeface="Courier New" panose="02070309020205020404" pitchFamily="49" charset="0"/>
+                <a:cs typeface="Courier New" panose="02070309020205020404" pitchFamily="49" charset="0"/>
+              </a:endParaRPr>
+            </a:p>
+          </p:txBody>
+        </p:sp>
+      </p:grpSp>
+      <p:grpSp>
+        <p:nvGrpSpPr>
+          <p:cNvPr id="18" name="Group 17">
+            <a:extLst>
+              <a:ext uri="{FF2B5EF4-FFF2-40B4-BE49-F238E27FC236}">
+                <a16:creationId xmlns:a16="http://schemas.microsoft.com/office/drawing/2014/main" id="{0CF8A9C7-3DF9-27F0-02D0-07666A27E0A4}"/>
+              </a:ext>
+            </a:extLst>
+          </p:cNvPr>
+          <p:cNvGrpSpPr/>
+          <p:nvPr/>
+        </p:nvGrpSpPr>
+        <p:grpSpPr>
+          <a:xfrm>
+            <a:off x="5638800" y="2439565"/>
+            <a:ext cx="6553200" cy="1675235"/>
+            <a:chOff x="5638800" y="2439565"/>
+            <a:chExt cx="6553200" cy="1675235"/>
+          </a:xfrm>
+        </p:grpSpPr>
+        <p:grpSp>
+          <p:nvGrpSpPr>
+            <p:cNvPr id="6" name="Group 5">
+              <a:extLst>
+                <a:ext uri="{FF2B5EF4-FFF2-40B4-BE49-F238E27FC236}">
+                  <a16:creationId xmlns:a16="http://schemas.microsoft.com/office/drawing/2014/main" id="{9974C461-1C87-51F8-5E7F-1D2BDF74AE74}"/>
+                </a:ext>
+              </a:extLst>
+            </p:cNvPr>
+            <p:cNvGrpSpPr/>
+            <p:nvPr/>
+          </p:nvGrpSpPr>
+          <p:grpSpPr>
+            <a:xfrm>
+              <a:off x="5638800" y="2979099"/>
+              <a:ext cx="6238181" cy="1135701"/>
+              <a:chOff x="-450540" y="5535406"/>
+              <a:chExt cx="6238181" cy="1135701"/>
+            </a:xfrm>
+          </p:grpSpPr>
+          <p:sp>
+            <p:nvSpPr>
+              <p:cNvPr id="9" name="TextBox 8">
+                <a:extLst>
+                  <a:ext uri="{FF2B5EF4-FFF2-40B4-BE49-F238E27FC236}">
+                    <a16:creationId xmlns:a16="http://schemas.microsoft.com/office/drawing/2014/main" id="{55867E9C-B646-D64C-F28E-1F27C0F63DDC}"/>
+                  </a:ext>
+                </a:extLst>
+              </p:cNvPr>
+              <p:cNvSpPr txBox="1"/>
+              <p:nvPr/>
+            </p:nvSpPr>
+            <p:spPr>
+              <a:xfrm>
+                <a:off x="3707904" y="5535406"/>
+                <a:ext cx="2079737" cy="369332"/>
+              </a:xfrm>
+              <a:prstGeom prst="rect">
+                <a:avLst/>
+              </a:prstGeom>
+              <a:solidFill>
+                <a:schemeClr val="bg1"/>
+              </a:solidFill>
+              <a:ln w="19050">
+                <a:solidFill>
+                  <a:srgbClr val="C00000"/>
+                </a:solidFill>
+              </a:ln>
+            </p:spPr>
+            <p:txBody>
+              <a:bodyPr wrap="none" rtlCol="0">
+                <a:spAutoFit/>
+              </a:bodyPr>
+              <a:lstStyle/>
+              <a:p>
+                <a:pPr marL="0" marR="0" lvl="0" indent="0" algn="l" defTabSz="914400" rtl="0" eaLnBrk="1" fontAlgn="auto" latinLnBrk="0" hangingPunct="1">
+                  <a:lnSpc>
+                    <a:spcPct val="100000"/>
+                  </a:lnSpc>
+                  <a:spcBef>
+                    <a:spcPts val="0"/>
+                  </a:spcBef>
+                  <a:spcAft>
+                    <a:spcPts val="0"/>
+                  </a:spcAft>
+                  <a:buClrTx/>
+                  <a:buSzTx/>
+                  <a:buFontTx/>
+                  <a:buNone/>
+                  <a:tabLst/>
+                  <a:defRPr/>
+                </a:pPr>
+                <a:r>
+                  <a:rPr kumimoji="0" lang="en-US" sz="1800" b="0" i="0" u="none" strike="noStrike" kern="1200" cap="none" spc="0" normalizeH="0" baseline="0" noProof="0" dirty="0">
+                    <a:ln>
+                      <a:noFill/>
+                    </a:ln>
+                    <a:solidFill>
+                      <a:prstClr val="black"/>
+                    </a:solidFill>
+                    <a:effectLst/>
+                    <a:uLnTx/>
+                    <a:uFillTx/>
+                    <a:latin typeface="Calibri" panose="020F0502020204030204"/>
+                    <a:ea typeface="+mn-ea"/>
+                    <a:cs typeface="+mn-cs"/>
+                  </a:rPr>
+                  <a:t>Reduces side effects</a:t>
+                </a:r>
+                <a:endParaRPr kumimoji="0" lang="nl-BE" sz="1800" b="0" i="0" u="none" strike="noStrike" kern="1200" cap="none" spc="0" normalizeH="0" baseline="0" noProof="0" dirty="0">
+                  <a:ln>
+                    <a:noFill/>
+                  </a:ln>
+                  <a:solidFill>
+                    <a:prstClr val="black"/>
+                  </a:solidFill>
+                  <a:effectLst/>
+                  <a:uLnTx/>
+                  <a:uFillTx/>
+                  <a:latin typeface="Calibri" panose="020F0502020204030204"/>
+                  <a:ea typeface="+mn-ea"/>
+                  <a:cs typeface="+mn-cs"/>
+                </a:endParaRPr>
+              </a:p>
+            </p:txBody>
+          </p:sp>
+          <p:cxnSp>
+            <p:nvCxnSpPr>
+              <p:cNvPr id="11" name="Straight Arrow Connector 10">
+                <a:extLst>
+                  <a:ext uri="{FF2B5EF4-FFF2-40B4-BE49-F238E27FC236}">
+                    <a16:creationId xmlns:a16="http://schemas.microsoft.com/office/drawing/2014/main" id="{7CA1ABDC-2CBB-5794-6FAC-C6D59A51F49D}"/>
+                  </a:ext>
+                </a:extLst>
+              </p:cNvPr>
+              <p:cNvCxnSpPr>
+                <a:cxnSpLocks/>
+                <a:stCxn id="9" idx="1"/>
+              </p:cNvCxnSpPr>
+              <p:nvPr/>
+            </p:nvCxnSpPr>
+            <p:spPr>
+              <a:xfrm flipH="1">
+                <a:off x="-450540" y="5720072"/>
+                <a:ext cx="4158444" cy="951035"/>
+              </a:xfrm>
+              <a:prstGeom prst="straightConnector1">
+                <a:avLst/>
+              </a:prstGeom>
+              <a:ln w="28575">
+                <a:solidFill>
+                  <a:srgbClr val="C00000"/>
+                </a:solidFill>
+                <a:tailEnd type="stealth" w="lg" len="lg"/>
+              </a:ln>
+            </p:spPr>
+            <p:style>
+              <a:lnRef idx="1">
+                <a:schemeClr val="accent1"/>
+              </a:lnRef>
+              <a:fillRef idx="0">
+                <a:schemeClr val="accent1"/>
+              </a:fillRef>
+              <a:effectRef idx="0">
+                <a:schemeClr val="accent1"/>
+              </a:effectRef>
+              <a:fontRef idx="minor">
+                <a:schemeClr val="tx1"/>
+              </a:fontRef>
+            </p:style>
+          </p:cxnSp>
+        </p:grpSp>
+        <p:pic>
+          <p:nvPicPr>
+            <p:cNvPr id="17" name="Graphic 16" descr="Thumbs up sign with solid fill">
+              <a:extLst>
+                <a:ext uri="{FF2B5EF4-FFF2-40B4-BE49-F238E27FC236}">
+                  <a16:creationId xmlns:a16="http://schemas.microsoft.com/office/drawing/2014/main" id="{39B36D00-80D8-6CBD-63B2-AD30770A0B38}"/>
+                </a:ext>
+              </a:extLst>
+            </p:cNvPr>
+            <p:cNvPicPr>
+              <a:picLocks noChangeAspect="1"/>
+            </p:cNvPicPr>
+            <p:nvPr/>
+          </p:nvPicPr>
+          <p:blipFill>
+            <a:blip r:embed="rId2">
+              <a:extLst>
+                <a:ext uri="{96DAC541-7B7A-43D3-8B79-37D633B846F1}">
+                  <asvg:svgBlip xmlns:asvg="http://schemas.microsoft.com/office/drawing/2016/SVG/main" r:embed="rId3"/>
+                </a:ext>
+              </a:extLst>
+            </a:blip>
+            <a:stretch>
+              <a:fillRect/>
+            </a:stretch>
+          </p:blipFill>
+          <p:spPr>
+            <a:xfrm>
+              <a:off x="11467800" y="2439565"/>
+              <a:ext cx="724200" cy="724200"/>
+            </a:xfrm>
+            <a:prstGeom prst="rect">
+              <a:avLst/>
+            </a:prstGeom>
+          </p:spPr>
+        </p:pic>
+      </p:grpSp>
+      <p:grpSp>
+        <p:nvGrpSpPr>
+          <p:cNvPr id="20" name="Group 19">
+            <a:extLst>
+              <a:ext uri="{FF2B5EF4-FFF2-40B4-BE49-F238E27FC236}">
+                <a16:creationId xmlns:a16="http://schemas.microsoft.com/office/drawing/2014/main" id="{07F8870C-EF21-D5B8-AFEC-58CF7D1B03A2}"/>
+              </a:ext>
+            </a:extLst>
+          </p:cNvPr>
+          <p:cNvGrpSpPr/>
+          <p:nvPr/>
+        </p:nvGrpSpPr>
+        <p:grpSpPr>
+          <a:xfrm>
+            <a:off x="6444343" y="3309744"/>
+            <a:ext cx="5747657" cy="1459591"/>
+            <a:chOff x="6444343" y="3309744"/>
+            <a:chExt cx="5747657" cy="1459591"/>
+          </a:xfrm>
+        </p:grpSpPr>
+        <p:grpSp>
+          <p:nvGrpSpPr>
+            <p:cNvPr id="13" name="Group 12">
+              <a:extLst>
+                <a:ext uri="{FF2B5EF4-FFF2-40B4-BE49-F238E27FC236}">
+                  <a16:creationId xmlns:a16="http://schemas.microsoft.com/office/drawing/2014/main" id="{5C188A9C-1C5B-45F4-EAA1-491882DA475E}"/>
+                </a:ext>
+              </a:extLst>
+            </p:cNvPr>
+            <p:cNvGrpSpPr/>
+            <p:nvPr/>
+          </p:nvGrpSpPr>
+          <p:grpSpPr>
+            <a:xfrm>
+              <a:off x="6444343" y="3818300"/>
+              <a:ext cx="5432638" cy="951035"/>
+              <a:chOff x="665216" y="5535406"/>
+              <a:chExt cx="5432638" cy="951035"/>
+            </a:xfrm>
+          </p:grpSpPr>
+          <p:sp>
+            <p:nvSpPr>
+              <p:cNvPr id="14" name="TextBox 13">
+                <a:extLst>
+                  <a:ext uri="{FF2B5EF4-FFF2-40B4-BE49-F238E27FC236}">
+                    <a16:creationId xmlns:a16="http://schemas.microsoft.com/office/drawing/2014/main" id="{90A7626F-1105-BAD6-3A95-7542888EB75A}"/>
+                  </a:ext>
+                </a:extLst>
+              </p:cNvPr>
+              <p:cNvSpPr txBox="1"/>
+              <p:nvPr/>
+            </p:nvSpPr>
+            <p:spPr>
+              <a:xfrm>
+                <a:off x="3707904" y="5535406"/>
+                <a:ext cx="2389950" cy="369332"/>
+              </a:xfrm>
+              <a:prstGeom prst="rect">
+                <a:avLst/>
+              </a:prstGeom>
+              <a:solidFill>
+                <a:schemeClr val="bg1"/>
+              </a:solidFill>
+              <a:ln w="19050">
+                <a:solidFill>
+                  <a:srgbClr val="C00000"/>
+                </a:solidFill>
+              </a:ln>
+            </p:spPr>
+            <p:txBody>
+              <a:bodyPr wrap="none" rtlCol="0">
+                <a:spAutoFit/>
+              </a:bodyPr>
+              <a:lstStyle/>
+              <a:p>
+                <a:pPr marL="0" marR="0" lvl="0" indent="0" algn="l" defTabSz="914400" rtl="0" eaLnBrk="1" fontAlgn="auto" latinLnBrk="0" hangingPunct="1">
+                  <a:lnSpc>
+                    <a:spcPct val="100000"/>
+                  </a:lnSpc>
+                  <a:spcBef>
+                    <a:spcPts val="0"/>
+                  </a:spcBef>
+                  <a:spcAft>
+                    <a:spcPts val="0"/>
+                  </a:spcAft>
+                  <a:buClrTx/>
+                  <a:buSzTx/>
+                  <a:buFontTx/>
+                  <a:buNone/>
+                  <a:tabLst/>
+                  <a:defRPr/>
+                </a:pPr>
+                <a:r>
+                  <a:rPr kumimoji="0" lang="en-US" sz="1800" b="0" i="0" u="none" strike="noStrike" kern="1200" cap="none" spc="0" normalizeH="0" baseline="0" noProof="0" dirty="0">
+                    <a:ln>
+                      <a:noFill/>
+                    </a:ln>
+                    <a:solidFill>
+                      <a:prstClr val="black"/>
+                    </a:solidFill>
+                    <a:effectLst/>
+                    <a:uLnTx/>
+                    <a:uFillTx/>
+                    <a:latin typeface="Calibri" panose="020F0502020204030204"/>
+                    <a:ea typeface="+mn-ea"/>
+                    <a:cs typeface="+mn-cs"/>
+                  </a:rPr>
+                  <a:t>Ensures </a:t>
+                </a:r>
+                <a:r>
+                  <a:rPr kumimoji="0" lang="en-US" sz="1800" b="0" i="0" u="none" strike="noStrike" kern="1200" cap="none" spc="0" normalizeH="0" baseline="0" noProof="0" dirty="0" err="1">
+                    <a:ln>
+                      <a:noFill/>
+                    </a:ln>
+                    <a:solidFill>
+                      <a:prstClr val="black"/>
+                    </a:solidFill>
+                    <a:effectLst/>
+                    <a:uLnTx/>
+                    <a:uFillTx/>
+                    <a:latin typeface="Calibri" panose="020F0502020204030204"/>
+                    <a:ea typeface="+mn-ea"/>
+                    <a:cs typeface="+mn-cs"/>
+                  </a:rPr>
+                  <a:t>reproducability</a:t>
+                </a:r>
+                <a:endParaRPr kumimoji="0" lang="nl-BE" sz="1800" b="0" i="0" u="none" strike="noStrike" kern="1200" cap="none" spc="0" normalizeH="0" baseline="0" noProof="0" dirty="0">
+                  <a:ln>
+                    <a:noFill/>
+                  </a:ln>
+                  <a:solidFill>
+                    <a:prstClr val="black"/>
+                  </a:solidFill>
+                  <a:effectLst/>
+                  <a:uLnTx/>
+                  <a:uFillTx/>
+                  <a:latin typeface="Calibri" panose="020F0502020204030204"/>
+                  <a:ea typeface="+mn-ea"/>
+                  <a:cs typeface="+mn-cs"/>
+                </a:endParaRPr>
+              </a:p>
+            </p:txBody>
+          </p:sp>
+          <p:cxnSp>
+            <p:nvCxnSpPr>
+              <p:cNvPr id="15" name="Straight Arrow Connector 14">
+                <a:extLst>
+                  <a:ext uri="{FF2B5EF4-FFF2-40B4-BE49-F238E27FC236}">
+                    <a16:creationId xmlns:a16="http://schemas.microsoft.com/office/drawing/2014/main" id="{B0E4A869-845A-E022-EBB4-F7A8E5D721B2}"/>
+                  </a:ext>
+                </a:extLst>
+              </p:cNvPr>
+              <p:cNvCxnSpPr>
+                <a:cxnSpLocks/>
+                <a:stCxn id="14" idx="1"/>
+              </p:cNvCxnSpPr>
+              <p:nvPr/>
+            </p:nvCxnSpPr>
+            <p:spPr>
+              <a:xfrm flipH="1">
+                <a:off x="665216" y="5720072"/>
+                <a:ext cx="3042688" cy="766369"/>
+              </a:xfrm>
+              <a:prstGeom prst="straightConnector1">
+                <a:avLst/>
+              </a:prstGeom>
+              <a:ln w="28575">
+                <a:solidFill>
+                  <a:srgbClr val="C00000"/>
+                </a:solidFill>
+                <a:tailEnd type="stealth" w="lg" len="lg"/>
+              </a:ln>
+            </p:spPr>
+            <p:style>
+              <a:lnRef idx="1">
+                <a:schemeClr val="accent1"/>
+              </a:lnRef>
+              <a:fillRef idx="0">
+                <a:schemeClr val="accent1"/>
+              </a:fillRef>
+              <a:effectRef idx="0">
+                <a:schemeClr val="accent1"/>
+              </a:effectRef>
+              <a:fontRef idx="minor">
+                <a:schemeClr val="tx1"/>
+              </a:fontRef>
+            </p:style>
+          </p:cxnSp>
+        </p:grpSp>
+        <p:pic>
+          <p:nvPicPr>
+            <p:cNvPr id="19" name="Graphic 18" descr="Thumbs up sign with solid fill">
+              <a:extLst>
+                <a:ext uri="{FF2B5EF4-FFF2-40B4-BE49-F238E27FC236}">
+                  <a16:creationId xmlns:a16="http://schemas.microsoft.com/office/drawing/2014/main" id="{2E83F4A8-61A2-7D99-759C-761A2F83B0D4}"/>
+                </a:ext>
+              </a:extLst>
+            </p:cNvPr>
+            <p:cNvPicPr>
+              <a:picLocks noChangeAspect="1"/>
+            </p:cNvPicPr>
+            <p:nvPr/>
+          </p:nvPicPr>
+          <p:blipFill>
+            <a:blip r:embed="rId2">
+              <a:extLst>
+                <a:ext uri="{96DAC541-7B7A-43D3-8B79-37D633B846F1}">
+                  <asvg:svgBlip xmlns:asvg="http://schemas.microsoft.com/office/drawing/2016/SVG/main" r:embed="rId3"/>
+                </a:ext>
+              </a:extLst>
+            </a:blip>
+            <a:stretch>
+              <a:fillRect/>
+            </a:stretch>
+          </p:blipFill>
+          <p:spPr>
+            <a:xfrm>
+              <a:off x="11467800" y="3309744"/>
+              <a:ext cx="724200" cy="724200"/>
+            </a:xfrm>
+            <a:prstGeom prst="rect">
+              <a:avLst/>
+            </a:prstGeom>
+          </p:spPr>
+        </p:pic>
+      </p:grpSp>
+      <p:sp>
+        <p:nvSpPr>
+          <p:cNvPr id="21" name="TextBox 20">
+            <a:extLst>
+              <a:ext uri="{FF2B5EF4-FFF2-40B4-BE49-F238E27FC236}">
+                <a16:creationId xmlns:a16="http://schemas.microsoft.com/office/drawing/2014/main" id="{4C41FD80-F478-39C8-9948-A158D94C850C}"/>
+              </a:ext>
+            </a:extLst>
+          </p:cNvPr>
+          <p:cNvSpPr txBox="1"/>
+          <p:nvPr/>
+        </p:nvSpPr>
+        <p:spPr>
+          <a:xfrm>
+            <a:off x="4691743" y="5791695"/>
+            <a:ext cx="2529475" cy="461665"/>
+          </a:xfrm>
+          <a:prstGeom prst="rect">
+            <a:avLst/>
+          </a:prstGeom>
+          <a:noFill/>
+          <a:ln>
+            <a:solidFill>
+              <a:schemeClr val="tx1"/>
+            </a:solidFill>
+          </a:ln>
+        </p:spPr>
+        <p:txBody>
+          <a:bodyPr wrap="none" rtlCol="0">
+            <a:spAutoFit/>
+          </a:bodyPr>
+          <a:lstStyle/>
+          <a:p>
+            <a:r>
+              <a:rPr lang="en-US" sz="2400" dirty="0"/>
+              <a:t>Similar for Python</a:t>
+            </a:r>
+            <a:endParaRPr lang="LID4096" sz="2400" dirty="0"/>
+          </a:p>
+        </p:txBody>
+      </p:sp>
+      <p:sp>
+        <p:nvSpPr>
+          <p:cNvPr id="22" name="Slide Number Placeholder 21">
+            <a:extLst>
+              <a:ext uri="{FF2B5EF4-FFF2-40B4-BE49-F238E27FC236}">
+                <a16:creationId xmlns:a16="http://schemas.microsoft.com/office/drawing/2014/main" id="{49B4DA03-AD96-27B7-D077-BA713A27ACEB}"/>
+              </a:ext>
+            </a:extLst>
+          </p:cNvPr>
+          <p:cNvSpPr>
+            <a:spLocks noGrp="1"/>
+          </p:cNvSpPr>
+          <p:nvPr>
+            <p:ph type="sldNum" sz="quarter" idx="12"/>
+          </p:nvPr>
+        </p:nvSpPr>
+        <p:spPr/>
+        <p:txBody>
+          <a:bodyPr/>
+          <a:lstStyle/>
+          <a:p>
+            <a:fld id="{9C7CE217-4467-4B8D-A735-B008FA7C4816}" type="slidenum">
+              <a:rPr lang="LID4096" smtClean="0"/>
+              <a:t>12</a:t>
+            </a:fld>
+            <a:endParaRPr lang="LID4096"/>
+          </a:p>
+        </p:txBody>
+      </p:sp>
+    </p:spTree>
+    <p:extLst>
+      <p:ext uri="{BB962C8B-B14F-4D97-AF65-F5344CB8AC3E}">
+        <p14:creationId xmlns:p14="http://schemas.microsoft.com/office/powerpoint/2010/main" val="3438008388"/>
       </p:ext>
     </p:extLst>
   </p:cSld>
@@ -3868,6 +5611,35 @@
           </a:prstGeom>
         </p:spPr>
       </p:pic>
+      <p:sp>
+        <p:nvSpPr>
+          <p:cNvPr id="2" name="Slide Number Placeholder 1">
+            <a:extLst>
+              <a:ext uri="{FF2B5EF4-FFF2-40B4-BE49-F238E27FC236}">
+                <a16:creationId xmlns:a16="http://schemas.microsoft.com/office/drawing/2014/main" id="{6DE1F145-C5E0-46AB-A22B-68461DC26AD6}"/>
+              </a:ext>
+            </a:extLst>
+          </p:cNvPr>
+          <p:cNvSpPr>
+            <a:spLocks noGrp="1"/>
+          </p:cNvSpPr>
+          <p:nvPr>
+            <p:ph type="sldNum" sz="quarter" idx="12"/>
+          </p:nvPr>
+        </p:nvSpPr>
+        <p:spPr/>
+        <p:txBody>
+          <a:bodyPr/>
+          <a:lstStyle/>
+          <a:p>
+            <a:fld id="{9C7CE217-4467-4B8D-A735-B008FA7C4816}" type="slidenum">
+              <a:rPr lang="LID4096" smtClean="0"/>
+              <a:t>3</a:t>
+            </a:fld>
+            <a:endParaRPr lang="LID4096"/>
+          </a:p>
+        </p:txBody>
+      </p:sp>
     </p:spTree>
     <p:extLst>
       <p:ext uri="{BB962C8B-B14F-4D97-AF65-F5344CB8AC3E}">
@@ -6173,6 +7945,826 @@
 </p:sld>
 </file>
 
+<file path=ppt/slides/slide6.xml><?xml version="1.0" encoding="utf-8"?>
+<p:sld xmlns:a="http://schemas.openxmlformats.org/drawingml/2006/main" xmlns:r="http://schemas.openxmlformats.org/officeDocument/2006/relationships" xmlns:p="http://schemas.openxmlformats.org/presentationml/2006/main">
+  <p:cSld>
+    <p:spTree>
+      <p:nvGrpSpPr>
+        <p:cNvPr id="1" name=""/>
+        <p:cNvGrpSpPr/>
+        <p:nvPr/>
+      </p:nvGrpSpPr>
+      <p:grpSpPr>
+        <a:xfrm>
+          <a:off x="0" y="0"/>
+          <a:ext cx="0" cy="0"/>
+          <a:chOff x="0" y="0"/>
+          <a:chExt cx="0" cy="0"/>
+        </a:xfrm>
+      </p:grpSpPr>
+      <p:sp>
+        <p:nvSpPr>
+          <p:cNvPr id="2" name="Title 1">
+            <a:extLst>
+              <a:ext uri="{FF2B5EF4-FFF2-40B4-BE49-F238E27FC236}">
+                <a16:creationId xmlns:a16="http://schemas.microsoft.com/office/drawing/2014/main" id="{5BDEE096-03BC-AF45-1BAD-8FB0E39A53C9}"/>
+              </a:ext>
+            </a:extLst>
+          </p:cNvPr>
+          <p:cNvSpPr>
+            <a:spLocks noGrp="1"/>
+          </p:cNvSpPr>
+          <p:nvPr>
+            <p:ph type="title"/>
+          </p:nvPr>
+        </p:nvSpPr>
+        <p:spPr/>
+        <p:txBody>
+          <a:bodyPr/>
+          <a:lstStyle/>
+          <a:p>
+            <a:r>
+              <a:rPr lang="en-US" dirty="0"/>
+              <a:t>Introduction</a:t>
+            </a:r>
+            <a:endParaRPr lang="LID4096" dirty="0"/>
+          </a:p>
+        </p:txBody>
+      </p:sp>
+      <p:sp>
+        <p:nvSpPr>
+          <p:cNvPr id="3" name="Text Placeholder 2">
+            <a:extLst>
+              <a:ext uri="{FF2B5EF4-FFF2-40B4-BE49-F238E27FC236}">
+                <a16:creationId xmlns:a16="http://schemas.microsoft.com/office/drawing/2014/main" id="{EBA1C1E0-757C-352E-1DA0-6DA0677ACD43}"/>
+              </a:ext>
+            </a:extLst>
+          </p:cNvPr>
+          <p:cNvSpPr>
+            <a:spLocks noGrp="1"/>
+          </p:cNvSpPr>
+          <p:nvPr>
+            <p:ph type="body" idx="1"/>
+          </p:nvPr>
+        </p:nvSpPr>
+        <p:spPr/>
+        <p:txBody>
+          <a:bodyPr/>
+          <a:lstStyle/>
+          <a:p>
+            <a:endParaRPr lang="LID4096"/>
+          </a:p>
+        </p:txBody>
+      </p:sp>
+      <p:sp>
+        <p:nvSpPr>
+          <p:cNvPr id="4" name="Slide Number Placeholder 3">
+            <a:extLst>
+              <a:ext uri="{FF2B5EF4-FFF2-40B4-BE49-F238E27FC236}">
+                <a16:creationId xmlns:a16="http://schemas.microsoft.com/office/drawing/2014/main" id="{E2367565-51CE-9B91-F4BB-D273A8B3CEC0}"/>
+              </a:ext>
+            </a:extLst>
+          </p:cNvPr>
+          <p:cNvSpPr>
+            <a:spLocks noGrp="1"/>
+          </p:cNvSpPr>
+          <p:nvPr>
+            <p:ph type="sldNum" sz="quarter" idx="12"/>
+          </p:nvPr>
+        </p:nvSpPr>
+        <p:spPr/>
+        <p:txBody>
+          <a:bodyPr/>
+          <a:lstStyle/>
+          <a:p>
+            <a:fld id="{9C7CE217-4467-4B8D-A735-B008FA7C4816}" type="slidenum">
+              <a:rPr lang="LID4096" smtClean="0"/>
+              <a:t>6</a:t>
+            </a:fld>
+            <a:endParaRPr lang="LID4096"/>
+          </a:p>
+        </p:txBody>
+      </p:sp>
+    </p:spTree>
+    <p:extLst>
+      <p:ext uri="{BB962C8B-B14F-4D97-AF65-F5344CB8AC3E}">
+        <p14:creationId xmlns:p14="http://schemas.microsoft.com/office/powerpoint/2010/main" val="1242019794"/>
+      </p:ext>
+    </p:extLst>
+  </p:cSld>
+  <p:clrMapOvr>
+    <a:masterClrMapping/>
+  </p:clrMapOvr>
+</p:sld>
+</file>
+
+<file path=ppt/slides/slide7.xml><?xml version="1.0" encoding="utf-8"?>
+<p:sld xmlns:a="http://schemas.openxmlformats.org/drawingml/2006/main" xmlns:r="http://schemas.openxmlformats.org/officeDocument/2006/relationships" xmlns:p="http://schemas.openxmlformats.org/presentationml/2006/main">
+  <p:cSld>
+    <p:spTree>
+      <p:nvGrpSpPr>
+        <p:cNvPr id="1" name=""/>
+        <p:cNvGrpSpPr/>
+        <p:nvPr/>
+      </p:nvGrpSpPr>
+      <p:grpSpPr>
+        <a:xfrm>
+          <a:off x="0" y="0"/>
+          <a:ext cx="0" cy="0"/>
+          <a:chOff x="0" y="0"/>
+          <a:chExt cx="0" cy="0"/>
+        </a:xfrm>
+      </p:grpSpPr>
+      <p:sp>
+        <p:nvSpPr>
+          <p:cNvPr id="2" name="Title 1">
+            <a:extLst>
+              <a:ext uri="{FF2B5EF4-FFF2-40B4-BE49-F238E27FC236}">
+                <a16:creationId xmlns:a16="http://schemas.microsoft.com/office/drawing/2014/main" id="{AC27ECA5-E85B-8CD0-3EFD-91F03AB36879}"/>
+              </a:ext>
+            </a:extLst>
+          </p:cNvPr>
+          <p:cNvSpPr>
+            <a:spLocks noGrp="1"/>
+          </p:cNvSpPr>
+          <p:nvPr>
+            <p:ph type="title"/>
+          </p:nvPr>
+        </p:nvSpPr>
+        <p:spPr/>
+        <p:txBody>
+          <a:bodyPr/>
+          <a:lstStyle/>
+          <a:p>
+            <a:r>
+              <a:rPr lang="en-US" dirty="0"/>
+              <a:t>Motivation: why use HPC?</a:t>
+            </a:r>
+            <a:endParaRPr lang="LID4096" dirty="0"/>
+          </a:p>
+        </p:txBody>
+      </p:sp>
+      <p:sp>
+        <p:nvSpPr>
+          <p:cNvPr id="3" name="Content Placeholder 2">
+            <a:extLst>
+              <a:ext uri="{FF2B5EF4-FFF2-40B4-BE49-F238E27FC236}">
+                <a16:creationId xmlns:a16="http://schemas.microsoft.com/office/drawing/2014/main" id="{85282D46-2921-4DBF-5E80-F22607016E49}"/>
+              </a:ext>
+            </a:extLst>
+          </p:cNvPr>
+          <p:cNvSpPr>
+            <a:spLocks noGrp="1"/>
+          </p:cNvSpPr>
+          <p:nvPr>
+            <p:ph idx="1"/>
+          </p:nvPr>
+        </p:nvSpPr>
+        <p:spPr/>
+        <p:txBody>
+          <a:bodyPr/>
+          <a:lstStyle/>
+          <a:p>
+            <a:r>
+              <a:rPr lang="en-US" dirty="0"/>
+              <a:t>Computation takes a lot of time</a:t>
+            </a:r>
+          </a:p>
+          <a:p>
+            <a:endParaRPr lang="en-US" dirty="0"/>
+          </a:p>
+          <a:p>
+            <a:endParaRPr lang="en-US" dirty="0"/>
+          </a:p>
+          <a:p>
+            <a:r>
+              <a:rPr lang="en-US" dirty="0"/>
+              <a:t>Large data set, not enough memory</a:t>
+            </a:r>
+          </a:p>
+          <a:p>
+            <a:endParaRPr lang="en-US" dirty="0"/>
+          </a:p>
+          <a:p>
+            <a:endParaRPr lang="en-US" dirty="0"/>
+          </a:p>
+          <a:p>
+            <a:r>
+              <a:rPr lang="en-US" dirty="0"/>
+              <a:t>Many different scenarios to compute</a:t>
+            </a:r>
+            <a:endParaRPr lang="LID4096" dirty="0"/>
+          </a:p>
+        </p:txBody>
+      </p:sp>
+      <p:pic>
+        <p:nvPicPr>
+          <p:cNvPr id="5" name="Graphic 4" descr="Hourglass Full with solid fill">
+            <a:extLst>
+              <a:ext uri="{FF2B5EF4-FFF2-40B4-BE49-F238E27FC236}">
+                <a16:creationId xmlns:a16="http://schemas.microsoft.com/office/drawing/2014/main" id="{67C7CA4E-53A8-A80E-DD9A-A6DD06A01AD6}"/>
+              </a:ext>
+            </a:extLst>
+          </p:cNvPr>
+          <p:cNvPicPr>
+            <a:picLocks noChangeAspect="1"/>
+          </p:cNvPicPr>
+          <p:nvPr/>
+        </p:nvPicPr>
+        <p:blipFill>
+          <a:blip r:embed="rId2">
+            <a:extLst>
+              <a:ext uri="{96DAC541-7B7A-43D3-8B79-37D633B846F1}">
+                <asvg:svgBlip xmlns:asvg="http://schemas.microsoft.com/office/drawing/2016/SVG/main" r:embed="rId3"/>
+              </a:ext>
+            </a:extLst>
+          </a:blip>
+          <a:stretch>
+            <a:fillRect/>
+          </a:stretch>
+        </p:blipFill>
+        <p:spPr>
+          <a:xfrm>
+            <a:off x="6923314" y="1761332"/>
+            <a:ext cx="914400" cy="914400"/>
+          </a:xfrm>
+          <a:prstGeom prst="rect">
+            <a:avLst/>
+          </a:prstGeom>
+        </p:spPr>
+      </p:pic>
+      <p:pic>
+        <p:nvPicPr>
+          <p:cNvPr id="7" name="Graphic 6" descr="Database with solid fill">
+            <a:extLst>
+              <a:ext uri="{FF2B5EF4-FFF2-40B4-BE49-F238E27FC236}">
+                <a16:creationId xmlns:a16="http://schemas.microsoft.com/office/drawing/2014/main" id="{B06E9CB9-B6ED-0860-FCDE-3E2EE7073DCA}"/>
+              </a:ext>
+            </a:extLst>
+          </p:cNvPr>
+          <p:cNvPicPr>
+            <a:picLocks noChangeAspect="1"/>
+          </p:cNvPicPr>
+          <p:nvPr/>
+        </p:nvPicPr>
+        <p:blipFill>
+          <a:blip r:embed="rId4">
+            <a:extLst>
+              <a:ext uri="{96DAC541-7B7A-43D3-8B79-37D633B846F1}">
+                <asvg:svgBlip xmlns:asvg="http://schemas.microsoft.com/office/drawing/2016/SVG/main" r:embed="rId5"/>
+              </a:ext>
+            </a:extLst>
+          </a:blip>
+          <a:stretch>
+            <a:fillRect/>
+          </a:stretch>
+        </p:blipFill>
+        <p:spPr>
+          <a:xfrm>
+            <a:off x="6923314" y="3200400"/>
+            <a:ext cx="914400" cy="914400"/>
+          </a:xfrm>
+          <a:prstGeom prst="rect">
+            <a:avLst/>
+          </a:prstGeom>
+        </p:spPr>
+      </p:pic>
+      <p:pic>
+        <p:nvPicPr>
+          <p:cNvPr id="9" name="Graphic 8" descr="Branching diagram with solid fill">
+            <a:extLst>
+              <a:ext uri="{FF2B5EF4-FFF2-40B4-BE49-F238E27FC236}">
+                <a16:creationId xmlns:a16="http://schemas.microsoft.com/office/drawing/2014/main" id="{1758EBC3-87FD-FE87-13F9-670C66AA1451}"/>
+              </a:ext>
+            </a:extLst>
+          </p:cNvPr>
+          <p:cNvPicPr>
+            <a:picLocks noChangeAspect="1"/>
+          </p:cNvPicPr>
+          <p:nvPr/>
+        </p:nvPicPr>
+        <p:blipFill>
+          <a:blip r:embed="rId6">
+            <a:extLst>
+              <a:ext uri="{96DAC541-7B7A-43D3-8B79-37D633B846F1}">
+                <asvg:svgBlip xmlns:asvg="http://schemas.microsoft.com/office/drawing/2016/SVG/main" r:embed="rId7"/>
+              </a:ext>
+            </a:extLst>
+          </a:blip>
+          <a:stretch>
+            <a:fillRect/>
+          </a:stretch>
+        </p:blipFill>
+        <p:spPr>
+          <a:xfrm>
+            <a:off x="6923314" y="4710112"/>
+            <a:ext cx="914400" cy="914400"/>
+          </a:xfrm>
+          <a:prstGeom prst="rect">
+            <a:avLst/>
+          </a:prstGeom>
+        </p:spPr>
+      </p:pic>
+      <p:sp>
+        <p:nvSpPr>
+          <p:cNvPr id="10" name="TextBox 9">
+            <a:extLst>
+              <a:ext uri="{FF2B5EF4-FFF2-40B4-BE49-F238E27FC236}">
+                <a16:creationId xmlns:a16="http://schemas.microsoft.com/office/drawing/2014/main" id="{16748437-A7EC-8E99-2684-BF2A05DA10ED}"/>
+              </a:ext>
+            </a:extLst>
+          </p:cNvPr>
+          <p:cNvSpPr txBox="1"/>
+          <p:nvPr/>
+        </p:nvSpPr>
+        <p:spPr>
+          <a:xfrm>
+            <a:off x="9046029" y="3128036"/>
+            <a:ext cx="2146806" cy="954107"/>
+          </a:xfrm>
+          <a:prstGeom prst="rect">
+            <a:avLst/>
+          </a:prstGeom>
+          <a:noFill/>
+          <a:ln>
+            <a:solidFill>
+              <a:schemeClr val="tx1"/>
+            </a:solidFill>
+          </a:ln>
+        </p:spPr>
+        <p:txBody>
+          <a:bodyPr wrap="none" rtlCol="0">
+            <a:spAutoFit/>
+          </a:bodyPr>
+          <a:lstStyle/>
+          <a:p>
+            <a:r>
+              <a:rPr lang="en-US" sz="2800" dirty="0"/>
+              <a:t>Or some</a:t>
+            </a:r>
+          </a:p>
+          <a:p>
+            <a:r>
+              <a:rPr lang="en-US" sz="2800" dirty="0"/>
+              <a:t>combination</a:t>
+            </a:r>
+            <a:endParaRPr lang="LID4096" sz="2800" dirty="0"/>
+          </a:p>
+        </p:txBody>
+      </p:sp>
+      <p:sp>
+        <p:nvSpPr>
+          <p:cNvPr id="11" name="Slide Number Placeholder 10">
+            <a:extLst>
+              <a:ext uri="{FF2B5EF4-FFF2-40B4-BE49-F238E27FC236}">
+                <a16:creationId xmlns:a16="http://schemas.microsoft.com/office/drawing/2014/main" id="{D18B4BCF-9A5F-062B-B373-49846F260704}"/>
+              </a:ext>
+            </a:extLst>
+          </p:cNvPr>
+          <p:cNvSpPr>
+            <a:spLocks noGrp="1"/>
+          </p:cNvSpPr>
+          <p:nvPr>
+            <p:ph type="sldNum" sz="quarter" idx="12"/>
+          </p:nvPr>
+        </p:nvSpPr>
+        <p:spPr/>
+        <p:txBody>
+          <a:bodyPr/>
+          <a:lstStyle/>
+          <a:p>
+            <a:fld id="{9C7CE217-4467-4B8D-A735-B008FA7C4816}" type="slidenum">
+              <a:rPr lang="LID4096" smtClean="0"/>
+              <a:t>7</a:t>
+            </a:fld>
+            <a:endParaRPr lang="LID4096"/>
+          </a:p>
+        </p:txBody>
+      </p:sp>
+    </p:spTree>
+    <p:extLst>
+      <p:ext uri="{BB962C8B-B14F-4D97-AF65-F5344CB8AC3E}">
+        <p14:creationId xmlns:p14="http://schemas.microsoft.com/office/powerpoint/2010/main" val="522655816"/>
+      </p:ext>
+    </p:extLst>
+  </p:cSld>
+  <p:clrMapOvr>
+    <a:masterClrMapping/>
+  </p:clrMapOvr>
+</p:sld>
+</file>
+
+<file path=ppt/slides/slide8.xml><?xml version="1.0" encoding="utf-8"?>
+<p:sld xmlns:a="http://schemas.openxmlformats.org/drawingml/2006/main" xmlns:r="http://schemas.openxmlformats.org/officeDocument/2006/relationships" xmlns:p="http://schemas.openxmlformats.org/presentationml/2006/main">
+  <p:cSld>
+    <p:spTree>
+      <p:nvGrpSpPr>
+        <p:cNvPr id="1" name=""/>
+        <p:cNvGrpSpPr/>
+        <p:nvPr/>
+      </p:nvGrpSpPr>
+      <p:grpSpPr>
+        <a:xfrm>
+          <a:off x="0" y="0"/>
+          <a:ext cx="0" cy="0"/>
+          <a:chOff x="0" y="0"/>
+          <a:chExt cx="0" cy="0"/>
+        </a:xfrm>
+      </p:grpSpPr>
+      <p:sp>
+        <p:nvSpPr>
+          <p:cNvPr id="2" name="Title 1">
+            <a:extLst>
+              <a:ext uri="{FF2B5EF4-FFF2-40B4-BE49-F238E27FC236}">
+                <a16:creationId xmlns:a16="http://schemas.microsoft.com/office/drawing/2014/main" id="{2E2D0B3A-FFE0-081F-ED05-A7CF53956E43}"/>
+              </a:ext>
+            </a:extLst>
+          </p:cNvPr>
+          <p:cNvSpPr>
+            <a:spLocks noGrp="1"/>
+          </p:cNvSpPr>
+          <p:nvPr>
+            <p:ph type="title"/>
+          </p:nvPr>
+        </p:nvSpPr>
+        <p:spPr/>
+        <p:txBody>
+          <a:bodyPr/>
+          <a:lstStyle/>
+          <a:p>
+            <a:r>
+              <a:rPr lang="en-US" dirty="0"/>
+              <a:t>Is it hard?</a:t>
+            </a:r>
+            <a:endParaRPr lang="LID4096" dirty="0"/>
+          </a:p>
+        </p:txBody>
+      </p:sp>
+      <p:sp>
+        <p:nvSpPr>
+          <p:cNvPr id="3" name="Content Placeholder 2">
+            <a:extLst>
+              <a:ext uri="{FF2B5EF4-FFF2-40B4-BE49-F238E27FC236}">
+                <a16:creationId xmlns:a16="http://schemas.microsoft.com/office/drawing/2014/main" id="{2D665696-90AD-5AEE-257D-5F9789B05579}"/>
+              </a:ext>
+            </a:extLst>
+          </p:cNvPr>
+          <p:cNvSpPr>
+            <a:spLocks noGrp="1"/>
+          </p:cNvSpPr>
+          <p:nvPr>
+            <p:ph idx="1"/>
+          </p:nvPr>
+        </p:nvSpPr>
+        <p:spPr/>
+        <p:txBody>
+          <a:bodyPr/>
+          <a:lstStyle/>
+          <a:p>
+            <a:r>
+              <a:rPr lang="en-US" dirty="0"/>
+              <a:t>There is a learning curve</a:t>
+            </a:r>
+          </a:p>
+          <a:p>
+            <a:r>
+              <a:rPr lang="en-US" dirty="0"/>
+              <a:t>There are pitfalls</a:t>
+            </a:r>
+          </a:p>
+          <a:p>
+            <a:endParaRPr lang="en-US" dirty="0"/>
+          </a:p>
+          <a:p>
+            <a:endParaRPr lang="en-US" dirty="0"/>
+          </a:p>
+          <a:p>
+            <a:endParaRPr lang="en-US" dirty="0"/>
+          </a:p>
+          <a:p>
+            <a:r>
+              <a:rPr lang="en-US" dirty="0"/>
+              <a:t>Extensive training catalog</a:t>
+            </a:r>
+          </a:p>
+          <a:p>
+            <a:r>
+              <a:rPr lang="en-US" dirty="0"/>
+              <a:t>Support is here to help</a:t>
+            </a:r>
+          </a:p>
+        </p:txBody>
+      </p:sp>
+      <p:pic>
+        <p:nvPicPr>
+          <p:cNvPr id="4" name="Graphic 3" descr="Warning with solid fill">
+            <a:extLst>
+              <a:ext uri="{FF2B5EF4-FFF2-40B4-BE49-F238E27FC236}">
+                <a16:creationId xmlns:a16="http://schemas.microsoft.com/office/drawing/2014/main" id="{B6BF90D3-38A7-D04B-D4CF-5215B358EAC6}"/>
+              </a:ext>
+            </a:extLst>
+          </p:cNvPr>
+          <p:cNvPicPr>
+            <a:picLocks noChangeAspect="1"/>
+          </p:cNvPicPr>
+          <p:nvPr/>
+        </p:nvPicPr>
+        <p:blipFill>
+          <a:blip r:embed="rId2">
+            <a:extLst>
+              <a:ext uri="{96DAC541-7B7A-43D3-8B79-37D633B846F1}">
+                <asvg:svgBlip xmlns:asvg="http://schemas.microsoft.com/office/drawing/2016/SVG/main" r:embed="rId3"/>
+              </a:ext>
+            </a:extLst>
+          </a:blip>
+          <a:stretch>
+            <a:fillRect/>
+          </a:stretch>
+        </p:blipFill>
+        <p:spPr>
+          <a:xfrm>
+            <a:off x="5231261" y="1690688"/>
+            <a:ext cx="1115109" cy="1115109"/>
+          </a:xfrm>
+          <a:prstGeom prst="rect">
+            <a:avLst/>
+          </a:prstGeom>
+        </p:spPr>
+      </p:pic>
+      <p:sp>
+        <p:nvSpPr>
+          <p:cNvPr id="5" name="TextBox 4">
+            <a:extLst>
+              <a:ext uri="{FF2B5EF4-FFF2-40B4-BE49-F238E27FC236}">
+                <a16:creationId xmlns:a16="http://schemas.microsoft.com/office/drawing/2014/main" id="{28977B0C-826D-A801-6943-C509C70C0C77}"/>
+              </a:ext>
+            </a:extLst>
+          </p:cNvPr>
+          <p:cNvSpPr txBox="1"/>
+          <p:nvPr/>
+        </p:nvSpPr>
+        <p:spPr>
+          <a:xfrm>
+            <a:off x="3711483" y="3614217"/>
+            <a:ext cx="5265544" cy="584775"/>
+          </a:xfrm>
+          <a:prstGeom prst="rect">
+            <a:avLst/>
+          </a:prstGeom>
+          <a:noFill/>
+          <a:ln>
+            <a:solidFill>
+              <a:schemeClr val="tx1"/>
+            </a:solidFill>
+          </a:ln>
+        </p:spPr>
+        <p:txBody>
+          <a:bodyPr wrap="none" rtlCol="0">
+            <a:spAutoFit/>
+          </a:bodyPr>
+          <a:lstStyle/>
+          <a:p>
+            <a:r>
+              <a:rPr lang="en-US" sz="3200" dirty="0"/>
+              <a:t>It's not rocket science either!</a:t>
+            </a:r>
+            <a:endParaRPr lang="LID4096" sz="3200" dirty="0"/>
+          </a:p>
+        </p:txBody>
+      </p:sp>
+      <p:sp>
+        <p:nvSpPr>
+          <p:cNvPr id="6" name="Slide Number Placeholder 5">
+            <a:extLst>
+              <a:ext uri="{FF2B5EF4-FFF2-40B4-BE49-F238E27FC236}">
+                <a16:creationId xmlns:a16="http://schemas.microsoft.com/office/drawing/2014/main" id="{B0BDE30E-7417-BF06-8E35-C0F19987DC8C}"/>
+              </a:ext>
+            </a:extLst>
+          </p:cNvPr>
+          <p:cNvSpPr>
+            <a:spLocks noGrp="1"/>
+          </p:cNvSpPr>
+          <p:nvPr>
+            <p:ph type="sldNum" sz="quarter" idx="12"/>
+          </p:nvPr>
+        </p:nvSpPr>
+        <p:spPr/>
+        <p:txBody>
+          <a:bodyPr/>
+          <a:lstStyle/>
+          <a:p>
+            <a:fld id="{9C7CE217-4467-4B8D-A735-B008FA7C4816}" type="slidenum">
+              <a:rPr lang="LID4096" smtClean="0"/>
+              <a:t>8</a:t>
+            </a:fld>
+            <a:endParaRPr lang="LID4096"/>
+          </a:p>
+        </p:txBody>
+      </p:sp>
+    </p:spTree>
+    <p:extLst>
+      <p:ext uri="{BB962C8B-B14F-4D97-AF65-F5344CB8AC3E}">
+        <p14:creationId xmlns:p14="http://schemas.microsoft.com/office/powerpoint/2010/main" val="3111872426"/>
+      </p:ext>
+    </p:extLst>
+  </p:cSld>
+  <p:clrMapOvr>
+    <a:masterClrMapping/>
+  </p:clrMapOvr>
+  <p:timing>
+    <p:tnLst>
+      <p:par>
+        <p:cTn id="1" dur="indefinite" restart="never" nodeType="tmRoot">
+          <p:childTnLst>
+            <p:seq concurrent="1" nextAc="seek">
+              <p:cTn id="2" dur="indefinite" nodeType="mainSeq">
+                <p:childTnLst>
+                  <p:par>
+                    <p:cTn id="3" fill="hold">
+                      <p:stCondLst>
+                        <p:cond delay="indefinite"/>
+                        <p:cond evt="onBegin" delay="0">
+                          <p:tn val="2"/>
+                        </p:cond>
+                      </p:stCondLst>
+                      <p:childTnLst>
+                        <p:par>
+                          <p:cTn id="4" fill="hold">
+                            <p:stCondLst>
+                              <p:cond delay="0"/>
+                            </p:stCondLst>
+                            <p:childTnLst>
+                              <p:par>
+                                <p:cTn id="5" presetID="1" presetClass="entr" presetSubtype="0" fill="hold" nodeType="withEffect">
+                                  <p:stCondLst>
+                                    <p:cond delay="0"/>
+                                  </p:stCondLst>
+                                  <p:childTnLst>
+                                    <p:set>
+                                      <p:cBhvr>
+                                        <p:cTn id="6" dur="1" fill="hold">
+                                          <p:stCondLst>
+                                            <p:cond delay="0"/>
+                                          </p:stCondLst>
+                                        </p:cTn>
+                                        <p:tgtEl>
+                                          <p:spTgt spid="4"/>
+                                        </p:tgtEl>
+                                        <p:attrNameLst>
+                                          <p:attrName>style.visibility</p:attrName>
+                                        </p:attrNameLst>
+                                      </p:cBhvr>
+                                      <p:to>
+                                        <p:strVal val="visible"/>
+                                      </p:to>
+                                    </p:set>
+                                  </p:childTnLst>
+                                </p:cTn>
+                              </p:par>
+                            </p:childTnLst>
+                          </p:cTn>
+                        </p:par>
+                      </p:childTnLst>
+                    </p:cTn>
+                  </p:par>
+                </p:childTnLst>
+              </p:cTn>
+              <p:prevCondLst>
+                <p:cond evt="onPrev" delay="0">
+                  <p:tgtEl>
+                    <p:sldTgt/>
+                  </p:tgtEl>
+                </p:cond>
+              </p:prevCondLst>
+              <p:nextCondLst>
+                <p:cond evt="onNext" delay="0">
+                  <p:tgtEl>
+                    <p:sldTgt/>
+                  </p:tgtEl>
+                </p:cond>
+              </p:nextCondLst>
+            </p:seq>
+          </p:childTnLst>
+        </p:cTn>
+      </p:par>
+    </p:tnLst>
+  </p:timing>
+</p:sld>
+</file>
+
+<file path=ppt/slides/slide9.xml><?xml version="1.0" encoding="utf-8"?>
+<p:sld xmlns:a="http://schemas.openxmlformats.org/drawingml/2006/main" xmlns:r="http://schemas.openxmlformats.org/officeDocument/2006/relationships" xmlns:p="http://schemas.openxmlformats.org/presentationml/2006/main">
+  <p:cSld>
+    <p:spTree>
+      <p:nvGrpSpPr>
+        <p:cNvPr id="1" name=""/>
+        <p:cNvGrpSpPr/>
+        <p:nvPr/>
+      </p:nvGrpSpPr>
+      <p:grpSpPr>
+        <a:xfrm>
+          <a:off x="0" y="0"/>
+          <a:ext cx="0" cy="0"/>
+          <a:chOff x="0" y="0"/>
+          <a:chExt cx="0" cy="0"/>
+        </a:xfrm>
+      </p:grpSpPr>
+      <p:sp>
+        <p:nvSpPr>
+          <p:cNvPr id="2" name="Title 1">
+            <a:extLst>
+              <a:ext uri="{FF2B5EF4-FFF2-40B4-BE49-F238E27FC236}">
+                <a16:creationId xmlns:a16="http://schemas.microsoft.com/office/drawing/2014/main" id="{CEA08FD7-C36F-5AEA-0BE1-7BBB5FA55C9F}"/>
+              </a:ext>
+            </a:extLst>
+          </p:cNvPr>
+          <p:cNvSpPr>
+            <a:spLocks noGrp="1"/>
+          </p:cNvSpPr>
+          <p:nvPr>
+            <p:ph type="title"/>
+          </p:nvPr>
+        </p:nvSpPr>
+        <p:spPr/>
+        <p:txBody>
+          <a:bodyPr/>
+          <a:lstStyle/>
+          <a:p>
+            <a:r>
+              <a:rPr lang="en-US" dirty="0"/>
+              <a:t>Set up your environment</a:t>
+            </a:r>
+            <a:endParaRPr lang="LID4096" dirty="0"/>
+          </a:p>
+        </p:txBody>
+      </p:sp>
+      <p:sp>
+        <p:nvSpPr>
+          <p:cNvPr id="3" name="Text Placeholder 2">
+            <a:extLst>
+              <a:ext uri="{FF2B5EF4-FFF2-40B4-BE49-F238E27FC236}">
+                <a16:creationId xmlns:a16="http://schemas.microsoft.com/office/drawing/2014/main" id="{2DA9A868-BB36-DFD0-5AE2-AC229CC9E87C}"/>
+              </a:ext>
+            </a:extLst>
+          </p:cNvPr>
+          <p:cNvSpPr>
+            <a:spLocks noGrp="1"/>
+          </p:cNvSpPr>
+          <p:nvPr>
+            <p:ph type="body" idx="1"/>
+          </p:nvPr>
+        </p:nvSpPr>
+        <p:spPr/>
+        <p:txBody>
+          <a:bodyPr/>
+          <a:lstStyle/>
+          <a:p>
+            <a:endParaRPr lang="LID4096"/>
+          </a:p>
+        </p:txBody>
+      </p:sp>
+      <p:sp>
+        <p:nvSpPr>
+          <p:cNvPr id="4" name="Slide Number Placeholder 3">
+            <a:extLst>
+              <a:ext uri="{FF2B5EF4-FFF2-40B4-BE49-F238E27FC236}">
+                <a16:creationId xmlns:a16="http://schemas.microsoft.com/office/drawing/2014/main" id="{F3D5540B-592D-09F7-A654-0C15AB88A7D0}"/>
+              </a:ext>
+            </a:extLst>
+          </p:cNvPr>
+          <p:cNvSpPr>
+            <a:spLocks noGrp="1"/>
+          </p:cNvSpPr>
+          <p:nvPr>
+            <p:ph type="sldNum" sz="quarter" idx="12"/>
+          </p:nvPr>
+        </p:nvSpPr>
+        <p:spPr/>
+        <p:txBody>
+          <a:bodyPr/>
+          <a:lstStyle/>
+          <a:p>
+            <a:fld id="{9C7CE217-4467-4B8D-A735-B008FA7C4816}" type="slidenum">
+              <a:rPr lang="LID4096" smtClean="0"/>
+              <a:t>9</a:t>
+            </a:fld>
+            <a:endParaRPr lang="LID4096"/>
+          </a:p>
+        </p:txBody>
+      </p:sp>
+    </p:spTree>
+    <p:extLst>
+      <p:ext uri="{BB962C8B-B14F-4D97-AF65-F5344CB8AC3E}">
+        <p14:creationId xmlns:p14="http://schemas.microsoft.com/office/powerpoint/2010/main" val="3099589173"/>
+      </p:ext>
+    </p:extLst>
+  </p:cSld>
+  <p:clrMapOvr>
+    <a:masterClrMapping/>
+  </p:clrMapOvr>
+</p:sld>
+</file>
+
 <file path=ppt/theme/theme1.xml><?xml version="1.0" encoding="utf-8"?>
 <a:theme xmlns:a="http://schemas.openxmlformats.org/drawingml/2006/main" name="Office Theme">
   <a:themeElements>
@@ -6486,4 +9078,319 @@
     </a:ext>
   </a:extLst>
 </a:theme>
+</file>
+
+<file path=ppt/theme/theme2.xml><?xml version="1.0" encoding="utf-8"?>
+<a:theme xmlns:a="http://schemas.openxmlformats.org/drawingml/2006/main" name="Office Theme">
+  <a:themeElements>
+    <a:clrScheme name="Office">
+      <a:dk1>
+        <a:sysClr val="windowText" lastClr="000000"/>
+      </a:dk1>
+      <a:lt1>
+        <a:sysClr val="window" lastClr="FFFFFF"/>
+      </a:lt1>
+      <a:dk2>
+        <a:srgbClr val="0E2841"/>
+      </a:dk2>
+      <a:lt2>
+        <a:srgbClr val="E8E8E8"/>
+      </a:lt2>
+      <a:accent1>
+        <a:srgbClr val="156082"/>
+      </a:accent1>
+      <a:accent2>
+        <a:srgbClr val="E97132"/>
+      </a:accent2>
+      <a:accent3>
+        <a:srgbClr val="196B24"/>
+      </a:accent3>
+      <a:accent4>
+        <a:srgbClr val="0F9ED5"/>
+      </a:accent4>
+      <a:accent5>
+        <a:srgbClr val="A02B93"/>
+      </a:accent5>
+      <a:accent6>
+        <a:srgbClr val="4EA72E"/>
+      </a:accent6>
+      <a:hlink>
+        <a:srgbClr val="467886"/>
+      </a:hlink>
+      <a:folHlink>
+        <a:srgbClr val="96607D"/>
+      </a:folHlink>
+    </a:clrScheme>
+    <a:fontScheme name="Office">
+      <a:majorFont>
+        <a:latin typeface="Aptos Display" panose="02110004020202020204"/>
+        <a:ea typeface=""/>
+        <a:cs typeface=""/>
+        <a:font script="Jpan" typeface="游ゴシック Light"/>
+        <a:font script="Hang" typeface="맑은 고딕"/>
+        <a:font script="Hans" typeface="等线 Light"/>
+        <a:font script="Hant" typeface="新細明體"/>
+        <a:font script="Arab" typeface="Times New Roman"/>
+        <a:font script="Hebr" typeface="Times New Roman"/>
+        <a:font script="Thai" typeface="Angsana New"/>
+        <a:font script="Ethi" typeface="Nyala"/>
+        <a:font script="Beng" typeface="Vrinda"/>
+        <a:font script="Gujr" typeface="Shruti"/>
+        <a:font script="Khmr" typeface="MoolBoran"/>
+        <a:font script="Knda" typeface="Tunga"/>
+        <a:font script="Guru" typeface="Raavi"/>
+        <a:font script="Cans" typeface="Euphemia"/>
+        <a:font script="Cher" typeface="Plantagenet Cherokee"/>
+        <a:font script="Yiii" typeface="Microsoft Yi Baiti"/>
+        <a:font script="Tibt" typeface="Microsoft Himalaya"/>
+        <a:font script="Thaa" typeface="MV Boli"/>
+        <a:font script="Deva" typeface="Mangal"/>
+        <a:font script="Telu" typeface="Gautami"/>
+        <a:font script="Taml" typeface="Latha"/>
+        <a:font script="Syrc" typeface="Estrangelo Edessa"/>
+        <a:font script="Orya" typeface="Kalinga"/>
+        <a:font script="Mlym" typeface="Kartika"/>
+        <a:font script="Laoo" typeface="DokChampa"/>
+        <a:font script="Sinh" typeface="Iskoola Pota"/>
+        <a:font script="Mong" typeface="Mongolian Baiti"/>
+        <a:font script="Viet" typeface="Times New Roman"/>
+        <a:font script="Uigh" typeface="Microsoft Uighur"/>
+        <a:font script="Geor" typeface="Sylfaen"/>
+        <a:font script="Armn" typeface="Arial"/>
+        <a:font script="Bugi" typeface="Leelawadee UI"/>
+        <a:font script="Bopo" typeface="Microsoft JhengHei"/>
+        <a:font script="Java" typeface="Javanese Text"/>
+        <a:font script="Lisu" typeface="Segoe UI"/>
+        <a:font script="Mymr" typeface="Myanmar Text"/>
+        <a:font script="Nkoo" typeface="Ebrima"/>
+        <a:font script="Olck" typeface="Nirmala UI"/>
+        <a:font script="Osma" typeface="Ebrima"/>
+        <a:font script="Phag" typeface="Phagspa"/>
+        <a:font script="Syrn" typeface="Estrangelo Edessa"/>
+        <a:font script="Syrj" typeface="Estrangelo Edessa"/>
+        <a:font script="Syre" typeface="Estrangelo Edessa"/>
+        <a:font script="Sora" typeface="Nirmala UI"/>
+        <a:font script="Tale" typeface="Microsoft Tai Le"/>
+        <a:font script="Talu" typeface="Microsoft New Tai Lue"/>
+        <a:font script="Tfng" typeface="Ebrima"/>
+      </a:majorFont>
+      <a:minorFont>
+        <a:latin typeface="Aptos" panose="02110004020202020204"/>
+        <a:ea typeface=""/>
+        <a:cs typeface=""/>
+        <a:font script="Jpan" typeface="游ゴシック"/>
+        <a:font script="Hang" typeface="맑은 고딕"/>
+        <a:font script="Hans" typeface="等线"/>
+        <a:font script="Hant" typeface="新細明體"/>
+        <a:font script="Arab" typeface="Arial"/>
+        <a:font script="Hebr" typeface="Arial"/>
+        <a:font script="Thai" typeface="Cordia New"/>
+        <a:font script="Ethi" typeface="Nyala"/>
+        <a:font script="Beng" typeface="Vrinda"/>
+        <a:font script="Gujr" typeface="Shruti"/>
+        <a:font script="Khmr" typeface="DaunPenh"/>
+        <a:font script="Knda" typeface="Tunga"/>
+        <a:font script="Guru" typeface="Raavi"/>
+        <a:font script="Cans" typeface="Euphemia"/>
+        <a:font script="Cher" typeface="Plantagenet Cherokee"/>
+        <a:font script="Yiii" typeface="Microsoft Yi Baiti"/>
+        <a:font script="Tibt" typeface="Microsoft Himalaya"/>
+        <a:font script="Thaa" typeface="MV Boli"/>
+        <a:font script="Deva" typeface="Mangal"/>
+        <a:font script="Telu" typeface="Gautami"/>
+        <a:font script="Taml" typeface="Latha"/>
+        <a:font script="Syrc" typeface="Estrangelo Edessa"/>
+        <a:font script="Orya" typeface="Kalinga"/>
+        <a:font script="Mlym" typeface="Kartika"/>
+        <a:font script="Laoo" typeface="DokChampa"/>
+        <a:font script="Sinh" typeface="Iskoola Pota"/>
+        <a:font script="Mong" typeface="Mongolian Baiti"/>
+        <a:font script="Viet" typeface="Arial"/>
+        <a:font script="Uigh" typeface="Microsoft Uighur"/>
+        <a:font script="Geor" typeface="Sylfaen"/>
+        <a:font script="Armn" typeface="Arial"/>
+        <a:font script="Bugi" typeface="Leelawadee UI"/>
+        <a:font script="Bopo" typeface="Microsoft JhengHei"/>
+        <a:font script="Java" typeface="Javanese Text"/>
+        <a:font script="Lisu" typeface="Segoe UI"/>
+        <a:font script="Mymr" typeface="Myanmar Text"/>
+        <a:font script="Nkoo" typeface="Ebrima"/>
+        <a:font script="Olck" typeface="Nirmala UI"/>
+        <a:font script="Osma" typeface="Ebrima"/>
+        <a:font script="Phag" typeface="Phagspa"/>
+        <a:font script="Syrn" typeface="Estrangelo Edessa"/>
+        <a:font script="Syrj" typeface="Estrangelo Edessa"/>
+        <a:font script="Syre" typeface="Estrangelo Edessa"/>
+        <a:font script="Sora" typeface="Nirmala UI"/>
+        <a:font script="Tale" typeface="Microsoft Tai Le"/>
+        <a:font script="Talu" typeface="Microsoft New Tai Lue"/>
+        <a:font script="Tfng" typeface="Ebrima"/>
+      </a:minorFont>
+    </a:fontScheme>
+    <a:fmtScheme name="Office">
+      <a:fillStyleLst>
+        <a:solidFill>
+          <a:schemeClr val="phClr"/>
+        </a:solidFill>
+        <a:gradFill rotWithShape="1">
+          <a:gsLst>
+            <a:gs pos="0">
+              <a:schemeClr val="phClr">
+                <a:lumMod val="110000"/>
+                <a:satMod val="105000"/>
+                <a:tint val="67000"/>
+              </a:schemeClr>
+            </a:gs>
+            <a:gs pos="50000">
+              <a:schemeClr val="phClr">
+                <a:lumMod val="105000"/>
+                <a:satMod val="103000"/>
+                <a:tint val="73000"/>
+              </a:schemeClr>
+            </a:gs>
+            <a:gs pos="100000">
+              <a:schemeClr val="phClr">
+                <a:lumMod val="105000"/>
+                <a:satMod val="109000"/>
+                <a:tint val="81000"/>
+              </a:schemeClr>
+            </a:gs>
+          </a:gsLst>
+          <a:lin ang="5400000" scaled="0"/>
+        </a:gradFill>
+        <a:gradFill rotWithShape="1">
+          <a:gsLst>
+            <a:gs pos="0">
+              <a:schemeClr val="phClr">
+                <a:satMod val="103000"/>
+                <a:lumMod val="102000"/>
+                <a:tint val="94000"/>
+              </a:schemeClr>
+            </a:gs>
+            <a:gs pos="50000">
+              <a:schemeClr val="phClr">
+                <a:satMod val="110000"/>
+                <a:lumMod val="100000"/>
+                <a:shade val="100000"/>
+              </a:schemeClr>
+            </a:gs>
+            <a:gs pos="100000">
+              <a:schemeClr val="phClr">
+                <a:lumMod val="99000"/>
+                <a:satMod val="120000"/>
+                <a:shade val="78000"/>
+              </a:schemeClr>
+            </a:gs>
+          </a:gsLst>
+          <a:lin ang="5400000" scaled="0"/>
+        </a:gradFill>
+      </a:fillStyleLst>
+      <a:lnStyleLst>
+        <a:ln w="12700" cap="flat" cmpd="sng" algn="ctr">
+          <a:solidFill>
+            <a:schemeClr val="phClr"/>
+          </a:solidFill>
+          <a:prstDash val="solid"/>
+          <a:miter lim="800000"/>
+        </a:ln>
+        <a:ln w="19050" cap="flat" cmpd="sng" algn="ctr">
+          <a:solidFill>
+            <a:schemeClr val="phClr"/>
+          </a:solidFill>
+          <a:prstDash val="solid"/>
+          <a:miter lim="800000"/>
+        </a:ln>
+        <a:ln w="25400" cap="flat" cmpd="sng" algn="ctr">
+          <a:solidFill>
+            <a:schemeClr val="phClr"/>
+          </a:solidFill>
+          <a:prstDash val="solid"/>
+          <a:miter lim="800000"/>
+        </a:ln>
+      </a:lnStyleLst>
+      <a:effectStyleLst>
+        <a:effectStyle>
+          <a:effectLst/>
+        </a:effectStyle>
+        <a:effectStyle>
+          <a:effectLst/>
+        </a:effectStyle>
+        <a:effectStyle>
+          <a:effectLst>
+            <a:outerShdw blurRad="57150" dist="19050" dir="5400000" algn="ctr" rotWithShape="0">
+              <a:srgbClr val="000000">
+                <a:alpha val="63000"/>
+              </a:srgbClr>
+            </a:outerShdw>
+          </a:effectLst>
+        </a:effectStyle>
+      </a:effectStyleLst>
+      <a:bgFillStyleLst>
+        <a:solidFill>
+          <a:schemeClr val="phClr"/>
+        </a:solidFill>
+        <a:solidFill>
+          <a:schemeClr val="phClr">
+            <a:tint val="95000"/>
+            <a:satMod val="170000"/>
+          </a:schemeClr>
+        </a:solidFill>
+        <a:gradFill rotWithShape="1">
+          <a:gsLst>
+            <a:gs pos="0">
+              <a:schemeClr val="phClr">
+                <a:tint val="93000"/>
+                <a:satMod val="150000"/>
+                <a:shade val="98000"/>
+                <a:lumMod val="102000"/>
+              </a:schemeClr>
+            </a:gs>
+            <a:gs pos="50000">
+              <a:schemeClr val="phClr">
+                <a:tint val="98000"/>
+                <a:satMod val="130000"/>
+                <a:shade val="90000"/>
+                <a:lumMod val="103000"/>
+              </a:schemeClr>
+            </a:gs>
+            <a:gs pos="100000">
+              <a:schemeClr val="phClr">
+                <a:shade val="63000"/>
+                <a:satMod val="120000"/>
+              </a:schemeClr>
+            </a:gs>
+          </a:gsLst>
+          <a:lin ang="5400000" scaled="0"/>
+        </a:gradFill>
+      </a:bgFillStyleLst>
+    </a:fmtScheme>
+  </a:themeElements>
+  <a:objectDefaults>
+    <a:lnDef>
+      <a:spPr/>
+      <a:bodyPr/>
+      <a:lstStyle/>
+      <a:style>
+        <a:lnRef idx="2">
+          <a:schemeClr val="accent1"/>
+        </a:lnRef>
+        <a:fillRef idx="0">
+          <a:schemeClr val="accent1"/>
+        </a:fillRef>
+        <a:effectRef idx="1">
+          <a:schemeClr val="accent1"/>
+        </a:effectRef>
+        <a:fontRef idx="minor">
+          <a:schemeClr val="tx1"/>
+        </a:fontRef>
+      </a:style>
+    </a:lnDef>
+  </a:objectDefaults>
+  <a:extraClrSchemeLst/>
+  <a:extLst>
+    <a:ext uri="{05A4C25C-085E-4340-85A3-A5531E510DB2}">
+      <thm15:themeFamily xmlns:thm15="http://schemas.microsoft.com/office/thememl/2012/main" name="Office Theme" id="{2E142A2C-CD16-42D6-873A-C26D2A0506FA}" vid="{1BDDFF52-6CD6-40A5-AB3C-68EB2F1E4D0A}"/>
+    </a:ext>
+  </a:extLst>
+</a:theme>
 </file>
</xml_diff>

<commit_message>
Add slide on GUI versus script
</commit_message>
<xml_diff>
--- a/best_practices_for_data_science_on_hpc.pptx
+++ b/best_practices_for_data_science_on_hpc.pptx
@@ -5,7 +5,7 @@
     <p:sldMasterId id="2147483648" r:id="rId1"/>
   </p:sldMasterIdLst>
   <p:notesMasterIdLst>
-    <p:notesMasterId r:id="rId14"/>
+    <p:notesMasterId r:id="rId15"/>
   </p:notesMasterIdLst>
   <p:sldIdLst>
     <p:sldId id="257" r:id="rId2"/>
@@ -18,8 +18,9 @@
     <p:sldId id="360" r:id="rId9"/>
     <p:sldId id="361" r:id="rId10"/>
     <p:sldId id="362" r:id="rId11"/>
-    <p:sldId id="364" r:id="rId12"/>
-    <p:sldId id="365" r:id="rId13"/>
+    <p:sldId id="366" r:id="rId12"/>
+    <p:sldId id="364" r:id="rId13"/>
+    <p:sldId id="365" r:id="rId14"/>
   </p:sldIdLst>
   <p:sldSz cx="12192000" cy="6858000"/>
   <p:notesSz cx="6858000" cy="9144000"/>
@@ -4288,7 +4289,7 @@
           <p:cNvPr id="2" name="Title 1">
             <a:extLst>
               <a:ext uri="{FF2B5EF4-FFF2-40B4-BE49-F238E27FC236}">
-                <a16:creationId xmlns:a16="http://schemas.microsoft.com/office/drawing/2014/main" id="{6A4E4FB0-D4D9-8C9A-CCA8-4E1049D53ED5}"/>
+                <a16:creationId xmlns:a16="http://schemas.microsoft.com/office/drawing/2014/main" id="{A87F8A1B-F890-0E7B-CF16-138B17FC40FF}"/>
               </a:ext>
             </a:extLst>
           </p:cNvPr>
@@ -4306,7 +4307,7 @@
           <a:p>
             <a:r>
               <a:rPr lang="en-US" dirty="0"/>
-              <a:t>Modules</a:t>
+              <a:t>Modus operandi</a:t>
             </a:r>
             <a:endParaRPr lang="LID4096" dirty="0"/>
           </a:p>
@@ -4314,167 +4315,10 @@
       </p:sp>
       <p:sp>
         <p:nvSpPr>
-          <p:cNvPr id="3" name="Content Placeholder 2">
-            <a:extLst>
-              <a:ext uri="{FF2B5EF4-FFF2-40B4-BE49-F238E27FC236}">
-                <a16:creationId xmlns:a16="http://schemas.microsoft.com/office/drawing/2014/main" id="{B8BC8460-3442-3102-41FB-3742F191148F}"/>
-              </a:ext>
-            </a:extLst>
-          </p:cNvPr>
-          <p:cNvSpPr>
-            <a:spLocks noGrp="1"/>
-          </p:cNvSpPr>
-          <p:nvPr>
-            <p:ph idx="1"/>
-          </p:nvPr>
-        </p:nvSpPr>
-        <p:spPr/>
-        <p:txBody>
-          <a:bodyPr/>
-          <a:lstStyle/>
-          <a:p>
-            <a:r>
-              <a:rPr lang="en-US" dirty="0"/>
-              <a:t>Use installed modules, when possible, e.g.,</a:t>
-            </a:r>
-          </a:p>
-          <a:p>
-            <a:pPr lvl="1"/>
-            <a:r>
-              <a:rPr lang="fr-BE" dirty="0">
-                <a:latin typeface="Courier New" panose="02070309020205020404" pitchFamily="49" charset="0"/>
-                <a:cs typeface="Courier New" panose="02070309020205020404" pitchFamily="49" charset="0"/>
-              </a:rPr>
-              <a:t>R/4.4.0-gfbf-2023a</a:t>
-            </a:r>
-          </a:p>
-          <a:p>
-            <a:pPr lvl="1"/>
-            <a:r>
-              <a:rPr lang="en-US" dirty="0">
-                <a:latin typeface="Courier New" panose="02070309020205020404" pitchFamily="49" charset="0"/>
-                <a:cs typeface="Courier New" panose="02070309020205020404" pitchFamily="49" charset="0"/>
-              </a:rPr>
-              <a:t>Python/3.12.3-GCCcore-13.3.0</a:t>
-            </a:r>
-          </a:p>
-          <a:p>
-            <a:r>
-              <a:rPr lang="en-US" dirty="0"/>
-              <a:t>Use package bundles, e.g.,</a:t>
-            </a:r>
-          </a:p>
-          <a:p>
-            <a:pPr lvl="1"/>
-            <a:r>
-              <a:rPr lang="fr-BE" dirty="0">
-                <a:latin typeface="Courier New" panose="02070309020205020404" pitchFamily="49" charset="0"/>
-                <a:cs typeface="Courier New" panose="02070309020205020404" pitchFamily="49" charset="0"/>
-              </a:rPr>
-              <a:t>R-bundle-CRAN/2023.12-foss-2023a</a:t>
-            </a:r>
-          </a:p>
-          <a:p>
-            <a:pPr lvl="1"/>
-            <a:r>
-              <a:rPr lang="en-US" dirty="0">
-                <a:latin typeface="Courier New" panose="02070309020205020404" pitchFamily="49" charset="0"/>
-                <a:cs typeface="Courier New" panose="02070309020205020404" pitchFamily="49" charset="0"/>
-              </a:rPr>
-              <a:t>SciPy-bundle/2024.05-gfbf-2024a</a:t>
-            </a:r>
-          </a:p>
-          <a:p>
-            <a:r>
-              <a:rPr lang="en-US" dirty="0"/>
-              <a:t>Use additional modules, e.g.,</a:t>
-            </a:r>
-          </a:p>
-          <a:p>
-            <a:pPr lvl="1"/>
-            <a:r>
-              <a:rPr lang="en-US" dirty="0">
-                <a:latin typeface="Courier New" panose="02070309020205020404" pitchFamily="49" charset="0"/>
-                <a:cs typeface="Courier New" panose="02070309020205020404" pitchFamily="49" charset="0"/>
-              </a:rPr>
-              <a:t>TensorFlow/2.15.1-foss-2023a-CUDA-12.1.1</a:t>
-            </a:r>
-          </a:p>
-          <a:p>
-            <a:pPr lvl="1"/>
-            <a:r>
-              <a:rPr lang="en-US" dirty="0">
-                <a:latin typeface="Courier New" panose="02070309020205020404" pitchFamily="49" charset="0"/>
-                <a:cs typeface="Courier New" panose="02070309020205020404" pitchFamily="49" charset="0"/>
-              </a:rPr>
-              <a:t>matplotlib/3.9.2-gfbf-2024a</a:t>
-            </a:r>
-          </a:p>
-        </p:txBody>
-      </p:sp>
-      <p:sp>
-        <p:nvSpPr>
-          <p:cNvPr id="4" name="TextBox 3">
-            <a:extLst>
-              <a:ext uri="{FF2B5EF4-FFF2-40B4-BE49-F238E27FC236}">
-                <a16:creationId xmlns:a16="http://schemas.microsoft.com/office/drawing/2014/main" id="{36EC73E5-41E2-D442-7611-AC0633BD9D89}"/>
-              </a:ext>
-            </a:extLst>
-          </p:cNvPr>
-          <p:cNvSpPr txBox="1"/>
-          <p:nvPr/>
-        </p:nvSpPr>
-        <p:spPr>
-          <a:xfrm rot="1009166">
-            <a:off x="8382909" y="2890390"/>
-            <a:ext cx="2960875" cy="1077218"/>
-          </a:xfrm>
-          <a:prstGeom prst="rect">
-            <a:avLst/>
-          </a:prstGeom>
-          <a:solidFill>
-            <a:srgbClr val="EBBE83"/>
-          </a:solidFill>
-          <a:ln>
-            <a:solidFill>
-              <a:schemeClr val="tx1"/>
-            </a:solidFill>
-          </a:ln>
-          <a:effectLst>
-            <a:outerShdw blurRad="50800" dist="38100" dir="2700000" algn="tl" rotWithShape="0">
-              <a:prstClr val="black">
-                <a:alpha val="40000"/>
-              </a:prstClr>
-            </a:outerShdw>
-          </a:effectLst>
-        </p:spPr>
-        <p:txBody>
-          <a:bodyPr wrap="none" rtlCol="0">
-            <a:spAutoFit/>
-          </a:bodyPr>
-          <a:lstStyle/>
-          <a:p>
-            <a:r>
-              <a:rPr lang="en-US" sz="3200" dirty="0"/>
-              <a:t>Much, but likely</a:t>
-            </a:r>
-            <a:br>
-              <a:rPr lang="en-US" sz="3200" dirty="0"/>
-            </a:br>
-            <a:r>
-              <a:rPr lang="en-US" sz="3200" dirty="0"/>
-              <a:t>not all</a:t>
-            </a:r>
-            <a:endParaRPr lang="LID4096" sz="3200" dirty="0"/>
-          </a:p>
-        </p:txBody>
-      </p:sp>
-      <p:sp>
-        <p:nvSpPr>
-          <p:cNvPr id="5" name="Slide Number Placeholder 4">
-            <a:extLst>
-              <a:ext uri="{FF2B5EF4-FFF2-40B4-BE49-F238E27FC236}">
-                <a16:creationId xmlns:a16="http://schemas.microsoft.com/office/drawing/2014/main" id="{AEFBEE10-594A-0164-043D-803AEE126DC3}"/>
+          <p:cNvPr id="4" name="Slide Number Placeholder 3">
+            <a:extLst>
+              <a:ext uri="{FF2B5EF4-FFF2-40B4-BE49-F238E27FC236}">
+                <a16:creationId xmlns:a16="http://schemas.microsoft.com/office/drawing/2014/main" id="{90DCF936-FB19-99F8-C364-ABF10AA1CA28}"/>
               </a:ext>
             </a:extLst>
           </p:cNvPr>
@@ -4498,10 +4342,104 @@
           </a:p>
         </p:txBody>
       </p:sp>
+      <p:pic>
+        <p:nvPicPr>
+          <p:cNvPr id="1026" name="Picture 2" descr="A screenshot of the four RStudio panes, labeled Source, Environments, Console, and Output.">
+            <a:extLst>
+              <a:ext uri="{FF2B5EF4-FFF2-40B4-BE49-F238E27FC236}">
+                <a16:creationId xmlns:a16="http://schemas.microsoft.com/office/drawing/2014/main" id="{D9C1B41B-A8D2-6FF8-C1C7-F65C085A7C4B}"/>
+              </a:ext>
+            </a:extLst>
+          </p:cNvPr>
+          <p:cNvPicPr>
+            <a:picLocks noChangeAspect="1" noChangeArrowheads="1"/>
+          </p:cNvPicPr>
+          <p:nvPr/>
+        </p:nvPicPr>
+        <p:blipFill>
+          <a:blip r:embed="rId2">
+            <a:extLst>
+              <a:ext uri="{28A0092B-C50C-407E-A947-70E740481C1C}">
+                <a14:useLocalDpi xmlns:a14="http://schemas.microsoft.com/office/drawing/2010/main" val="0"/>
+              </a:ext>
+            </a:extLst>
+          </a:blip>
+          <a:srcRect/>
+          <a:stretch>
+            <a:fillRect/>
+          </a:stretch>
+        </p:blipFill>
+        <p:spPr bwMode="auto">
+          <a:xfrm>
+            <a:off x="838200" y="1863568"/>
+            <a:ext cx="4562413" cy="3429549"/>
+          </a:xfrm>
+          <a:prstGeom prst="rect">
+            <a:avLst/>
+          </a:prstGeom>
+          <a:noFill/>
+          <a:extLst>
+            <a:ext uri="{909E8E84-426E-40DD-AFC4-6F175D3DCCD1}">
+              <a14:hiddenFill xmlns:a14="http://schemas.microsoft.com/office/drawing/2010/main">
+                <a:solidFill>
+                  <a:srgbClr val="FFFFFF"/>
+                </a:solidFill>
+              </a14:hiddenFill>
+            </a:ext>
+          </a:extLst>
+        </p:spPr>
+      </p:pic>
+      <p:pic>
+        <p:nvPicPr>
+          <p:cNvPr id="1028" name="Picture 4" descr="interface-screenshot">
+            <a:extLst>
+              <a:ext uri="{FF2B5EF4-FFF2-40B4-BE49-F238E27FC236}">
+                <a16:creationId xmlns:a16="http://schemas.microsoft.com/office/drawing/2014/main" id="{E1A1D796-3ADD-87FF-168A-EF847C932983}"/>
+              </a:ext>
+            </a:extLst>
+          </p:cNvPr>
+          <p:cNvPicPr>
+            <a:picLocks noChangeAspect="1" noChangeArrowheads="1"/>
+          </p:cNvPicPr>
+          <p:nvPr/>
+        </p:nvPicPr>
+        <p:blipFill>
+          <a:blip r:embed="rId3">
+            <a:extLst>
+              <a:ext uri="{28A0092B-C50C-407E-A947-70E740481C1C}">
+                <a14:useLocalDpi xmlns:a14="http://schemas.microsoft.com/office/drawing/2010/main" val="0"/>
+              </a:ext>
+            </a:extLst>
+          </a:blip>
+          <a:srcRect/>
+          <a:stretch>
+            <a:fillRect/>
+          </a:stretch>
+        </p:blipFill>
+        <p:spPr bwMode="auto">
+          <a:xfrm>
+            <a:off x="2150610" y="2710378"/>
+            <a:ext cx="4957762" cy="3429549"/>
+          </a:xfrm>
+          <a:prstGeom prst="rect">
+            <a:avLst/>
+          </a:prstGeom>
+          <a:noFill/>
+          <a:extLst>
+            <a:ext uri="{909E8E84-426E-40DD-AFC4-6F175D3DCCD1}">
+              <a14:hiddenFill xmlns:a14="http://schemas.microsoft.com/office/drawing/2010/main">
+                <a:solidFill>
+                  <a:srgbClr val="FFFFFF"/>
+                </a:solidFill>
+              </a14:hiddenFill>
+            </a:ext>
+          </a:extLst>
+        </p:spPr>
+      </p:pic>
     </p:spTree>
     <p:extLst>
       <p:ext uri="{BB962C8B-B14F-4D97-AF65-F5344CB8AC3E}">
-        <p14:creationId xmlns:p14="http://schemas.microsoft.com/office/powerpoint/2010/main" val="81425153"/>
+        <p14:creationId xmlns:p14="http://schemas.microsoft.com/office/powerpoint/2010/main" val="572724651"/>
       </p:ext>
     </p:extLst>
   </p:cSld>
@@ -4533,7 +4471,7 @@
           <p:cNvPr id="2" name="Title 1">
             <a:extLst>
               <a:ext uri="{FF2B5EF4-FFF2-40B4-BE49-F238E27FC236}">
-                <a16:creationId xmlns:a16="http://schemas.microsoft.com/office/drawing/2014/main" id="{B92D361E-5725-81AD-1613-A54CB4F70245}"/>
+                <a16:creationId xmlns:a16="http://schemas.microsoft.com/office/drawing/2014/main" id="{6A4E4FB0-D4D9-8C9A-CCA8-4E1049D53ED5}"/>
               </a:ext>
             </a:extLst>
           </p:cNvPr>
@@ -4551,7 +4489,252 @@
           <a:p>
             <a:r>
               <a:rPr lang="en-US" dirty="0"/>
-              <a:t>Job script modules best practices</a:t>
+              <a:t>Modules</a:t>
+            </a:r>
+            <a:endParaRPr lang="LID4096" dirty="0"/>
+          </a:p>
+        </p:txBody>
+      </p:sp>
+      <p:sp>
+        <p:nvSpPr>
+          <p:cNvPr id="3" name="Content Placeholder 2">
+            <a:extLst>
+              <a:ext uri="{FF2B5EF4-FFF2-40B4-BE49-F238E27FC236}">
+                <a16:creationId xmlns:a16="http://schemas.microsoft.com/office/drawing/2014/main" id="{B8BC8460-3442-3102-41FB-3742F191148F}"/>
+              </a:ext>
+            </a:extLst>
+          </p:cNvPr>
+          <p:cNvSpPr>
+            <a:spLocks noGrp="1"/>
+          </p:cNvSpPr>
+          <p:nvPr>
+            <p:ph idx="1"/>
+          </p:nvPr>
+        </p:nvSpPr>
+        <p:spPr/>
+        <p:txBody>
+          <a:bodyPr/>
+          <a:lstStyle/>
+          <a:p>
+            <a:r>
+              <a:rPr lang="en-US" dirty="0"/>
+              <a:t>Use installed modules, when possible, e.g.,</a:t>
+            </a:r>
+          </a:p>
+          <a:p>
+            <a:pPr lvl="1"/>
+            <a:r>
+              <a:rPr lang="fr-BE" dirty="0">
+                <a:latin typeface="Courier New" panose="02070309020205020404" pitchFamily="49" charset="0"/>
+                <a:cs typeface="Courier New" panose="02070309020205020404" pitchFamily="49" charset="0"/>
+              </a:rPr>
+              <a:t>R/4.4.0-gfbf-2023a</a:t>
+            </a:r>
+          </a:p>
+          <a:p>
+            <a:pPr lvl="1"/>
+            <a:r>
+              <a:rPr lang="en-US" dirty="0">
+                <a:latin typeface="Courier New" panose="02070309020205020404" pitchFamily="49" charset="0"/>
+                <a:cs typeface="Courier New" panose="02070309020205020404" pitchFamily="49" charset="0"/>
+              </a:rPr>
+              <a:t>Python/3.12.3-GCCcore-13.3.0</a:t>
+            </a:r>
+          </a:p>
+          <a:p>
+            <a:r>
+              <a:rPr lang="en-US" dirty="0"/>
+              <a:t>Use package bundles, e.g.,</a:t>
+            </a:r>
+          </a:p>
+          <a:p>
+            <a:pPr lvl="1"/>
+            <a:r>
+              <a:rPr lang="fr-BE" dirty="0">
+                <a:latin typeface="Courier New" panose="02070309020205020404" pitchFamily="49" charset="0"/>
+                <a:cs typeface="Courier New" panose="02070309020205020404" pitchFamily="49" charset="0"/>
+              </a:rPr>
+              <a:t>R-bundle-CRAN/2023.12-foss-2023a</a:t>
+            </a:r>
+          </a:p>
+          <a:p>
+            <a:pPr lvl="1"/>
+            <a:r>
+              <a:rPr lang="en-US" dirty="0">
+                <a:latin typeface="Courier New" panose="02070309020205020404" pitchFamily="49" charset="0"/>
+                <a:cs typeface="Courier New" panose="02070309020205020404" pitchFamily="49" charset="0"/>
+              </a:rPr>
+              <a:t>SciPy-bundle/2024.05-gfbf-2024a</a:t>
+            </a:r>
+          </a:p>
+          <a:p>
+            <a:r>
+              <a:rPr lang="en-US" dirty="0"/>
+              <a:t>Use additional modules, e.g.,</a:t>
+            </a:r>
+          </a:p>
+          <a:p>
+            <a:pPr lvl="1"/>
+            <a:r>
+              <a:rPr lang="en-US" dirty="0">
+                <a:latin typeface="Courier New" panose="02070309020205020404" pitchFamily="49" charset="0"/>
+                <a:cs typeface="Courier New" panose="02070309020205020404" pitchFamily="49" charset="0"/>
+              </a:rPr>
+              <a:t>TensorFlow/2.15.1-foss-2023a-CUDA-12.1.1</a:t>
+            </a:r>
+          </a:p>
+          <a:p>
+            <a:pPr lvl="1"/>
+            <a:r>
+              <a:rPr lang="en-US" dirty="0">
+                <a:latin typeface="Courier New" panose="02070309020205020404" pitchFamily="49" charset="0"/>
+                <a:cs typeface="Courier New" panose="02070309020205020404" pitchFamily="49" charset="0"/>
+              </a:rPr>
+              <a:t>matplotlib/3.9.2-gfbf-2024a</a:t>
+            </a:r>
+          </a:p>
+        </p:txBody>
+      </p:sp>
+      <p:sp>
+        <p:nvSpPr>
+          <p:cNvPr id="4" name="TextBox 3">
+            <a:extLst>
+              <a:ext uri="{FF2B5EF4-FFF2-40B4-BE49-F238E27FC236}">
+                <a16:creationId xmlns:a16="http://schemas.microsoft.com/office/drawing/2014/main" id="{36EC73E5-41E2-D442-7611-AC0633BD9D89}"/>
+              </a:ext>
+            </a:extLst>
+          </p:cNvPr>
+          <p:cNvSpPr txBox="1"/>
+          <p:nvPr/>
+        </p:nvSpPr>
+        <p:spPr>
+          <a:xfrm rot="1009166">
+            <a:off x="8382909" y="2890390"/>
+            <a:ext cx="2960875" cy="1077218"/>
+          </a:xfrm>
+          <a:prstGeom prst="rect">
+            <a:avLst/>
+          </a:prstGeom>
+          <a:solidFill>
+            <a:srgbClr val="EBBE83"/>
+          </a:solidFill>
+          <a:ln>
+            <a:solidFill>
+              <a:schemeClr val="tx1"/>
+            </a:solidFill>
+          </a:ln>
+          <a:effectLst>
+            <a:outerShdw blurRad="50800" dist="38100" dir="2700000" algn="tl" rotWithShape="0">
+              <a:prstClr val="black">
+                <a:alpha val="40000"/>
+              </a:prstClr>
+            </a:outerShdw>
+          </a:effectLst>
+        </p:spPr>
+        <p:txBody>
+          <a:bodyPr wrap="none" rtlCol="0">
+            <a:spAutoFit/>
+          </a:bodyPr>
+          <a:lstStyle/>
+          <a:p>
+            <a:r>
+              <a:rPr lang="en-US" sz="3200" dirty="0"/>
+              <a:t>Much, but likely</a:t>
+            </a:r>
+            <a:br>
+              <a:rPr lang="en-US" sz="3200" dirty="0"/>
+            </a:br>
+            <a:r>
+              <a:rPr lang="en-US" sz="3200" dirty="0"/>
+              <a:t>not all</a:t>
+            </a:r>
+            <a:endParaRPr lang="LID4096" sz="3200" dirty="0"/>
+          </a:p>
+        </p:txBody>
+      </p:sp>
+      <p:sp>
+        <p:nvSpPr>
+          <p:cNvPr id="5" name="Slide Number Placeholder 4">
+            <a:extLst>
+              <a:ext uri="{FF2B5EF4-FFF2-40B4-BE49-F238E27FC236}">
+                <a16:creationId xmlns:a16="http://schemas.microsoft.com/office/drawing/2014/main" id="{AEFBEE10-594A-0164-043D-803AEE126DC3}"/>
+              </a:ext>
+            </a:extLst>
+          </p:cNvPr>
+          <p:cNvSpPr>
+            <a:spLocks noGrp="1"/>
+          </p:cNvSpPr>
+          <p:nvPr>
+            <p:ph type="sldNum" sz="quarter" idx="12"/>
+          </p:nvPr>
+        </p:nvSpPr>
+        <p:spPr/>
+        <p:txBody>
+          <a:bodyPr/>
+          <a:lstStyle/>
+          <a:p>
+            <a:fld id="{9C7CE217-4467-4B8D-A735-B008FA7C4816}" type="slidenum">
+              <a:rPr lang="LID4096" smtClean="0"/>
+              <a:t>12</a:t>
+            </a:fld>
+            <a:endParaRPr lang="LID4096"/>
+          </a:p>
+        </p:txBody>
+      </p:sp>
+    </p:spTree>
+    <p:extLst>
+      <p:ext uri="{BB962C8B-B14F-4D97-AF65-F5344CB8AC3E}">
+        <p14:creationId xmlns:p14="http://schemas.microsoft.com/office/powerpoint/2010/main" val="81425153"/>
+      </p:ext>
+    </p:extLst>
+  </p:cSld>
+  <p:clrMapOvr>
+    <a:masterClrMapping/>
+  </p:clrMapOvr>
+</p:sld>
+</file>
+
+<file path=ppt/slides/slide13.xml><?xml version="1.0" encoding="utf-8"?>
+<p:sld xmlns:a="http://schemas.openxmlformats.org/drawingml/2006/main" xmlns:r="http://schemas.openxmlformats.org/officeDocument/2006/relationships" xmlns:p="http://schemas.openxmlformats.org/presentationml/2006/main">
+  <p:cSld>
+    <p:spTree>
+      <p:nvGrpSpPr>
+        <p:cNvPr id="1" name=""/>
+        <p:cNvGrpSpPr/>
+        <p:nvPr/>
+      </p:nvGrpSpPr>
+      <p:grpSpPr>
+        <a:xfrm>
+          <a:off x="0" y="0"/>
+          <a:ext cx="0" cy="0"/>
+          <a:chOff x="0" y="0"/>
+          <a:chExt cx="0" cy="0"/>
+        </a:xfrm>
+      </p:grpSpPr>
+      <p:sp>
+        <p:nvSpPr>
+          <p:cNvPr id="2" name="Title 1">
+            <a:extLst>
+              <a:ext uri="{FF2B5EF4-FFF2-40B4-BE49-F238E27FC236}">
+                <a16:creationId xmlns:a16="http://schemas.microsoft.com/office/drawing/2014/main" id="{B92D361E-5725-81AD-1613-A54CB4F70245}"/>
+              </a:ext>
+            </a:extLst>
+          </p:cNvPr>
+          <p:cNvSpPr>
+            <a:spLocks noGrp="1"/>
+          </p:cNvSpPr>
+          <p:nvPr>
+            <p:ph type="title"/>
+          </p:nvPr>
+        </p:nvSpPr>
+        <p:spPr/>
+        <p:txBody>
+          <a:bodyPr/>
+          <a:lstStyle/>
+          <a:p>
+            <a:r>
+              <a:rPr lang="en-US" dirty="0"/>
+              <a:t>Job script &amp; modules: best practices</a:t>
             </a:r>
             <a:endParaRPr lang="LID4096" dirty="0"/>
           </a:p>
@@ -4936,7 +5119,7 @@
         </p:nvGrpSpPr>
         <p:grpSpPr>
           <a:xfrm>
-            <a:off x="5638800" y="2439565"/>
+            <a:off x="5377543" y="2439565"/>
             <a:ext cx="6553200" cy="1675235"/>
             <a:chOff x="5638800" y="2439565"/>
             <a:chExt cx="6553200" cy="1675235"/>
@@ -5145,7 +5328,7 @@
         </p:nvGrpSpPr>
         <p:grpSpPr>
           <a:xfrm>
-            <a:off x="6444343" y="3309744"/>
+            <a:off x="6183086" y="3309744"/>
             <a:ext cx="5747657" cy="1459591"/>
             <a:chOff x="6444343" y="3309744"/>
             <a:chExt cx="5747657" cy="1459591"/>
@@ -5421,7 +5604,7 @@
           <a:p>
             <a:fld id="{9C7CE217-4467-4B8D-A735-B008FA7C4816}" type="slidenum">
               <a:rPr lang="LID4096" smtClean="0"/>
-              <a:t>12</a:t>
+              <a:t>13</a:t>
             </a:fld>
             <a:endParaRPr lang="LID4096"/>
           </a:p>

</xml_diff>

<commit_message>
Add slides on command line arguments
</commit_message>
<xml_diff>
--- a/best_practices_for_data_science_on_hpc.pptx
+++ b/best_practices_for_data_science_on_hpc.pptx
@@ -5,7 +5,7 @@
     <p:sldMasterId id="2147483648" r:id="rId1"/>
   </p:sldMasterIdLst>
   <p:notesMasterIdLst>
-    <p:notesMasterId r:id="rId15"/>
+    <p:notesMasterId r:id="rId18"/>
   </p:notesMasterIdLst>
   <p:sldIdLst>
     <p:sldId id="257" r:id="rId2"/>
@@ -19,8 +19,11 @@
     <p:sldId id="361" r:id="rId10"/>
     <p:sldId id="362" r:id="rId11"/>
     <p:sldId id="366" r:id="rId12"/>
-    <p:sldId id="364" r:id="rId13"/>
-    <p:sldId id="365" r:id="rId14"/>
+    <p:sldId id="367" r:id="rId13"/>
+    <p:sldId id="368" r:id="rId14"/>
+    <p:sldId id="369" r:id="rId15"/>
+    <p:sldId id="364" r:id="rId16"/>
+    <p:sldId id="365" r:id="rId17"/>
   </p:sldIdLst>
   <p:sldSz cx="12192000" cy="6858000"/>
   <p:notesSz cx="6858000" cy="9144000"/>
@@ -354,7 +357,7 @@
           <a:p>
             <a:fld id="{AFA0CAC4-3EE0-4DC7-ABD6-D3D6E5AAAB9D}" type="datetimeFigureOut">
               <a:rPr lang="LID4096" smtClean="0"/>
-              <a:t>05/21/2025</a:t>
+              <a:t>05/22/2025</a:t>
             </a:fld>
             <a:endParaRPr lang="LID4096"/>
           </a:p>
@@ -771,7 +774,7 @@
           <a:p>
             <a:fld id="{D44F87C4-D0FF-4ABC-B333-BDD4A889DCA1}" type="datetime1">
               <a:rPr lang="LID4096" smtClean="0"/>
-              <a:t>05/21/2025</a:t>
+              <a:t>05/22/2025</a:t>
             </a:fld>
             <a:endParaRPr lang="LID4096"/>
           </a:p>
@@ -971,7 +974,7 @@
           <a:p>
             <a:fld id="{C798A9AB-7D13-4A1F-BEC7-C733FF8E3B84}" type="datetime1">
               <a:rPr lang="LID4096" smtClean="0"/>
-              <a:t>05/21/2025</a:t>
+              <a:t>05/22/2025</a:t>
             </a:fld>
             <a:endParaRPr lang="LID4096"/>
           </a:p>
@@ -1181,7 +1184,7 @@
           <a:p>
             <a:fld id="{DB9488E1-5B48-4482-9C1F-FB8A64529493}" type="datetime1">
               <a:rPr lang="LID4096" smtClean="0"/>
-              <a:t>05/21/2025</a:t>
+              <a:t>05/22/2025</a:t>
             </a:fld>
             <a:endParaRPr lang="LID4096"/>
           </a:p>
@@ -1381,7 +1384,7 @@
           <a:p>
             <a:fld id="{02E48E22-1479-48C4-B746-780F47AD5EC9}" type="datetime1">
               <a:rPr lang="LID4096" smtClean="0"/>
-              <a:t>05/21/2025</a:t>
+              <a:t>05/22/2025</a:t>
             </a:fld>
             <a:endParaRPr lang="LID4096"/>
           </a:p>
@@ -1657,7 +1660,7 @@
           <a:p>
             <a:fld id="{ACFA5FA8-46CB-46C5-AAB0-0D899A830AB1}" type="datetime1">
               <a:rPr lang="LID4096" smtClean="0"/>
-              <a:t>05/21/2025</a:t>
+              <a:t>05/22/2025</a:t>
             </a:fld>
             <a:endParaRPr lang="LID4096"/>
           </a:p>
@@ -1925,7 +1928,7 @@
           <a:p>
             <a:fld id="{C8250588-C4C6-4E7A-B27D-46BD5B8159A8}" type="datetime1">
               <a:rPr lang="LID4096" smtClean="0"/>
-              <a:t>05/21/2025</a:t>
+              <a:t>05/22/2025</a:t>
             </a:fld>
             <a:endParaRPr lang="LID4096"/>
           </a:p>
@@ -2340,7 +2343,7 @@
           <a:p>
             <a:fld id="{72985A48-4465-48A8-AAD4-B9BEB580B31E}" type="datetime1">
               <a:rPr lang="LID4096" smtClean="0"/>
-              <a:t>05/21/2025</a:t>
+              <a:t>05/22/2025</a:t>
             </a:fld>
             <a:endParaRPr lang="LID4096"/>
           </a:p>
@@ -2482,7 +2485,7 @@
           <a:p>
             <a:fld id="{566EFD7D-974A-4FEA-9103-2A0F722D35E4}" type="datetime1">
               <a:rPr lang="LID4096" smtClean="0"/>
-              <a:t>05/21/2025</a:t>
+              <a:t>05/22/2025</a:t>
             </a:fld>
             <a:endParaRPr lang="LID4096"/>
           </a:p>
@@ -2595,7 +2598,7 @@
           <a:p>
             <a:fld id="{4601B35C-61E9-41E8-9D04-B075C63E69AD}" type="datetime1">
               <a:rPr lang="LID4096" smtClean="0"/>
-              <a:t>05/21/2025</a:t>
+              <a:t>05/22/2025</a:t>
             </a:fld>
             <a:endParaRPr lang="LID4096"/>
           </a:p>
@@ -2908,7 +2911,7 @@
           <a:p>
             <a:fld id="{69A9A7E0-60EF-4A8E-B5EF-6F8166A81BDD}" type="datetime1">
               <a:rPr lang="LID4096" smtClean="0"/>
-              <a:t>05/21/2025</a:t>
+              <a:t>05/22/2025</a:t>
             </a:fld>
             <a:endParaRPr lang="LID4096"/>
           </a:p>
@@ -3197,7 +3200,7 @@
           <a:p>
             <a:fld id="{437CDF53-035C-4F7E-91D9-70126BA0C501}" type="datetime1">
               <a:rPr lang="LID4096" smtClean="0"/>
-              <a:t>05/21/2025</a:t>
+              <a:t>05/22/2025</a:t>
             </a:fld>
             <a:endParaRPr lang="LID4096"/>
           </a:p>
@@ -3440,7 +3443,7 @@
           <a:p>
             <a:fld id="{C4428A7A-D2AE-4E58-ACE6-968F47E7F9F9}" type="datetime1">
               <a:rPr lang="LID4096" smtClean="0"/>
-              <a:t>05/21/2025</a:t>
+              <a:t>05/22/2025</a:t>
             </a:fld>
             <a:endParaRPr lang="LID4096"/>
           </a:p>
@@ -4175,6 +4178,9 @@
             </a:r>
           </a:p>
           <a:p>
+            <a:endParaRPr lang="en-US" dirty="0"/>
+          </a:p>
+          <a:p>
             <a:r>
               <a:rPr lang="en-US" dirty="0"/>
               <a:t>Packages</a:t>
@@ -4199,6 +4205,9 @@
               <a:rPr lang="en-US" dirty="0"/>
               <a:t> more packages</a:t>
             </a:r>
+          </a:p>
+          <a:p>
+            <a:endParaRPr lang="en-US" dirty="0"/>
           </a:p>
           <a:p>
             <a:r>
@@ -4251,6 +4260,166 @@
               <a:t>10</a:t>
             </a:fld>
             <a:endParaRPr lang="LID4096"/>
+          </a:p>
+        </p:txBody>
+      </p:sp>
+      <p:pic>
+        <p:nvPicPr>
+          <p:cNvPr id="1026" name="Picture 2">
+            <a:extLst>
+              <a:ext uri="{FF2B5EF4-FFF2-40B4-BE49-F238E27FC236}">
+                <a16:creationId xmlns:a16="http://schemas.microsoft.com/office/drawing/2014/main" id="{DFC5DB07-BDCE-65E8-D36C-9A1CB8993EEE}"/>
+              </a:ext>
+            </a:extLst>
+          </p:cNvPr>
+          <p:cNvPicPr>
+            <a:picLocks noChangeAspect="1" noChangeArrowheads="1"/>
+          </p:cNvPicPr>
+          <p:nvPr/>
+        </p:nvPicPr>
+        <p:blipFill>
+          <a:blip r:embed="rId2">
+            <a:extLst>
+              <a:ext uri="{28A0092B-C50C-407E-A947-70E740481C1C}">
+                <a14:useLocalDpi xmlns:a14="http://schemas.microsoft.com/office/drawing/2010/main" val="0"/>
+              </a:ext>
+            </a:extLst>
+          </a:blip>
+          <a:srcRect/>
+          <a:stretch>
+            <a:fillRect/>
+          </a:stretch>
+        </p:blipFill>
+        <p:spPr bwMode="auto">
+          <a:xfrm>
+            <a:off x="3275240" y="1978478"/>
+            <a:ext cx="941613" cy="941613"/>
+          </a:xfrm>
+          <a:prstGeom prst="rect">
+            <a:avLst/>
+          </a:prstGeom>
+          <a:noFill/>
+          <a:extLst>
+            <a:ext uri="{909E8E84-426E-40DD-AFC4-6F175D3DCCD1}">
+              <a14:hiddenFill xmlns:a14="http://schemas.microsoft.com/office/drawing/2010/main">
+                <a:solidFill>
+                  <a:srgbClr val="FFFFFF"/>
+                </a:solidFill>
+              </a14:hiddenFill>
+            </a:ext>
+          </a:extLst>
+        </p:spPr>
+      </p:pic>
+      <p:pic>
+        <p:nvPicPr>
+          <p:cNvPr id="1028" name="Picture 4">
+            <a:extLst>
+              <a:ext uri="{FF2B5EF4-FFF2-40B4-BE49-F238E27FC236}">
+                <a16:creationId xmlns:a16="http://schemas.microsoft.com/office/drawing/2014/main" id="{CB375B32-15AB-E193-F7E7-9A8622D85699}"/>
+              </a:ext>
+            </a:extLst>
+          </p:cNvPr>
+          <p:cNvPicPr>
+            <a:picLocks noChangeAspect="1" noChangeArrowheads="1"/>
+          </p:cNvPicPr>
+          <p:nvPr/>
+        </p:nvPicPr>
+        <p:blipFill>
+          <a:blip r:embed="rId3">
+            <a:extLst>
+              <a:ext uri="{28A0092B-C50C-407E-A947-70E740481C1C}">
+                <a14:useLocalDpi xmlns:a14="http://schemas.microsoft.com/office/drawing/2010/main" val="0"/>
+              </a:ext>
+            </a:extLst>
+          </a:blip>
+          <a:srcRect/>
+          <a:stretch>
+            <a:fillRect/>
+          </a:stretch>
+        </p:blipFill>
+        <p:spPr bwMode="auto">
+          <a:xfrm>
+            <a:off x="4957377" y="1898195"/>
+            <a:ext cx="1316876" cy="1021896"/>
+          </a:xfrm>
+          <a:prstGeom prst="rect">
+            <a:avLst/>
+          </a:prstGeom>
+          <a:noFill/>
+          <a:extLst>
+            <a:ext uri="{909E8E84-426E-40DD-AFC4-6F175D3DCCD1}">
+              <a14:hiddenFill xmlns:a14="http://schemas.microsoft.com/office/drawing/2010/main">
+                <a:solidFill>
+                  <a:srgbClr val="FFFFFF"/>
+                </a:solidFill>
+              </a14:hiddenFill>
+            </a:ext>
+          </a:extLst>
+        </p:spPr>
+      </p:pic>
+      <p:pic>
+        <p:nvPicPr>
+          <p:cNvPr id="9" name="Picture 8">
+            <a:extLst>
+              <a:ext uri="{FF2B5EF4-FFF2-40B4-BE49-F238E27FC236}">
+                <a16:creationId xmlns:a16="http://schemas.microsoft.com/office/drawing/2014/main" id="{D8E716E1-CBD0-AAD4-AA22-67D72C0FA3C0}"/>
+              </a:ext>
+            </a:extLst>
+          </p:cNvPr>
+          <p:cNvPicPr>
+            <a:picLocks noChangeAspect="1"/>
+          </p:cNvPicPr>
+          <p:nvPr/>
+        </p:nvPicPr>
+        <p:blipFill>
+          <a:blip r:embed="rId4"/>
+          <a:stretch>
+            <a:fillRect/>
+          </a:stretch>
+        </p:blipFill>
+        <p:spPr>
+          <a:xfrm>
+            <a:off x="9204937" y="3074079"/>
+            <a:ext cx="1609286" cy="1183690"/>
+          </a:xfrm>
+          <a:prstGeom prst="rect">
+            <a:avLst/>
+          </a:prstGeom>
+        </p:spPr>
+      </p:pic>
+      <p:sp>
+        <p:nvSpPr>
+          <p:cNvPr id="10" name="TextBox 9">
+            <a:extLst>
+              <a:ext uri="{FF2B5EF4-FFF2-40B4-BE49-F238E27FC236}">
+                <a16:creationId xmlns:a16="http://schemas.microsoft.com/office/drawing/2014/main" id="{6CC1C990-10EA-2700-6525-C5AF9141159E}"/>
+              </a:ext>
+            </a:extLst>
+          </p:cNvPr>
+          <p:cNvSpPr txBox="1"/>
+          <p:nvPr/>
+        </p:nvSpPr>
+        <p:spPr>
+          <a:xfrm>
+            <a:off x="9307285" y="4561114"/>
+            <a:ext cx="1114601" cy="523220"/>
+          </a:xfrm>
+          <a:prstGeom prst="rect">
+            <a:avLst/>
+          </a:prstGeom>
+          <a:noFill/>
+        </p:spPr>
+        <p:txBody>
+          <a:bodyPr wrap="none" rtlCol="0">
+            <a:spAutoFit/>
+          </a:bodyPr>
+          <a:lstStyle/>
+          <a:p>
+            <a:r>
+              <a:rPr lang="en-US" sz="2800" dirty="0"/>
+              <a:t>CRAN</a:t>
+            </a:r>
+            <a:endParaRPr lang="LID4096" sz="2800" dirty="0"/>
           </a:p>
         </p:txBody>
       </p:sp>
@@ -4371,7 +4540,7 @@
         </p:blipFill>
         <p:spPr bwMode="auto">
           <a:xfrm>
-            <a:off x="838200" y="1863568"/>
+            <a:off x="252573" y="1483424"/>
             <a:ext cx="4562413" cy="3429549"/>
           </a:xfrm>
           <a:prstGeom prst="rect">
@@ -4418,8 +4587,8 @@
         </p:blipFill>
         <p:spPr bwMode="auto">
           <a:xfrm>
-            <a:off x="2150610" y="2710378"/>
-            <a:ext cx="4957762" cy="3429549"/>
+            <a:off x="1917963" y="2808987"/>
+            <a:ext cx="3761849" cy="2602272"/>
           </a:xfrm>
           <a:prstGeom prst="rect">
             <a:avLst/>
@@ -4436,6 +4605,249 @@
           </a:extLst>
         </p:spPr>
       </p:pic>
+      <p:sp>
+        <p:nvSpPr>
+          <p:cNvPr id="3" name="Arrow: Right 2">
+            <a:extLst>
+              <a:ext uri="{FF2B5EF4-FFF2-40B4-BE49-F238E27FC236}">
+                <a16:creationId xmlns:a16="http://schemas.microsoft.com/office/drawing/2014/main" id="{30A02069-44A7-AE64-71D4-678EF0ECEF93}"/>
+              </a:ext>
+            </a:extLst>
+          </p:cNvPr>
+          <p:cNvSpPr/>
+          <p:nvPr/>
+        </p:nvSpPr>
+        <p:spPr>
+          <a:xfrm>
+            <a:off x="6267236" y="3198198"/>
+            <a:ext cx="893851" cy="510773"/>
+          </a:xfrm>
+          <a:prstGeom prst="rightArrow">
+            <a:avLst/>
+          </a:prstGeom>
+          <a:solidFill>
+            <a:srgbClr val="FF0000"/>
+          </a:solidFill>
+          <a:ln>
+            <a:solidFill>
+              <a:srgbClr val="FF0000"/>
+            </a:solidFill>
+          </a:ln>
+        </p:spPr>
+        <p:style>
+          <a:lnRef idx="2">
+            <a:schemeClr val="accent1">
+              <a:shade val="15000"/>
+            </a:schemeClr>
+          </a:lnRef>
+          <a:fillRef idx="1">
+            <a:schemeClr val="accent1"/>
+          </a:fillRef>
+          <a:effectRef idx="0">
+            <a:schemeClr val="accent1"/>
+          </a:effectRef>
+          <a:fontRef idx="minor">
+            <a:schemeClr val="lt1"/>
+          </a:fontRef>
+        </p:style>
+        <p:txBody>
+          <a:bodyPr rtlCol="0" anchor="ctr"/>
+          <a:lstStyle/>
+          <a:p>
+            <a:pPr algn="ctr"/>
+            <a:endParaRPr lang="LID4096"/>
+          </a:p>
+        </p:txBody>
+      </p:sp>
+      <p:sp>
+        <p:nvSpPr>
+          <p:cNvPr id="5" name="TextBox 4">
+            <a:extLst>
+              <a:ext uri="{FF2B5EF4-FFF2-40B4-BE49-F238E27FC236}">
+                <a16:creationId xmlns:a16="http://schemas.microsoft.com/office/drawing/2014/main" id="{0ADD09D0-04E0-D1DD-AF34-54BB33D35321}"/>
+              </a:ext>
+            </a:extLst>
+          </p:cNvPr>
+          <p:cNvSpPr txBox="1"/>
+          <p:nvPr/>
+        </p:nvSpPr>
+        <p:spPr>
+          <a:xfrm>
+            <a:off x="7928384" y="2601723"/>
+            <a:ext cx="3768980" cy="369332"/>
+          </a:xfrm>
+          <a:prstGeom prst="rect">
+            <a:avLst/>
+          </a:prstGeom>
+          <a:solidFill>
+            <a:schemeClr val="tx1"/>
+          </a:solidFill>
+          <a:ln>
+            <a:solidFill>
+              <a:schemeClr val="tx1"/>
+            </a:solidFill>
+          </a:ln>
+        </p:spPr>
+        <p:txBody>
+          <a:bodyPr wrap="none" rtlCol="0">
+            <a:spAutoFit/>
+          </a:bodyPr>
+          <a:lstStyle/>
+          <a:p>
+            <a:r>
+              <a:rPr lang="en-US" b="1" dirty="0">
+                <a:solidFill>
+                  <a:schemeClr val="bg1"/>
+                </a:solidFill>
+                <a:latin typeface="Courier New" pitchFamily="49" charset="0"/>
+                <a:cs typeface="Courier New" pitchFamily="49" charset="0"/>
+              </a:rPr>
+              <a:t>$  python  data_parsing.py</a:t>
+            </a:r>
+            <a:endParaRPr lang="nl-BE" b="1" dirty="0">
+              <a:solidFill>
+                <a:schemeClr val="bg1"/>
+              </a:solidFill>
+              <a:latin typeface="Courier New" pitchFamily="49" charset="0"/>
+              <a:cs typeface="Courier New" pitchFamily="49" charset="0"/>
+            </a:endParaRPr>
+          </a:p>
+        </p:txBody>
+      </p:sp>
+      <p:sp>
+        <p:nvSpPr>
+          <p:cNvPr id="6" name="TextBox 5">
+            <a:extLst>
+              <a:ext uri="{FF2B5EF4-FFF2-40B4-BE49-F238E27FC236}">
+                <a16:creationId xmlns:a16="http://schemas.microsoft.com/office/drawing/2014/main" id="{E4377C71-1D0C-DED7-03C0-B6044A448CF2}"/>
+              </a:ext>
+            </a:extLst>
+          </p:cNvPr>
+          <p:cNvSpPr txBox="1"/>
+          <p:nvPr/>
+        </p:nvSpPr>
+        <p:spPr>
+          <a:xfrm>
+            <a:off x="7928384" y="3697424"/>
+            <a:ext cx="3768980" cy="369332"/>
+          </a:xfrm>
+          <a:prstGeom prst="rect">
+            <a:avLst/>
+          </a:prstGeom>
+          <a:solidFill>
+            <a:schemeClr val="tx1"/>
+          </a:solidFill>
+          <a:ln>
+            <a:solidFill>
+              <a:schemeClr val="tx1"/>
+            </a:solidFill>
+          </a:ln>
+        </p:spPr>
+        <p:txBody>
+          <a:bodyPr wrap="none" rtlCol="0">
+            <a:spAutoFit/>
+          </a:bodyPr>
+          <a:lstStyle/>
+          <a:p>
+            <a:r>
+              <a:rPr lang="en-US" b="1" dirty="0">
+                <a:solidFill>
+                  <a:schemeClr val="bg1"/>
+                </a:solidFill>
+                <a:latin typeface="Courier New" pitchFamily="49" charset="0"/>
+                <a:cs typeface="Courier New" pitchFamily="49" charset="0"/>
+              </a:rPr>
+              <a:t>$  </a:t>
+            </a:r>
+            <a:r>
+              <a:rPr lang="en-US" b="1" dirty="0" err="1">
+                <a:solidFill>
+                  <a:schemeClr val="bg1"/>
+                </a:solidFill>
+                <a:latin typeface="Courier New" pitchFamily="49" charset="0"/>
+                <a:cs typeface="Courier New" pitchFamily="49" charset="0"/>
+              </a:rPr>
+              <a:t>Rscript</a:t>
+            </a:r>
+            <a:r>
+              <a:rPr lang="en-US" b="1" dirty="0">
+                <a:solidFill>
+                  <a:schemeClr val="bg1"/>
+                </a:solidFill>
+                <a:latin typeface="Courier New" pitchFamily="49" charset="0"/>
+                <a:cs typeface="Courier New" pitchFamily="49" charset="0"/>
+              </a:rPr>
+              <a:t>  </a:t>
+            </a:r>
+            <a:r>
+              <a:rPr lang="en-US" b="1" dirty="0" err="1">
+                <a:solidFill>
+                  <a:schemeClr val="bg1"/>
+                </a:solidFill>
+                <a:latin typeface="Courier New" pitchFamily="49" charset="0"/>
+                <a:cs typeface="Courier New" pitchFamily="49" charset="0"/>
+              </a:rPr>
+              <a:t>data_parsing.R</a:t>
+            </a:r>
+            <a:endParaRPr lang="nl-BE" b="1" dirty="0">
+              <a:solidFill>
+                <a:schemeClr val="bg1"/>
+              </a:solidFill>
+              <a:latin typeface="Courier New" pitchFamily="49" charset="0"/>
+              <a:cs typeface="Courier New" pitchFamily="49" charset="0"/>
+            </a:endParaRPr>
+          </a:p>
+        </p:txBody>
+      </p:sp>
+      <p:sp>
+        <p:nvSpPr>
+          <p:cNvPr id="7" name="TextBox 6">
+            <a:extLst>
+              <a:ext uri="{FF2B5EF4-FFF2-40B4-BE49-F238E27FC236}">
+                <a16:creationId xmlns:a16="http://schemas.microsoft.com/office/drawing/2014/main" id="{21A9E243-0BAC-6D5B-D93A-C446F59EBA98}"/>
+              </a:ext>
+            </a:extLst>
+          </p:cNvPr>
+          <p:cNvSpPr txBox="1"/>
+          <p:nvPr/>
+        </p:nvSpPr>
+        <p:spPr>
+          <a:xfrm>
+            <a:off x="6181778" y="4435340"/>
+            <a:ext cx="3493212" cy="1384995"/>
+          </a:xfrm>
+          <a:prstGeom prst="rect">
+            <a:avLst/>
+          </a:prstGeom>
+          <a:noFill/>
+          <a:ln>
+            <a:solidFill>
+              <a:srgbClr val="FF0000"/>
+            </a:solidFill>
+          </a:ln>
+        </p:spPr>
+        <p:txBody>
+          <a:bodyPr wrap="square" rtlCol="0">
+            <a:spAutoFit/>
+          </a:bodyPr>
+          <a:lstStyle/>
+          <a:p>
+            <a:r>
+              <a:rPr lang="en-US" sz="2800" dirty="0">
+                <a:solidFill>
+                  <a:srgbClr val="FF0000"/>
+                </a:solidFill>
+              </a:rPr>
+              <a:t>Transition from GUI/interactive to command line/batch</a:t>
+            </a:r>
+            <a:endParaRPr lang="LID4096" sz="2800" dirty="0">
+              <a:solidFill>
+                <a:srgbClr val="FF0000"/>
+              </a:solidFill>
+            </a:endParaRPr>
+          </a:p>
+        </p:txBody>
+      </p:sp>
     </p:spTree>
     <p:extLst>
       <p:ext uri="{BB962C8B-B14F-4D97-AF65-F5344CB8AC3E}">
@@ -4446,10 +4858,3239 @@
   <p:clrMapOvr>
     <a:masterClrMapping/>
   </p:clrMapOvr>
+  <p:timing>
+    <p:tnLst>
+      <p:par>
+        <p:cTn id="1" dur="indefinite" restart="never" nodeType="tmRoot">
+          <p:childTnLst>
+            <p:seq concurrent="1" nextAc="seek">
+              <p:cTn id="2" dur="indefinite" nodeType="mainSeq">
+                <p:childTnLst>
+                  <p:par>
+                    <p:cTn id="3" fill="hold">
+                      <p:stCondLst>
+                        <p:cond delay="indefinite"/>
+                        <p:cond evt="onBegin" delay="0">
+                          <p:tn val="2"/>
+                        </p:cond>
+                      </p:stCondLst>
+                      <p:childTnLst>
+                        <p:par>
+                          <p:cTn id="4" fill="hold">
+                            <p:stCondLst>
+                              <p:cond delay="0"/>
+                            </p:stCondLst>
+                            <p:childTnLst>
+                              <p:par>
+                                <p:cTn id="5" presetID="1" presetClass="entr" presetSubtype="0" fill="hold" grpId="0" nodeType="withEffect">
+                                  <p:stCondLst>
+                                    <p:cond delay="0"/>
+                                  </p:stCondLst>
+                                  <p:childTnLst>
+                                    <p:set>
+                                      <p:cBhvr>
+                                        <p:cTn id="6" dur="1" fill="hold">
+                                          <p:stCondLst>
+                                            <p:cond delay="0"/>
+                                          </p:stCondLst>
+                                        </p:cTn>
+                                        <p:tgtEl>
+                                          <p:spTgt spid="5"/>
+                                        </p:tgtEl>
+                                        <p:attrNameLst>
+                                          <p:attrName>style.visibility</p:attrName>
+                                        </p:attrNameLst>
+                                      </p:cBhvr>
+                                      <p:to>
+                                        <p:strVal val="visible"/>
+                                      </p:to>
+                                    </p:set>
+                                  </p:childTnLst>
+                                </p:cTn>
+                              </p:par>
+                              <p:par>
+                                <p:cTn id="7" presetID="1" presetClass="entr" presetSubtype="0" fill="hold" grpId="0" nodeType="withEffect">
+                                  <p:stCondLst>
+                                    <p:cond delay="0"/>
+                                  </p:stCondLst>
+                                  <p:childTnLst>
+                                    <p:set>
+                                      <p:cBhvr>
+                                        <p:cTn id="8" dur="1" fill="hold">
+                                          <p:stCondLst>
+                                            <p:cond delay="0"/>
+                                          </p:stCondLst>
+                                        </p:cTn>
+                                        <p:tgtEl>
+                                          <p:spTgt spid="6"/>
+                                        </p:tgtEl>
+                                        <p:attrNameLst>
+                                          <p:attrName>style.visibility</p:attrName>
+                                        </p:attrNameLst>
+                                      </p:cBhvr>
+                                      <p:to>
+                                        <p:strVal val="visible"/>
+                                      </p:to>
+                                    </p:set>
+                                  </p:childTnLst>
+                                </p:cTn>
+                              </p:par>
+                            </p:childTnLst>
+                          </p:cTn>
+                        </p:par>
+                      </p:childTnLst>
+                    </p:cTn>
+                  </p:par>
+                </p:childTnLst>
+              </p:cTn>
+              <p:prevCondLst>
+                <p:cond evt="onPrev" delay="0">
+                  <p:tgtEl>
+                    <p:sldTgt/>
+                  </p:tgtEl>
+                </p:cond>
+              </p:prevCondLst>
+              <p:nextCondLst>
+                <p:cond evt="onNext" delay="0">
+                  <p:tgtEl>
+                    <p:sldTgt/>
+                  </p:tgtEl>
+                </p:cond>
+              </p:nextCondLst>
+            </p:seq>
+          </p:childTnLst>
+        </p:cTn>
+      </p:par>
+    </p:tnLst>
+    <p:bldLst>
+      <p:bldP spid="5" grpId="0" animBg="1"/>
+      <p:bldP spid="6" grpId="0" animBg="1"/>
+    </p:bldLst>
+  </p:timing>
 </p:sld>
 </file>
 
 <file path=ppt/slides/slide12.xml><?xml version="1.0" encoding="utf-8"?>
+<p:sld xmlns:a="http://schemas.openxmlformats.org/drawingml/2006/main" xmlns:r="http://schemas.openxmlformats.org/officeDocument/2006/relationships" xmlns:p="http://schemas.openxmlformats.org/presentationml/2006/main">
+  <p:cSld>
+    <p:spTree>
+      <p:nvGrpSpPr>
+        <p:cNvPr id="1" name=""/>
+        <p:cNvGrpSpPr/>
+        <p:nvPr/>
+      </p:nvGrpSpPr>
+      <p:grpSpPr>
+        <a:xfrm>
+          <a:off x="0" y="0"/>
+          <a:ext cx="0" cy="0"/>
+          <a:chOff x="0" y="0"/>
+          <a:chExt cx="0" cy="0"/>
+        </a:xfrm>
+      </p:grpSpPr>
+      <p:sp>
+        <p:nvSpPr>
+          <p:cNvPr id="2" name="Title 1">
+            <a:extLst>
+              <a:ext uri="{FF2B5EF4-FFF2-40B4-BE49-F238E27FC236}">
+                <a16:creationId xmlns:a16="http://schemas.microsoft.com/office/drawing/2014/main" id="{44B79F4F-7537-041F-2607-CE8621D9C709}"/>
+              </a:ext>
+            </a:extLst>
+          </p:cNvPr>
+          <p:cNvSpPr>
+            <a:spLocks noGrp="1"/>
+          </p:cNvSpPr>
+          <p:nvPr>
+            <p:ph type="title"/>
+          </p:nvPr>
+        </p:nvSpPr>
+        <p:spPr/>
+        <p:txBody>
+          <a:bodyPr/>
+          <a:lstStyle/>
+          <a:p>
+            <a:r>
+              <a:rPr lang="en-US" dirty="0"/>
+              <a:t>How to transition?</a:t>
+            </a:r>
+            <a:endParaRPr lang="LID4096" dirty="0"/>
+          </a:p>
+        </p:txBody>
+      </p:sp>
+      <p:sp>
+        <p:nvSpPr>
+          <p:cNvPr id="4" name="Content Placeholder 3">
+            <a:extLst>
+              <a:ext uri="{FF2B5EF4-FFF2-40B4-BE49-F238E27FC236}">
+                <a16:creationId xmlns:a16="http://schemas.microsoft.com/office/drawing/2014/main" id="{0ADDF557-75BF-700D-507F-6E7D9FB06971}"/>
+              </a:ext>
+            </a:extLst>
+          </p:cNvPr>
+          <p:cNvSpPr>
+            <a:spLocks noGrp="1"/>
+          </p:cNvSpPr>
+          <p:nvPr>
+            <p:ph idx="1"/>
+          </p:nvPr>
+        </p:nvSpPr>
+        <p:spPr/>
+        <p:txBody>
+          <a:bodyPr/>
+          <a:lstStyle/>
+          <a:p>
+            <a:r>
+              <a:rPr lang="en-US" dirty="0"/>
+              <a:t>No absolute paths!</a:t>
+            </a:r>
+          </a:p>
+          <a:p>
+            <a:endParaRPr lang="en-US" dirty="0"/>
+          </a:p>
+          <a:p>
+            <a:endParaRPr lang="en-US" dirty="0"/>
+          </a:p>
+          <a:p>
+            <a:endParaRPr lang="en-US" dirty="0"/>
+          </a:p>
+          <a:p>
+            <a:r>
+              <a:rPr lang="en-US" dirty="0"/>
+              <a:t>Values changed interactively </a:t>
+            </a:r>
+            <a:r>
+              <a:rPr lang="en-US" dirty="0">
+                <a:sym typeface="Symbol" panose="05050102010706020507" pitchFamily="18" charset="2"/>
+              </a:rPr>
+              <a:t> </a:t>
+            </a:r>
+            <a:r>
+              <a:rPr lang="en-US" dirty="0"/>
+              <a:t>command line arguments</a:t>
+            </a:r>
+          </a:p>
+          <a:p>
+            <a:pPr lvl="1"/>
+            <a:r>
+              <a:rPr lang="en-US" dirty="0"/>
+              <a:t>Python: use </a:t>
+            </a:r>
+            <a:r>
+              <a:rPr lang="en-US" dirty="0" err="1">
+                <a:latin typeface="Courier New" panose="02070309020205020404" pitchFamily="49" charset="0"/>
+                <a:cs typeface="Courier New" panose="02070309020205020404" pitchFamily="49" charset="0"/>
+              </a:rPr>
+              <a:t>argparse</a:t>
+            </a:r>
+            <a:r>
+              <a:rPr lang="en-US" dirty="0"/>
+              <a:t>/</a:t>
+            </a:r>
+            <a:r>
+              <a:rPr lang="en-US" dirty="0">
+                <a:latin typeface="Courier New" panose="02070309020205020404" pitchFamily="49" charset="0"/>
+                <a:cs typeface="Courier New" panose="02070309020205020404" pitchFamily="49" charset="0"/>
+              </a:rPr>
+              <a:t>click</a:t>
+            </a:r>
+          </a:p>
+          <a:p>
+            <a:pPr lvl="1"/>
+            <a:r>
+              <a:rPr lang="en-US" dirty="0"/>
+              <a:t>R: </a:t>
+            </a:r>
+            <a:r>
+              <a:rPr lang="en-US" dirty="0" err="1">
+                <a:latin typeface="Courier New" panose="02070309020205020404" pitchFamily="49" charset="0"/>
+                <a:cs typeface="Courier New" panose="02070309020205020404" pitchFamily="49" charset="0"/>
+              </a:rPr>
+              <a:t>optparse</a:t>
+            </a:r>
+            <a:endParaRPr lang="en-US" dirty="0">
+              <a:latin typeface="Courier New" panose="02070309020205020404" pitchFamily="49" charset="0"/>
+              <a:cs typeface="Courier New" panose="02070309020205020404" pitchFamily="49" charset="0"/>
+            </a:endParaRPr>
+          </a:p>
+          <a:p>
+            <a:r>
+              <a:rPr lang="en-US" dirty="0"/>
+              <a:t>Choose/create your environment</a:t>
+            </a:r>
+            <a:endParaRPr lang="LID4096" dirty="0"/>
+          </a:p>
+        </p:txBody>
+      </p:sp>
+      <p:sp>
+        <p:nvSpPr>
+          <p:cNvPr id="3" name="Slide Number Placeholder 2">
+            <a:extLst>
+              <a:ext uri="{FF2B5EF4-FFF2-40B4-BE49-F238E27FC236}">
+                <a16:creationId xmlns:a16="http://schemas.microsoft.com/office/drawing/2014/main" id="{24D340C4-C4D9-69DC-9B56-66BA260F391E}"/>
+              </a:ext>
+            </a:extLst>
+          </p:cNvPr>
+          <p:cNvSpPr>
+            <a:spLocks noGrp="1"/>
+          </p:cNvSpPr>
+          <p:nvPr>
+            <p:ph type="sldNum" sz="quarter" idx="12"/>
+          </p:nvPr>
+        </p:nvSpPr>
+        <p:spPr/>
+        <p:txBody>
+          <a:bodyPr/>
+          <a:lstStyle/>
+          <a:p>
+            <a:fld id="{9C7CE217-4467-4B8D-A735-B008FA7C4816}" type="slidenum">
+              <a:rPr lang="LID4096" smtClean="0"/>
+              <a:t>12</a:t>
+            </a:fld>
+            <a:endParaRPr lang="LID4096"/>
+          </a:p>
+        </p:txBody>
+      </p:sp>
+      <p:sp>
+        <p:nvSpPr>
+          <p:cNvPr id="7" name="TextBox 6">
+            <a:extLst>
+              <a:ext uri="{FF2B5EF4-FFF2-40B4-BE49-F238E27FC236}">
+                <a16:creationId xmlns:a16="http://schemas.microsoft.com/office/drawing/2014/main" id="{9862107F-621A-CA00-38CD-5273575242A8}"/>
+              </a:ext>
+            </a:extLst>
+          </p:cNvPr>
+          <p:cNvSpPr txBox="1"/>
+          <p:nvPr/>
+        </p:nvSpPr>
+        <p:spPr>
+          <a:xfrm>
+            <a:off x="2927561" y="2715795"/>
+            <a:ext cx="2913788" cy="461665"/>
+          </a:xfrm>
+          <a:prstGeom prst="rect">
+            <a:avLst/>
+          </a:prstGeom>
+          <a:solidFill>
+            <a:schemeClr val="bg1">
+              <a:lumMod val="85000"/>
+            </a:schemeClr>
+          </a:solidFill>
+          <a:ln>
+            <a:solidFill>
+              <a:schemeClr val="tx1"/>
+            </a:solidFill>
+          </a:ln>
+        </p:spPr>
+        <p:txBody>
+          <a:bodyPr wrap="square" rtlCol="0">
+            <a:spAutoFit/>
+          </a:bodyPr>
+          <a:lstStyle/>
+          <a:p>
+            <a:pPr marL="0" marR="0" lvl="0" indent="0" algn="l" defTabSz="914400" rtl="0" eaLnBrk="1" fontAlgn="auto" latinLnBrk="0" hangingPunct="1">
+              <a:lnSpc>
+                <a:spcPct val="100000"/>
+              </a:lnSpc>
+              <a:spcBef>
+                <a:spcPts val="0"/>
+              </a:spcBef>
+              <a:spcAft>
+                <a:spcPts val="0"/>
+              </a:spcAft>
+              <a:buClrTx/>
+              <a:buSzTx/>
+              <a:buFontTx/>
+              <a:buNone/>
+              <a:tabLst/>
+              <a:defRPr/>
+            </a:pPr>
+            <a:r>
+              <a:rPr kumimoji="0" lang="en-US" sz="2400" b="0" i="0" u="none" strike="noStrike" kern="1200" cap="none" spc="0" normalizeH="0" baseline="0" noProof="0" dirty="0">
+                <a:ln>
+                  <a:noFill/>
+                </a:ln>
+                <a:solidFill>
+                  <a:prstClr val="black"/>
+                </a:solidFill>
+                <a:effectLst/>
+                <a:uLnTx/>
+                <a:uFillTx/>
+                <a:latin typeface="Courier New" pitchFamily="49" charset="0"/>
+                <a:ea typeface="+mn-ea"/>
+                <a:cs typeface="Courier New" pitchFamily="49" charset="0"/>
+              </a:rPr>
+              <a:t>"C:\Users\..."</a:t>
+            </a:r>
+          </a:p>
+        </p:txBody>
+      </p:sp>
+      <p:grpSp>
+        <p:nvGrpSpPr>
+          <p:cNvPr id="13" name="Group 12">
+            <a:extLst>
+              <a:ext uri="{FF2B5EF4-FFF2-40B4-BE49-F238E27FC236}">
+                <a16:creationId xmlns:a16="http://schemas.microsoft.com/office/drawing/2014/main" id="{C6403BD0-2207-A4CC-EB80-75C7EC9C55A0}"/>
+              </a:ext>
+            </a:extLst>
+          </p:cNvPr>
+          <p:cNvGrpSpPr/>
+          <p:nvPr/>
+        </p:nvGrpSpPr>
+        <p:grpSpPr>
+          <a:xfrm>
+            <a:off x="3217890" y="2539680"/>
+            <a:ext cx="2405743" cy="849086"/>
+            <a:chOff x="3145971" y="2960914"/>
+            <a:chExt cx="2405743" cy="849086"/>
+          </a:xfrm>
+        </p:grpSpPr>
+        <p:cxnSp>
+          <p:nvCxnSpPr>
+            <p:cNvPr id="9" name="Straight Connector 8">
+              <a:extLst>
+                <a:ext uri="{FF2B5EF4-FFF2-40B4-BE49-F238E27FC236}">
+                  <a16:creationId xmlns:a16="http://schemas.microsoft.com/office/drawing/2014/main" id="{24F49A03-AEE7-2F72-00FC-8A753E1B74CF}"/>
+                </a:ext>
+              </a:extLst>
+            </p:cNvPr>
+            <p:cNvCxnSpPr/>
+            <p:nvPr/>
+          </p:nvCxnSpPr>
+          <p:spPr>
+            <a:xfrm>
+              <a:off x="3145971" y="2960914"/>
+              <a:ext cx="2405743" cy="849086"/>
+            </a:xfrm>
+            <a:prstGeom prst="line">
+              <a:avLst/>
+            </a:prstGeom>
+            <a:ln w="63500">
+              <a:solidFill>
+                <a:srgbClr val="FF0000"/>
+              </a:solidFill>
+            </a:ln>
+          </p:spPr>
+          <p:style>
+            <a:lnRef idx="2">
+              <a:schemeClr val="accent1"/>
+            </a:lnRef>
+            <a:fillRef idx="0">
+              <a:schemeClr val="accent1"/>
+            </a:fillRef>
+            <a:effectRef idx="1">
+              <a:schemeClr val="accent1"/>
+            </a:effectRef>
+            <a:fontRef idx="minor">
+              <a:schemeClr val="tx1"/>
+            </a:fontRef>
+          </p:style>
+        </p:cxnSp>
+        <p:cxnSp>
+          <p:nvCxnSpPr>
+            <p:cNvPr id="10" name="Straight Connector 9">
+              <a:extLst>
+                <a:ext uri="{FF2B5EF4-FFF2-40B4-BE49-F238E27FC236}">
+                  <a16:creationId xmlns:a16="http://schemas.microsoft.com/office/drawing/2014/main" id="{9A627891-D940-FB9F-5482-D3BE57F42928}"/>
+                </a:ext>
+              </a:extLst>
+            </p:cNvPr>
+            <p:cNvCxnSpPr>
+              <a:cxnSpLocks/>
+            </p:cNvCxnSpPr>
+            <p:nvPr/>
+          </p:nvCxnSpPr>
+          <p:spPr>
+            <a:xfrm flipV="1">
+              <a:off x="3256908" y="2960914"/>
+              <a:ext cx="2147299" cy="849086"/>
+            </a:xfrm>
+            <a:prstGeom prst="line">
+              <a:avLst/>
+            </a:prstGeom>
+            <a:ln w="63500">
+              <a:solidFill>
+                <a:srgbClr val="FF0000"/>
+              </a:solidFill>
+            </a:ln>
+          </p:spPr>
+          <p:style>
+            <a:lnRef idx="2">
+              <a:schemeClr val="accent1"/>
+            </a:lnRef>
+            <a:fillRef idx="0">
+              <a:schemeClr val="accent1"/>
+            </a:fillRef>
+            <a:effectRef idx="1">
+              <a:schemeClr val="accent1"/>
+            </a:effectRef>
+            <a:fontRef idx="minor">
+              <a:schemeClr val="tx1"/>
+            </a:fontRef>
+          </p:style>
+        </p:cxnSp>
+      </p:grpSp>
+    </p:spTree>
+    <p:extLst>
+      <p:ext uri="{BB962C8B-B14F-4D97-AF65-F5344CB8AC3E}">
+        <p14:creationId xmlns:p14="http://schemas.microsoft.com/office/powerpoint/2010/main" val="1378388462"/>
+      </p:ext>
+    </p:extLst>
+  </p:cSld>
+  <p:clrMapOvr>
+    <a:masterClrMapping/>
+  </p:clrMapOvr>
+  <p:timing>
+    <p:tnLst>
+      <p:par>
+        <p:cTn id="1" dur="indefinite" restart="never" nodeType="tmRoot">
+          <p:childTnLst>
+            <p:seq concurrent="1" nextAc="seek">
+              <p:cTn id="2" dur="indefinite" nodeType="mainSeq">
+                <p:childTnLst>
+                  <p:par>
+                    <p:cTn id="3" fill="hold">
+                      <p:stCondLst>
+                        <p:cond delay="indefinite"/>
+                        <p:cond evt="onBegin" delay="0">
+                          <p:tn val="2"/>
+                        </p:cond>
+                      </p:stCondLst>
+                      <p:childTnLst>
+                        <p:par>
+                          <p:cTn id="4" fill="hold">
+                            <p:stCondLst>
+                              <p:cond delay="0"/>
+                            </p:stCondLst>
+                            <p:childTnLst>
+                              <p:par>
+                                <p:cTn id="5" presetID="1" presetClass="entr" presetSubtype="0" fill="hold" grpId="0" nodeType="withEffect">
+                                  <p:stCondLst>
+                                    <p:cond delay="0"/>
+                                  </p:stCondLst>
+                                  <p:childTnLst>
+                                    <p:set>
+                                      <p:cBhvr>
+                                        <p:cTn id="6" dur="1" fill="hold">
+                                          <p:stCondLst>
+                                            <p:cond delay="0"/>
+                                          </p:stCondLst>
+                                        </p:cTn>
+                                        <p:tgtEl>
+                                          <p:spTgt spid="7"/>
+                                        </p:tgtEl>
+                                        <p:attrNameLst>
+                                          <p:attrName>style.visibility</p:attrName>
+                                        </p:attrNameLst>
+                                      </p:cBhvr>
+                                      <p:to>
+                                        <p:strVal val="visible"/>
+                                      </p:to>
+                                    </p:set>
+                                  </p:childTnLst>
+                                </p:cTn>
+                              </p:par>
+                            </p:childTnLst>
+                          </p:cTn>
+                        </p:par>
+                      </p:childTnLst>
+                    </p:cTn>
+                  </p:par>
+                </p:childTnLst>
+              </p:cTn>
+              <p:prevCondLst>
+                <p:cond evt="onPrev" delay="0">
+                  <p:tgtEl>
+                    <p:sldTgt/>
+                  </p:tgtEl>
+                </p:cond>
+              </p:prevCondLst>
+              <p:nextCondLst>
+                <p:cond evt="onNext" delay="0">
+                  <p:tgtEl>
+                    <p:sldTgt/>
+                  </p:tgtEl>
+                </p:cond>
+              </p:nextCondLst>
+            </p:seq>
+          </p:childTnLst>
+        </p:cTn>
+      </p:par>
+    </p:tnLst>
+    <p:bldLst>
+      <p:bldP spid="7" grpId="0" animBg="1"/>
+    </p:bldLst>
+  </p:timing>
+</p:sld>
+</file>
+
+<file path=ppt/slides/slide13.xml><?xml version="1.0" encoding="utf-8"?>
+<p:sld xmlns:a="http://schemas.openxmlformats.org/drawingml/2006/main" xmlns:r="http://schemas.openxmlformats.org/officeDocument/2006/relationships" xmlns:p="http://schemas.openxmlformats.org/presentationml/2006/main">
+  <p:cSld>
+    <p:spTree>
+      <p:nvGrpSpPr>
+        <p:cNvPr id="1" name=""/>
+        <p:cNvGrpSpPr/>
+        <p:nvPr/>
+      </p:nvGrpSpPr>
+      <p:grpSpPr>
+        <a:xfrm>
+          <a:off x="0" y="0"/>
+          <a:ext cx="0" cy="0"/>
+          <a:chOff x="0" y="0"/>
+          <a:chExt cx="0" cy="0"/>
+        </a:xfrm>
+      </p:grpSpPr>
+      <p:sp>
+        <p:nvSpPr>
+          <p:cNvPr id="2" name="Title 1">
+            <a:extLst>
+              <a:ext uri="{FF2B5EF4-FFF2-40B4-BE49-F238E27FC236}">
+                <a16:creationId xmlns:a16="http://schemas.microsoft.com/office/drawing/2014/main" id="{0608DADC-E412-78E6-F9B0-3CEDFC022922}"/>
+              </a:ext>
+            </a:extLst>
+          </p:cNvPr>
+          <p:cNvSpPr>
+            <a:spLocks noGrp="1"/>
+          </p:cNvSpPr>
+          <p:nvPr>
+            <p:ph type="title"/>
+          </p:nvPr>
+        </p:nvSpPr>
+        <p:spPr/>
+        <p:txBody>
+          <a:bodyPr/>
+          <a:lstStyle/>
+          <a:p>
+            <a:r>
+              <a:rPr lang="en-US" dirty="0"/>
+              <a:t>Python: </a:t>
+            </a:r>
+            <a:r>
+              <a:rPr lang="en-US" dirty="0" err="1">
+                <a:latin typeface="Courier New" panose="02070309020205020404" pitchFamily="49" charset="0"/>
+                <a:cs typeface="Courier New" panose="02070309020205020404" pitchFamily="49" charset="0"/>
+              </a:rPr>
+              <a:t>argparse</a:t>
+            </a:r>
+            <a:endParaRPr lang="LID4096" dirty="0">
+              <a:latin typeface="Courier New" panose="02070309020205020404" pitchFamily="49" charset="0"/>
+              <a:cs typeface="Courier New" panose="02070309020205020404" pitchFamily="49" charset="0"/>
+            </a:endParaRPr>
+          </a:p>
+        </p:txBody>
+      </p:sp>
+      <p:sp>
+        <p:nvSpPr>
+          <p:cNvPr id="3" name="Slide Number Placeholder 2">
+            <a:extLst>
+              <a:ext uri="{FF2B5EF4-FFF2-40B4-BE49-F238E27FC236}">
+                <a16:creationId xmlns:a16="http://schemas.microsoft.com/office/drawing/2014/main" id="{3E94AC48-40A3-9E2A-AFDD-BB36BFF1A09D}"/>
+              </a:ext>
+            </a:extLst>
+          </p:cNvPr>
+          <p:cNvSpPr>
+            <a:spLocks noGrp="1"/>
+          </p:cNvSpPr>
+          <p:nvPr>
+            <p:ph type="sldNum" sz="quarter" idx="12"/>
+          </p:nvPr>
+        </p:nvSpPr>
+        <p:spPr/>
+        <p:txBody>
+          <a:bodyPr/>
+          <a:lstStyle/>
+          <a:p>
+            <a:fld id="{9C7CE217-4467-4B8D-A735-B008FA7C4816}" type="slidenum">
+              <a:rPr lang="LID4096" smtClean="0"/>
+              <a:t>13</a:t>
+            </a:fld>
+            <a:endParaRPr lang="LID4096"/>
+          </a:p>
+        </p:txBody>
+      </p:sp>
+      <p:grpSp>
+        <p:nvGrpSpPr>
+          <p:cNvPr id="6" name="Group 5">
+            <a:extLst>
+              <a:ext uri="{FF2B5EF4-FFF2-40B4-BE49-F238E27FC236}">
+                <a16:creationId xmlns:a16="http://schemas.microsoft.com/office/drawing/2014/main" id="{755E79A6-58FF-1218-58C7-43E8845FF29B}"/>
+              </a:ext>
+            </a:extLst>
+          </p:cNvPr>
+          <p:cNvGrpSpPr/>
+          <p:nvPr/>
+        </p:nvGrpSpPr>
+        <p:grpSpPr>
+          <a:xfrm>
+            <a:off x="239730" y="1483517"/>
+            <a:ext cx="11716226" cy="4247317"/>
+            <a:chOff x="-143472" y="2169659"/>
+            <a:chExt cx="9997981" cy="4247317"/>
+          </a:xfrm>
+        </p:grpSpPr>
+        <p:sp>
+          <p:nvSpPr>
+            <p:cNvPr id="7" name="TextBox 6">
+              <a:extLst>
+                <a:ext uri="{FF2B5EF4-FFF2-40B4-BE49-F238E27FC236}">
+                  <a16:creationId xmlns:a16="http://schemas.microsoft.com/office/drawing/2014/main" id="{A60C6E7A-EB70-6823-CA41-389AF17A8A90}"/>
+                </a:ext>
+              </a:extLst>
+            </p:cNvPr>
+            <p:cNvSpPr txBox="1"/>
+            <p:nvPr/>
+          </p:nvSpPr>
+          <p:spPr>
+            <a:xfrm>
+              <a:off x="-143472" y="2169659"/>
+              <a:ext cx="9995043" cy="4247317"/>
+            </a:xfrm>
+            <a:prstGeom prst="rect">
+              <a:avLst/>
+            </a:prstGeom>
+            <a:solidFill>
+              <a:schemeClr val="bg1">
+                <a:lumMod val="85000"/>
+              </a:schemeClr>
+            </a:solidFill>
+            <a:ln>
+              <a:solidFill>
+                <a:schemeClr val="tx1"/>
+              </a:solidFill>
+            </a:ln>
+          </p:spPr>
+          <p:txBody>
+            <a:bodyPr wrap="square" rtlCol="0">
+              <a:spAutoFit/>
+            </a:bodyPr>
+            <a:lstStyle/>
+            <a:p>
+              <a:pPr>
+                <a:defRPr/>
+              </a:pPr>
+              <a:r>
+                <a:rPr lang="en-US" dirty="0">
+                  <a:solidFill>
+                    <a:prstClr val="black"/>
+                  </a:solidFill>
+                  <a:latin typeface="Courier New" pitchFamily="49" charset="0"/>
+                  <a:cs typeface="Courier New" pitchFamily="49" charset="0"/>
+                  <a:sym typeface="Symbol" panose="05050102010706020507" pitchFamily="18" charset="2"/>
+                </a:rPr>
+                <a:t></a:t>
+              </a:r>
+              <a:endParaRPr lang="en-US" dirty="0">
+                <a:solidFill>
+                  <a:prstClr val="black"/>
+                </a:solidFill>
+                <a:latin typeface="Courier New" pitchFamily="49" charset="0"/>
+                <a:cs typeface="Courier New" pitchFamily="49" charset="0"/>
+              </a:endParaRPr>
+            </a:p>
+            <a:p>
+              <a:pPr lvl="0">
+                <a:defRPr/>
+              </a:pPr>
+              <a:r>
+                <a:rPr lang="en-US" dirty="0">
+                  <a:solidFill>
+                    <a:prstClr val="black"/>
+                  </a:solidFill>
+                  <a:latin typeface="Courier New" pitchFamily="49" charset="0"/>
+                  <a:cs typeface="Courier New" pitchFamily="49" charset="0"/>
+                </a:rPr>
+                <a:t>Import </a:t>
+              </a:r>
+              <a:r>
+                <a:rPr lang="en-US" dirty="0" err="1">
+                  <a:solidFill>
+                    <a:prstClr val="black"/>
+                  </a:solidFill>
+                  <a:latin typeface="Courier New" pitchFamily="49" charset="0"/>
+                  <a:cs typeface="Courier New" pitchFamily="49" charset="0"/>
+                </a:rPr>
+                <a:t>argparse</a:t>
+              </a:r>
+              <a:endParaRPr lang="en-US" dirty="0">
+                <a:solidFill>
+                  <a:prstClr val="black"/>
+                </a:solidFill>
+                <a:latin typeface="Courier New" pitchFamily="49" charset="0"/>
+                <a:cs typeface="Courier New" pitchFamily="49" charset="0"/>
+              </a:endParaRPr>
+            </a:p>
+            <a:p>
+              <a:pPr>
+                <a:defRPr/>
+              </a:pPr>
+              <a:r>
+                <a:rPr lang="en-US" dirty="0">
+                  <a:solidFill>
+                    <a:prstClr val="black"/>
+                  </a:solidFill>
+                  <a:latin typeface="Courier New" pitchFamily="49" charset="0"/>
+                  <a:cs typeface="Courier New" pitchFamily="49" charset="0"/>
+                  <a:sym typeface="Symbol" panose="05050102010706020507" pitchFamily="18" charset="2"/>
+                </a:rPr>
+                <a:t></a:t>
+              </a:r>
+              <a:endParaRPr lang="en-US" dirty="0">
+                <a:solidFill>
+                  <a:prstClr val="black"/>
+                </a:solidFill>
+                <a:latin typeface="Courier New" pitchFamily="49" charset="0"/>
+                <a:cs typeface="Courier New" pitchFamily="49" charset="0"/>
+              </a:endParaRPr>
+            </a:p>
+            <a:p>
+              <a:pPr lvl="0">
+                <a:defRPr/>
+              </a:pPr>
+              <a:r>
+                <a:rPr lang="en-US" dirty="0">
+                  <a:solidFill>
+                    <a:prstClr val="black"/>
+                  </a:solidFill>
+                  <a:latin typeface="Courier New" pitchFamily="49" charset="0"/>
+                  <a:cs typeface="Courier New" pitchFamily="49" charset="0"/>
+                </a:rPr>
+                <a:t>parser = </a:t>
+              </a:r>
+              <a:r>
+                <a:rPr lang="en-US" dirty="0" err="1">
+                  <a:solidFill>
+                    <a:prstClr val="black"/>
+                  </a:solidFill>
+                  <a:latin typeface="Courier New" pitchFamily="49" charset="0"/>
+                  <a:cs typeface="Courier New" pitchFamily="49" charset="0"/>
+                </a:rPr>
+                <a:t>argparse.ArgumentParser</a:t>
+              </a:r>
+              <a:r>
+                <a:rPr lang="en-US" dirty="0">
+                  <a:solidFill>
+                    <a:prstClr val="black"/>
+                  </a:solidFill>
+                  <a:latin typeface="Courier New" pitchFamily="49" charset="0"/>
+                  <a:cs typeface="Courier New" pitchFamily="49" charset="0"/>
+                </a:rPr>
+                <a:t>(description='Compute cosine values.')</a:t>
+              </a:r>
+            </a:p>
+            <a:p>
+              <a:pPr lvl="0">
+                <a:defRPr/>
+              </a:pPr>
+              <a:r>
+                <a:rPr lang="en-US" dirty="0" err="1">
+                  <a:solidFill>
+                    <a:prstClr val="black"/>
+                  </a:solidFill>
+                  <a:latin typeface="Courier New" pitchFamily="49" charset="0"/>
+                  <a:cs typeface="Courier New" pitchFamily="49" charset="0"/>
+                </a:rPr>
+                <a:t>parser.add_argument</a:t>
+              </a:r>
+              <a:r>
+                <a:rPr lang="en-US" dirty="0">
+                  <a:solidFill>
+                    <a:prstClr val="black"/>
+                  </a:solidFill>
+                  <a:latin typeface="Courier New" pitchFamily="49" charset="0"/>
+                  <a:cs typeface="Courier New" pitchFamily="49" charset="0"/>
+                </a:rPr>
+                <a:t>('-n', '--num-points', type=int, default=100,</a:t>
+              </a:r>
+            </a:p>
+            <a:p>
+              <a:pPr lvl="0">
+                <a:defRPr/>
+              </a:pPr>
+              <a:r>
+                <a:rPr lang="en-US" dirty="0">
+                  <a:solidFill>
+                    <a:prstClr val="black"/>
+                  </a:solidFill>
+                  <a:latin typeface="Courier New" pitchFamily="49" charset="0"/>
+                  <a:cs typeface="Courier New" pitchFamily="49" charset="0"/>
+                </a:rPr>
+                <a:t>                    help='Number of points to compute')</a:t>
+              </a:r>
+            </a:p>
+            <a:p>
+              <a:pPr lvl="0">
+                <a:defRPr/>
+              </a:pPr>
+              <a:r>
+                <a:rPr lang="en-US" dirty="0" err="1">
+                  <a:solidFill>
+                    <a:prstClr val="black"/>
+                  </a:solidFill>
+                  <a:latin typeface="Courier New" pitchFamily="49" charset="0"/>
+                  <a:cs typeface="Courier New" pitchFamily="49" charset="0"/>
+                </a:rPr>
+                <a:t>parser.add_argument</a:t>
+              </a:r>
+              <a:r>
+                <a:rPr lang="en-US" dirty="0">
+                  <a:solidFill>
+                    <a:prstClr val="black"/>
+                  </a:solidFill>
+                  <a:latin typeface="Courier New" pitchFamily="49" charset="0"/>
+                  <a:cs typeface="Courier New" pitchFamily="49" charset="0"/>
+                </a:rPr>
+                <a:t>('-A', '--amplitude', type=float, default=1.0,</a:t>
+              </a:r>
+            </a:p>
+            <a:p>
+              <a:pPr lvl="0">
+                <a:defRPr/>
+              </a:pPr>
+              <a:r>
+                <a:rPr lang="en-US" dirty="0">
+                  <a:solidFill>
+                    <a:prstClr val="black"/>
+                  </a:solidFill>
+                  <a:latin typeface="Courier New" pitchFamily="49" charset="0"/>
+                  <a:cs typeface="Courier New" pitchFamily="49" charset="0"/>
+                </a:rPr>
+                <a:t>                    help='Amplitude of the cosine function')</a:t>
+              </a:r>
+            </a:p>
+            <a:p>
+              <a:pPr lvl="0">
+                <a:defRPr/>
+              </a:pPr>
+              <a:r>
+                <a:rPr lang="en-US" dirty="0" err="1">
+                  <a:solidFill>
+                    <a:prstClr val="black"/>
+                  </a:solidFill>
+                  <a:latin typeface="Courier New" pitchFamily="49" charset="0"/>
+                  <a:cs typeface="Courier New" pitchFamily="49" charset="0"/>
+                </a:rPr>
+                <a:t>parser.add_argument</a:t>
+              </a:r>
+              <a:r>
+                <a:rPr lang="en-US" dirty="0">
+                  <a:solidFill>
+                    <a:prstClr val="black"/>
+                  </a:solidFill>
+                  <a:latin typeface="Courier New" pitchFamily="49" charset="0"/>
+                  <a:cs typeface="Courier New" pitchFamily="49" charset="0"/>
+                </a:rPr>
+                <a:t>('-f', '--frequency', type=float, default=1.0,</a:t>
+              </a:r>
+            </a:p>
+            <a:p>
+              <a:pPr lvl="0">
+                <a:defRPr/>
+              </a:pPr>
+              <a:r>
+                <a:rPr lang="en-US" dirty="0">
+                  <a:solidFill>
+                    <a:prstClr val="black"/>
+                  </a:solidFill>
+                  <a:latin typeface="Courier New" pitchFamily="49" charset="0"/>
+                  <a:cs typeface="Courier New" pitchFamily="49" charset="0"/>
+                </a:rPr>
+                <a:t>                    help='Frequency of the cosine function')</a:t>
+              </a:r>
+            </a:p>
+            <a:p>
+              <a:pPr>
+                <a:defRPr/>
+              </a:pPr>
+              <a:r>
+                <a:rPr lang="en-US" dirty="0">
+                  <a:solidFill>
+                    <a:prstClr val="black"/>
+                  </a:solidFill>
+                  <a:latin typeface="Courier New" pitchFamily="49" charset="0"/>
+                  <a:cs typeface="Courier New" pitchFamily="49" charset="0"/>
+                  <a:sym typeface="Symbol" panose="05050102010706020507" pitchFamily="18" charset="2"/>
+                </a:rPr>
+                <a:t></a:t>
+              </a:r>
+            </a:p>
+            <a:p>
+              <a:pPr>
+                <a:defRPr/>
+              </a:pPr>
+              <a:r>
+                <a:rPr lang="en-US" dirty="0" err="1">
+                  <a:solidFill>
+                    <a:prstClr val="black"/>
+                  </a:solidFill>
+                  <a:latin typeface="Courier New" pitchFamily="49" charset="0"/>
+                  <a:cs typeface="Courier New" pitchFamily="49" charset="0"/>
+                </a:rPr>
+                <a:t>args</a:t>
+              </a:r>
+              <a:r>
+                <a:rPr lang="en-US" dirty="0">
+                  <a:solidFill>
+                    <a:prstClr val="black"/>
+                  </a:solidFill>
+                  <a:latin typeface="Courier New" pitchFamily="49" charset="0"/>
+                  <a:cs typeface="Courier New" pitchFamily="49" charset="0"/>
+                </a:rPr>
+                <a:t> = </a:t>
+              </a:r>
+              <a:r>
+                <a:rPr lang="en-US" dirty="0" err="1">
+                  <a:solidFill>
+                    <a:prstClr val="black"/>
+                  </a:solidFill>
+                  <a:latin typeface="Courier New" pitchFamily="49" charset="0"/>
+                  <a:cs typeface="Courier New" pitchFamily="49" charset="0"/>
+                </a:rPr>
+                <a:t>parser.parse_args</a:t>
+              </a:r>
+              <a:r>
+                <a:rPr lang="en-US" dirty="0">
+                  <a:solidFill>
+                    <a:prstClr val="black"/>
+                  </a:solidFill>
+                  <a:latin typeface="Courier New" pitchFamily="49" charset="0"/>
+                  <a:cs typeface="Courier New" pitchFamily="49" charset="0"/>
+                </a:rPr>
+                <a:t>()</a:t>
+              </a:r>
+            </a:p>
+            <a:p>
+              <a:pPr>
+                <a:defRPr/>
+              </a:pPr>
+              <a:r>
+                <a:rPr lang="en-US" dirty="0">
+                  <a:solidFill>
+                    <a:prstClr val="black"/>
+                  </a:solidFill>
+                  <a:latin typeface="Courier New" pitchFamily="49" charset="0"/>
+                  <a:cs typeface="Courier New" pitchFamily="49" charset="0"/>
+                  <a:sym typeface="Symbol" panose="05050102010706020507" pitchFamily="18" charset="2"/>
+                </a:rPr>
+                <a:t></a:t>
+              </a:r>
+              <a:endParaRPr lang="en-US" dirty="0">
+                <a:solidFill>
+                  <a:prstClr val="black"/>
+                </a:solidFill>
+                <a:latin typeface="Courier New" pitchFamily="49" charset="0"/>
+                <a:cs typeface="Courier New" pitchFamily="49" charset="0"/>
+              </a:endParaRPr>
+            </a:p>
+            <a:p>
+              <a:pPr lvl="0">
+                <a:defRPr/>
+              </a:pPr>
+              <a:r>
+                <a:rPr lang="en-US" dirty="0">
+                  <a:solidFill>
+                    <a:prstClr val="black"/>
+                  </a:solidFill>
+                  <a:latin typeface="Courier New" pitchFamily="49" charset="0"/>
+                  <a:cs typeface="Courier New" pitchFamily="49" charset="0"/>
+                </a:rPr>
+                <a:t>x, y = </a:t>
+              </a:r>
+              <a:r>
+                <a:rPr lang="en-US" dirty="0" err="1">
+                  <a:solidFill>
+                    <a:prstClr val="black"/>
+                  </a:solidFill>
+                  <a:latin typeface="Courier New" pitchFamily="49" charset="0"/>
+                  <a:cs typeface="Courier New" pitchFamily="49" charset="0"/>
+                </a:rPr>
+                <a:t>compute_cosine</a:t>
+              </a:r>
+              <a:r>
+                <a:rPr lang="en-US" dirty="0">
+                  <a:solidFill>
+                    <a:prstClr val="black"/>
+                  </a:solidFill>
+                  <a:latin typeface="Courier New" pitchFamily="49" charset="0"/>
+                  <a:cs typeface="Courier New" pitchFamily="49" charset="0"/>
+                </a:rPr>
+                <a:t>(</a:t>
+              </a:r>
+              <a:r>
+                <a:rPr lang="en-US" dirty="0" err="1">
+                  <a:solidFill>
+                    <a:prstClr val="black"/>
+                  </a:solidFill>
+                  <a:latin typeface="Courier New" pitchFamily="49" charset="0"/>
+                  <a:cs typeface="Courier New" pitchFamily="49" charset="0"/>
+                </a:rPr>
+                <a:t>args.num_points</a:t>
+              </a:r>
+              <a:r>
+                <a:rPr lang="en-US" dirty="0">
+                  <a:solidFill>
+                    <a:prstClr val="black"/>
+                  </a:solidFill>
+                  <a:latin typeface="Courier New" pitchFamily="49" charset="0"/>
+                  <a:cs typeface="Courier New" pitchFamily="49" charset="0"/>
+                </a:rPr>
+                <a:t>, </a:t>
+              </a:r>
+              <a:r>
+                <a:rPr lang="en-US" dirty="0" err="1">
+                  <a:solidFill>
+                    <a:prstClr val="black"/>
+                  </a:solidFill>
+                  <a:latin typeface="Courier New" pitchFamily="49" charset="0"/>
+                  <a:cs typeface="Courier New" pitchFamily="49" charset="0"/>
+                </a:rPr>
+                <a:t>args.amplitude</a:t>
+              </a:r>
+              <a:r>
+                <a:rPr lang="en-US" dirty="0">
+                  <a:solidFill>
+                    <a:prstClr val="black"/>
+                  </a:solidFill>
+                  <a:latin typeface="Courier New" pitchFamily="49" charset="0"/>
+                  <a:cs typeface="Courier New" pitchFamily="49" charset="0"/>
+                </a:rPr>
+                <a:t>, </a:t>
+              </a:r>
+              <a:r>
+                <a:rPr lang="en-US" dirty="0" err="1">
+                  <a:solidFill>
+                    <a:prstClr val="black"/>
+                  </a:solidFill>
+                  <a:latin typeface="Courier New" pitchFamily="49" charset="0"/>
+                  <a:cs typeface="Courier New" pitchFamily="49" charset="0"/>
+                </a:rPr>
+                <a:t>args.frequency</a:t>
+              </a:r>
+              <a:r>
+                <a:rPr lang="en-US" dirty="0">
+                  <a:solidFill>
+                    <a:prstClr val="black"/>
+                  </a:solidFill>
+                  <a:latin typeface="Courier New" pitchFamily="49" charset="0"/>
+                  <a:cs typeface="Courier New" pitchFamily="49" charset="0"/>
+                </a:rPr>
+                <a:t>)</a:t>
+              </a:r>
+            </a:p>
+            <a:p>
+              <a:pPr lvl="0">
+                <a:defRPr/>
+              </a:pPr>
+              <a:r>
+                <a:rPr lang="en-US" dirty="0">
+                  <a:solidFill>
+                    <a:prstClr val="black"/>
+                  </a:solidFill>
+                  <a:latin typeface="Courier New" pitchFamily="49" charset="0"/>
+                  <a:cs typeface="Courier New" pitchFamily="49" charset="0"/>
+                  <a:sym typeface="Symbol" panose="05050102010706020507" pitchFamily="18" charset="2"/>
+                </a:rPr>
+                <a:t></a:t>
+              </a:r>
+              <a:endParaRPr lang="en-US" dirty="0">
+                <a:solidFill>
+                  <a:prstClr val="black"/>
+                </a:solidFill>
+                <a:latin typeface="Courier New" pitchFamily="49" charset="0"/>
+                <a:cs typeface="Courier New" pitchFamily="49" charset="0"/>
+              </a:endParaRPr>
+            </a:p>
+          </p:txBody>
+        </p:sp>
+        <p:sp>
+          <p:nvSpPr>
+            <p:cNvPr id="8" name="TextBox 7">
+              <a:extLst>
+                <a:ext uri="{FF2B5EF4-FFF2-40B4-BE49-F238E27FC236}">
+                  <a16:creationId xmlns:a16="http://schemas.microsoft.com/office/drawing/2014/main" id="{52CCEE4F-EB43-BD7B-C9A1-DF8D30BBC1AA}"/>
+                </a:ext>
+              </a:extLst>
+            </p:cNvPr>
+            <p:cNvSpPr txBox="1"/>
+            <p:nvPr/>
+          </p:nvSpPr>
+          <p:spPr>
+            <a:xfrm>
+              <a:off x="8748961" y="2169659"/>
+              <a:ext cx="1105548" cy="338554"/>
+            </a:xfrm>
+            <a:prstGeom prst="rect">
+              <a:avLst/>
+            </a:prstGeom>
+            <a:solidFill>
+              <a:schemeClr val="bg1"/>
+            </a:solidFill>
+            <a:ln>
+              <a:solidFill>
+                <a:schemeClr val="tx1"/>
+              </a:solidFill>
+            </a:ln>
+          </p:spPr>
+          <p:txBody>
+            <a:bodyPr wrap="none" rtlCol="0">
+              <a:spAutoFit/>
+            </a:bodyPr>
+            <a:lstStyle/>
+            <a:p>
+              <a:r>
+                <a:rPr lang="en-US" sz="1600" dirty="0">
+                  <a:latin typeface="Courier New" panose="02070309020205020404" pitchFamily="49" charset="0"/>
+                  <a:cs typeface="Courier New" panose="02070309020205020404" pitchFamily="49" charset="0"/>
+                </a:rPr>
+                <a:t>cosine.py</a:t>
+              </a:r>
+              <a:endParaRPr lang="LID4096" sz="1600" dirty="0">
+                <a:latin typeface="Courier New" panose="02070309020205020404" pitchFamily="49" charset="0"/>
+                <a:cs typeface="Courier New" panose="02070309020205020404" pitchFamily="49" charset="0"/>
+              </a:endParaRPr>
+            </a:p>
+          </p:txBody>
+        </p:sp>
+      </p:grpSp>
+      <p:grpSp>
+        <p:nvGrpSpPr>
+          <p:cNvPr id="9" name="Group 8">
+            <a:extLst>
+              <a:ext uri="{FF2B5EF4-FFF2-40B4-BE49-F238E27FC236}">
+                <a16:creationId xmlns:a16="http://schemas.microsoft.com/office/drawing/2014/main" id="{B07DE18D-ADA7-2238-61EE-672DBE10A8AF}"/>
+              </a:ext>
+            </a:extLst>
+          </p:cNvPr>
+          <p:cNvGrpSpPr/>
+          <p:nvPr/>
+        </p:nvGrpSpPr>
+        <p:grpSpPr>
+          <a:xfrm>
+            <a:off x="9087687" y="2517496"/>
+            <a:ext cx="2864582" cy="476298"/>
+            <a:chOff x="2498712" y="5535406"/>
+            <a:chExt cx="2864582" cy="476298"/>
+          </a:xfrm>
+        </p:grpSpPr>
+        <p:sp>
+          <p:nvSpPr>
+            <p:cNvPr id="10" name="TextBox 9">
+              <a:extLst>
+                <a:ext uri="{FF2B5EF4-FFF2-40B4-BE49-F238E27FC236}">
+                  <a16:creationId xmlns:a16="http://schemas.microsoft.com/office/drawing/2014/main" id="{8D369320-6670-DBCA-FE7D-D73AB018448B}"/>
+                </a:ext>
+              </a:extLst>
+            </p:cNvPr>
+            <p:cNvSpPr txBox="1"/>
+            <p:nvPr/>
+          </p:nvSpPr>
+          <p:spPr>
+            <a:xfrm>
+              <a:off x="3707904" y="5535406"/>
+              <a:ext cx="1655390" cy="369332"/>
+            </a:xfrm>
+            <a:prstGeom prst="rect">
+              <a:avLst/>
+            </a:prstGeom>
+            <a:solidFill>
+              <a:schemeClr val="bg1"/>
+            </a:solidFill>
+            <a:ln w="19050">
+              <a:solidFill>
+                <a:schemeClr val="tx1"/>
+              </a:solidFill>
+            </a:ln>
+          </p:spPr>
+          <p:txBody>
+            <a:bodyPr wrap="none" rtlCol="0">
+              <a:spAutoFit/>
+            </a:bodyPr>
+            <a:lstStyle/>
+            <a:p>
+              <a:pPr marL="0" marR="0" lvl="0" indent="0" algn="l" defTabSz="914400" rtl="0" eaLnBrk="1" fontAlgn="auto" latinLnBrk="0" hangingPunct="1">
+                <a:lnSpc>
+                  <a:spcPct val="100000"/>
+                </a:lnSpc>
+                <a:spcBef>
+                  <a:spcPts val="0"/>
+                </a:spcBef>
+                <a:spcAft>
+                  <a:spcPts val="0"/>
+                </a:spcAft>
+                <a:buClrTx/>
+                <a:buSzTx/>
+                <a:buFontTx/>
+                <a:buNone/>
+                <a:tabLst/>
+                <a:defRPr/>
+              </a:pPr>
+              <a:r>
+                <a:rPr kumimoji="0" lang="en-US" sz="1800" b="0" i="0" u="none" strike="noStrike" kern="1200" cap="none" spc="0" normalizeH="0" baseline="0" noProof="0" dirty="0">
+                  <a:ln>
+                    <a:noFill/>
+                  </a:ln>
+                  <a:solidFill>
+                    <a:prstClr val="black"/>
+                  </a:solidFill>
+                  <a:effectLst/>
+                  <a:uLnTx/>
+                  <a:uFillTx/>
+                  <a:latin typeface="Calibri" panose="020F0502020204030204"/>
+                  <a:ea typeface="+mn-ea"/>
+                  <a:cs typeface="+mn-cs"/>
+                </a:rPr>
+                <a:t>Declare options</a:t>
+              </a:r>
+              <a:endParaRPr kumimoji="0" lang="nl-BE" sz="1800" b="0" i="0" u="none" strike="noStrike" kern="1200" cap="none" spc="0" normalizeH="0" baseline="0" noProof="0" dirty="0">
+                <a:ln>
+                  <a:noFill/>
+                </a:ln>
+                <a:solidFill>
+                  <a:prstClr val="black"/>
+                </a:solidFill>
+                <a:effectLst/>
+                <a:uLnTx/>
+                <a:uFillTx/>
+                <a:latin typeface="Calibri" panose="020F0502020204030204"/>
+                <a:ea typeface="+mn-ea"/>
+                <a:cs typeface="+mn-cs"/>
+              </a:endParaRPr>
+            </a:p>
+          </p:txBody>
+        </p:sp>
+        <p:cxnSp>
+          <p:nvCxnSpPr>
+            <p:cNvPr id="11" name="Straight Arrow Connector 10">
+              <a:extLst>
+                <a:ext uri="{FF2B5EF4-FFF2-40B4-BE49-F238E27FC236}">
+                  <a16:creationId xmlns:a16="http://schemas.microsoft.com/office/drawing/2014/main" id="{5407D12E-A4C1-E5F2-7501-41A1816CB949}"/>
+                </a:ext>
+              </a:extLst>
+            </p:cNvPr>
+            <p:cNvCxnSpPr>
+              <a:cxnSpLocks/>
+              <a:stCxn id="10" idx="1"/>
+            </p:cNvCxnSpPr>
+            <p:nvPr/>
+          </p:nvCxnSpPr>
+          <p:spPr>
+            <a:xfrm flipH="1">
+              <a:off x="2498712" y="5720072"/>
+              <a:ext cx="1209192" cy="291632"/>
+            </a:xfrm>
+            <a:prstGeom prst="straightConnector1">
+              <a:avLst/>
+            </a:prstGeom>
+            <a:ln w="28575">
+              <a:solidFill>
+                <a:schemeClr val="tx1"/>
+              </a:solidFill>
+              <a:tailEnd type="stealth" w="lg" len="lg"/>
+            </a:ln>
+          </p:spPr>
+          <p:style>
+            <a:lnRef idx="1">
+              <a:schemeClr val="accent1"/>
+            </a:lnRef>
+            <a:fillRef idx="0">
+              <a:schemeClr val="accent1"/>
+            </a:fillRef>
+            <a:effectRef idx="0">
+              <a:schemeClr val="accent1"/>
+            </a:effectRef>
+            <a:fontRef idx="minor">
+              <a:schemeClr val="tx1"/>
+            </a:fontRef>
+          </p:style>
+        </p:cxnSp>
+      </p:grpSp>
+      <p:grpSp>
+        <p:nvGrpSpPr>
+          <p:cNvPr id="12" name="Group 11">
+            <a:extLst>
+              <a:ext uri="{FF2B5EF4-FFF2-40B4-BE49-F238E27FC236}">
+                <a16:creationId xmlns:a16="http://schemas.microsoft.com/office/drawing/2014/main" id="{E7532BD6-5BF1-E1E2-DD4F-4D9A2FBCE3E2}"/>
+              </a:ext>
+            </a:extLst>
+          </p:cNvPr>
+          <p:cNvGrpSpPr/>
+          <p:nvPr/>
+        </p:nvGrpSpPr>
+        <p:grpSpPr>
+          <a:xfrm>
+            <a:off x="4539343" y="4056805"/>
+            <a:ext cx="7412926" cy="634938"/>
+            <a:chOff x="-2094709" y="5535406"/>
+            <a:chExt cx="7412926" cy="634938"/>
+          </a:xfrm>
+        </p:grpSpPr>
+        <p:sp>
+          <p:nvSpPr>
+            <p:cNvPr id="13" name="TextBox 12">
+              <a:extLst>
+                <a:ext uri="{FF2B5EF4-FFF2-40B4-BE49-F238E27FC236}">
+                  <a16:creationId xmlns:a16="http://schemas.microsoft.com/office/drawing/2014/main" id="{1F873BC2-5902-2762-E2B2-8C17A5BBCDBD}"/>
+                </a:ext>
+              </a:extLst>
+            </p:cNvPr>
+            <p:cNvSpPr txBox="1"/>
+            <p:nvPr/>
+          </p:nvSpPr>
+          <p:spPr>
+            <a:xfrm>
+              <a:off x="3707904" y="5535406"/>
+              <a:ext cx="1610313" cy="369332"/>
+            </a:xfrm>
+            <a:prstGeom prst="rect">
+              <a:avLst/>
+            </a:prstGeom>
+            <a:solidFill>
+              <a:schemeClr val="bg1"/>
+            </a:solidFill>
+            <a:ln w="19050">
+              <a:solidFill>
+                <a:schemeClr val="tx1"/>
+              </a:solidFill>
+            </a:ln>
+          </p:spPr>
+          <p:txBody>
+            <a:bodyPr wrap="none" rtlCol="0">
+              <a:spAutoFit/>
+            </a:bodyPr>
+            <a:lstStyle/>
+            <a:p>
+              <a:pPr marL="0" marR="0" lvl="0" indent="0" algn="l" defTabSz="914400" rtl="0" eaLnBrk="1" fontAlgn="auto" latinLnBrk="0" hangingPunct="1">
+                <a:lnSpc>
+                  <a:spcPct val="100000"/>
+                </a:lnSpc>
+                <a:spcBef>
+                  <a:spcPts val="0"/>
+                </a:spcBef>
+                <a:spcAft>
+                  <a:spcPts val="0"/>
+                </a:spcAft>
+                <a:buClrTx/>
+                <a:buSzTx/>
+                <a:buFontTx/>
+                <a:buNone/>
+                <a:tabLst/>
+                <a:defRPr/>
+              </a:pPr>
+              <a:r>
+                <a:rPr kumimoji="0" lang="en-US" sz="1800" b="0" i="0" u="none" strike="noStrike" kern="1200" cap="none" spc="0" normalizeH="0" baseline="0" noProof="0" dirty="0">
+                  <a:ln>
+                    <a:noFill/>
+                  </a:ln>
+                  <a:solidFill>
+                    <a:prstClr val="black"/>
+                  </a:solidFill>
+                  <a:effectLst/>
+                  <a:uLnTx/>
+                  <a:uFillTx/>
+                  <a:latin typeface="Calibri" panose="020F0502020204030204"/>
+                  <a:ea typeface="+mn-ea"/>
+                  <a:cs typeface="+mn-cs"/>
+                </a:rPr>
+                <a:t>Handle options</a:t>
+              </a:r>
+              <a:endParaRPr kumimoji="0" lang="nl-BE" sz="1800" b="0" i="0" u="none" strike="noStrike" kern="1200" cap="none" spc="0" normalizeH="0" baseline="0" noProof="0" dirty="0">
+                <a:ln>
+                  <a:noFill/>
+                </a:ln>
+                <a:solidFill>
+                  <a:prstClr val="black"/>
+                </a:solidFill>
+                <a:effectLst/>
+                <a:uLnTx/>
+                <a:uFillTx/>
+                <a:latin typeface="Calibri" panose="020F0502020204030204"/>
+                <a:ea typeface="+mn-ea"/>
+                <a:cs typeface="+mn-cs"/>
+              </a:endParaRPr>
+            </a:p>
+          </p:txBody>
+        </p:sp>
+        <p:cxnSp>
+          <p:nvCxnSpPr>
+            <p:cNvPr id="14" name="Straight Arrow Connector 13">
+              <a:extLst>
+                <a:ext uri="{FF2B5EF4-FFF2-40B4-BE49-F238E27FC236}">
+                  <a16:creationId xmlns:a16="http://schemas.microsoft.com/office/drawing/2014/main" id="{4A3E9340-9B78-07F7-1185-EBD716D2634E}"/>
+                </a:ext>
+              </a:extLst>
+            </p:cNvPr>
+            <p:cNvCxnSpPr>
+              <a:cxnSpLocks/>
+              <a:stCxn id="13" idx="1"/>
+            </p:cNvCxnSpPr>
+            <p:nvPr/>
+          </p:nvCxnSpPr>
+          <p:spPr>
+            <a:xfrm flipH="1">
+              <a:off x="-2094709" y="5720072"/>
+              <a:ext cx="5802613" cy="450272"/>
+            </a:xfrm>
+            <a:prstGeom prst="straightConnector1">
+              <a:avLst/>
+            </a:prstGeom>
+            <a:ln w="28575">
+              <a:solidFill>
+                <a:schemeClr val="tx1"/>
+              </a:solidFill>
+              <a:tailEnd type="stealth" w="lg" len="lg"/>
+            </a:ln>
+          </p:spPr>
+          <p:style>
+            <a:lnRef idx="1">
+              <a:schemeClr val="accent1"/>
+            </a:lnRef>
+            <a:fillRef idx="0">
+              <a:schemeClr val="accent1"/>
+            </a:fillRef>
+            <a:effectRef idx="0">
+              <a:schemeClr val="accent1"/>
+            </a:effectRef>
+            <a:fontRef idx="minor">
+              <a:schemeClr val="tx1"/>
+            </a:fontRef>
+          </p:style>
+        </p:cxnSp>
+      </p:grpSp>
+      <p:grpSp>
+        <p:nvGrpSpPr>
+          <p:cNvPr id="15" name="Group 14">
+            <a:extLst>
+              <a:ext uri="{FF2B5EF4-FFF2-40B4-BE49-F238E27FC236}">
+                <a16:creationId xmlns:a16="http://schemas.microsoft.com/office/drawing/2014/main" id="{11F2B522-0B27-C40D-CC95-75F3532D504A}"/>
+              </a:ext>
+            </a:extLst>
+          </p:cNvPr>
+          <p:cNvGrpSpPr/>
+          <p:nvPr/>
+        </p:nvGrpSpPr>
+        <p:grpSpPr>
+          <a:xfrm>
+            <a:off x="7554686" y="5486400"/>
+            <a:ext cx="4397583" cy="732863"/>
+            <a:chOff x="1160892" y="5171875"/>
+            <a:chExt cx="4397583" cy="732863"/>
+          </a:xfrm>
+        </p:grpSpPr>
+        <p:sp>
+          <p:nvSpPr>
+            <p:cNvPr id="16" name="TextBox 15">
+              <a:extLst>
+                <a:ext uri="{FF2B5EF4-FFF2-40B4-BE49-F238E27FC236}">
+                  <a16:creationId xmlns:a16="http://schemas.microsoft.com/office/drawing/2014/main" id="{6E57A4E7-C109-2521-24D6-68B670D1E018}"/>
+                </a:ext>
+              </a:extLst>
+            </p:cNvPr>
+            <p:cNvSpPr txBox="1"/>
+            <p:nvPr/>
+          </p:nvSpPr>
+          <p:spPr>
+            <a:xfrm>
+              <a:off x="3707904" y="5535406"/>
+              <a:ext cx="1850571" cy="369332"/>
+            </a:xfrm>
+            <a:prstGeom prst="rect">
+              <a:avLst/>
+            </a:prstGeom>
+            <a:solidFill>
+              <a:schemeClr val="bg1"/>
+            </a:solidFill>
+            <a:ln w="19050">
+              <a:solidFill>
+                <a:schemeClr val="tx1"/>
+              </a:solidFill>
+            </a:ln>
+          </p:spPr>
+          <p:txBody>
+            <a:bodyPr wrap="none" rtlCol="0">
+              <a:spAutoFit/>
+            </a:bodyPr>
+            <a:lstStyle/>
+            <a:p>
+              <a:pPr marL="0" marR="0" lvl="0" indent="0" algn="l" defTabSz="914400" rtl="0" eaLnBrk="1" fontAlgn="auto" latinLnBrk="0" hangingPunct="1">
+                <a:lnSpc>
+                  <a:spcPct val="100000"/>
+                </a:lnSpc>
+                <a:spcBef>
+                  <a:spcPts val="0"/>
+                </a:spcBef>
+                <a:spcAft>
+                  <a:spcPts val="0"/>
+                </a:spcAft>
+                <a:buClrTx/>
+                <a:buSzTx/>
+                <a:buFontTx/>
+                <a:buNone/>
+                <a:tabLst/>
+                <a:defRPr/>
+              </a:pPr>
+              <a:r>
+                <a:rPr kumimoji="0" lang="en-US" sz="1800" b="0" i="0" u="none" strike="noStrike" kern="1200" cap="none" spc="0" normalizeH="0" baseline="0" noProof="0" dirty="0">
+                  <a:ln>
+                    <a:noFill/>
+                  </a:ln>
+                  <a:solidFill>
+                    <a:prstClr val="black"/>
+                  </a:solidFill>
+                  <a:effectLst/>
+                  <a:uLnTx/>
+                  <a:uFillTx/>
+                  <a:latin typeface="Calibri" panose="020F0502020204030204"/>
+                  <a:ea typeface="+mn-ea"/>
+                  <a:cs typeface="+mn-cs"/>
+                </a:rPr>
+                <a:t>Use option values</a:t>
+              </a:r>
+              <a:endParaRPr kumimoji="0" lang="nl-BE" sz="1800" b="0" i="0" u="none" strike="noStrike" kern="1200" cap="none" spc="0" normalizeH="0" baseline="0" noProof="0" dirty="0">
+                <a:ln>
+                  <a:noFill/>
+                </a:ln>
+                <a:solidFill>
+                  <a:prstClr val="black"/>
+                </a:solidFill>
+                <a:effectLst/>
+                <a:uLnTx/>
+                <a:uFillTx/>
+                <a:latin typeface="Calibri" panose="020F0502020204030204"/>
+                <a:ea typeface="+mn-ea"/>
+                <a:cs typeface="+mn-cs"/>
+              </a:endParaRPr>
+            </a:p>
+          </p:txBody>
+        </p:sp>
+        <p:cxnSp>
+          <p:nvCxnSpPr>
+            <p:cNvPr id="17" name="Straight Arrow Connector 16">
+              <a:extLst>
+                <a:ext uri="{FF2B5EF4-FFF2-40B4-BE49-F238E27FC236}">
+                  <a16:creationId xmlns:a16="http://schemas.microsoft.com/office/drawing/2014/main" id="{763C1299-6FED-9421-755B-596E8E1747E1}"/>
+                </a:ext>
+              </a:extLst>
+            </p:cNvPr>
+            <p:cNvCxnSpPr>
+              <a:cxnSpLocks/>
+              <a:stCxn id="16" idx="1"/>
+            </p:cNvCxnSpPr>
+            <p:nvPr/>
+          </p:nvCxnSpPr>
+          <p:spPr>
+            <a:xfrm flipH="1" flipV="1">
+              <a:off x="1160892" y="5171875"/>
+              <a:ext cx="2547012" cy="548197"/>
+            </a:xfrm>
+            <a:prstGeom prst="straightConnector1">
+              <a:avLst/>
+            </a:prstGeom>
+            <a:ln w="28575">
+              <a:solidFill>
+                <a:schemeClr val="tx1"/>
+              </a:solidFill>
+              <a:tailEnd type="stealth" w="lg" len="lg"/>
+            </a:ln>
+          </p:spPr>
+          <p:style>
+            <a:lnRef idx="1">
+              <a:schemeClr val="accent1"/>
+            </a:lnRef>
+            <a:fillRef idx="0">
+              <a:schemeClr val="accent1"/>
+            </a:fillRef>
+            <a:effectRef idx="0">
+              <a:schemeClr val="accent1"/>
+            </a:effectRef>
+            <a:fontRef idx="minor">
+              <a:schemeClr val="tx1"/>
+            </a:fontRef>
+          </p:style>
+        </p:cxnSp>
+      </p:grpSp>
+      <p:sp>
+        <p:nvSpPr>
+          <p:cNvPr id="20" name="TextBox 19">
+            <a:extLst>
+              <a:ext uri="{FF2B5EF4-FFF2-40B4-BE49-F238E27FC236}">
+                <a16:creationId xmlns:a16="http://schemas.microsoft.com/office/drawing/2014/main" id="{D50CC737-F74E-F232-04C8-EF1B32DFD862}"/>
+              </a:ext>
+            </a:extLst>
+          </p:cNvPr>
+          <p:cNvSpPr txBox="1"/>
+          <p:nvPr/>
+        </p:nvSpPr>
+        <p:spPr>
+          <a:xfrm>
+            <a:off x="239730" y="6219263"/>
+            <a:ext cx="6995930" cy="369332"/>
+          </a:xfrm>
+          <a:prstGeom prst="rect">
+            <a:avLst/>
+          </a:prstGeom>
+          <a:solidFill>
+            <a:schemeClr val="tx1"/>
+          </a:solidFill>
+          <a:ln>
+            <a:solidFill>
+              <a:schemeClr val="tx1"/>
+            </a:solidFill>
+          </a:ln>
+        </p:spPr>
+        <p:txBody>
+          <a:bodyPr wrap="square" rtlCol="0">
+            <a:spAutoFit/>
+          </a:bodyPr>
+          <a:lstStyle/>
+          <a:p>
+            <a:r>
+              <a:rPr lang="en-US" b="1" dirty="0">
+                <a:solidFill>
+                  <a:schemeClr val="bg1"/>
+                </a:solidFill>
+                <a:latin typeface="Courier New" pitchFamily="49" charset="0"/>
+                <a:cs typeface="Courier New" pitchFamily="49" charset="0"/>
+              </a:rPr>
+              <a:t>$  python  cosine.py  -n 100  --amplitude 2.5 </a:t>
+            </a:r>
+            <a:r>
+              <a:rPr lang="en-US" dirty="0">
+                <a:solidFill>
+                  <a:schemeClr val="bg1"/>
+                </a:solidFill>
+                <a:latin typeface="Courier New" pitchFamily="49" charset="0"/>
+                <a:cs typeface="Courier New" pitchFamily="49" charset="0"/>
+                <a:sym typeface="Symbol" panose="05050102010706020507" pitchFamily="18" charset="2"/>
+              </a:rPr>
+              <a:t></a:t>
+            </a:r>
+            <a:endParaRPr lang="en-US" dirty="0">
+              <a:solidFill>
+                <a:schemeClr val="bg1"/>
+              </a:solidFill>
+              <a:latin typeface="Courier New" pitchFamily="49" charset="0"/>
+              <a:cs typeface="Courier New" pitchFamily="49" charset="0"/>
+            </a:endParaRPr>
+          </a:p>
+        </p:txBody>
+      </p:sp>
+    </p:spTree>
+    <p:extLst>
+      <p:ext uri="{BB962C8B-B14F-4D97-AF65-F5344CB8AC3E}">
+        <p14:creationId xmlns:p14="http://schemas.microsoft.com/office/powerpoint/2010/main" val="2643432611"/>
+      </p:ext>
+    </p:extLst>
+  </p:cSld>
+  <p:clrMapOvr>
+    <a:masterClrMapping/>
+  </p:clrMapOvr>
+  <p:timing>
+    <p:tnLst>
+      <p:par>
+        <p:cTn id="1" dur="indefinite" restart="never" nodeType="tmRoot">
+          <p:childTnLst>
+            <p:seq concurrent="1" nextAc="seek">
+              <p:cTn id="2" dur="indefinite" nodeType="mainSeq">
+                <p:childTnLst>
+                  <p:par>
+                    <p:cTn id="3" fill="hold">
+                      <p:stCondLst>
+                        <p:cond delay="indefinite"/>
+                        <p:cond evt="onBegin" delay="0">
+                          <p:tn val="2"/>
+                        </p:cond>
+                      </p:stCondLst>
+                      <p:childTnLst>
+                        <p:par>
+                          <p:cTn id="4" fill="hold">
+                            <p:stCondLst>
+                              <p:cond delay="0"/>
+                            </p:stCondLst>
+                            <p:childTnLst>
+                              <p:par>
+                                <p:cTn id="5" presetID="1" presetClass="entr" presetSubtype="0" fill="hold" grpId="0" nodeType="withEffect">
+                                  <p:stCondLst>
+                                    <p:cond delay="0"/>
+                                  </p:stCondLst>
+                                  <p:childTnLst>
+                                    <p:set>
+                                      <p:cBhvr>
+                                        <p:cTn id="6" dur="1" fill="hold">
+                                          <p:stCondLst>
+                                            <p:cond delay="0"/>
+                                          </p:stCondLst>
+                                        </p:cTn>
+                                        <p:tgtEl>
+                                          <p:spTgt spid="20"/>
+                                        </p:tgtEl>
+                                        <p:attrNameLst>
+                                          <p:attrName>style.visibility</p:attrName>
+                                        </p:attrNameLst>
+                                      </p:cBhvr>
+                                      <p:to>
+                                        <p:strVal val="visible"/>
+                                      </p:to>
+                                    </p:set>
+                                  </p:childTnLst>
+                                </p:cTn>
+                              </p:par>
+                            </p:childTnLst>
+                          </p:cTn>
+                        </p:par>
+                      </p:childTnLst>
+                    </p:cTn>
+                  </p:par>
+                </p:childTnLst>
+              </p:cTn>
+              <p:prevCondLst>
+                <p:cond evt="onPrev" delay="0">
+                  <p:tgtEl>
+                    <p:sldTgt/>
+                  </p:tgtEl>
+                </p:cond>
+              </p:prevCondLst>
+              <p:nextCondLst>
+                <p:cond evt="onNext" delay="0">
+                  <p:tgtEl>
+                    <p:sldTgt/>
+                  </p:tgtEl>
+                </p:cond>
+              </p:nextCondLst>
+            </p:seq>
+          </p:childTnLst>
+        </p:cTn>
+      </p:par>
+    </p:tnLst>
+    <p:bldLst>
+      <p:bldP spid="20" grpId="0" animBg="1"/>
+    </p:bldLst>
+  </p:timing>
+</p:sld>
+</file>
+
+<file path=ppt/slides/slide14.xml><?xml version="1.0" encoding="utf-8"?>
+<p:sld xmlns:a="http://schemas.openxmlformats.org/drawingml/2006/main" xmlns:r="http://schemas.openxmlformats.org/officeDocument/2006/relationships" xmlns:p="http://schemas.openxmlformats.org/presentationml/2006/main">
+  <p:cSld>
+    <p:spTree>
+      <p:nvGrpSpPr>
+        <p:cNvPr id="1" name="">
+          <a:extLst>
+            <a:ext uri="{FF2B5EF4-FFF2-40B4-BE49-F238E27FC236}">
+              <a16:creationId xmlns:a16="http://schemas.microsoft.com/office/drawing/2014/main" id="{C7145170-CFD3-C68F-983B-B9413ABD92AF}"/>
+            </a:ext>
+          </a:extLst>
+        </p:cNvPr>
+        <p:cNvGrpSpPr/>
+        <p:nvPr/>
+      </p:nvGrpSpPr>
+      <p:grpSpPr>
+        <a:xfrm>
+          <a:off x="0" y="0"/>
+          <a:ext cx="0" cy="0"/>
+          <a:chOff x="0" y="0"/>
+          <a:chExt cx="0" cy="0"/>
+        </a:xfrm>
+      </p:grpSpPr>
+      <p:sp>
+        <p:nvSpPr>
+          <p:cNvPr id="2" name="Title 1">
+            <a:extLst>
+              <a:ext uri="{FF2B5EF4-FFF2-40B4-BE49-F238E27FC236}">
+                <a16:creationId xmlns:a16="http://schemas.microsoft.com/office/drawing/2014/main" id="{1F60B9BD-5B23-1C8C-76FF-3C767614F759}"/>
+              </a:ext>
+            </a:extLst>
+          </p:cNvPr>
+          <p:cNvSpPr>
+            <a:spLocks noGrp="1"/>
+          </p:cNvSpPr>
+          <p:nvPr>
+            <p:ph type="title"/>
+          </p:nvPr>
+        </p:nvSpPr>
+        <p:spPr/>
+        <p:txBody>
+          <a:bodyPr/>
+          <a:lstStyle/>
+          <a:p>
+            <a:r>
+              <a:rPr lang="en-US" dirty="0"/>
+              <a:t>R: </a:t>
+            </a:r>
+            <a:r>
+              <a:rPr lang="en-US" dirty="0" err="1">
+                <a:latin typeface="Courier New" panose="02070309020205020404" pitchFamily="49" charset="0"/>
+                <a:cs typeface="Courier New" panose="02070309020205020404" pitchFamily="49" charset="0"/>
+              </a:rPr>
+              <a:t>optparse</a:t>
+            </a:r>
+            <a:endParaRPr lang="LID4096" dirty="0">
+              <a:latin typeface="Courier New" panose="02070309020205020404" pitchFamily="49" charset="0"/>
+              <a:cs typeface="Courier New" panose="02070309020205020404" pitchFamily="49" charset="0"/>
+            </a:endParaRPr>
+          </a:p>
+        </p:txBody>
+      </p:sp>
+      <p:sp>
+        <p:nvSpPr>
+          <p:cNvPr id="3" name="Slide Number Placeholder 2">
+            <a:extLst>
+              <a:ext uri="{FF2B5EF4-FFF2-40B4-BE49-F238E27FC236}">
+                <a16:creationId xmlns:a16="http://schemas.microsoft.com/office/drawing/2014/main" id="{5E66B277-32C1-8EF6-76E5-81778D56D354}"/>
+              </a:ext>
+            </a:extLst>
+          </p:cNvPr>
+          <p:cNvSpPr>
+            <a:spLocks noGrp="1"/>
+          </p:cNvSpPr>
+          <p:nvPr>
+            <p:ph type="sldNum" sz="quarter" idx="12"/>
+          </p:nvPr>
+        </p:nvSpPr>
+        <p:spPr/>
+        <p:txBody>
+          <a:bodyPr/>
+          <a:lstStyle/>
+          <a:p>
+            <a:fld id="{9C7CE217-4467-4B8D-A735-B008FA7C4816}" type="slidenum">
+              <a:rPr lang="LID4096" smtClean="0"/>
+              <a:t>14</a:t>
+            </a:fld>
+            <a:endParaRPr lang="LID4096"/>
+          </a:p>
+        </p:txBody>
+      </p:sp>
+      <p:grpSp>
+        <p:nvGrpSpPr>
+          <p:cNvPr id="4" name="Group 3">
+            <a:extLst>
+              <a:ext uri="{FF2B5EF4-FFF2-40B4-BE49-F238E27FC236}">
+                <a16:creationId xmlns:a16="http://schemas.microsoft.com/office/drawing/2014/main" id="{8862C23D-5C56-66F2-47AC-024DC4B888EB}"/>
+              </a:ext>
+            </a:extLst>
+          </p:cNvPr>
+          <p:cNvGrpSpPr/>
+          <p:nvPr/>
+        </p:nvGrpSpPr>
+        <p:grpSpPr>
+          <a:xfrm>
+            <a:off x="239731" y="1331118"/>
+            <a:ext cx="11453781" cy="4801314"/>
+            <a:chOff x="-143472" y="2169659"/>
+            <a:chExt cx="9996369" cy="4801314"/>
+          </a:xfrm>
+        </p:grpSpPr>
+        <p:sp>
+          <p:nvSpPr>
+            <p:cNvPr id="5" name="TextBox 4">
+              <a:extLst>
+                <a:ext uri="{FF2B5EF4-FFF2-40B4-BE49-F238E27FC236}">
+                  <a16:creationId xmlns:a16="http://schemas.microsoft.com/office/drawing/2014/main" id="{BA234BEB-E521-484F-F763-679F3EC559B3}"/>
+                </a:ext>
+              </a:extLst>
+            </p:cNvPr>
+            <p:cNvSpPr txBox="1"/>
+            <p:nvPr/>
+          </p:nvSpPr>
+          <p:spPr>
+            <a:xfrm>
+              <a:off x="-143472" y="2169659"/>
+              <a:ext cx="9995043" cy="4801314"/>
+            </a:xfrm>
+            <a:prstGeom prst="rect">
+              <a:avLst/>
+            </a:prstGeom>
+            <a:solidFill>
+              <a:schemeClr val="bg1">
+                <a:lumMod val="85000"/>
+              </a:schemeClr>
+            </a:solidFill>
+            <a:ln>
+              <a:solidFill>
+                <a:schemeClr val="tx1"/>
+              </a:solidFill>
+            </a:ln>
+          </p:spPr>
+          <p:txBody>
+            <a:bodyPr wrap="square" rtlCol="0">
+              <a:spAutoFit/>
+            </a:bodyPr>
+            <a:lstStyle/>
+            <a:p>
+              <a:pPr>
+                <a:defRPr/>
+              </a:pPr>
+              <a:r>
+                <a:rPr lang="en-US" dirty="0">
+                  <a:solidFill>
+                    <a:prstClr val="black"/>
+                  </a:solidFill>
+                  <a:latin typeface="Courier New" pitchFamily="49" charset="0"/>
+                  <a:cs typeface="Courier New" pitchFamily="49" charset="0"/>
+                  <a:sym typeface="Symbol" panose="05050102010706020507" pitchFamily="18" charset="2"/>
+                </a:rPr>
+                <a:t></a:t>
+              </a:r>
+              <a:endParaRPr lang="en-US" dirty="0">
+                <a:solidFill>
+                  <a:prstClr val="black"/>
+                </a:solidFill>
+                <a:latin typeface="Courier New" pitchFamily="49" charset="0"/>
+                <a:cs typeface="Courier New" pitchFamily="49" charset="0"/>
+              </a:endParaRPr>
+            </a:p>
+            <a:p>
+              <a:pPr lvl="0">
+                <a:defRPr/>
+              </a:pPr>
+              <a:r>
+                <a:rPr lang="en-US" dirty="0">
+                  <a:solidFill>
+                    <a:prstClr val="black"/>
+                  </a:solidFill>
+                  <a:latin typeface="Courier New" pitchFamily="49" charset="0"/>
+                  <a:cs typeface="Courier New" pitchFamily="49" charset="0"/>
+                </a:rPr>
+                <a:t>library(</a:t>
+              </a:r>
+              <a:r>
+                <a:rPr lang="en-US" dirty="0" err="1">
+                  <a:solidFill>
+                    <a:prstClr val="black"/>
+                  </a:solidFill>
+                  <a:latin typeface="Courier New" pitchFamily="49" charset="0"/>
+                  <a:cs typeface="Courier New" pitchFamily="49" charset="0"/>
+                </a:rPr>
+                <a:t>optparse</a:t>
+              </a:r>
+              <a:r>
+                <a:rPr lang="en-US" dirty="0">
+                  <a:solidFill>
+                    <a:prstClr val="black"/>
+                  </a:solidFill>
+                  <a:latin typeface="Courier New" pitchFamily="49" charset="0"/>
+                  <a:cs typeface="Courier New" pitchFamily="49" charset="0"/>
+                </a:rPr>
+                <a:t>)</a:t>
+              </a:r>
+            </a:p>
+            <a:p>
+              <a:pPr>
+                <a:defRPr/>
+              </a:pPr>
+              <a:r>
+                <a:rPr lang="en-US" dirty="0">
+                  <a:solidFill>
+                    <a:prstClr val="black"/>
+                  </a:solidFill>
+                  <a:latin typeface="Courier New" pitchFamily="49" charset="0"/>
+                  <a:cs typeface="Courier New" pitchFamily="49" charset="0"/>
+                  <a:sym typeface="Symbol" panose="05050102010706020507" pitchFamily="18" charset="2"/>
+                </a:rPr>
+                <a:t></a:t>
+              </a:r>
+              <a:endParaRPr lang="en-US" dirty="0">
+                <a:solidFill>
+                  <a:prstClr val="black"/>
+                </a:solidFill>
+                <a:latin typeface="Courier New" pitchFamily="49" charset="0"/>
+                <a:cs typeface="Courier New" pitchFamily="49" charset="0"/>
+              </a:endParaRPr>
+            </a:p>
+            <a:p>
+              <a:pPr lvl="0">
+                <a:defRPr/>
+              </a:pPr>
+              <a:r>
+                <a:rPr lang="en-US" dirty="0" err="1">
+                  <a:solidFill>
+                    <a:prstClr val="black"/>
+                  </a:solidFill>
+                  <a:latin typeface="Courier New" pitchFamily="49" charset="0"/>
+                  <a:cs typeface="Courier New" pitchFamily="49" charset="0"/>
+                </a:rPr>
+                <a:t>option_list</a:t>
+              </a:r>
+              <a:r>
+                <a:rPr lang="en-US" dirty="0">
+                  <a:solidFill>
+                    <a:prstClr val="black"/>
+                  </a:solidFill>
+                  <a:latin typeface="Courier New" pitchFamily="49" charset="0"/>
+                  <a:cs typeface="Courier New" pitchFamily="49" charset="0"/>
+                </a:rPr>
+                <a:t> &lt;- list(</a:t>
+              </a:r>
+            </a:p>
+            <a:p>
+              <a:pPr lvl="0">
+                <a:defRPr/>
+              </a:pPr>
+              <a:r>
+                <a:rPr lang="en-US" dirty="0">
+                  <a:solidFill>
+                    <a:prstClr val="black"/>
+                  </a:solidFill>
+                  <a:latin typeface="Courier New" pitchFamily="49" charset="0"/>
+                  <a:cs typeface="Courier New" pitchFamily="49" charset="0"/>
+                </a:rPr>
+                <a:t>    </a:t>
+              </a:r>
+              <a:r>
+                <a:rPr lang="en-US" dirty="0" err="1">
+                  <a:solidFill>
+                    <a:prstClr val="black"/>
+                  </a:solidFill>
+                  <a:latin typeface="Courier New" pitchFamily="49" charset="0"/>
+                  <a:cs typeface="Courier New" pitchFamily="49" charset="0"/>
+                </a:rPr>
+                <a:t>make_option</a:t>
+              </a:r>
+              <a:r>
+                <a:rPr lang="en-US" dirty="0">
+                  <a:solidFill>
+                    <a:prstClr val="black"/>
+                  </a:solidFill>
+                  <a:latin typeface="Courier New" pitchFamily="49" charset="0"/>
+                  <a:cs typeface="Courier New" pitchFamily="49" charset="0"/>
+                </a:rPr>
+                <a:t>(c("-c", "--city"), type = "character",</a:t>
+              </a:r>
+              <a:br>
+                <a:rPr lang="en-US" dirty="0">
+                  <a:solidFill>
+                    <a:prstClr val="black"/>
+                  </a:solidFill>
+                  <a:latin typeface="Courier New" pitchFamily="49" charset="0"/>
+                  <a:cs typeface="Courier New" pitchFamily="49" charset="0"/>
+                </a:rPr>
+              </a:br>
+              <a:r>
+                <a:rPr lang="en-US" dirty="0">
+                  <a:solidFill>
+                    <a:prstClr val="black"/>
+                  </a:solidFill>
+                  <a:latin typeface="Courier New" pitchFamily="49" charset="0"/>
+                  <a:cs typeface="Courier New" pitchFamily="49" charset="0"/>
+                </a:rPr>
+                <a:t>                  help = "Name of the city to analyze weather data for"),</a:t>
+              </a:r>
+            </a:p>
+            <a:p>
+              <a:pPr lvl="0">
+                <a:defRPr/>
+              </a:pPr>
+              <a:r>
+                <a:rPr lang="en-US" dirty="0">
+                  <a:solidFill>
+                    <a:prstClr val="black"/>
+                  </a:solidFill>
+                  <a:latin typeface="Courier New" pitchFamily="49" charset="0"/>
+                  <a:cs typeface="Courier New" pitchFamily="49" charset="0"/>
+                </a:rPr>
+                <a:t>    </a:t>
+              </a:r>
+              <a:r>
+                <a:rPr lang="en-US" dirty="0" err="1">
+                  <a:solidFill>
+                    <a:prstClr val="black"/>
+                  </a:solidFill>
+                  <a:latin typeface="Courier New" pitchFamily="49" charset="0"/>
+                  <a:cs typeface="Courier New" pitchFamily="49" charset="0"/>
+                </a:rPr>
+                <a:t>make_option</a:t>
+              </a:r>
+              <a:r>
+                <a:rPr lang="en-US" dirty="0">
+                  <a:solidFill>
+                    <a:prstClr val="black"/>
+                  </a:solidFill>
+                  <a:latin typeface="Courier New" pitchFamily="49" charset="0"/>
+                  <a:cs typeface="Courier New" pitchFamily="49" charset="0"/>
+                </a:rPr>
+                <a:t>(c("-q", "--quantity"), type = "character", default = "temp",</a:t>
+              </a:r>
+            </a:p>
+            <a:p>
+              <a:pPr lvl="0">
+                <a:defRPr/>
+              </a:pPr>
+              <a:r>
+                <a:rPr lang="en-US" dirty="0">
+                  <a:solidFill>
+                    <a:prstClr val="black"/>
+                  </a:solidFill>
+                  <a:latin typeface="Courier New" pitchFamily="49" charset="0"/>
+                  <a:cs typeface="Courier New" pitchFamily="49" charset="0"/>
+                </a:rPr>
+                <a:t>                  help = "Name of the quantity to analyze"),</a:t>
+              </a:r>
+            </a:p>
+            <a:p>
+              <a:pPr lvl="0">
+                <a:defRPr/>
+              </a:pPr>
+              <a:r>
+                <a:rPr lang="en-US" dirty="0">
+                  <a:solidFill>
+                    <a:prstClr val="black"/>
+                  </a:solidFill>
+                  <a:latin typeface="Courier New" pitchFamily="49" charset="0"/>
+                  <a:cs typeface="Courier New" pitchFamily="49" charset="0"/>
+                </a:rPr>
+                <a:t>    </a:t>
+              </a:r>
+              <a:r>
+                <a:rPr lang="en-US" dirty="0" err="1">
+                  <a:solidFill>
+                    <a:prstClr val="black"/>
+                  </a:solidFill>
+                  <a:latin typeface="Courier New" pitchFamily="49" charset="0"/>
+                  <a:cs typeface="Courier New" pitchFamily="49" charset="0"/>
+                </a:rPr>
+                <a:t>make_option</a:t>
+              </a:r>
+              <a:r>
+                <a:rPr lang="en-US" dirty="0">
+                  <a:solidFill>
+                    <a:prstClr val="black"/>
+                  </a:solidFill>
+                  <a:latin typeface="Courier New" pitchFamily="49" charset="0"/>
+                  <a:cs typeface="Courier New" pitchFamily="49" charset="0"/>
+                </a:rPr>
+                <a:t>(c("-o", "--output"), type = "character",</a:t>
+              </a:r>
+            </a:p>
+            <a:p>
+              <a:pPr lvl="0">
+                <a:defRPr/>
+              </a:pPr>
+              <a:r>
+                <a:rPr lang="en-US" dirty="0">
+                  <a:solidFill>
+                    <a:prstClr val="black"/>
+                  </a:solidFill>
+                  <a:latin typeface="Courier New" pitchFamily="49" charset="0"/>
+                  <a:cs typeface="Courier New" pitchFamily="49" charset="0"/>
+                </a:rPr>
+                <a:t>                  help = "Path to the output CSV file")</a:t>
+              </a:r>
+            </a:p>
+            <a:p>
+              <a:pPr lvl="0">
+                <a:defRPr/>
+              </a:pPr>
+              <a:r>
+                <a:rPr lang="en-US" dirty="0">
+                  <a:solidFill>
+                    <a:prstClr val="black"/>
+                  </a:solidFill>
+                  <a:latin typeface="Courier New" pitchFamily="49" charset="0"/>
+                  <a:cs typeface="Courier New" pitchFamily="49" charset="0"/>
+                </a:rPr>
+                <a:t>)</a:t>
+              </a:r>
+            </a:p>
+            <a:p>
+              <a:pPr lvl="0">
+                <a:defRPr/>
+              </a:pPr>
+              <a:r>
+                <a:rPr lang="en-US" dirty="0">
+                  <a:solidFill>
+                    <a:prstClr val="black"/>
+                  </a:solidFill>
+                  <a:latin typeface="Courier New" pitchFamily="49" charset="0"/>
+                  <a:cs typeface="Courier New" pitchFamily="49" charset="0"/>
+                </a:rPr>
+                <a:t>opt &lt;- </a:t>
+              </a:r>
+              <a:r>
+                <a:rPr lang="en-US" dirty="0" err="1">
+                  <a:solidFill>
+                    <a:prstClr val="black"/>
+                  </a:solidFill>
+                  <a:latin typeface="Courier New" pitchFamily="49" charset="0"/>
+                  <a:cs typeface="Courier New" pitchFamily="49" charset="0"/>
+                </a:rPr>
+                <a:t>parse_args</a:t>
+              </a:r>
+              <a:r>
+                <a:rPr lang="en-US" dirty="0">
+                  <a:solidFill>
+                    <a:prstClr val="black"/>
+                  </a:solidFill>
+                  <a:latin typeface="Courier New" pitchFamily="49" charset="0"/>
+                  <a:cs typeface="Courier New" pitchFamily="49" charset="0"/>
+                </a:rPr>
+                <a:t>(</a:t>
+              </a:r>
+              <a:r>
+                <a:rPr lang="en-US" dirty="0" err="1">
+                  <a:solidFill>
+                    <a:prstClr val="black"/>
+                  </a:solidFill>
+                  <a:latin typeface="Courier New" pitchFamily="49" charset="0"/>
+                  <a:cs typeface="Courier New" pitchFamily="49" charset="0"/>
+                </a:rPr>
+                <a:t>OptionParser</a:t>
+              </a:r>
+              <a:r>
+                <a:rPr lang="en-US" dirty="0">
+                  <a:solidFill>
+                    <a:prstClr val="black"/>
+                  </a:solidFill>
+                  <a:latin typeface="Courier New" pitchFamily="49" charset="0"/>
+                  <a:cs typeface="Courier New" pitchFamily="49" charset="0"/>
+                </a:rPr>
+                <a:t>(</a:t>
+              </a:r>
+              <a:r>
+                <a:rPr lang="en-US" dirty="0" err="1">
+                  <a:solidFill>
+                    <a:prstClr val="black"/>
+                  </a:solidFill>
+                  <a:latin typeface="Courier New" pitchFamily="49" charset="0"/>
+                  <a:cs typeface="Courier New" pitchFamily="49" charset="0"/>
+                </a:rPr>
+                <a:t>option_list</a:t>
+              </a:r>
+              <a:r>
+                <a:rPr lang="en-US" dirty="0">
+                  <a:solidFill>
+                    <a:prstClr val="black"/>
+                  </a:solidFill>
+                  <a:latin typeface="Courier New" pitchFamily="49" charset="0"/>
+                  <a:cs typeface="Courier New" pitchFamily="49" charset="0"/>
+                </a:rPr>
+                <a:t> = </a:t>
+              </a:r>
+              <a:r>
+                <a:rPr lang="en-US" dirty="0" err="1">
+                  <a:solidFill>
+                    <a:prstClr val="black"/>
+                  </a:solidFill>
+                  <a:latin typeface="Courier New" pitchFamily="49" charset="0"/>
+                  <a:cs typeface="Courier New" pitchFamily="49" charset="0"/>
+                </a:rPr>
+                <a:t>option_list</a:t>
+              </a:r>
+              <a:r>
+                <a:rPr lang="en-US" dirty="0">
+                  <a:solidFill>
+                    <a:prstClr val="black"/>
+                  </a:solidFill>
+                  <a:latin typeface="Courier New" pitchFamily="49" charset="0"/>
+                  <a:cs typeface="Courier New" pitchFamily="49" charset="0"/>
+                </a:rPr>
+                <a:t>))</a:t>
+              </a:r>
+            </a:p>
+            <a:p>
+              <a:pPr lvl="0">
+                <a:defRPr/>
+              </a:pPr>
+              <a:endParaRPr lang="en-US" dirty="0">
+                <a:solidFill>
+                  <a:prstClr val="black"/>
+                </a:solidFill>
+                <a:latin typeface="Courier New" pitchFamily="49" charset="0"/>
+                <a:cs typeface="Courier New" pitchFamily="49" charset="0"/>
+              </a:endParaRPr>
+            </a:p>
+            <a:p>
+              <a:pPr lvl="0">
+                <a:defRPr/>
+              </a:pPr>
+              <a:r>
+                <a:rPr lang="en-US" dirty="0">
+                  <a:solidFill>
+                    <a:prstClr val="black"/>
+                  </a:solidFill>
+                  <a:latin typeface="Courier New" pitchFamily="49" charset="0"/>
+                  <a:cs typeface="Courier New" pitchFamily="49" charset="0"/>
+                </a:rPr>
+                <a:t>if (</a:t>
+              </a:r>
+              <a:r>
+                <a:rPr lang="en-US" dirty="0" err="1">
+                  <a:solidFill>
+                    <a:prstClr val="black"/>
+                  </a:solidFill>
+                  <a:latin typeface="Courier New" pitchFamily="49" charset="0"/>
+                  <a:cs typeface="Courier New" pitchFamily="49" charset="0"/>
+                </a:rPr>
+                <a:t>dirname</a:t>
+              </a:r>
+              <a:r>
+                <a:rPr lang="en-US" dirty="0">
+                  <a:solidFill>
+                    <a:prstClr val="black"/>
+                  </a:solidFill>
+                  <a:latin typeface="Courier New" pitchFamily="49" charset="0"/>
+                  <a:cs typeface="Courier New" pitchFamily="49" charset="0"/>
+                </a:rPr>
+                <a:t>(</a:t>
+              </a:r>
+              <a:r>
+                <a:rPr lang="en-US" dirty="0" err="1">
+                  <a:solidFill>
+                    <a:prstClr val="black"/>
+                  </a:solidFill>
+                  <a:latin typeface="Courier New" pitchFamily="49" charset="0"/>
+                  <a:cs typeface="Courier New" pitchFamily="49" charset="0"/>
+                </a:rPr>
+                <a:t>opt$output</a:t>
+              </a:r>
+              <a:r>
+                <a:rPr lang="en-US" dirty="0">
+                  <a:solidFill>
+                    <a:prstClr val="black"/>
+                  </a:solidFill>
+                  <a:latin typeface="Courier New" pitchFamily="49" charset="0"/>
+                  <a:cs typeface="Courier New" pitchFamily="49" charset="0"/>
+                </a:rPr>
+                <a:t>) != ".") {</a:t>
+              </a:r>
+            </a:p>
+            <a:p>
+              <a:pPr lvl="0">
+                <a:defRPr/>
+              </a:pPr>
+              <a:r>
+                <a:rPr lang="en-US" dirty="0">
+                  <a:solidFill>
+                    <a:prstClr val="black"/>
+                  </a:solidFill>
+                  <a:latin typeface="Courier New" pitchFamily="49" charset="0"/>
+                  <a:cs typeface="Courier New" pitchFamily="49" charset="0"/>
+                </a:rPr>
+                <a:t>    </a:t>
+              </a:r>
+              <a:r>
+                <a:rPr lang="en-US" dirty="0" err="1">
+                  <a:solidFill>
+                    <a:prstClr val="black"/>
+                  </a:solidFill>
+                  <a:latin typeface="Courier New" pitchFamily="49" charset="0"/>
+                  <a:cs typeface="Courier New" pitchFamily="49" charset="0"/>
+                </a:rPr>
+                <a:t>dir.create</a:t>
+              </a:r>
+              <a:r>
+                <a:rPr lang="en-US" dirty="0">
+                  <a:solidFill>
+                    <a:prstClr val="black"/>
+                  </a:solidFill>
+                  <a:latin typeface="Courier New" pitchFamily="49" charset="0"/>
+                  <a:cs typeface="Courier New" pitchFamily="49" charset="0"/>
+                </a:rPr>
+                <a:t>(</a:t>
+              </a:r>
+              <a:r>
+                <a:rPr lang="en-US" dirty="0" err="1">
+                  <a:solidFill>
+                    <a:prstClr val="black"/>
+                  </a:solidFill>
+                  <a:latin typeface="Courier New" pitchFamily="49" charset="0"/>
+                  <a:cs typeface="Courier New" pitchFamily="49" charset="0"/>
+                </a:rPr>
+                <a:t>dirname</a:t>
+              </a:r>
+              <a:r>
+                <a:rPr lang="en-US" dirty="0">
+                  <a:solidFill>
+                    <a:prstClr val="black"/>
+                  </a:solidFill>
+                  <a:latin typeface="Courier New" pitchFamily="49" charset="0"/>
+                  <a:cs typeface="Courier New" pitchFamily="49" charset="0"/>
+                </a:rPr>
+                <a:t>(</a:t>
+              </a:r>
+              <a:r>
+                <a:rPr lang="en-US" dirty="0" err="1">
+                  <a:solidFill>
+                    <a:prstClr val="black"/>
+                  </a:solidFill>
+                  <a:latin typeface="Courier New" pitchFamily="49" charset="0"/>
+                  <a:cs typeface="Courier New" pitchFamily="49" charset="0"/>
+                </a:rPr>
+                <a:t>opt$output</a:t>
+              </a:r>
+              <a:r>
+                <a:rPr lang="en-US" dirty="0">
+                  <a:solidFill>
+                    <a:prstClr val="black"/>
+                  </a:solidFill>
+                  <a:latin typeface="Courier New" pitchFamily="49" charset="0"/>
+                  <a:cs typeface="Courier New" pitchFamily="49" charset="0"/>
+                </a:rPr>
+                <a:t>), </a:t>
+              </a:r>
+              <a:r>
+                <a:rPr lang="en-US" dirty="0" err="1">
+                  <a:solidFill>
+                    <a:prstClr val="black"/>
+                  </a:solidFill>
+                  <a:latin typeface="Courier New" pitchFamily="49" charset="0"/>
+                  <a:cs typeface="Courier New" pitchFamily="49" charset="0"/>
+                </a:rPr>
+                <a:t>showWarnings</a:t>
+              </a:r>
+              <a:r>
+                <a:rPr lang="en-US" dirty="0">
+                  <a:solidFill>
+                    <a:prstClr val="black"/>
+                  </a:solidFill>
+                  <a:latin typeface="Courier New" pitchFamily="49" charset="0"/>
+                  <a:cs typeface="Courier New" pitchFamily="49" charset="0"/>
+                </a:rPr>
+                <a:t> = FALSE, recursive = TRUE)</a:t>
+              </a:r>
+            </a:p>
+            <a:p>
+              <a:pPr lvl="0">
+                <a:defRPr/>
+              </a:pPr>
+              <a:r>
+                <a:rPr lang="en-US" dirty="0">
+                  <a:solidFill>
+                    <a:prstClr val="black"/>
+                  </a:solidFill>
+                  <a:latin typeface="Courier New" pitchFamily="49" charset="0"/>
+                  <a:cs typeface="Courier New" pitchFamily="49" charset="0"/>
+                </a:rPr>
+                <a:t>}</a:t>
+              </a:r>
+            </a:p>
+            <a:p>
+              <a:pPr lvl="0">
+                <a:defRPr/>
+              </a:pPr>
+              <a:r>
+                <a:rPr lang="en-US" dirty="0">
+                  <a:solidFill>
+                    <a:prstClr val="black"/>
+                  </a:solidFill>
+                  <a:latin typeface="Courier New" pitchFamily="49" charset="0"/>
+                  <a:cs typeface="Courier New" pitchFamily="49" charset="0"/>
+                  <a:sym typeface="Symbol" panose="05050102010706020507" pitchFamily="18" charset="2"/>
+                </a:rPr>
+                <a:t></a:t>
+              </a:r>
+              <a:endParaRPr lang="en-US" dirty="0">
+                <a:solidFill>
+                  <a:prstClr val="black"/>
+                </a:solidFill>
+                <a:latin typeface="Courier New" pitchFamily="49" charset="0"/>
+                <a:cs typeface="Courier New" pitchFamily="49" charset="0"/>
+              </a:endParaRPr>
+            </a:p>
+          </p:txBody>
+        </p:sp>
+        <p:sp>
+          <p:nvSpPr>
+            <p:cNvPr id="6" name="TextBox 5">
+              <a:extLst>
+                <a:ext uri="{FF2B5EF4-FFF2-40B4-BE49-F238E27FC236}">
+                  <a16:creationId xmlns:a16="http://schemas.microsoft.com/office/drawing/2014/main" id="{0DD0ED2A-E93A-114A-D562-6B8D9C92AE7D}"/>
+                </a:ext>
+              </a:extLst>
+            </p:cNvPr>
+            <p:cNvSpPr txBox="1"/>
+            <p:nvPr/>
+          </p:nvSpPr>
+          <p:spPr>
+            <a:xfrm>
+              <a:off x="7752670" y="2169659"/>
+              <a:ext cx="2100227" cy="338554"/>
+            </a:xfrm>
+            <a:prstGeom prst="rect">
+              <a:avLst/>
+            </a:prstGeom>
+            <a:solidFill>
+              <a:schemeClr val="bg1"/>
+            </a:solidFill>
+            <a:ln>
+              <a:solidFill>
+                <a:schemeClr val="tx1"/>
+              </a:solidFill>
+            </a:ln>
+          </p:spPr>
+          <p:txBody>
+            <a:bodyPr wrap="none" rtlCol="0">
+              <a:spAutoFit/>
+            </a:bodyPr>
+            <a:lstStyle/>
+            <a:p>
+              <a:r>
+                <a:rPr lang="en-US" sz="1600" dirty="0" err="1">
+                  <a:latin typeface="Courier New" panose="02070309020205020404" pitchFamily="49" charset="0"/>
+                  <a:cs typeface="Courier New" panose="02070309020205020404" pitchFamily="49" charset="0"/>
+                </a:rPr>
+                <a:t>weather_analysis.R</a:t>
+              </a:r>
+              <a:endParaRPr lang="LID4096" sz="1600" dirty="0">
+                <a:latin typeface="Courier New" panose="02070309020205020404" pitchFamily="49" charset="0"/>
+                <a:cs typeface="Courier New" panose="02070309020205020404" pitchFamily="49" charset="0"/>
+              </a:endParaRPr>
+            </a:p>
+          </p:txBody>
+        </p:sp>
+      </p:grpSp>
+      <p:grpSp>
+        <p:nvGrpSpPr>
+          <p:cNvPr id="8" name="Group 7">
+            <a:extLst>
+              <a:ext uri="{FF2B5EF4-FFF2-40B4-BE49-F238E27FC236}">
+                <a16:creationId xmlns:a16="http://schemas.microsoft.com/office/drawing/2014/main" id="{3D123542-4017-D10F-0657-BE9BA16A106B}"/>
+              </a:ext>
+            </a:extLst>
+          </p:cNvPr>
+          <p:cNvGrpSpPr/>
+          <p:nvPr/>
+        </p:nvGrpSpPr>
+        <p:grpSpPr>
+          <a:xfrm>
+            <a:off x="9087687" y="2147382"/>
+            <a:ext cx="2864582" cy="476298"/>
+            <a:chOff x="2498712" y="5535406"/>
+            <a:chExt cx="2864582" cy="476298"/>
+          </a:xfrm>
+        </p:grpSpPr>
+        <p:sp>
+          <p:nvSpPr>
+            <p:cNvPr id="10" name="TextBox 9">
+              <a:extLst>
+                <a:ext uri="{FF2B5EF4-FFF2-40B4-BE49-F238E27FC236}">
+                  <a16:creationId xmlns:a16="http://schemas.microsoft.com/office/drawing/2014/main" id="{10E0FA68-0C62-28A7-5B10-0B7DB342BFE6}"/>
+                </a:ext>
+              </a:extLst>
+            </p:cNvPr>
+            <p:cNvSpPr txBox="1"/>
+            <p:nvPr/>
+          </p:nvSpPr>
+          <p:spPr>
+            <a:xfrm>
+              <a:off x="3707904" y="5535406"/>
+              <a:ext cx="1655390" cy="369332"/>
+            </a:xfrm>
+            <a:prstGeom prst="rect">
+              <a:avLst/>
+            </a:prstGeom>
+            <a:solidFill>
+              <a:schemeClr val="bg1"/>
+            </a:solidFill>
+            <a:ln w="19050">
+              <a:solidFill>
+                <a:schemeClr val="tx1"/>
+              </a:solidFill>
+            </a:ln>
+          </p:spPr>
+          <p:txBody>
+            <a:bodyPr wrap="none" rtlCol="0">
+              <a:spAutoFit/>
+            </a:bodyPr>
+            <a:lstStyle/>
+            <a:p>
+              <a:pPr marL="0" marR="0" lvl="0" indent="0" algn="l" defTabSz="914400" rtl="0" eaLnBrk="1" fontAlgn="auto" latinLnBrk="0" hangingPunct="1">
+                <a:lnSpc>
+                  <a:spcPct val="100000"/>
+                </a:lnSpc>
+                <a:spcBef>
+                  <a:spcPts val="0"/>
+                </a:spcBef>
+                <a:spcAft>
+                  <a:spcPts val="0"/>
+                </a:spcAft>
+                <a:buClrTx/>
+                <a:buSzTx/>
+                <a:buFontTx/>
+                <a:buNone/>
+                <a:tabLst/>
+                <a:defRPr/>
+              </a:pPr>
+              <a:r>
+                <a:rPr kumimoji="0" lang="en-US" sz="1800" b="0" i="0" u="none" strike="noStrike" kern="1200" cap="none" spc="0" normalizeH="0" baseline="0" noProof="0" dirty="0">
+                  <a:ln>
+                    <a:noFill/>
+                  </a:ln>
+                  <a:solidFill>
+                    <a:prstClr val="black"/>
+                  </a:solidFill>
+                  <a:effectLst/>
+                  <a:uLnTx/>
+                  <a:uFillTx/>
+                  <a:latin typeface="Calibri" panose="020F0502020204030204"/>
+                  <a:ea typeface="+mn-ea"/>
+                  <a:cs typeface="+mn-cs"/>
+                </a:rPr>
+                <a:t>Declare options</a:t>
+              </a:r>
+              <a:endParaRPr kumimoji="0" lang="nl-BE" sz="1800" b="0" i="0" u="none" strike="noStrike" kern="1200" cap="none" spc="0" normalizeH="0" baseline="0" noProof="0" dirty="0">
+                <a:ln>
+                  <a:noFill/>
+                </a:ln>
+                <a:solidFill>
+                  <a:prstClr val="black"/>
+                </a:solidFill>
+                <a:effectLst/>
+                <a:uLnTx/>
+                <a:uFillTx/>
+                <a:latin typeface="Calibri" panose="020F0502020204030204"/>
+                <a:ea typeface="+mn-ea"/>
+                <a:cs typeface="+mn-cs"/>
+              </a:endParaRPr>
+            </a:p>
+          </p:txBody>
+        </p:sp>
+        <p:cxnSp>
+          <p:nvCxnSpPr>
+            <p:cNvPr id="11" name="Straight Arrow Connector 10">
+              <a:extLst>
+                <a:ext uri="{FF2B5EF4-FFF2-40B4-BE49-F238E27FC236}">
+                  <a16:creationId xmlns:a16="http://schemas.microsoft.com/office/drawing/2014/main" id="{5E1C33AB-A7DD-065C-2927-3459EBDDE530}"/>
+                </a:ext>
+              </a:extLst>
+            </p:cNvPr>
+            <p:cNvCxnSpPr>
+              <a:cxnSpLocks/>
+              <a:stCxn id="10" idx="1"/>
+            </p:cNvCxnSpPr>
+            <p:nvPr/>
+          </p:nvCxnSpPr>
+          <p:spPr>
+            <a:xfrm flipH="1">
+              <a:off x="2498712" y="5720072"/>
+              <a:ext cx="1209192" cy="291632"/>
+            </a:xfrm>
+            <a:prstGeom prst="straightConnector1">
+              <a:avLst/>
+            </a:prstGeom>
+            <a:ln w="28575">
+              <a:solidFill>
+                <a:schemeClr val="tx1"/>
+              </a:solidFill>
+              <a:tailEnd type="stealth" w="lg" len="lg"/>
+            </a:ln>
+          </p:spPr>
+          <p:style>
+            <a:lnRef idx="1">
+              <a:schemeClr val="accent1"/>
+            </a:lnRef>
+            <a:fillRef idx="0">
+              <a:schemeClr val="accent1"/>
+            </a:fillRef>
+            <a:effectRef idx="0">
+              <a:schemeClr val="accent1"/>
+            </a:effectRef>
+            <a:fontRef idx="minor">
+              <a:schemeClr val="tx1"/>
+            </a:fontRef>
+          </p:style>
+        </p:cxnSp>
+      </p:grpSp>
+      <p:grpSp>
+        <p:nvGrpSpPr>
+          <p:cNvPr id="13" name="Group 12">
+            <a:extLst>
+              <a:ext uri="{FF2B5EF4-FFF2-40B4-BE49-F238E27FC236}">
+                <a16:creationId xmlns:a16="http://schemas.microsoft.com/office/drawing/2014/main" id="{51DB8941-6F04-9C76-F9B1-4E6FF5773504}"/>
+              </a:ext>
+            </a:extLst>
+          </p:cNvPr>
+          <p:cNvGrpSpPr/>
+          <p:nvPr/>
+        </p:nvGrpSpPr>
+        <p:grpSpPr>
+          <a:xfrm>
+            <a:off x="8270697" y="3479862"/>
+            <a:ext cx="3681572" cy="958957"/>
+            <a:chOff x="1636645" y="5535406"/>
+            <a:chExt cx="3681572" cy="958957"/>
+          </a:xfrm>
+        </p:grpSpPr>
+        <p:sp>
+          <p:nvSpPr>
+            <p:cNvPr id="14" name="TextBox 13">
+              <a:extLst>
+                <a:ext uri="{FF2B5EF4-FFF2-40B4-BE49-F238E27FC236}">
+                  <a16:creationId xmlns:a16="http://schemas.microsoft.com/office/drawing/2014/main" id="{4C1B9986-47BA-F907-BCDA-C2B6AE122A55}"/>
+                </a:ext>
+              </a:extLst>
+            </p:cNvPr>
+            <p:cNvSpPr txBox="1"/>
+            <p:nvPr/>
+          </p:nvSpPr>
+          <p:spPr>
+            <a:xfrm>
+              <a:off x="3707904" y="5535406"/>
+              <a:ext cx="1610313" cy="369332"/>
+            </a:xfrm>
+            <a:prstGeom prst="rect">
+              <a:avLst/>
+            </a:prstGeom>
+            <a:solidFill>
+              <a:schemeClr val="bg1"/>
+            </a:solidFill>
+            <a:ln w="19050">
+              <a:solidFill>
+                <a:schemeClr val="tx1"/>
+              </a:solidFill>
+            </a:ln>
+          </p:spPr>
+          <p:txBody>
+            <a:bodyPr wrap="none" rtlCol="0">
+              <a:spAutoFit/>
+            </a:bodyPr>
+            <a:lstStyle/>
+            <a:p>
+              <a:pPr marL="0" marR="0" lvl="0" indent="0" algn="l" defTabSz="914400" rtl="0" eaLnBrk="1" fontAlgn="auto" latinLnBrk="0" hangingPunct="1">
+                <a:lnSpc>
+                  <a:spcPct val="100000"/>
+                </a:lnSpc>
+                <a:spcBef>
+                  <a:spcPts val="0"/>
+                </a:spcBef>
+                <a:spcAft>
+                  <a:spcPts val="0"/>
+                </a:spcAft>
+                <a:buClrTx/>
+                <a:buSzTx/>
+                <a:buFontTx/>
+                <a:buNone/>
+                <a:tabLst/>
+                <a:defRPr/>
+              </a:pPr>
+              <a:r>
+                <a:rPr kumimoji="0" lang="en-US" sz="1800" b="0" i="0" u="none" strike="noStrike" kern="1200" cap="none" spc="0" normalizeH="0" baseline="0" noProof="0" dirty="0">
+                  <a:ln>
+                    <a:noFill/>
+                  </a:ln>
+                  <a:solidFill>
+                    <a:prstClr val="black"/>
+                  </a:solidFill>
+                  <a:effectLst/>
+                  <a:uLnTx/>
+                  <a:uFillTx/>
+                  <a:latin typeface="Calibri" panose="020F0502020204030204"/>
+                  <a:ea typeface="+mn-ea"/>
+                  <a:cs typeface="+mn-cs"/>
+                </a:rPr>
+                <a:t>Handle options</a:t>
+              </a:r>
+              <a:endParaRPr kumimoji="0" lang="nl-BE" sz="1800" b="0" i="0" u="none" strike="noStrike" kern="1200" cap="none" spc="0" normalizeH="0" baseline="0" noProof="0" dirty="0">
+                <a:ln>
+                  <a:noFill/>
+                </a:ln>
+                <a:solidFill>
+                  <a:prstClr val="black"/>
+                </a:solidFill>
+                <a:effectLst/>
+                <a:uLnTx/>
+                <a:uFillTx/>
+                <a:latin typeface="Calibri" panose="020F0502020204030204"/>
+                <a:ea typeface="+mn-ea"/>
+                <a:cs typeface="+mn-cs"/>
+              </a:endParaRPr>
+            </a:p>
+          </p:txBody>
+        </p:sp>
+        <p:cxnSp>
+          <p:nvCxnSpPr>
+            <p:cNvPr id="15" name="Straight Arrow Connector 14">
+              <a:extLst>
+                <a:ext uri="{FF2B5EF4-FFF2-40B4-BE49-F238E27FC236}">
+                  <a16:creationId xmlns:a16="http://schemas.microsoft.com/office/drawing/2014/main" id="{83A4BC1E-31F1-7CA8-55DF-34E13B6C1573}"/>
+                </a:ext>
+              </a:extLst>
+            </p:cNvPr>
+            <p:cNvCxnSpPr>
+              <a:cxnSpLocks/>
+              <a:stCxn id="14" idx="1"/>
+            </p:cNvCxnSpPr>
+            <p:nvPr/>
+          </p:nvCxnSpPr>
+          <p:spPr>
+            <a:xfrm flipH="1">
+              <a:off x="1636645" y="5720072"/>
+              <a:ext cx="2071259" cy="774291"/>
+            </a:xfrm>
+            <a:prstGeom prst="straightConnector1">
+              <a:avLst/>
+            </a:prstGeom>
+            <a:ln w="28575">
+              <a:solidFill>
+                <a:schemeClr val="tx1"/>
+              </a:solidFill>
+              <a:tailEnd type="stealth" w="lg" len="lg"/>
+            </a:ln>
+          </p:spPr>
+          <p:style>
+            <a:lnRef idx="1">
+              <a:schemeClr val="accent1"/>
+            </a:lnRef>
+            <a:fillRef idx="0">
+              <a:schemeClr val="accent1"/>
+            </a:fillRef>
+            <a:effectRef idx="0">
+              <a:schemeClr val="accent1"/>
+            </a:effectRef>
+            <a:fontRef idx="minor">
+              <a:schemeClr val="tx1"/>
+            </a:fontRef>
+          </p:style>
+        </p:cxnSp>
+      </p:grpSp>
+      <p:grpSp>
+        <p:nvGrpSpPr>
+          <p:cNvPr id="17" name="Group 16">
+            <a:extLst>
+              <a:ext uri="{FF2B5EF4-FFF2-40B4-BE49-F238E27FC236}">
+                <a16:creationId xmlns:a16="http://schemas.microsoft.com/office/drawing/2014/main" id="{4D8225C1-E956-5B89-7415-907E3E0DC97A}"/>
+              </a:ext>
+            </a:extLst>
+          </p:cNvPr>
+          <p:cNvGrpSpPr/>
+          <p:nvPr/>
+        </p:nvGrpSpPr>
+        <p:grpSpPr>
+          <a:xfrm>
+            <a:off x="5260369" y="4140873"/>
+            <a:ext cx="6691900" cy="1081211"/>
+            <a:chOff x="-1133425" y="5535406"/>
+            <a:chExt cx="6691900" cy="1081211"/>
+          </a:xfrm>
+        </p:grpSpPr>
+        <p:sp>
+          <p:nvSpPr>
+            <p:cNvPr id="18" name="TextBox 17">
+              <a:extLst>
+                <a:ext uri="{FF2B5EF4-FFF2-40B4-BE49-F238E27FC236}">
+                  <a16:creationId xmlns:a16="http://schemas.microsoft.com/office/drawing/2014/main" id="{55C24928-77A8-9D19-544C-04FE0CFDA1CE}"/>
+                </a:ext>
+              </a:extLst>
+            </p:cNvPr>
+            <p:cNvSpPr txBox="1"/>
+            <p:nvPr/>
+          </p:nvSpPr>
+          <p:spPr>
+            <a:xfrm>
+              <a:off x="3707904" y="5535406"/>
+              <a:ext cx="1850571" cy="369332"/>
+            </a:xfrm>
+            <a:prstGeom prst="rect">
+              <a:avLst/>
+            </a:prstGeom>
+            <a:solidFill>
+              <a:schemeClr val="bg1"/>
+            </a:solidFill>
+            <a:ln w="19050">
+              <a:solidFill>
+                <a:schemeClr val="tx1"/>
+              </a:solidFill>
+            </a:ln>
+          </p:spPr>
+          <p:txBody>
+            <a:bodyPr wrap="none" rtlCol="0">
+              <a:spAutoFit/>
+            </a:bodyPr>
+            <a:lstStyle/>
+            <a:p>
+              <a:pPr marL="0" marR="0" lvl="0" indent="0" algn="l" defTabSz="914400" rtl="0" eaLnBrk="1" fontAlgn="auto" latinLnBrk="0" hangingPunct="1">
+                <a:lnSpc>
+                  <a:spcPct val="100000"/>
+                </a:lnSpc>
+                <a:spcBef>
+                  <a:spcPts val="0"/>
+                </a:spcBef>
+                <a:spcAft>
+                  <a:spcPts val="0"/>
+                </a:spcAft>
+                <a:buClrTx/>
+                <a:buSzTx/>
+                <a:buFontTx/>
+                <a:buNone/>
+                <a:tabLst/>
+                <a:defRPr/>
+              </a:pPr>
+              <a:r>
+                <a:rPr kumimoji="0" lang="en-US" sz="1800" b="0" i="0" u="none" strike="noStrike" kern="1200" cap="none" spc="0" normalizeH="0" baseline="0" noProof="0" dirty="0">
+                  <a:ln>
+                    <a:noFill/>
+                  </a:ln>
+                  <a:solidFill>
+                    <a:prstClr val="black"/>
+                  </a:solidFill>
+                  <a:effectLst/>
+                  <a:uLnTx/>
+                  <a:uFillTx/>
+                  <a:latin typeface="Calibri" panose="020F0502020204030204"/>
+                  <a:ea typeface="+mn-ea"/>
+                  <a:cs typeface="+mn-cs"/>
+                </a:rPr>
+                <a:t>Use option values</a:t>
+              </a:r>
+              <a:endParaRPr kumimoji="0" lang="nl-BE" sz="1800" b="0" i="0" u="none" strike="noStrike" kern="1200" cap="none" spc="0" normalizeH="0" baseline="0" noProof="0" dirty="0">
+                <a:ln>
+                  <a:noFill/>
+                </a:ln>
+                <a:solidFill>
+                  <a:prstClr val="black"/>
+                </a:solidFill>
+                <a:effectLst/>
+                <a:uLnTx/>
+                <a:uFillTx/>
+                <a:latin typeface="Calibri" panose="020F0502020204030204"/>
+                <a:ea typeface="+mn-ea"/>
+                <a:cs typeface="+mn-cs"/>
+              </a:endParaRPr>
+            </a:p>
+          </p:txBody>
+        </p:sp>
+        <p:cxnSp>
+          <p:nvCxnSpPr>
+            <p:cNvPr id="19" name="Straight Arrow Connector 18">
+              <a:extLst>
+                <a:ext uri="{FF2B5EF4-FFF2-40B4-BE49-F238E27FC236}">
+                  <a16:creationId xmlns:a16="http://schemas.microsoft.com/office/drawing/2014/main" id="{CEA3FA62-FDFC-74CF-A735-2C5738AC9989}"/>
+                </a:ext>
+              </a:extLst>
+            </p:cNvPr>
+            <p:cNvCxnSpPr>
+              <a:cxnSpLocks/>
+              <a:stCxn id="18" idx="1"/>
+            </p:cNvCxnSpPr>
+            <p:nvPr/>
+          </p:nvCxnSpPr>
+          <p:spPr>
+            <a:xfrm flipH="1">
+              <a:off x="-1133425" y="5720072"/>
+              <a:ext cx="4841329" cy="896545"/>
+            </a:xfrm>
+            <a:prstGeom prst="straightConnector1">
+              <a:avLst/>
+            </a:prstGeom>
+            <a:ln w="28575">
+              <a:solidFill>
+                <a:schemeClr val="tx1"/>
+              </a:solidFill>
+              <a:tailEnd type="stealth" w="lg" len="lg"/>
+            </a:ln>
+          </p:spPr>
+          <p:style>
+            <a:lnRef idx="1">
+              <a:schemeClr val="accent1"/>
+            </a:lnRef>
+            <a:fillRef idx="0">
+              <a:schemeClr val="accent1"/>
+            </a:fillRef>
+            <a:effectRef idx="0">
+              <a:schemeClr val="accent1"/>
+            </a:effectRef>
+            <a:fontRef idx="minor">
+              <a:schemeClr val="tx1"/>
+            </a:fontRef>
+          </p:style>
+        </p:cxnSp>
+      </p:grpSp>
+      <p:sp>
+        <p:nvSpPr>
+          <p:cNvPr id="23" name="TextBox 22">
+            <a:extLst>
+              <a:ext uri="{FF2B5EF4-FFF2-40B4-BE49-F238E27FC236}">
+                <a16:creationId xmlns:a16="http://schemas.microsoft.com/office/drawing/2014/main" id="{2178CF5F-46EB-81C1-3689-1589443BF331}"/>
+              </a:ext>
+            </a:extLst>
+          </p:cNvPr>
+          <p:cNvSpPr txBox="1"/>
+          <p:nvPr/>
+        </p:nvSpPr>
+        <p:spPr>
+          <a:xfrm>
+            <a:off x="239731" y="6317098"/>
+            <a:ext cx="9684456" cy="369332"/>
+          </a:xfrm>
+          <a:prstGeom prst="rect">
+            <a:avLst/>
+          </a:prstGeom>
+          <a:solidFill>
+            <a:schemeClr val="tx1"/>
+          </a:solidFill>
+          <a:ln>
+            <a:solidFill>
+              <a:schemeClr val="tx1"/>
+            </a:solidFill>
+          </a:ln>
+        </p:spPr>
+        <p:txBody>
+          <a:bodyPr wrap="square" rtlCol="0">
+            <a:spAutoFit/>
+          </a:bodyPr>
+          <a:lstStyle/>
+          <a:p>
+            <a:r>
+              <a:rPr lang="en-US" b="1" dirty="0">
+                <a:solidFill>
+                  <a:schemeClr val="bg1"/>
+                </a:solidFill>
+                <a:latin typeface="Courier New" pitchFamily="49" charset="0"/>
+                <a:cs typeface="Courier New" pitchFamily="49" charset="0"/>
+              </a:rPr>
+              <a:t>$  </a:t>
+            </a:r>
+            <a:r>
+              <a:rPr lang="en-US" b="1" dirty="0" err="1">
+                <a:solidFill>
+                  <a:schemeClr val="bg1"/>
+                </a:solidFill>
+                <a:latin typeface="Courier New" pitchFamily="49" charset="0"/>
+                <a:cs typeface="Courier New" pitchFamily="49" charset="0"/>
+              </a:rPr>
+              <a:t>Rscript</a:t>
+            </a:r>
+            <a:r>
+              <a:rPr lang="en-US" b="1" dirty="0">
+                <a:solidFill>
+                  <a:schemeClr val="bg1"/>
+                </a:solidFill>
+                <a:latin typeface="Courier New" pitchFamily="49" charset="0"/>
+                <a:cs typeface="Courier New" pitchFamily="49" charset="0"/>
+              </a:rPr>
+              <a:t>  </a:t>
+            </a:r>
+            <a:r>
+              <a:rPr lang="en-US" b="1" dirty="0" err="1">
+                <a:solidFill>
+                  <a:schemeClr val="bg1"/>
+                </a:solidFill>
+                <a:latin typeface="Courier New" pitchFamily="49" charset="0"/>
+                <a:cs typeface="Courier New" pitchFamily="49" charset="0"/>
+              </a:rPr>
+              <a:t>weather_analysis.R</a:t>
+            </a:r>
+            <a:r>
+              <a:rPr lang="en-US" b="1" dirty="0">
+                <a:solidFill>
+                  <a:schemeClr val="bg1"/>
+                </a:solidFill>
+                <a:latin typeface="Courier New" pitchFamily="49" charset="0"/>
+                <a:cs typeface="Courier New" pitchFamily="49" charset="0"/>
+              </a:rPr>
+              <a:t>  -c London  --output data_out.csv </a:t>
+            </a:r>
+            <a:r>
+              <a:rPr lang="en-US" dirty="0">
+                <a:solidFill>
+                  <a:schemeClr val="bg1"/>
+                </a:solidFill>
+                <a:latin typeface="Courier New" pitchFamily="49" charset="0"/>
+                <a:cs typeface="Courier New" pitchFamily="49" charset="0"/>
+                <a:sym typeface="Symbol" panose="05050102010706020507" pitchFamily="18" charset="2"/>
+              </a:rPr>
+              <a:t></a:t>
+            </a:r>
+            <a:endParaRPr lang="en-US" dirty="0">
+              <a:solidFill>
+                <a:schemeClr val="bg1"/>
+              </a:solidFill>
+              <a:latin typeface="Courier New" pitchFamily="49" charset="0"/>
+              <a:cs typeface="Courier New" pitchFamily="49" charset="0"/>
+            </a:endParaRPr>
+          </a:p>
+        </p:txBody>
+      </p:sp>
+    </p:spTree>
+    <p:extLst>
+      <p:ext uri="{BB962C8B-B14F-4D97-AF65-F5344CB8AC3E}">
+        <p14:creationId xmlns:p14="http://schemas.microsoft.com/office/powerpoint/2010/main" val="3283186473"/>
+      </p:ext>
+    </p:extLst>
+  </p:cSld>
+  <p:clrMapOvr>
+    <a:masterClrMapping/>
+  </p:clrMapOvr>
+  <p:timing>
+    <p:tnLst>
+      <p:par>
+        <p:cTn id="1" dur="indefinite" restart="never" nodeType="tmRoot">
+          <p:childTnLst>
+            <p:seq concurrent="1" nextAc="seek">
+              <p:cTn id="2" dur="indefinite" nodeType="mainSeq">
+                <p:childTnLst>
+                  <p:par>
+                    <p:cTn id="3" fill="hold">
+                      <p:stCondLst>
+                        <p:cond delay="indefinite"/>
+                        <p:cond evt="onBegin" delay="0">
+                          <p:tn val="2"/>
+                        </p:cond>
+                      </p:stCondLst>
+                      <p:childTnLst>
+                        <p:par>
+                          <p:cTn id="4" fill="hold">
+                            <p:stCondLst>
+                              <p:cond delay="0"/>
+                            </p:stCondLst>
+                            <p:childTnLst>
+                              <p:par>
+                                <p:cTn id="5" presetID="1" presetClass="entr" presetSubtype="0" fill="hold" grpId="0" nodeType="withEffect">
+                                  <p:stCondLst>
+                                    <p:cond delay="0"/>
+                                  </p:stCondLst>
+                                  <p:childTnLst>
+                                    <p:set>
+                                      <p:cBhvr>
+                                        <p:cTn id="6" dur="1" fill="hold">
+                                          <p:stCondLst>
+                                            <p:cond delay="0"/>
+                                          </p:stCondLst>
+                                        </p:cTn>
+                                        <p:tgtEl>
+                                          <p:spTgt spid="23"/>
+                                        </p:tgtEl>
+                                        <p:attrNameLst>
+                                          <p:attrName>style.visibility</p:attrName>
+                                        </p:attrNameLst>
+                                      </p:cBhvr>
+                                      <p:to>
+                                        <p:strVal val="visible"/>
+                                      </p:to>
+                                    </p:set>
+                                  </p:childTnLst>
+                                </p:cTn>
+                              </p:par>
+                            </p:childTnLst>
+                          </p:cTn>
+                        </p:par>
+                      </p:childTnLst>
+                    </p:cTn>
+                  </p:par>
+                </p:childTnLst>
+              </p:cTn>
+              <p:prevCondLst>
+                <p:cond evt="onPrev" delay="0">
+                  <p:tgtEl>
+                    <p:sldTgt/>
+                  </p:tgtEl>
+                </p:cond>
+              </p:prevCondLst>
+              <p:nextCondLst>
+                <p:cond evt="onNext" delay="0">
+                  <p:tgtEl>
+                    <p:sldTgt/>
+                  </p:tgtEl>
+                </p:cond>
+              </p:nextCondLst>
+            </p:seq>
+          </p:childTnLst>
+        </p:cTn>
+      </p:par>
+    </p:tnLst>
+    <p:bldLst>
+      <p:bldP spid="23" grpId="0" animBg="1"/>
+    </p:bldLst>
+  </p:timing>
+</p:sld>
+</file>
+
+<file path=ppt/slides/slide15.xml><?xml version="1.0" encoding="utf-8"?>
 <p:sld xmlns:a="http://schemas.openxmlformats.org/drawingml/2006/main" xmlns:r="http://schemas.openxmlformats.org/officeDocument/2006/relationships" xmlns:p="http://schemas.openxmlformats.org/presentationml/2006/main">
   <p:cSld>
     <p:spTree>
@@ -4675,7 +8316,7 @@
           <a:p>
             <a:fld id="{9C7CE217-4467-4B8D-A735-B008FA7C4816}" type="slidenum">
               <a:rPr lang="LID4096" smtClean="0"/>
-              <a:t>12</a:t>
+              <a:t>15</a:t>
             </a:fld>
             <a:endParaRPr lang="LID4096"/>
           </a:p>
@@ -4694,7 +8335,7 @@
 </p:sld>
 </file>
 
-<file path=ppt/slides/slide13.xml><?xml version="1.0" encoding="utf-8"?>
+<file path=ppt/slides/slide16.xml><?xml version="1.0" encoding="utf-8"?>
 <p:sld xmlns:a="http://schemas.openxmlformats.org/drawingml/2006/main" xmlns:r="http://schemas.openxmlformats.org/officeDocument/2006/relationships" xmlns:p="http://schemas.openxmlformats.org/presentationml/2006/main">
   <p:cSld>
     <p:spTree>
@@ -5604,7 +9245,7 @@
           <a:p>
             <a:fld id="{9C7CE217-4467-4B8D-A735-B008FA7C4816}" type="slidenum">
               <a:rPr lang="LID4096" smtClean="0"/>
-              <a:t>13</a:t>
+              <a:t>16</a:t>
             </a:fld>
             <a:endParaRPr lang="LID4096"/>
           </a:p>

</xml_diff>

<commit_message>
Add slide on conda
</commit_message>
<xml_diff>
--- a/best_practices_for_data_science_on_hpc.pptx
+++ b/best_practices_for_data_science_on_hpc.pptx
@@ -5,7 +5,7 @@
     <p:sldMasterId id="2147483648" r:id="rId1"/>
   </p:sldMasterIdLst>
   <p:notesMasterIdLst>
-    <p:notesMasterId r:id="rId18"/>
+    <p:notesMasterId r:id="rId24"/>
   </p:notesMasterIdLst>
   <p:sldIdLst>
     <p:sldId id="257" r:id="rId2"/>
@@ -20,10 +20,16 @@
     <p:sldId id="362" r:id="rId11"/>
     <p:sldId id="366" r:id="rId12"/>
     <p:sldId id="367" r:id="rId13"/>
-    <p:sldId id="368" r:id="rId14"/>
-    <p:sldId id="369" r:id="rId15"/>
-    <p:sldId id="364" r:id="rId16"/>
-    <p:sldId id="365" r:id="rId17"/>
+    <p:sldId id="370" r:id="rId14"/>
+    <p:sldId id="368" r:id="rId15"/>
+    <p:sldId id="369" r:id="rId16"/>
+    <p:sldId id="372" r:id="rId17"/>
+    <p:sldId id="373" r:id="rId18"/>
+    <p:sldId id="371" r:id="rId19"/>
+    <p:sldId id="364" r:id="rId20"/>
+    <p:sldId id="365" r:id="rId21"/>
+    <p:sldId id="374" r:id="rId22"/>
+    <p:sldId id="375" r:id="rId23"/>
   </p:sldIdLst>
   <p:sldSz cx="12192000" cy="6858000"/>
   <p:notesSz cx="6858000" cy="9144000"/>
@@ -5443,7 +5449,7 @@
           <p:cNvPr id="2" name="Title 1">
             <a:extLst>
               <a:ext uri="{FF2B5EF4-FFF2-40B4-BE49-F238E27FC236}">
-                <a16:creationId xmlns:a16="http://schemas.microsoft.com/office/drawing/2014/main" id="{0608DADC-E412-78E6-F9B0-3CEDFC022922}"/>
+                <a16:creationId xmlns:a16="http://schemas.microsoft.com/office/drawing/2014/main" id="{14866773-14CE-13EE-EE39-51B5FB7AE97D}"/>
               </a:ext>
             </a:extLst>
           </p:cNvPr>
@@ -5461,28 +5467,43 @@
           <a:p>
             <a:r>
               <a:rPr lang="en-US" dirty="0"/>
-              <a:t>Python: </a:t>
-            </a:r>
-            <a:r>
-              <a:rPr lang="en-US" dirty="0" err="1">
-                <a:latin typeface="Courier New" panose="02070309020205020404" pitchFamily="49" charset="0"/>
-                <a:cs typeface="Courier New" panose="02070309020205020404" pitchFamily="49" charset="0"/>
-              </a:rPr>
-              <a:t>argparse</a:t>
-            </a:r>
-            <a:endParaRPr lang="LID4096" dirty="0">
-              <a:latin typeface="Courier New" panose="02070309020205020404" pitchFamily="49" charset="0"/>
-              <a:cs typeface="Courier New" panose="02070309020205020404" pitchFamily="49" charset="0"/>
-            </a:endParaRPr>
-          </a:p>
-        </p:txBody>
-      </p:sp>
-      <p:sp>
-        <p:nvSpPr>
-          <p:cNvPr id="3" name="Slide Number Placeholder 2">
-            <a:extLst>
-              <a:ext uri="{FF2B5EF4-FFF2-40B4-BE49-F238E27FC236}">
-                <a16:creationId xmlns:a16="http://schemas.microsoft.com/office/drawing/2014/main" id="{3E94AC48-40A3-9E2A-AFDD-BB36BFF1A09D}"/>
+              <a:t>Command line arguments</a:t>
+            </a:r>
+            <a:endParaRPr lang="LID4096" dirty="0"/>
+          </a:p>
+        </p:txBody>
+      </p:sp>
+      <p:sp>
+        <p:nvSpPr>
+          <p:cNvPr id="3" name="Text Placeholder 2">
+            <a:extLst>
+              <a:ext uri="{FF2B5EF4-FFF2-40B4-BE49-F238E27FC236}">
+                <a16:creationId xmlns:a16="http://schemas.microsoft.com/office/drawing/2014/main" id="{30E9A134-4B71-6BC9-70E1-116F3FBACDA8}"/>
+              </a:ext>
+            </a:extLst>
+          </p:cNvPr>
+          <p:cNvSpPr>
+            <a:spLocks noGrp="1"/>
+          </p:cNvSpPr>
+          <p:nvPr>
+            <p:ph type="body" idx="1"/>
+          </p:nvPr>
+        </p:nvSpPr>
+        <p:spPr/>
+        <p:txBody>
+          <a:bodyPr/>
+          <a:lstStyle/>
+          <a:p>
+            <a:endParaRPr lang="LID4096"/>
+          </a:p>
+        </p:txBody>
+      </p:sp>
+      <p:sp>
+        <p:nvSpPr>
+          <p:cNvPr id="4" name="Slide Number Placeholder 3">
+            <a:extLst>
+              <a:ext uri="{FF2B5EF4-FFF2-40B4-BE49-F238E27FC236}">
+                <a16:creationId xmlns:a16="http://schemas.microsoft.com/office/drawing/2014/main" id="{9CEB0658-7531-BD9E-BF2C-050DA366A59A}"/>
               </a:ext>
             </a:extLst>
           </p:cNvPr>
@@ -5501,6 +5522,104 @@
             <a:fld id="{9C7CE217-4467-4B8D-A735-B008FA7C4816}" type="slidenum">
               <a:rPr lang="LID4096" smtClean="0"/>
               <a:t>13</a:t>
+            </a:fld>
+            <a:endParaRPr lang="LID4096"/>
+          </a:p>
+        </p:txBody>
+      </p:sp>
+    </p:spTree>
+    <p:extLst>
+      <p:ext uri="{BB962C8B-B14F-4D97-AF65-F5344CB8AC3E}">
+        <p14:creationId xmlns:p14="http://schemas.microsoft.com/office/powerpoint/2010/main" val="487879017"/>
+      </p:ext>
+    </p:extLst>
+  </p:cSld>
+  <p:clrMapOvr>
+    <a:masterClrMapping/>
+  </p:clrMapOvr>
+</p:sld>
+</file>
+
+<file path=ppt/slides/slide14.xml><?xml version="1.0" encoding="utf-8"?>
+<p:sld xmlns:a="http://schemas.openxmlformats.org/drawingml/2006/main" xmlns:r="http://schemas.openxmlformats.org/officeDocument/2006/relationships" xmlns:p="http://schemas.openxmlformats.org/presentationml/2006/main">
+  <p:cSld>
+    <p:spTree>
+      <p:nvGrpSpPr>
+        <p:cNvPr id="1" name=""/>
+        <p:cNvGrpSpPr/>
+        <p:nvPr/>
+      </p:nvGrpSpPr>
+      <p:grpSpPr>
+        <a:xfrm>
+          <a:off x="0" y="0"/>
+          <a:ext cx="0" cy="0"/>
+          <a:chOff x="0" y="0"/>
+          <a:chExt cx="0" cy="0"/>
+        </a:xfrm>
+      </p:grpSpPr>
+      <p:sp>
+        <p:nvSpPr>
+          <p:cNvPr id="2" name="Title 1">
+            <a:extLst>
+              <a:ext uri="{FF2B5EF4-FFF2-40B4-BE49-F238E27FC236}">
+                <a16:creationId xmlns:a16="http://schemas.microsoft.com/office/drawing/2014/main" id="{0608DADC-E412-78E6-F9B0-3CEDFC022922}"/>
+              </a:ext>
+            </a:extLst>
+          </p:cNvPr>
+          <p:cNvSpPr>
+            <a:spLocks noGrp="1"/>
+          </p:cNvSpPr>
+          <p:nvPr>
+            <p:ph type="title"/>
+          </p:nvPr>
+        </p:nvSpPr>
+        <p:spPr/>
+        <p:txBody>
+          <a:bodyPr/>
+          <a:lstStyle/>
+          <a:p>
+            <a:r>
+              <a:rPr lang="en-US" dirty="0"/>
+              <a:t>Python: </a:t>
+            </a:r>
+            <a:r>
+              <a:rPr lang="en-US" dirty="0" err="1">
+                <a:latin typeface="Courier New" panose="02070309020205020404" pitchFamily="49" charset="0"/>
+                <a:cs typeface="Courier New" panose="02070309020205020404" pitchFamily="49" charset="0"/>
+              </a:rPr>
+              <a:t>argparse</a:t>
+            </a:r>
+            <a:endParaRPr lang="LID4096" dirty="0">
+              <a:latin typeface="Courier New" panose="02070309020205020404" pitchFamily="49" charset="0"/>
+              <a:cs typeface="Courier New" panose="02070309020205020404" pitchFamily="49" charset="0"/>
+            </a:endParaRPr>
+          </a:p>
+        </p:txBody>
+      </p:sp>
+      <p:sp>
+        <p:nvSpPr>
+          <p:cNvPr id="3" name="Slide Number Placeholder 2">
+            <a:extLst>
+              <a:ext uri="{FF2B5EF4-FFF2-40B4-BE49-F238E27FC236}">
+                <a16:creationId xmlns:a16="http://schemas.microsoft.com/office/drawing/2014/main" id="{3E94AC48-40A3-9E2A-AFDD-BB36BFF1A09D}"/>
+              </a:ext>
+            </a:extLst>
+          </p:cNvPr>
+          <p:cNvSpPr>
+            <a:spLocks noGrp="1"/>
+          </p:cNvSpPr>
+          <p:nvPr>
+            <p:ph type="sldNum" sz="quarter" idx="12"/>
+          </p:nvPr>
+        </p:nvSpPr>
+        <p:spPr/>
+        <p:txBody>
+          <a:bodyPr/>
+          <a:lstStyle/>
+          <a:p>
+            <a:fld id="{9C7CE217-4467-4B8D-A735-B008FA7C4816}" type="slidenum">
+              <a:rPr lang="LID4096" smtClean="0"/>
+              <a:t>14</a:t>
             </a:fld>
             <a:endParaRPr lang="LID4096"/>
           </a:p>
@@ -6665,7 +6784,7 @@
 </p:sld>
 </file>
 
-<file path=ppt/slides/slide14.xml><?xml version="1.0" encoding="utf-8"?>
+<file path=ppt/slides/slide15.xml><?xml version="1.0" encoding="utf-8"?>
 <p:sld xmlns:a="http://schemas.openxmlformats.org/drawingml/2006/main" xmlns:r="http://schemas.openxmlformats.org/officeDocument/2006/relationships" xmlns:p="http://schemas.openxmlformats.org/presentationml/2006/main">
   <p:cSld>
     <p:spTree>
@@ -6750,7 +6869,7 @@
           <a:p>
             <a:fld id="{9C7CE217-4467-4B8D-A735-B008FA7C4816}" type="slidenum">
               <a:rPr lang="LID4096" smtClean="0"/>
-              <a:t>14</a:t>
+              <a:t>15</a:t>
             </a:fld>
             <a:endParaRPr lang="LID4096"/>
           </a:p>
@@ -8090,7 +8209,379 @@
 </p:sld>
 </file>
 
-<file path=ppt/slides/slide15.xml><?xml version="1.0" encoding="utf-8"?>
+<file path=ppt/slides/slide16.xml><?xml version="1.0" encoding="utf-8"?>
+<p:sld xmlns:a="http://schemas.openxmlformats.org/drawingml/2006/main" xmlns:r="http://schemas.openxmlformats.org/officeDocument/2006/relationships" xmlns:p="http://schemas.openxmlformats.org/presentationml/2006/main">
+  <p:cSld>
+    <p:spTree>
+      <p:nvGrpSpPr>
+        <p:cNvPr id="1" name=""/>
+        <p:cNvGrpSpPr/>
+        <p:nvPr/>
+      </p:nvGrpSpPr>
+      <p:grpSpPr>
+        <a:xfrm>
+          <a:off x="0" y="0"/>
+          <a:ext cx="0" cy="0"/>
+          <a:chOff x="0" y="0"/>
+          <a:chExt cx="0" cy="0"/>
+        </a:xfrm>
+      </p:grpSpPr>
+      <p:sp>
+        <p:nvSpPr>
+          <p:cNvPr id="2" name="Title 1">
+            <a:extLst>
+              <a:ext uri="{FF2B5EF4-FFF2-40B4-BE49-F238E27FC236}">
+                <a16:creationId xmlns:a16="http://schemas.microsoft.com/office/drawing/2014/main" id="{13EA5DF3-6A7B-359B-A16E-27031DCEFE3B}"/>
+              </a:ext>
+            </a:extLst>
+          </p:cNvPr>
+          <p:cNvSpPr>
+            <a:spLocks noGrp="1"/>
+          </p:cNvSpPr>
+          <p:nvPr>
+            <p:ph type="title"/>
+          </p:nvPr>
+        </p:nvSpPr>
+        <p:spPr/>
+        <p:txBody>
+          <a:bodyPr/>
+          <a:lstStyle/>
+          <a:p>
+            <a:r>
+              <a:rPr lang="en-US" dirty="0"/>
+              <a:t>Environment</a:t>
+            </a:r>
+            <a:endParaRPr lang="LID4096" dirty="0"/>
+          </a:p>
+        </p:txBody>
+      </p:sp>
+      <p:sp>
+        <p:nvSpPr>
+          <p:cNvPr id="3" name="Text Placeholder 2">
+            <a:extLst>
+              <a:ext uri="{FF2B5EF4-FFF2-40B4-BE49-F238E27FC236}">
+                <a16:creationId xmlns:a16="http://schemas.microsoft.com/office/drawing/2014/main" id="{2116E260-481C-BE27-DDF5-BE916465D064}"/>
+              </a:ext>
+            </a:extLst>
+          </p:cNvPr>
+          <p:cNvSpPr>
+            <a:spLocks noGrp="1"/>
+          </p:cNvSpPr>
+          <p:nvPr>
+            <p:ph type="body" idx="1"/>
+          </p:nvPr>
+        </p:nvSpPr>
+        <p:spPr/>
+        <p:txBody>
+          <a:bodyPr/>
+          <a:lstStyle/>
+          <a:p>
+            <a:endParaRPr lang="LID4096"/>
+          </a:p>
+        </p:txBody>
+      </p:sp>
+      <p:sp>
+        <p:nvSpPr>
+          <p:cNvPr id="4" name="Slide Number Placeholder 3">
+            <a:extLst>
+              <a:ext uri="{FF2B5EF4-FFF2-40B4-BE49-F238E27FC236}">
+                <a16:creationId xmlns:a16="http://schemas.microsoft.com/office/drawing/2014/main" id="{6759AE21-D6CD-C11A-5C46-2C8A84B9245F}"/>
+              </a:ext>
+            </a:extLst>
+          </p:cNvPr>
+          <p:cNvSpPr>
+            <a:spLocks noGrp="1"/>
+          </p:cNvSpPr>
+          <p:nvPr>
+            <p:ph type="sldNum" sz="quarter" idx="12"/>
+          </p:nvPr>
+        </p:nvSpPr>
+        <p:spPr/>
+        <p:txBody>
+          <a:bodyPr/>
+          <a:lstStyle/>
+          <a:p>
+            <a:fld id="{9C7CE217-4467-4B8D-A735-B008FA7C4816}" type="slidenum">
+              <a:rPr lang="LID4096" smtClean="0"/>
+              <a:t>16</a:t>
+            </a:fld>
+            <a:endParaRPr lang="LID4096"/>
+          </a:p>
+        </p:txBody>
+      </p:sp>
+    </p:spTree>
+    <p:extLst>
+      <p:ext uri="{BB962C8B-B14F-4D97-AF65-F5344CB8AC3E}">
+        <p14:creationId xmlns:p14="http://schemas.microsoft.com/office/powerpoint/2010/main" val="105107686"/>
+      </p:ext>
+    </p:extLst>
+  </p:cSld>
+  <p:clrMapOvr>
+    <a:masterClrMapping/>
+  </p:clrMapOvr>
+</p:sld>
+</file>
+
+<file path=ppt/slides/slide17.xml><?xml version="1.0" encoding="utf-8"?>
+<p:sld xmlns:a="http://schemas.openxmlformats.org/drawingml/2006/main" xmlns:r="http://schemas.openxmlformats.org/officeDocument/2006/relationships" xmlns:p="http://schemas.openxmlformats.org/presentationml/2006/main">
+  <p:cSld>
+    <p:spTree>
+      <p:nvGrpSpPr>
+        <p:cNvPr id="1" name=""/>
+        <p:cNvGrpSpPr/>
+        <p:nvPr/>
+      </p:nvGrpSpPr>
+      <p:grpSpPr>
+        <a:xfrm>
+          <a:off x="0" y="0"/>
+          <a:ext cx="0" cy="0"/>
+          <a:chOff x="0" y="0"/>
+          <a:chExt cx="0" cy="0"/>
+        </a:xfrm>
+      </p:grpSpPr>
+      <p:sp>
+        <p:nvSpPr>
+          <p:cNvPr id="2" name="Title 1">
+            <a:extLst>
+              <a:ext uri="{FF2B5EF4-FFF2-40B4-BE49-F238E27FC236}">
+                <a16:creationId xmlns:a16="http://schemas.microsoft.com/office/drawing/2014/main" id="{03D337CC-43CA-36B6-1955-75F73AB0F793}"/>
+              </a:ext>
+            </a:extLst>
+          </p:cNvPr>
+          <p:cNvSpPr>
+            <a:spLocks noGrp="1"/>
+          </p:cNvSpPr>
+          <p:nvPr>
+            <p:ph type="title"/>
+          </p:nvPr>
+        </p:nvSpPr>
+        <p:spPr/>
+        <p:txBody>
+          <a:bodyPr/>
+          <a:lstStyle/>
+          <a:p>
+            <a:r>
+              <a:rPr lang="en-US" dirty="0"/>
+              <a:t>Options</a:t>
+            </a:r>
+            <a:endParaRPr lang="LID4096" dirty="0"/>
+          </a:p>
+        </p:txBody>
+      </p:sp>
+      <p:sp>
+        <p:nvSpPr>
+          <p:cNvPr id="3" name="Content Placeholder 2">
+            <a:extLst>
+              <a:ext uri="{FF2B5EF4-FFF2-40B4-BE49-F238E27FC236}">
+                <a16:creationId xmlns:a16="http://schemas.microsoft.com/office/drawing/2014/main" id="{3B6E6B68-0438-A9CD-FA89-7464B87F7853}"/>
+              </a:ext>
+            </a:extLst>
+          </p:cNvPr>
+          <p:cNvSpPr>
+            <a:spLocks noGrp="1"/>
+          </p:cNvSpPr>
+          <p:nvPr>
+            <p:ph idx="1"/>
+          </p:nvPr>
+        </p:nvSpPr>
+        <p:spPr/>
+        <p:txBody>
+          <a:bodyPr/>
+          <a:lstStyle/>
+          <a:p>
+            <a:r>
+              <a:rPr lang="en-US" dirty="0"/>
+              <a:t>Pre-installed modules</a:t>
+            </a:r>
+          </a:p>
+          <a:p>
+            <a:r>
+              <a:rPr lang="en-US" dirty="0"/>
+              <a:t>Install your own packages</a:t>
+            </a:r>
+          </a:p>
+          <a:p>
+            <a:r>
+              <a:rPr lang="en-US" dirty="0"/>
+              <a:t>Use containers</a:t>
+            </a:r>
+          </a:p>
+          <a:p>
+            <a:pPr lvl="1"/>
+            <a:r>
+              <a:rPr lang="en-US" dirty="0"/>
+              <a:t>Not in scope: see </a:t>
+            </a:r>
+            <a:r>
+              <a:rPr lang="en-US" dirty="0">
+                <a:hlinkClick r:id="rId2"/>
+              </a:rPr>
+              <a:t>https://gjbex.github.io/Containers-for-HPC/</a:t>
+            </a:r>
+            <a:r>
+              <a:rPr lang="en-US" dirty="0"/>
+              <a:t> </a:t>
+            </a:r>
+            <a:endParaRPr lang="LID4096" dirty="0"/>
+          </a:p>
+        </p:txBody>
+      </p:sp>
+      <p:sp>
+        <p:nvSpPr>
+          <p:cNvPr id="4" name="Slide Number Placeholder 3">
+            <a:extLst>
+              <a:ext uri="{FF2B5EF4-FFF2-40B4-BE49-F238E27FC236}">
+                <a16:creationId xmlns:a16="http://schemas.microsoft.com/office/drawing/2014/main" id="{D0238F99-E6C5-C1AE-94F9-336289C7C1FC}"/>
+              </a:ext>
+            </a:extLst>
+          </p:cNvPr>
+          <p:cNvSpPr>
+            <a:spLocks noGrp="1"/>
+          </p:cNvSpPr>
+          <p:nvPr>
+            <p:ph type="sldNum" sz="quarter" idx="12"/>
+          </p:nvPr>
+        </p:nvSpPr>
+        <p:spPr/>
+        <p:txBody>
+          <a:bodyPr/>
+          <a:lstStyle/>
+          <a:p>
+            <a:fld id="{9C7CE217-4467-4B8D-A735-B008FA7C4816}" type="slidenum">
+              <a:rPr lang="LID4096" smtClean="0"/>
+              <a:t>17</a:t>
+            </a:fld>
+            <a:endParaRPr lang="LID4096"/>
+          </a:p>
+        </p:txBody>
+      </p:sp>
+    </p:spTree>
+    <p:extLst>
+      <p:ext uri="{BB962C8B-B14F-4D97-AF65-F5344CB8AC3E}">
+        <p14:creationId xmlns:p14="http://schemas.microsoft.com/office/powerpoint/2010/main" val="264959717"/>
+      </p:ext>
+    </p:extLst>
+  </p:cSld>
+  <p:clrMapOvr>
+    <a:masterClrMapping/>
+  </p:clrMapOvr>
+</p:sld>
+</file>
+
+<file path=ppt/slides/slide18.xml><?xml version="1.0" encoding="utf-8"?>
+<p:sld xmlns:a="http://schemas.openxmlformats.org/drawingml/2006/main" xmlns:r="http://schemas.openxmlformats.org/officeDocument/2006/relationships" xmlns:p="http://schemas.openxmlformats.org/presentationml/2006/main">
+  <p:cSld>
+    <p:spTree>
+      <p:nvGrpSpPr>
+        <p:cNvPr id="1" name=""/>
+        <p:cNvGrpSpPr/>
+        <p:nvPr/>
+      </p:nvGrpSpPr>
+      <p:grpSpPr>
+        <a:xfrm>
+          <a:off x="0" y="0"/>
+          <a:ext cx="0" cy="0"/>
+          <a:chOff x="0" y="0"/>
+          <a:chExt cx="0" cy="0"/>
+        </a:xfrm>
+      </p:grpSpPr>
+      <p:sp>
+        <p:nvSpPr>
+          <p:cNvPr id="2" name="Title 1">
+            <a:extLst>
+              <a:ext uri="{FF2B5EF4-FFF2-40B4-BE49-F238E27FC236}">
+                <a16:creationId xmlns:a16="http://schemas.microsoft.com/office/drawing/2014/main" id="{EF4FAB7A-ACFC-5BB7-34DE-32FD747B14EB}"/>
+              </a:ext>
+            </a:extLst>
+          </p:cNvPr>
+          <p:cNvSpPr>
+            <a:spLocks noGrp="1"/>
+          </p:cNvSpPr>
+          <p:nvPr>
+            <p:ph type="title"/>
+          </p:nvPr>
+        </p:nvSpPr>
+        <p:spPr/>
+        <p:txBody>
+          <a:bodyPr/>
+          <a:lstStyle/>
+          <a:p>
+            <a:r>
+              <a:rPr lang="en-US" dirty="0"/>
+              <a:t>Environment: modules</a:t>
+            </a:r>
+            <a:endParaRPr lang="LID4096" dirty="0"/>
+          </a:p>
+        </p:txBody>
+      </p:sp>
+      <p:sp>
+        <p:nvSpPr>
+          <p:cNvPr id="3" name="Text Placeholder 2">
+            <a:extLst>
+              <a:ext uri="{FF2B5EF4-FFF2-40B4-BE49-F238E27FC236}">
+                <a16:creationId xmlns:a16="http://schemas.microsoft.com/office/drawing/2014/main" id="{5980683D-6082-E8D1-1301-126441AD31A8}"/>
+              </a:ext>
+            </a:extLst>
+          </p:cNvPr>
+          <p:cNvSpPr>
+            <a:spLocks noGrp="1"/>
+          </p:cNvSpPr>
+          <p:nvPr>
+            <p:ph type="body" idx="1"/>
+          </p:nvPr>
+        </p:nvSpPr>
+        <p:spPr/>
+        <p:txBody>
+          <a:bodyPr/>
+          <a:lstStyle/>
+          <a:p>
+            <a:endParaRPr lang="LID4096"/>
+          </a:p>
+        </p:txBody>
+      </p:sp>
+      <p:sp>
+        <p:nvSpPr>
+          <p:cNvPr id="4" name="Slide Number Placeholder 3">
+            <a:extLst>
+              <a:ext uri="{FF2B5EF4-FFF2-40B4-BE49-F238E27FC236}">
+                <a16:creationId xmlns:a16="http://schemas.microsoft.com/office/drawing/2014/main" id="{3D78520D-BFED-093A-C179-69E2853F4E10}"/>
+              </a:ext>
+            </a:extLst>
+          </p:cNvPr>
+          <p:cNvSpPr>
+            <a:spLocks noGrp="1"/>
+          </p:cNvSpPr>
+          <p:nvPr>
+            <p:ph type="sldNum" sz="quarter" idx="12"/>
+          </p:nvPr>
+        </p:nvSpPr>
+        <p:spPr/>
+        <p:txBody>
+          <a:bodyPr/>
+          <a:lstStyle/>
+          <a:p>
+            <a:fld id="{9C7CE217-4467-4B8D-A735-B008FA7C4816}" type="slidenum">
+              <a:rPr lang="LID4096" smtClean="0"/>
+              <a:t>18</a:t>
+            </a:fld>
+            <a:endParaRPr lang="LID4096"/>
+          </a:p>
+        </p:txBody>
+      </p:sp>
+    </p:spTree>
+    <p:extLst>
+      <p:ext uri="{BB962C8B-B14F-4D97-AF65-F5344CB8AC3E}">
+        <p14:creationId xmlns:p14="http://schemas.microsoft.com/office/powerpoint/2010/main" val="3211385631"/>
+      </p:ext>
+    </p:extLst>
+  </p:cSld>
+  <p:clrMapOvr>
+    <a:masterClrMapping/>
+  </p:clrMapOvr>
+</p:sld>
+</file>
+
+<file path=ppt/slides/slide19.xml><?xml version="1.0" encoding="utf-8"?>
 <p:sld xmlns:a="http://schemas.openxmlformats.org/drawingml/2006/main" xmlns:r="http://schemas.openxmlformats.org/officeDocument/2006/relationships" xmlns:p="http://schemas.openxmlformats.org/presentationml/2006/main">
   <p:cSld>
     <p:spTree>
@@ -8316,7 +8807,7 @@
           <a:p>
             <a:fld id="{9C7CE217-4467-4B8D-A735-B008FA7C4816}" type="slidenum">
               <a:rPr lang="LID4096" smtClean="0"/>
-              <a:t>15</a:t>
+              <a:t>19</a:t>
             </a:fld>
             <a:endParaRPr lang="LID4096"/>
           </a:p>
@@ -8335,7 +8826,125 @@
 </p:sld>
 </file>
 
-<file path=ppt/slides/slide16.xml><?xml version="1.0" encoding="utf-8"?>
+<file path=ppt/slides/slide2.xml><?xml version="1.0" encoding="utf-8"?>
+<p:sld xmlns:a="http://schemas.openxmlformats.org/drawingml/2006/main" xmlns:r="http://schemas.openxmlformats.org/officeDocument/2006/relationships" xmlns:p="http://schemas.openxmlformats.org/presentationml/2006/main">
+  <p:cSld>
+    <p:spTree>
+      <p:nvGrpSpPr>
+        <p:cNvPr id="1" name=""/>
+        <p:cNvGrpSpPr/>
+        <p:nvPr/>
+      </p:nvGrpSpPr>
+      <p:grpSpPr>
+        <a:xfrm>
+          <a:off x="0" y="0"/>
+          <a:ext cx="0" cy="0"/>
+          <a:chOff x="0" y="0"/>
+          <a:chExt cx="0" cy="0"/>
+        </a:xfrm>
+      </p:grpSpPr>
+      <p:sp>
+        <p:nvSpPr>
+          <p:cNvPr id="4" name="Slide Number Placeholder 3"/>
+          <p:cNvSpPr>
+            <a:spLocks noGrp="1"/>
+          </p:cNvSpPr>
+          <p:nvPr>
+            <p:ph type="sldNum" sz="quarter" idx="12"/>
+          </p:nvPr>
+        </p:nvSpPr>
+        <p:spPr/>
+        <p:txBody>
+          <a:bodyPr/>
+          <a:lstStyle/>
+          <a:p>
+            <a:fld id="{0AA598EC-1C61-495B-A9F8-4410E339CCF5}" type="slidenum">
+              <a:rPr lang="en-US" smtClean="0"/>
+              <a:t>2</a:t>
+            </a:fld>
+            <a:endParaRPr lang="en-US"/>
+          </a:p>
+        </p:txBody>
+      </p:sp>
+      <p:sp>
+        <p:nvSpPr>
+          <p:cNvPr id="6" name="TextBox 5"/>
+          <p:cNvSpPr txBox="1"/>
+          <p:nvPr/>
+        </p:nvSpPr>
+        <p:spPr>
+          <a:xfrm>
+            <a:off x="3066751" y="5445224"/>
+            <a:ext cx="5765681" cy="707886"/>
+          </a:xfrm>
+          <a:prstGeom prst="rect">
+            <a:avLst/>
+          </a:prstGeom>
+          <a:noFill/>
+        </p:spPr>
+        <p:txBody>
+          <a:bodyPr wrap="none" rtlCol="0">
+            <a:spAutoFit/>
+          </a:bodyPr>
+          <a:lstStyle/>
+          <a:p>
+            <a:r>
+              <a:rPr lang="en-US" sz="4000" dirty="0">
+                <a:hlinkClick r:id="rId2"/>
+              </a:rPr>
+              <a:t>https://shorturl.at/Rb4Ni</a:t>
+            </a:r>
+            <a:r>
+              <a:rPr lang="en-US" sz="4000" dirty="0"/>
+              <a:t> </a:t>
+            </a:r>
+          </a:p>
+        </p:txBody>
+      </p:sp>
+      <p:pic>
+        <p:nvPicPr>
+          <p:cNvPr id="3" name="Picture 2">
+            <a:extLst>
+              <a:ext uri="{FF2B5EF4-FFF2-40B4-BE49-F238E27FC236}">
+                <a16:creationId xmlns:a16="http://schemas.microsoft.com/office/drawing/2014/main" id="{16679C85-91D9-5467-5CA3-F1BD3EAAF104}"/>
+              </a:ext>
+            </a:extLst>
+          </p:cNvPr>
+          <p:cNvPicPr>
+            <a:picLocks noChangeAspect="1"/>
+          </p:cNvPicPr>
+          <p:nvPr/>
+        </p:nvPicPr>
+        <p:blipFill>
+          <a:blip r:embed="rId3"/>
+          <a:stretch>
+            <a:fillRect/>
+          </a:stretch>
+        </p:blipFill>
+        <p:spPr>
+          <a:xfrm>
+            <a:off x="3952875" y="1285875"/>
+            <a:ext cx="4286250" cy="4286250"/>
+          </a:xfrm>
+          <a:prstGeom prst="rect">
+            <a:avLst/>
+          </a:prstGeom>
+        </p:spPr>
+      </p:pic>
+    </p:spTree>
+    <p:extLst>
+      <p:ext uri="{BB962C8B-B14F-4D97-AF65-F5344CB8AC3E}">
+        <p14:creationId xmlns:p14="http://schemas.microsoft.com/office/powerpoint/2010/main" val="4231110881"/>
+      </p:ext>
+    </p:extLst>
+  </p:cSld>
+  <p:clrMapOvr>
+    <a:masterClrMapping/>
+  </p:clrMapOvr>
+</p:sld>
+</file>
+
+<file path=ppt/slides/slide20.xml><?xml version="1.0" encoding="utf-8"?>
 <p:sld xmlns:a="http://schemas.openxmlformats.org/drawingml/2006/main" xmlns:r="http://schemas.openxmlformats.org/officeDocument/2006/relationships" xmlns:p="http://schemas.openxmlformats.org/presentationml/2006/main">
   <p:cSld>
     <p:spTree>
@@ -8811,7 +9420,7 @@
               </a:solidFill>
               <a:ln w="19050">
                 <a:solidFill>
-                  <a:srgbClr val="C00000"/>
+                  <a:srgbClr val="00B050"/>
                 </a:solidFill>
               </a:ln>
             </p:spPr>
@@ -8897,7 +9506,7 @@
               </a:prstGeom>
               <a:ln w="28575">
                 <a:solidFill>
-                  <a:srgbClr val="C00000"/>
+                  <a:srgbClr val="00B050"/>
                 </a:solidFill>
                 <a:tailEnd type="stealth" w="lg" len="lg"/>
               </a:ln>
@@ -9020,7 +9629,7 @@
               </a:solidFill>
               <a:ln w="19050">
                 <a:solidFill>
-                  <a:srgbClr val="C00000"/>
+                  <a:srgbClr val="00B050"/>
                 </a:solidFill>
               </a:ln>
             </p:spPr>
@@ -9123,7 +9732,7 @@
               </a:prstGeom>
               <a:ln w="28575">
                 <a:solidFill>
-                  <a:srgbClr val="C00000"/>
+                  <a:srgbClr val="00B050"/>
                 </a:solidFill>
                 <a:tailEnd type="stealth" w="lg" len="lg"/>
               </a:ln>
@@ -9245,7 +9854,7 @@
           <a:p>
             <a:fld id="{9C7CE217-4467-4B8D-A735-B008FA7C4816}" type="slidenum">
               <a:rPr lang="LID4096" smtClean="0"/>
-              <a:t>16</a:t>
+              <a:t>20</a:t>
             </a:fld>
             <a:endParaRPr lang="LID4096"/>
           </a:p>
@@ -9264,7 +9873,7 @@
 </p:sld>
 </file>
 
-<file path=ppt/slides/slide2.xml><?xml version="1.0" encoding="utf-8"?>
+<file path=ppt/slides/slide21.xml><?xml version="1.0" encoding="utf-8"?>
 <p:sld xmlns:a="http://schemas.openxmlformats.org/drawingml/2006/main" xmlns:r="http://schemas.openxmlformats.org/officeDocument/2006/relationships" xmlns:p="http://schemas.openxmlformats.org/presentationml/2006/main">
   <p:cSld>
     <p:spTree>
@@ -9283,7 +9892,67 @@
       </p:grpSpPr>
       <p:sp>
         <p:nvSpPr>
-          <p:cNvPr id="4" name="Slide Number Placeholder 3"/>
+          <p:cNvPr id="2" name="Title 1">
+            <a:extLst>
+              <a:ext uri="{FF2B5EF4-FFF2-40B4-BE49-F238E27FC236}">
+                <a16:creationId xmlns:a16="http://schemas.microsoft.com/office/drawing/2014/main" id="{BF853AB3-034A-F8CF-8219-6DA6C8789EAC}"/>
+              </a:ext>
+            </a:extLst>
+          </p:cNvPr>
+          <p:cNvSpPr>
+            <a:spLocks noGrp="1"/>
+          </p:cNvSpPr>
+          <p:nvPr>
+            <p:ph type="title"/>
+          </p:nvPr>
+        </p:nvSpPr>
+        <p:spPr/>
+        <p:txBody>
+          <a:bodyPr/>
+          <a:lstStyle/>
+          <a:p>
+            <a:r>
+              <a:rPr lang="en-US" dirty="0"/>
+              <a:t>Python environments</a:t>
+            </a:r>
+            <a:endParaRPr lang="LID4096" dirty="0"/>
+          </a:p>
+        </p:txBody>
+      </p:sp>
+      <p:sp>
+        <p:nvSpPr>
+          <p:cNvPr id="3" name="Text Placeholder 2">
+            <a:extLst>
+              <a:ext uri="{FF2B5EF4-FFF2-40B4-BE49-F238E27FC236}">
+                <a16:creationId xmlns:a16="http://schemas.microsoft.com/office/drawing/2014/main" id="{98F0AC30-4EFF-4815-3030-BDCD1E084255}"/>
+              </a:ext>
+            </a:extLst>
+          </p:cNvPr>
+          <p:cNvSpPr>
+            <a:spLocks noGrp="1"/>
+          </p:cNvSpPr>
+          <p:nvPr>
+            <p:ph type="body" idx="1"/>
+          </p:nvPr>
+        </p:nvSpPr>
+        <p:spPr/>
+        <p:txBody>
+          <a:bodyPr/>
+          <a:lstStyle/>
+          <a:p>
+            <a:endParaRPr lang="LID4096"/>
+          </a:p>
+        </p:txBody>
+      </p:sp>
+      <p:sp>
+        <p:nvSpPr>
+          <p:cNvPr id="4" name="Slide Number Placeholder 3">
+            <a:extLst>
+              <a:ext uri="{FF2B5EF4-FFF2-40B4-BE49-F238E27FC236}">
+                <a16:creationId xmlns:a16="http://schemas.microsoft.com/office/drawing/2014/main" id="{581CD7FF-A236-C618-89E2-1834C3A7167E}"/>
+              </a:ext>
+            </a:extLst>
+          </p:cNvPr>
           <p:cNvSpPr>
             <a:spLocks noGrp="1"/>
           </p:cNvSpPr>
@@ -9296,55 +9965,294 @@
           <a:bodyPr/>
           <a:lstStyle/>
           <a:p>
-            <a:fld id="{0AA598EC-1C61-495B-A9F8-4410E339CCF5}" type="slidenum">
-              <a:rPr lang="en-US" smtClean="0"/>
-              <a:t>2</a:t>
+            <a:fld id="{9C7CE217-4467-4B8D-A735-B008FA7C4816}" type="slidenum">
+              <a:rPr lang="LID4096" smtClean="0"/>
+              <a:t>21</a:t>
             </a:fld>
-            <a:endParaRPr lang="en-US"/>
-          </a:p>
-        </p:txBody>
-      </p:sp>
-      <p:sp>
-        <p:nvSpPr>
-          <p:cNvPr id="6" name="TextBox 5"/>
+            <a:endParaRPr lang="LID4096"/>
+          </a:p>
+        </p:txBody>
+      </p:sp>
+    </p:spTree>
+    <p:extLst>
+      <p:ext uri="{BB962C8B-B14F-4D97-AF65-F5344CB8AC3E}">
+        <p14:creationId xmlns:p14="http://schemas.microsoft.com/office/powerpoint/2010/main" val="677364972"/>
+      </p:ext>
+    </p:extLst>
+  </p:cSld>
+  <p:clrMapOvr>
+    <a:masterClrMapping/>
+  </p:clrMapOvr>
+</p:sld>
+</file>
+
+<file path=ppt/slides/slide22.xml><?xml version="1.0" encoding="utf-8"?>
+<p:sld xmlns:a="http://schemas.openxmlformats.org/drawingml/2006/main" xmlns:r="http://schemas.openxmlformats.org/officeDocument/2006/relationships" xmlns:p="http://schemas.openxmlformats.org/presentationml/2006/main">
+  <p:cSld>
+    <p:spTree>
+      <p:nvGrpSpPr>
+        <p:cNvPr id="1" name=""/>
+        <p:cNvGrpSpPr/>
+        <p:nvPr/>
+      </p:nvGrpSpPr>
+      <p:grpSpPr>
+        <a:xfrm>
+          <a:off x="0" y="0"/>
+          <a:ext cx="0" cy="0"/>
+          <a:chOff x="0" y="0"/>
+          <a:chExt cx="0" cy="0"/>
+        </a:xfrm>
+      </p:grpSpPr>
+      <p:sp>
+        <p:nvSpPr>
+          <p:cNvPr id="2" name="Title 1">
+            <a:extLst>
+              <a:ext uri="{FF2B5EF4-FFF2-40B4-BE49-F238E27FC236}">
+                <a16:creationId xmlns:a16="http://schemas.microsoft.com/office/drawing/2014/main" id="{45CED853-DFDF-BC51-50DF-3D49D1CA23DA}"/>
+              </a:ext>
+            </a:extLst>
+          </p:cNvPr>
+          <p:cNvSpPr>
+            <a:spLocks noGrp="1"/>
+          </p:cNvSpPr>
+          <p:nvPr>
+            <p:ph type="title"/>
+          </p:nvPr>
+        </p:nvSpPr>
+        <p:spPr/>
+        <p:txBody>
+          <a:bodyPr/>
+          <a:lstStyle/>
+          <a:p>
+            <a:r>
+              <a:rPr lang="en-US" dirty="0"/>
+              <a:t>Conda</a:t>
+            </a:r>
+            <a:endParaRPr lang="LID4096" dirty="0"/>
+          </a:p>
+        </p:txBody>
+      </p:sp>
+      <p:sp>
+        <p:nvSpPr>
+          <p:cNvPr id="3" name="Content Placeholder 2">
+            <a:extLst>
+              <a:ext uri="{FF2B5EF4-FFF2-40B4-BE49-F238E27FC236}">
+                <a16:creationId xmlns:a16="http://schemas.microsoft.com/office/drawing/2014/main" id="{8FF9386A-C977-D456-C782-86154FC4D825}"/>
+              </a:ext>
+            </a:extLst>
+          </p:cNvPr>
+          <p:cNvSpPr>
+            <a:spLocks noGrp="1"/>
+          </p:cNvSpPr>
+          <p:nvPr>
+            <p:ph idx="1"/>
+          </p:nvPr>
+        </p:nvSpPr>
+        <p:spPr/>
+        <p:txBody>
+          <a:bodyPr>
+            <a:normAutofit/>
+          </a:bodyPr>
+          <a:lstStyle/>
+          <a:p>
+            <a:r>
+              <a:rPr lang="en-US" dirty="0"/>
+              <a:t>Best practices</a:t>
+            </a:r>
+          </a:p>
+          <a:p>
+            <a:pPr lvl="1"/>
+            <a:r>
+              <a:rPr lang="en-US" dirty="0"/>
+              <a:t>Lean, single purpose environments</a:t>
+            </a:r>
+          </a:p>
+          <a:p>
+            <a:pPr lvl="1"/>
+            <a:r>
+              <a:rPr lang="en-US" dirty="0"/>
+              <a:t>Keep under version control: </a:t>
+            </a:r>
+            <a:r>
+              <a:rPr lang="en-US" i="1" dirty="0">
+                <a:solidFill>
+                  <a:srgbClr val="00B050"/>
+                </a:solidFill>
+              </a:rPr>
+              <a:t>reproducible</a:t>
+            </a:r>
+            <a:endParaRPr lang="en-US" i="1" dirty="0"/>
+          </a:p>
+          <a:p>
+            <a:pPr lvl="1"/>
+            <a:endParaRPr lang="en-US" i="1" dirty="0"/>
+          </a:p>
+          <a:p>
+            <a:pPr lvl="1"/>
+            <a:endParaRPr lang="en-US" i="1" dirty="0"/>
+          </a:p>
+          <a:p>
+            <a:pPr lvl="1"/>
+            <a:r>
+              <a:rPr lang="en-US" dirty="0"/>
+              <a:t>Keep laptop and HPC in sync: </a:t>
+            </a:r>
+            <a:r>
+              <a:rPr lang="en-US" i="1" dirty="0">
+                <a:solidFill>
+                  <a:srgbClr val="00B050"/>
+                </a:solidFill>
+              </a:rPr>
+              <a:t>portability</a:t>
+            </a:r>
+            <a:endParaRPr lang="en-US" dirty="0"/>
+          </a:p>
+          <a:p>
+            <a:pPr lvl="1"/>
+            <a:endParaRPr lang="en-US" dirty="0"/>
+          </a:p>
+          <a:p>
+            <a:pPr lvl="1"/>
+            <a:endParaRPr lang="en-US" dirty="0"/>
+          </a:p>
+          <a:p>
+            <a:r>
+              <a:rPr lang="en-US" dirty="0"/>
+              <a:t>Pitfall: installation directory, see documentation</a:t>
+            </a:r>
+            <a:br>
+              <a:rPr lang="en-US" dirty="0"/>
+            </a:br>
+            <a:r>
+              <a:rPr lang="en-US" sz="2000" dirty="0">
+                <a:hlinkClick r:id="rId2"/>
+              </a:rPr>
+              <a:t>https://docs.vscentrum.be/compute/software/python_package_management.html</a:t>
+            </a:r>
+            <a:r>
+              <a:rPr lang="en-US" sz="2000" dirty="0"/>
+              <a:t> </a:t>
+            </a:r>
+          </a:p>
+          <a:p>
+            <a:endParaRPr lang="en-US" i="1" dirty="0">
+              <a:solidFill>
+                <a:srgbClr val="00B050"/>
+              </a:solidFill>
+            </a:endParaRPr>
+          </a:p>
+        </p:txBody>
+      </p:sp>
+      <p:sp>
+        <p:nvSpPr>
+          <p:cNvPr id="4" name="Slide Number Placeholder 3">
+            <a:extLst>
+              <a:ext uri="{FF2B5EF4-FFF2-40B4-BE49-F238E27FC236}">
+                <a16:creationId xmlns:a16="http://schemas.microsoft.com/office/drawing/2014/main" id="{A38D5F06-910B-6523-67A4-F713CB9C6F36}"/>
+              </a:ext>
+            </a:extLst>
+          </p:cNvPr>
+          <p:cNvSpPr>
+            <a:spLocks noGrp="1"/>
+          </p:cNvSpPr>
+          <p:nvPr>
+            <p:ph type="sldNum" sz="quarter" idx="12"/>
+          </p:nvPr>
+        </p:nvSpPr>
+        <p:spPr/>
+        <p:txBody>
+          <a:bodyPr/>
+          <a:lstStyle/>
+          <a:p>
+            <a:fld id="{9C7CE217-4467-4B8D-A735-B008FA7C4816}" type="slidenum">
+              <a:rPr lang="LID4096" smtClean="0"/>
+              <a:t>22</a:t>
+            </a:fld>
+            <a:endParaRPr lang="LID4096"/>
+          </a:p>
+        </p:txBody>
+      </p:sp>
+      <p:sp>
+        <p:nvSpPr>
+          <p:cNvPr id="5" name="TextBox 4">
+            <a:extLst>
+              <a:ext uri="{FF2B5EF4-FFF2-40B4-BE49-F238E27FC236}">
+                <a16:creationId xmlns:a16="http://schemas.microsoft.com/office/drawing/2014/main" id="{4A96AB11-9ECF-D5E6-6532-B07AB9001B2D}"/>
+              </a:ext>
+            </a:extLst>
+          </p:cNvPr>
           <p:cNvSpPr txBox="1"/>
           <p:nvPr/>
         </p:nvSpPr>
         <p:spPr>
           <a:xfrm>
-            <a:off x="3066751" y="5445224"/>
-            <a:ext cx="5765681" cy="707886"/>
+            <a:off x="1585645" y="3174716"/>
+            <a:ext cx="7938498" cy="369332"/>
           </a:xfrm>
           <a:prstGeom prst="rect">
             <a:avLst/>
           </a:prstGeom>
-          <a:noFill/>
+          <a:solidFill>
+            <a:schemeClr val="tx1"/>
+          </a:solidFill>
+          <a:ln>
+            <a:solidFill>
+              <a:schemeClr val="tx1"/>
+            </a:solidFill>
+          </a:ln>
         </p:spPr>
         <p:txBody>
-          <a:bodyPr wrap="none" rtlCol="0">
+          <a:bodyPr wrap="square" rtlCol="0">
             <a:spAutoFit/>
           </a:bodyPr>
           <a:lstStyle/>
           <a:p>
             <a:r>
-              <a:rPr lang="en-US" sz="4000" dirty="0">
-                <a:hlinkClick r:id="rId2"/>
+              <a:rPr lang="en-US" b="1" dirty="0">
+                <a:solidFill>
+                  <a:schemeClr val="bg1"/>
+                </a:solidFill>
+                <a:latin typeface="Courier New" pitchFamily="49" charset="0"/>
+                <a:cs typeface="Courier New" pitchFamily="49" charset="0"/>
               </a:rPr>
-              <a:t>https://shorturl.at/Rb4Ni</a:t>
-            </a:r>
-            <a:r>
-              <a:rPr lang="en-US" sz="4000" dirty="0"/>
-              <a:t> </a:t>
-            </a:r>
+              <a:t>$  </a:t>
+            </a:r>
+            <a:r>
+              <a:rPr lang="en-US" b="1" dirty="0" err="1">
+                <a:solidFill>
+                  <a:schemeClr val="bg1"/>
+                </a:solidFill>
+                <a:latin typeface="Courier New" pitchFamily="49" charset="0"/>
+                <a:cs typeface="Courier New" pitchFamily="49" charset="0"/>
+              </a:rPr>
+              <a:t>conda</a:t>
+            </a:r>
+            <a:r>
+              <a:rPr lang="en-US" b="1" dirty="0">
+                <a:solidFill>
+                  <a:schemeClr val="bg1"/>
+                </a:solidFill>
+                <a:latin typeface="Courier New" pitchFamily="49" charset="0"/>
+                <a:cs typeface="Courier New" pitchFamily="49" charset="0"/>
+              </a:rPr>
+              <a:t>  list  --explicit  &gt;  environment_spec.txt</a:t>
+            </a:r>
+            <a:endParaRPr lang="en-US" dirty="0">
+              <a:solidFill>
+                <a:schemeClr val="bg1"/>
+              </a:solidFill>
+              <a:latin typeface="Courier New" pitchFamily="49" charset="0"/>
+              <a:cs typeface="Courier New" pitchFamily="49" charset="0"/>
+            </a:endParaRPr>
           </a:p>
         </p:txBody>
       </p:sp>
       <p:pic>
         <p:nvPicPr>
-          <p:cNvPr id="3" name="Picture 2">
-            <a:extLst>
-              <a:ext uri="{FF2B5EF4-FFF2-40B4-BE49-F238E27FC236}">
-                <a16:creationId xmlns:a16="http://schemas.microsoft.com/office/drawing/2014/main" id="{16679C85-91D9-5467-5CA3-F1BD3EAAF104}"/>
+          <p:cNvPr id="6" name="Graphic 5" descr="Thumbs up sign with solid fill">
+            <a:extLst>
+              <a:ext uri="{FF2B5EF4-FFF2-40B4-BE49-F238E27FC236}">
+                <a16:creationId xmlns:a16="http://schemas.microsoft.com/office/drawing/2014/main" id="{8AC9E7C1-BCDB-9C8E-7382-EFB639E5A884}"/>
               </a:ext>
             </a:extLst>
           </p:cNvPr>
@@ -9354,31 +10262,341 @@
           <p:nvPr/>
         </p:nvPicPr>
         <p:blipFill>
-          <a:blip r:embed="rId3"/>
+          <a:blip r:embed="rId3">
+            <a:extLst>
+              <a:ext uri="{96DAC541-7B7A-43D3-8B79-37D633B846F1}">
+                <asvg:svgBlip xmlns:asvg="http://schemas.microsoft.com/office/drawing/2016/SVG/main" r:embed="rId4"/>
+              </a:ext>
+            </a:extLst>
+          </a:blip>
           <a:stretch>
             <a:fillRect/>
           </a:stretch>
         </p:blipFill>
         <p:spPr>
           <a:xfrm>
-            <a:off x="3952875" y="1285875"/>
-            <a:ext cx="4286250" cy="4286250"/>
+            <a:off x="9644871" y="2578254"/>
+            <a:ext cx="724200" cy="724200"/>
           </a:xfrm>
           <a:prstGeom prst="rect">
             <a:avLst/>
           </a:prstGeom>
         </p:spPr>
       </p:pic>
+      <p:sp>
+        <p:nvSpPr>
+          <p:cNvPr id="7" name="TextBox 6">
+            <a:extLst>
+              <a:ext uri="{FF2B5EF4-FFF2-40B4-BE49-F238E27FC236}">
+                <a16:creationId xmlns:a16="http://schemas.microsoft.com/office/drawing/2014/main" id="{0B60F4B9-0DC7-9C46-5D2A-B83B61031A04}"/>
+              </a:ext>
+            </a:extLst>
+          </p:cNvPr>
+          <p:cNvSpPr txBox="1"/>
+          <p:nvPr/>
+        </p:nvSpPr>
+        <p:spPr>
+          <a:xfrm>
+            <a:off x="1585644" y="4281390"/>
+            <a:ext cx="7938499" cy="369332"/>
+          </a:xfrm>
+          <a:prstGeom prst="rect">
+            <a:avLst/>
+          </a:prstGeom>
+          <a:solidFill>
+            <a:schemeClr val="tx1"/>
+          </a:solidFill>
+          <a:ln>
+            <a:solidFill>
+              <a:schemeClr val="tx1"/>
+            </a:solidFill>
+          </a:ln>
+        </p:spPr>
+        <p:txBody>
+          <a:bodyPr wrap="square" rtlCol="0">
+            <a:spAutoFit/>
+          </a:bodyPr>
+          <a:lstStyle/>
+          <a:p>
+            <a:r>
+              <a:rPr lang="en-US" b="1" dirty="0">
+                <a:solidFill>
+                  <a:schemeClr val="bg1"/>
+                </a:solidFill>
+                <a:latin typeface="Courier New" pitchFamily="49" charset="0"/>
+                <a:cs typeface="Courier New" pitchFamily="49" charset="0"/>
+              </a:rPr>
+              <a:t>$  </a:t>
+            </a:r>
+            <a:r>
+              <a:rPr lang="en-US" b="1" dirty="0" err="1">
+                <a:solidFill>
+                  <a:schemeClr val="bg1"/>
+                </a:solidFill>
+                <a:latin typeface="Courier New" pitchFamily="49" charset="0"/>
+                <a:cs typeface="Courier New" pitchFamily="49" charset="0"/>
+              </a:rPr>
+              <a:t>conda</a:t>
+            </a:r>
+            <a:r>
+              <a:rPr lang="en-US" b="1" dirty="0">
+                <a:solidFill>
+                  <a:schemeClr val="bg1"/>
+                </a:solidFill>
+                <a:latin typeface="Courier New" pitchFamily="49" charset="0"/>
+                <a:cs typeface="Courier New" pitchFamily="49" charset="0"/>
+              </a:rPr>
+              <a:t>  env export  --from-history  &gt;  </a:t>
+            </a:r>
+            <a:r>
+              <a:rPr lang="en-US" b="1" dirty="0" err="1">
+                <a:solidFill>
+                  <a:schemeClr val="bg1"/>
+                </a:solidFill>
+                <a:latin typeface="Courier New" pitchFamily="49" charset="0"/>
+                <a:cs typeface="Courier New" pitchFamily="49" charset="0"/>
+              </a:rPr>
+              <a:t>environment.yml</a:t>
+            </a:r>
+            <a:endParaRPr lang="en-US" dirty="0">
+              <a:solidFill>
+                <a:schemeClr val="bg1"/>
+              </a:solidFill>
+              <a:latin typeface="Courier New" pitchFamily="49" charset="0"/>
+              <a:cs typeface="Courier New" pitchFamily="49" charset="0"/>
+            </a:endParaRPr>
+          </a:p>
+        </p:txBody>
+      </p:sp>
+      <p:pic>
+        <p:nvPicPr>
+          <p:cNvPr id="8" name="Graphic 7" descr="Thumbs up sign with solid fill">
+            <a:extLst>
+              <a:ext uri="{FF2B5EF4-FFF2-40B4-BE49-F238E27FC236}">
+                <a16:creationId xmlns:a16="http://schemas.microsoft.com/office/drawing/2014/main" id="{1D398045-43A7-2AA1-18C7-C55F19288CFC}"/>
+              </a:ext>
+            </a:extLst>
+          </p:cNvPr>
+          <p:cNvPicPr>
+            <a:picLocks noChangeAspect="1"/>
+          </p:cNvPicPr>
+          <p:nvPr/>
+        </p:nvPicPr>
+        <p:blipFill>
+          <a:blip r:embed="rId3">
+            <a:extLst>
+              <a:ext uri="{96DAC541-7B7A-43D3-8B79-37D633B846F1}">
+                <asvg:svgBlip xmlns:asvg="http://schemas.microsoft.com/office/drawing/2016/SVG/main" r:embed="rId4"/>
+              </a:ext>
+            </a:extLst>
+          </a:blip>
+          <a:stretch>
+            <a:fillRect/>
+          </a:stretch>
+        </p:blipFill>
+        <p:spPr>
+          <a:xfrm>
+            <a:off x="9644871" y="3687884"/>
+            <a:ext cx="724200" cy="724200"/>
+          </a:xfrm>
+          <a:prstGeom prst="rect">
+            <a:avLst/>
+          </a:prstGeom>
+        </p:spPr>
+      </p:pic>
+      <p:pic>
+        <p:nvPicPr>
+          <p:cNvPr id="10" name="Picture 2" descr="C:\Users\lucg5005\AppData\Local\Microsoft\Windows\Temporary Internet Files\Content.IE5\CWZUAEH4\lgi01a201309290600[1].jpg">
+            <a:extLst>
+              <a:ext uri="{FF2B5EF4-FFF2-40B4-BE49-F238E27FC236}">
+                <a16:creationId xmlns:a16="http://schemas.microsoft.com/office/drawing/2014/main" id="{9EE27DB5-9280-E132-F5DF-4224354B4EB3}"/>
+              </a:ext>
+            </a:extLst>
+          </p:cNvPr>
+          <p:cNvPicPr>
+            <a:picLocks noChangeAspect="1" noChangeArrowheads="1"/>
+          </p:cNvPicPr>
+          <p:nvPr/>
+        </p:nvPicPr>
+        <p:blipFill>
+          <a:blip r:embed="rId5" cstate="print">
+            <a:extLst>
+              <a:ext uri="{28A0092B-C50C-407E-A947-70E740481C1C}">
+                <a14:useLocalDpi xmlns:a14="http://schemas.microsoft.com/office/drawing/2010/main" val="0"/>
+              </a:ext>
+            </a:extLst>
+          </a:blip>
+          <a:srcRect/>
+          <a:stretch>
+            <a:fillRect/>
+          </a:stretch>
+        </p:blipFill>
+        <p:spPr bwMode="auto">
+          <a:xfrm>
+            <a:off x="8610600" y="4828406"/>
+            <a:ext cx="566151" cy="580908"/>
+          </a:xfrm>
+          <a:prstGeom prst="rect">
+            <a:avLst/>
+          </a:prstGeom>
+          <a:noFill/>
+          <a:extLst>
+            <a:ext uri="{909E8E84-426E-40DD-AFC4-6F175D3DCCD1}">
+              <a14:hiddenFill xmlns:a14="http://schemas.microsoft.com/office/drawing/2010/main">
+                <a:solidFill>
+                  <a:srgbClr val="FFFFFF"/>
+                </a:solidFill>
+              </a14:hiddenFill>
+            </a:ext>
+          </a:extLst>
+        </p:spPr>
+      </p:pic>
     </p:spTree>
     <p:extLst>
       <p:ext uri="{BB962C8B-B14F-4D97-AF65-F5344CB8AC3E}">
-        <p14:creationId xmlns:p14="http://schemas.microsoft.com/office/powerpoint/2010/main" val="4231110881"/>
+        <p14:creationId xmlns:p14="http://schemas.microsoft.com/office/powerpoint/2010/main" val="367057393"/>
       </p:ext>
     </p:extLst>
   </p:cSld>
   <p:clrMapOvr>
     <a:masterClrMapping/>
   </p:clrMapOvr>
+  <p:timing>
+    <p:tnLst>
+      <p:par>
+        <p:cTn id="1" dur="indefinite" restart="never" nodeType="tmRoot">
+          <p:childTnLst>
+            <p:seq concurrent="1" nextAc="seek">
+              <p:cTn id="2" dur="indefinite" nodeType="mainSeq">
+                <p:childTnLst>
+                  <p:par>
+                    <p:cTn id="3" fill="hold">
+                      <p:stCondLst>
+                        <p:cond delay="indefinite"/>
+                        <p:cond evt="onBegin" delay="0">
+                          <p:tn val="2"/>
+                        </p:cond>
+                      </p:stCondLst>
+                      <p:childTnLst>
+                        <p:par>
+                          <p:cTn id="4" fill="hold">
+                            <p:stCondLst>
+                              <p:cond delay="0"/>
+                            </p:stCondLst>
+                            <p:childTnLst>
+                              <p:par>
+                                <p:cTn id="5" presetID="1" presetClass="entr" presetSubtype="0" fill="hold" grpId="0" nodeType="withEffect">
+                                  <p:stCondLst>
+                                    <p:cond delay="0"/>
+                                  </p:stCondLst>
+                                  <p:childTnLst>
+                                    <p:set>
+                                      <p:cBhvr>
+                                        <p:cTn id="6" dur="1" fill="hold">
+                                          <p:stCondLst>
+                                            <p:cond delay="0"/>
+                                          </p:stCondLst>
+                                        </p:cTn>
+                                        <p:tgtEl>
+                                          <p:spTgt spid="5"/>
+                                        </p:tgtEl>
+                                        <p:attrNameLst>
+                                          <p:attrName>style.visibility</p:attrName>
+                                        </p:attrNameLst>
+                                      </p:cBhvr>
+                                      <p:to>
+                                        <p:strVal val="visible"/>
+                                      </p:to>
+                                    </p:set>
+                                  </p:childTnLst>
+                                </p:cTn>
+                              </p:par>
+                              <p:par>
+                                <p:cTn id="7" presetID="1" presetClass="entr" presetSubtype="0" fill="hold" grpId="0" nodeType="withEffect">
+                                  <p:stCondLst>
+                                    <p:cond delay="0"/>
+                                  </p:stCondLst>
+                                  <p:childTnLst>
+                                    <p:set>
+                                      <p:cBhvr>
+                                        <p:cTn id="8" dur="1" fill="hold">
+                                          <p:stCondLst>
+                                            <p:cond delay="0"/>
+                                          </p:stCondLst>
+                                        </p:cTn>
+                                        <p:tgtEl>
+                                          <p:spTgt spid="7"/>
+                                        </p:tgtEl>
+                                        <p:attrNameLst>
+                                          <p:attrName>style.visibility</p:attrName>
+                                        </p:attrNameLst>
+                                      </p:cBhvr>
+                                      <p:to>
+                                        <p:strVal val="visible"/>
+                                      </p:to>
+                                    </p:set>
+                                  </p:childTnLst>
+                                </p:cTn>
+                              </p:par>
+                              <p:par>
+                                <p:cTn id="9" presetID="1" presetClass="entr" presetSubtype="0" fill="hold" nodeType="withEffect">
+                                  <p:stCondLst>
+                                    <p:cond delay="0"/>
+                                  </p:stCondLst>
+                                  <p:childTnLst>
+                                    <p:set>
+                                      <p:cBhvr>
+                                        <p:cTn id="10" dur="1" fill="hold">
+                                          <p:stCondLst>
+                                            <p:cond delay="0"/>
+                                          </p:stCondLst>
+                                        </p:cTn>
+                                        <p:tgtEl>
+                                          <p:spTgt spid="10"/>
+                                        </p:tgtEl>
+                                        <p:attrNameLst>
+                                          <p:attrName>style.visibility</p:attrName>
+                                        </p:attrNameLst>
+                                      </p:cBhvr>
+                                      <p:to>
+                                        <p:strVal val="visible"/>
+                                      </p:to>
+                                    </p:set>
+                                  </p:childTnLst>
+                                </p:cTn>
+                              </p:par>
+                            </p:childTnLst>
+                          </p:cTn>
+                        </p:par>
+                      </p:childTnLst>
+                    </p:cTn>
+                  </p:par>
+                </p:childTnLst>
+              </p:cTn>
+              <p:prevCondLst>
+                <p:cond evt="onPrev" delay="0">
+                  <p:tgtEl>
+                    <p:sldTgt/>
+                  </p:tgtEl>
+                </p:cond>
+              </p:prevCondLst>
+              <p:nextCondLst>
+                <p:cond evt="onNext" delay="0">
+                  <p:tgtEl>
+                    <p:sldTgt/>
+                  </p:tgtEl>
+                </p:cond>
+              </p:nextCondLst>
+            </p:seq>
+          </p:childTnLst>
+        </p:cTn>
+      </p:par>
+    </p:tnLst>
+    <p:bldLst>
+      <p:bldP spid="5" grpId="0" animBg="1"/>
+      <p:bldP spid="7" grpId="0" animBg="1"/>
+    </p:bldLst>
+  </p:timing>
 </p:sld>
 </file>
 

</xml_diff>

<commit_message>
Add R package installation slides
</commit_message>
<xml_diff>
--- a/best_practices_for_data_science_on_hpc.pptx
+++ b/best_practices_for_data_science_on_hpc.pptx
@@ -5,7 +5,7 @@
     <p:sldMasterId id="2147483648" r:id="rId1"/>
   </p:sldMasterIdLst>
   <p:notesMasterIdLst>
-    <p:notesMasterId r:id="rId24"/>
+    <p:notesMasterId r:id="rId30"/>
   </p:notesMasterIdLst>
   <p:sldIdLst>
     <p:sldId id="257" r:id="rId2"/>
@@ -30,6 +30,12 @@
     <p:sldId id="365" r:id="rId21"/>
     <p:sldId id="374" r:id="rId22"/>
     <p:sldId id="375" r:id="rId23"/>
+    <p:sldId id="376" r:id="rId24"/>
+    <p:sldId id="377" r:id="rId25"/>
+    <p:sldId id="378" r:id="rId26"/>
+    <p:sldId id="379" r:id="rId27"/>
+    <p:sldId id="380" r:id="rId28"/>
+    <p:sldId id="381" r:id="rId29"/>
   </p:sldIdLst>
   <p:sldSz cx="12192000" cy="6858000"/>
   <p:notesSz cx="6858000" cy="9144000"/>
@@ -10051,7 +10057,7 @@
         <p:spPr/>
         <p:txBody>
           <a:bodyPr>
-            <a:normAutofit/>
+            <a:normAutofit lnSpcReduction="10000"/>
           </a:bodyPr>
           <a:lstStyle/>
           <a:p>
@@ -10128,6 +10134,21 @@
                 <a:hlinkClick r:id="rId2"/>
               </a:rPr>
               <a:t>https://docs.vscentrum.be/compute/software/python_package_management.html</a:t>
+            </a:r>
+            <a:endParaRPr lang="en-US" sz="2000" dirty="0"/>
+          </a:p>
+          <a:p>
+            <a:r>
+              <a:rPr lang="en-US" dirty="0"/>
+              <a:t>For performance on CPU, use Intel </a:t>
+            </a:r>
+            <a:r>
+              <a:rPr lang="en-US" dirty="0" err="1"/>
+              <a:t>OneAPI</a:t>
+            </a:r>
+            <a:r>
+              <a:rPr lang="en-US" dirty="0"/>
+              <a:t> distribution</a:t>
             </a:r>
             <a:r>
               <a:rPr lang="en-US" sz="2000" dirty="0"/>
@@ -10235,7 +10256,7 @@
                 <a:latin typeface="Courier New" pitchFamily="49" charset="0"/>
                 <a:cs typeface="Courier New" pitchFamily="49" charset="0"/>
               </a:rPr>
-              <a:t>  list  --explicit  &gt;  environment_spec.txt</a:t>
+              <a:t> list  --explicit  &gt;  environment_spec.txt</a:t>
             </a:r>
             <a:endParaRPr lang="en-US" dirty="0">
               <a:solidFill>
@@ -10346,7 +10367,7 @@
                 <a:latin typeface="Courier New" pitchFamily="49" charset="0"/>
                 <a:cs typeface="Courier New" pitchFamily="49" charset="0"/>
               </a:rPr>
-              <a:t>  env export  --from-history  &gt;  </a:t>
+              <a:t> env export  --from-history  &gt;  </a:t>
             </a:r>
             <a:r>
               <a:rPr lang="en-US" b="1" dirty="0" err="1">
@@ -10433,7 +10454,7 @@
         </p:blipFill>
         <p:spPr bwMode="auto">
           <a:xfrm>
-            <a:off x="8610600" y="4828406"/>
+            <a:off x="10437245" y="4869503"/>
             <a:ext cx="566151" cy="580908"/>
           </a:xfrm>
           <a:prstGeom prst="rect">
@@ -10449,6 +10470,157 @@
               </a14:hiddenFill>
             </a:ext>
           </a:extLst>
+        </p:spPr>
+      </p:pic>
+      <p:sp>
+        <p:nvSpPr>
+          <p:cNvPr id="11" name="TextBox 10">
+            <a:extLst>
+              <a:ext uri="{FF2B5EF4-FFF2-40B4-BE49-F238E27FC236}">
+                <a16:creationId xmlns:a16="http://schemas.microsoft.com/office/drawing/2014/main" id="{CD81AE5F-0855-5FB4-03BF-AEFBCD80C180}"/>
+              </a:ext>
+            </a:extLst>
+          </p:cNvPr>
+          <p:cNvSpPr txBox="1"/>
+          <p:nvPr/>
+        </p:nvSpPr>
+        <p:spPr>
+          <a:xfrm>
+            <a:off x="1585645" y="6006789"/>
+            <a:ext cx="7938498" cy="369332"/>
+          </a:xfrm>
+          <a:prstGeom prst="rect">
+            <a:avLst/>
+          </a:prstGeom>
+          <a:solidFill>
+            <a:schemeClr val="tx1"/>
+          </a:solidFill>
+          <a:ln>
+            <a:solidFill>
+              <a:schemeClr val="tx1"/>
+            </a:solidFill>
+          </a:ln>
+        </p:spPr>
+        <p:txBody>
+          <a:bodyPr wrap="square" rtlCol="0">
+            <a:spAutoFit/>
+          </a:bodyPr>
+          <a:lstStyle/>
+          <a:p>
+            <a:r>
+              <a:rPr lang="en-US" b="1" dirty="0">
+                <a:solidFill>
+                  <a:schemeClr val="bg1"/>
+                </a:solidFill>
+                <a:latin typeface="Courier New" pitchFamily="49" charset="0"/>
+                <a:cs typeface="Courier New" pitchFamily="49" charset="0"/>
+              </a:rPr>
+              <a:t>$  </a:t>
+            </a:r>
+            <a:r>
+              <a:rPr lang="en-US" b="1" dirty="0" err="1">
+                <a:solidFill>
+                  <a:schemeClr val="bg1"/>
+                </a:solidFill>
+                <a:latin typeface="Courier New" pitchFamily="49" charset="0"/>
+                <a:cs typeface="Courier New" pitchFamily="49" charset="0"/>
+              </a:rPr>
+              <a:t>conda</a:t>
+            </a:r>
+            <a:r>
+              <a:rPr lang="en-US" b="1" dirty="0">
+                <a:solidFill>
+                  <a:schemeClr val="bg1"/>
+                </a:solidFill>
+                <a:latin typeface="Courier New" pitchFamily="49" charset="0"/>
+                <a:cs typeface="Courier New" pitchFamily="49" charset="0"/>
+              </a:rPr>
+              <a:t> create  -n </a:t>
+            </a:r>
+            <a:r>
+              <a:rPr lang="en-US" b="1" dirty="0" err="1">
+                <a:solidFill>
+                  <a:schemeClr val="bg1"/>
+                </a:solidFill>
+                <a:latin typeface="Courier New" pitchFamily="49" charset="0"/>
+                <a:cs typeface="Courier New" pitchFamily="49" charset="0"/>
+              </a:rPr>
+              <a:t>my_env</a:t>
+            </a:r>
+            <a:r>
+              <a:rPr lang="en-US" b="1" dirty="0">
+                <a:solidFill>
+                  <a:schemeClr val="bg1"/>
+                </a:solidFill>
+                <a:latin typeface="Courier New" pitchFamily="49" charset="0"/>
+                <a:cs typeface="Courier New" pitchFamily="49" charset="0"/>
+              </a:rPr>
+              <a:t>  -c intel  </a:t>
+            </a:r>
+            <a:r>
+              <a:rPr lang="en-US" b="1" dirty="0">
+                <a:solidFill>
+                  <a:schemeClr val="bg2"/>
+                </a:solidFill>
+                <a:latin typeface="Courier New" pitchFamily="49" charset="0"/>
+                <a:cs typeface="Courier New" pitchFamily="49" charset="0"/>
+              </a:rPr>
+              <a:t>intelpython3_full</a:t>
+            </a:r>
+            <a:r>
+              <a:rPr lang="en-US" b="1" dirty="0">
+                <a:solidFill>
+                  <a:schemeClr val="bg1"/>
+                </a:solidFill>
+                <a:latin typeface="Courier New" pitchFamily="49" charset="0"/>
+                <a:cs typeface="Courier New" pitchFamily="49" charset="0"/>
+              </a:rPr>
+              <a:t> </a:t>
+            </a:r>
+            <a:endParaRPr lang="en-US" dirty="0">
+              <a:solidFill>
+                <a:schemeClr val="bg1"/>
+              </a:solidFill>
+              <a:latin typeface="Courier New" pitchFamily="49" charset="0"/>
+              <a:cs typeface="Courier New" pitchFamily="49" charset="0"/>
+            </a:endParaRPr>
+          </a:p>
+        </p:txBody>
+      </p:sp>
+      <p:pic>
+        <p:nvPicPr>
+          <p:cNvPr id="12" name="Graphic 11" descr="Thumbs up sign with solid fill">
+            <a:extLst>
+              <a:ext uri="{FF2B5EF4-FFF2-40B4-BE49-F238E27FC236}">
+                <a16:creationId xmlns:a16="http://schemas.microsoft.com/office/drawing/2014/main" id="{87258E0F-A694-3C20-BAD8-2B7EC8722018}"/>
+              </a:ext>
+            </a:extLst>
+          </p:cNvPr>
+          <p:cNvPicPr>
+            <a:picLocks noChangeAspect="1"/>
+          </p:cNvPicPr>
+          <p:nvPr/>
+        </p:nvPicPr>
+        <p:blipFill>
+          <a:blip r:embed="rId3">
+            <a:extLst>
+              <a:ext uri="{96DAC541-7B7A-43D3-8B79-37D633B846F1}">
+                <asvg:svgBlip xmlns:asvg="http://schemas.microsoft.com/office/drawing/2016/SVG/main" r:embed="rId4"/>
+              </a:ext>
+            </a:extLst>
+          </a:blip>
+          <a:stretch>
+            <a:fillRect/>
+          </a:stretch>
+        </p:blipFill>
+        <p:spPr>
+          <a:xfrm>
+            <a:off x="9644871" y="5949800"/>
+            <a:ext cx="724200" cy="724200"/>
+          </a:xfrm>
+          <a:prstGeom prst="rect">
+            <a:avLst/>
+          </a:prstGeom>
         </p:spPr>
       </p:pic>
     </p:spTree>
@@ -10565,6 +10737,33 @@
                                   </p:childTnLst>
                                 </p:cTn>
                               </p:par>
+                              <p:par>
+                                <p:cTn id="11" presetID="1" presetClass="entr" presetSubtype="0" fill="hold" grpId="0" nodeType="withEffect">
+                                  <p:stCondLst>
+                                    <p:cond delay="0"/>
+                                  </p:stCondLst>
+                                  <p:childTnLst>
+                                    <p:set>
+                                      <p:cBhvr>
+                                        <p:cTn id="12" dur="1" fill="hold">
+                                          <p:stCondLst>
+                                            <p:cond delay="0"/>
+                                          </p:stCondLst>
+                                        </p:cTn>
+                                        <p:tgtEl>
+                                          <p:spTgt spid="11"/>
+                                        </p:tgtEl>
+                                        <p:attrNameLst>
+                                          <p:attrName>style.visibility</p:attrName>
+                                        </p:attrNameLst>
+                                      </p:cBhvr>
+                                      <p:to>
+                                        <p:strVal val="visible"/>
+                                      </p:to>
+                                    </p:set>
+                                  </p:childTnLst>
+                                </p:cTn>
+                              </p:par>
                             </p:childTnLst>
                           </p:cTn>
                         </p:par>
@@ -10595,6 +10794,2380 @@
     <p:bldLst>
       <p:bldP spid="5" grpId="0" animBg="1"/>
       <p:bldP spid="7" grpId="0" animBg="1"/>
+      <p:bldP spid="11" grpId="0" animBg="1"/>
+    </p:bldLst>
+  </p:timing>
+</p:sld>
+</file>
+
+<file path=ppt/slides/slide23.xml><?xml version="1.0" encoding="utf-8"?>
+<p:sld xmlns:a="http://schemas.openxmlformats.org/drawingml/2006/main" xmlns:r="http://schemas.openxmlformats.org/officeDocument/2006/relationships" xmlns:p="http://schemas.openxmlformats.org/presentationml/2006/main">
+  <p:cSld>
+    <p:spTree>
+      <p:nvGrpSpPr>
+        <p:cNvPr id="1" name=""/>
+        <p:cNvGrpSpPr/>
+        <p:nvPr/>
+      </p:nvGrpSpPr>
+      <p:grpSpPr>
+        <a:xfrm>
+          <a:off x="0" y="0"/>
+          <a:ext cx="0" cy="0"/>
+          <a:chOff x="0" y="0"/>
+          <a:chExt cx="0" cy="0"/>
+        </a:xfrm>
+      </p:grpSpPr>
+      <p:sp>
+        <p:nvSpPr>
+          <p:cNvPr id="2" name="Title 1">
+            <a:extLst>
+              <a:ext uri="{FF2B5EF4-FFF2-40B4-BE49-F238E27FC236}">
+                <a16:creationId xmlns:a16="http://schemas.microsoft.com/office/drawing/2014/main" id="{1A28D8A3-4975-C949-7B91-C0E052F3AD69}"/>
+              </a:ext>
+            </a:extLst>
+          </p:cNvPr>
+          <p:cNvSpPr>
+            <a:spLocks noGrp="1"/>
+          </p:cNvSpPr>
+          <p:nvPr>
+            <p:ph type="title"/>
+          </p:nvPr>
+        </p:nvSpPr>
+        <p:spPr/>
+        <p:txBody>
+          <a:bodyPr/>
+          <a:lstStyle/>
+          <a:p>
+            <a:r>
+              <a:rPr lang="en-US" dirty="0"/>
+              <a:t>Using </a:t>
+            </a:r>
+            <a:r>
+              <a:rPr lang="en-US" dirty="0" err="1"/>
+              <a:t>conda</a:t>
+            </a:r>
+            <a:r>
+              <a:rPr lang="en-US" dirty="0"/>
+              <a:t> environment</a:t>
+            </a:r>
+            <a:endParaRPr lang="LID4096" dirty="0"/>
+          </a:p>
+        </p:txBody>
+      </p:sp>
+      <p:sp>
+        <p:nvSpPr>
+          <p:cNvPr id="4" name="Slide Number Placeholder 3">
+            <a:extLst>
+              <a:ext uri="{FF2B5EF4-FFF2-40B4-BE49-F238E27FC236}">
+                <a16:creationId xmlns:a16="http://schemas.microsoft.com/office/drawing/2014/main" id="{0B60D58F-B2DD-B56F-1605-F336C108F92E}"/>
+              </a:ext>
+            </a:extLst>
+          </p:cNvPr>
+          <p:cNvSpPr>
+            <a:spLocks noGrp="1"/>
+          </p:cNvSpPr>
+          <p:nvPr>
+            <p:ph type="sldNum" sz="quarter" idx="12"/>
+          </p:nvPr>
+        </p:nvSpPr>
+        <p:spPr/>
+        <p:txBody>
+          <a:bodyPr/>
+          <a:lstStyle/>
+          <a:p>
+            <a:fld id="{9C7CE217-4467-4B8D-A735-B008FA7C4816}" type="slidenum">
+              <a:rPr lang="LID4096" smtClean="0"/>
+              <a:t>23</a:t>
+            </a:fld>
+            <a:endParaRPr lang="LID4096"/>
+          </a:p>
+        </p:txBody>
+      </p:sp>
+      <p:grpSp>
+        <p:nvGrpSpPr>
+          <p:cNvPr id="5" name="Group 4">
+            <a:extLst>
+              <a:ext uri="{FF2B5EF4-FFF2-40B4-BE49-F238E27FC236}">
+                <a16:creationId xmlns:a16="http://schemas.microsoft.com/office/drawing/2014/main" id="{43C82B07-178D-D541-0025-2BB3F490C54C}"/>
+              </a:ext>
+            </a:extLst>
+          </p:cNvPr>
+          <p:cNvGrpSpPr/>
+          <p:nvPr/>
+        </p:nvGrpSpPr>
+        <p:grpSpPr>
+          <a:xfrm>
+            <a:off x="1415143" y="1997839"/>
+            <a:ext cx="8795657" cy="2585323"/>
+            <a:chOff x="1055914" y="2169659"/>
+            <a:chExt cx="8795657" cy="2585323"/>
+          </a:xfrm>
+        </p:grpSpPr>
+        <p:sp>
+          <p:nvSpPr>
+            <p:cNvPr id="6" name="TextBox 5">
+              <a:extLst>
+                <a:ext uri="{FF2B5EF4-FFF2-40B4-BE49-F238E27FC236}">
+                  <a16:creationId xmlns:a16="http://schemas.microsoft.com/office/drawing/2014/main" id="{BFC30341-D255-B1D9-383A-79CD677F55F2}"/>
+                </a:ext>
+              </a:extLst>
+            </p:cNvPr>
+            <p:cNvSpPr txBox="1"/>
+            <p:nvPr/>
+          </p:nvSpPr>
+          <p:spPr>
+            <a:xfrm>
+              <a:off x="1055914" y="2169659"/>
+              <a:ext cx="8795657" cy="2585323"/>
+            </a:xfrm>
+            <a:prstGeom prst="rect">
+              <a:avLst/>
+            </a:prstGeom>
+            <a:solidFill>
+              <a:schemeClr val="bg1">
+                <a:lumMod val="85000"/>
+              </a:schemeClr>
+            </a:solidFill>
+            <a:ln>
+              <a:solidFill>
+                <a:schemeClr val="tx1"/>
+              </a:solidFill>
+            </a:ln>
+          </p:spPr>
+          <p:txBody>
+            <a:bodyPr wrap="square" rtlCol="0">
+              <a:spAutoFit/>
+            </a:bodyPr>
+            <a:lstStyle/>
+            <a:p>
+              <a:pPr lvl="0">
+                <a:defRPr/>
+              </a:pPr>
+              <a:r>
+                <a:rPr lang="en-US" dirty="0">
+                  <a:solidFill>
+                    <a:prstClr val="black"/>
+                  </a:solidFill>
+                  <a:latin typeface="Courier New" pitchFamily="49" charset="0"/>
+                  <a:cs typeface="Courier New" pitchFamily="49" charset="0"/>
+                </a:rPr>
+                <a:t>#!/usr/bin/env -S bash -l</a:t>
+              </a:r>
+            </a:p>
+            <a:p>
+              <a:pPr lvl="0">
+                <a:defRPr/>
+              </a:pPr>
+              <a:r>
+                <a:rPr lang="en-US" dirty="0">
+                  <a:solidFill>
+                    <a:prstClr val="black"/>
+                  </a:solidFill>
+                  <a:latin typeface="Courier New" pitchFamily="49" charset="0"/>
+                  <a:cs typeface="Courier New" pitchFamily="49" charset="0"/>
+                </a:rPr>
+                <a:t>#SBATCH --account=&lt;</a:t>
+              </a:r>
+              <a:r>
+                <a:rPr lang="en-US" dirty="0" err="1">
+                  <a:solidFill>
+                    <a:prstClr val="black"/>
+                  </a:solidFill>
+                  <a:latin typeface="Courier New" pitchFamily="49" charset="0"/>
+                  <a:cs typeface="Courier New" pitchFamily="49" charset="0"/>
+                </a:rPr>
+                <a:t>your_account</a:t>
+              </a:r>
+              <a:r>
+                <a:rPr lang="en-US" dirty="0">
+                  <a:solidFill>
+                    <a:prstClr val="black"/>
+                  </a:solidFill>
+                  <a:latin typeface="Courier New" pitchFamily="49" charset="0"/>
+                  <a:cs typeface="Courier New" pitchFamily="49" charset="0"/>
+                </a:rPr>
+                <a:t>&gt;</a:t>
+              </a:r>
+            </a:p>
+            <a:p>
+              <a:pPr lvl="0">
+                <a:defRPr/>
+              </a:pPr>
+              <a:r>
+                <a:rPr lang="en-US" dirty="0">
+                  <a:solidFill>
+                    <a:prstClr val="black"/>
+                  </a:solidFill>
+                  <a:latin typeface="Courier New" pitchFamily="49" charset="0"/>
+                  <a:cs typeface="Courier New" pitchFamily="49" charset="0"/>
+                </a:rPr>
+                <a:t>#SBATCH --cluster=&lt;</a:t>
+              </a:r>
+              <a:r>
+                <a:rPr lang="en-US" dirty="0" err="1">
+                  <a:solidFill>
+                    <a:prstClr val="black"/>
+                  </a:solidFill>
+                  <a:latin typeface="Courier New" pitchFamily="49" charset="0"/>
+                  <a:cs typeface="Courier New" pitchFamily="49" charset="0"/>
+                </a:rPr>
+                <a:t>your_cluster</a:t>
+              </a:r>
+              <a:r>
+                <a:rPr lang="en-US" dirty="0">
+                  <a:solidFill>
+                    <a:prstClr val="black"/>
+                  </a:solidFill>
+                  <a:latin typeface="Courier New" pitchFamily="49" charset="0"/>
+                  <a:cs typeface="Courier New" pitchFamily="49" charset="0"/>
+                </a:rPr>
+                <a:t>&gt;</a:t>
+              </a:r>
+            </a:p>
+            <a:p>
+              <a:pPr lvl="0">
+                <a:defRPr/>
+              </a:pPr>
+              <a:r>
+                <a:rPr lang="en-US" dirty="0">
+                  <a:solidFill>
+                    <a:prstClr val="black"/>
+                  </a:solidFill>
+                  <a:latin typeface="Courier New" pitchFamily="49" charset="0"/>
+                  <a:cs typeface="Courier New" pitchFamily="49" charset="0"/>
+                </a:rPr>
+                <a:t>#SBATCH --time=00:05:00</a:t>
+              </a:r>
+            </a:p>
+            <a:p>
+              <a:pPr lvl="0">
+                <a:defRPr/>
+              </a:pPr>
+              <a:endParaRPr lang="en-US" dirty="0">
+                <a:solidFill>
+                  <a:prstClr val="black"/>
+                </a:solidFill>
+                <a:latin typeface="Courier New" pitchFamily="49" charset="0"/>
+                <a:cs typeface="Courier New" pitchFamily="49" charset="0"/>
+              </a:endParaRPr>
+            </a:p>
+            <a:p>
+              <a:pPr lvl="0">
+                <a:defRPr/>
+              </a:pPr>
+              <a:r>
+                <a:rPr lang="en-US" b="1" dirty="0" err="1">
+                  <a:solidFill>
+                    <a:prstClr val="black"/>
+                  </a:solidFill>
+                  <a:latin typeface="Courier New" pitchFamily="49" charset="0"/>
+                  <a:cs typeface="Courier New" pitchFamily="49" charset="0"/>
+                </a:rPr>
+                <a:t>conda</a:t>
+              </a:r>
+              <a:r>
+                <a:rPr lang="en-US" b="1" dirty="0">
+                  <a:solidFill>
+                    <a:prstClr val="black"/>
+                  </a:solidFill>
+                  <a:latin typeface="Courier New" pitchFamily="49" charset="0"/>
+                  <a:cs typeface="Courier New" pitchFamily="49" charset="0"/>
+                </a:rPr>
+                <a:t> activate </a:t>
+              </a:r>
+              <a:r>
+                <a:rPr lang="en-US" b="1" dirty="0" err="1">
+                  <a:solidFill>
+                    <a:prstClr val="black"/>
+                  </a:solidFill>
+                  <a:latin typeface="Courier New" pitchFamily="49" charset="0"/>
+                  <a:cs typeface="Courier New" pitchFamily="49" charset="0"/>
+                </a:rPr>
+                <a:t>my_env</a:t>
+              </a:r>
+              <a:endParaRPr lang="en-US" b="1" dirty="0">
+                <a:solidFill>
+                  <a:prstClr val="black"/>
+                </a:solidFill>
+                <a:latin typeface="Courier New" pitchFamily="49" charset="0"/>
+                <a:cs typeface="Courier New" pitchFamily="49" charset="0"/>
+              </a:endParaRPr>
+            </a:p>
+            <a:p>
+              <a:pPr lvl="0">
+                <a:defRPr/>
+              </a:pPr>
+              <a:endParaRPr lang="en-US" dirty="0">
+                <a:solidFill>
+                  <a:prstClr val="black"/>
+                </a:solidFill>
+                <a:latin typeface="Courier New" pitchFamily="49" charset="0"/>
+                <a:cs typeface="Courier New" pitchFamily="49" charset="0"/>
+              </a:endParaRPr>
+            </a:p>
+            <a:p>
+              <a:pPr lvl="0">
+                <a:defRPr/>
+              </a:pPr>
+              <a:r>
+                <a:rPr lang="en-US" dirty="0">
+                  <a:solidFill>
+                    <a:prstClr val="black"/>
+                  </a:solidFill>
+                  <a:latin typeface="Courier New" pitchFamily="49" charset="0"/>
+                  <a:cs typeface="Courier New" pitchFamily="49" charset="0"/>
+                </a:rPr>
+                <a:t>python cosine.py -n 100 -o result_${SLURM_JOB_ID}.txt \</a:t>
+              </a:r>
+            </a:p>
+            <a:p>
+              <a:pPr lvl="0">
+                <a:defRPr/>
+              </a:pPr>
+              <a:r>
+                <a:rPr lang="en-US" dirty="0">
+                  <a:solidFill>
+                    <a:prstClr val="black"/>
+                  </a:solidFill>
+                  <a:latin typeface="Courier New" pitchFamily="49" charset="0"/>
+                  <a:cs typeface="Courier New" pitchFamily="49" charset="0"/>
+                </a:rPr>
+                <a:t>                 -p plot_${SLURM_JOB_ID}.png</a:t>
+              </a:r>
+            </a:p>
+          </p:txBody>
+        </p:sp>
+        <p:sp>
+          <p:nvSpPr>
+            <p:cNvPr id="7" name="TextBox 6">
+              <a:extLst>
+                <a:ext uri="{FF2B5EF4-FFF2-40B4-BE49-F238E27FC236}">
+                  <a16:creationId xmlns:a16="http://schemas.microsoft.com/office/drawing/2014/main" id="{78868513-48BA-39EC-C23C-1B6FA671588B}"/>
+                </a:ext>
+              </a:extLst>
+            </p:cNvPr>
+            <p:cNvSpPr txBox="1"/>
+            <p:nvPr/>
+          </p:nvSpPr>
+          <p:spPr>
+            <a:xfrm>
+              <a:off x="8175026" y="2169659"/>
+              <a:ext cx="1665841" cy="338554"/>
+            </a:xfrm>
+            <a:prstGeom prst="rect">
+              <a:avLst/>
+            </a:prstGeom>
+            <a:solidFill>
+              <a:schemeClr val="bg1"/>
+            </a:solidFill>
+            <a:ln>
+              <a:solidFill>
+                <a:schemeClr val="tx1"/>
+              </a:solidFill>
+            </a:ln>
+          </p:spPr>
+          <p:txBody>
+            <a:bodyPr wrap="none" rtlCol="0">
+              <a:spAutoFit/>
+            </a:bodyPr>
+            <a:lstStyle/>
+            <a:p>
+              <a:r>
+                <a:rPr lang="en-US" sz="1600" dirty="0" err="1">
+                  <a:latin typeface="Courier New" panose="02070309020205020404" pitchFamily="49" charset="0"/>
+                  <a:cs typeface="Courier New" panose="02070309020205020404" pitchFamily="49" charset="0"/>
+                </a:rPr>
+                <a:t>cosine.slurm</a:t>
+              </a:r>
+              <a:endParaRPr lang="LID4096" sz="1600" dirty="0">
+                <a:latin typeface="Courier New" panose="02070309020205020404" pitchFamily="49" charset="0"/>
+                <a:cs typeface="Courier New" panose="02070309020205020404" pitchFamily="49" charset="0"/>
+              </a:endParaRPr>
+            </a:p>
+          </p:txBody>
+        </p:sp>
+      </p:grpSp>
+      <p:grpSp>
+        <p:nvGrpSpPr>
+          <p:cNvPr id="9" name="Group 8">
+            <a:extLst>
+              <a:ext uri="{FF2B5EF4-FFF2-40B4-BE49-F238E27FC236}">
+                <a16:creationId xmlns:a16="http://schemas.microsoft.com/office/drawing/2014/main" id="{B51DC068-CDE1-3A93-2B07-23E4C9118CEE}"/>
+              </a:ext>
+            </a:extLst>
+          </p:cNvPr>
+          <p:cNvGrpSpPr/>
+          <p:nvPr/>
+        </p:nvGrpSpPr>
+        <p:grpSpPr>
+          <a:xfrm>
+            <a:off x="4705564" y="2643544"/>
+            <a:ext cx="6747133" cy="889068"/>
+            <a:chOff x="-834843" y="5535406"/>
+            <a:chExt cx="6747133" cy="889068"/>
+          </a:xfrm>
+        </p:grpSpPr>
+        <p:sp>
+          <p:nvSpPr>
+            <p:cNvPr id="11" name="TextBox 10">
+              <a:extLst>
+                <a:ext uri="{FF2B5EF4-FFF2-40B4-BE49-F238E27FC236}">
+                  <a16:creationId xmlns:a16="http://schemas.microsoft.com/office/drawing/2014/main" id="{F3DA2DFB-4A0B-5B15-3637-AE063DA3C62A}"/>
+                </a:ext>
+              </a:extLst>
+            </p:cNvPr>
+            <p:cNvSpPr txBox="1"/>
+            <p:nvPr/>
+          </p:nvSpPr>
+          <p:spPr>
+            <a:xfrm>
+              <a:off x="3707904" y="5535406"/>
+              <a:ext cx="2204386" cy="369332"/>
+            </a:xfrm>
+            <a:prstGeom prst="rect">
+              <a:avLst/>
+            </a:prstGeom>
+            <a:solidFill>
+              <a:schemeClr val="bg1"/>
+            </a:solidFill>
+            <a:ln w="19050">
+              <a:solidFill>
+                <a:schemeClr val="tx1"/>
+              </a:solidFill>
+            </a:ln>
+          </p:spPr>
+          <p:txBody>
+            <a:bodyPr wrap="none" rtlCol="0">
+              <a:spAutoFit/>
+            </a:bodyPr>
+            <a:lstStyle/>
+            <a:p>
+              <a:pPr marL="0" marR="0" lvl="0" indent="0" algn="l" defTabSz="914400" rtl="0" eaLnBrk="1" fontAlgn="auto" latinLnBrk="0" hangingPunct="1">
+                <a:lnSpc>
+                  <a:spcPct val="100000"/>
+                </a:lnSpc>
+                <a:spcBef>
+                  <a:spcPts val="0"/>
+                </a:spcBef>
+                <a:spcAft>
+                  <a:spcPts val="0"/>
+                </a:spcAft>
+                <a:buClrTx/>
+                <a:buSzTx/>
+                <a:buFontTx/>
+                <a:buNone/>
+                <a:tabLst/>
+                <a:defRPr/>
+              </a:pPr>
+              <a:r>
+                <a:rPr kumimoji="0" lang="en-US" sz="1800" b="0" i="0" u="none" strike="noStrike" kern="1200" cap="none" spc="0" normalizeH="0" baseline="0" noProof="0" dirty="0">
+                  <a:ln>
+                    <a:noFill/>
+                  </a:ln>
+                  <a:solidFill>
+                    <a:prstClr val="black"/>
+                  </a:solidFill>
+                  <a:effectLst/>
+                  <a:uLnTx/>
+                  <a:uFillTx/>
+                  <a:latin typeface="Calibri" panose="020F0502020204030204"/>
+                  <a:ea typeface="+mn-ea"/>
+                  <a:cs typeface="+mn-cs"/>
+                </a:rPr>
+                <a:t>Activate environment</a:t>
+              </a:r>
+              <a:endParaRPr kumimoji="0" lang="nl-BE" sz="1800" b="0" i="0" u="none" strike="noStrike" kern="1200" cap="none" spc="0" normalizeH="0" baseline="0" noProof="0" dirty="0">
+                <a:ln>
+                  <a:noFill/>
+                </a:ln>
+                <a:solidFill>
+                  <a:prstClr val="black"/>
+                </a:solidFill>
+                <a:effectLst/>
+                <a:uLnTx/>
+                <a:uFillTx/>
+                <a:latin typeface="Calibri" panose="020F0502020204030204"/>
+                <a:ea typeface="+mn-ea"/>
+                <a:cs typeface="+mn-cs"/>
+              </a:endParaRPr>
+            </a:p>
+          </p:txBody>
+        </p:sp>
+        <p:cxnSp>
+          <p:nvCxnSpPr>
+            <p:cNvPr id="12" name="Straight Arrow Connector 11">
+              <a:extLst>
+                <a:ext uri="{FF2B5EF4-FFF2-40B4-BE49-F238E27FC236}">
+                  <a16:creationId xmlns:a16="http://schemas.microsoft.com/office/drawing/2014/main" id="{34430F79-5313-F3F3-D223-BD940B26FA46}"/>
+                </a:ext>
+              </a:extLst>
+            </p:cNvPr>
+            <p:cNvCxnSpPr>
+              <a:cxnSpLocks/>
+              <a:stCxn id="11" idx="1"/>
+            </p:cNvCxnSpPr>
+            <p:nvPr/>
+          </p:nvCxnSpPr>
+          <p:spPr>
+            <a:xfrm flipH="1">
+              <a:off x="-834843" y="5720072"/>
+              <a:ext cx="4542747" cy="704402"/>
+            </a:xfrm>
+            <a:prstGeom prst="straightConnector1">
+              <a:avLst/>
+            </a:prstGeom>
+            <a:ln w="28575">
+              <a:solidFill>
+                <a:schemeClr val="tx1"/>
+              </a:solidFill>
+              <a:tailEnd type="stealth" w="lg" len="lg"/>
+            </a:ln>
+          </p:spPr>
+          <p:style>
+            <a:lnRef idx="1">
+              <a:schemeClr val="accent1"/>
+            </a:lnRef>
+            <a:fillRef idx="0">
+              <a:schemeClr val="accent1"/>
+            </a:fillRef>
+            <a:effectRef idx="0">
+              <a:schemeClr val="accent1"/>
+            </a:effectRef>
+            <a:fontRef idx="minor">
+              <a:schemeClr val="tx1"/>
+            </a:fontRef>
+          </p:style>
+        </p:cxnSp>
+      </p:grpSp>
+    </p:spTree>
+    <p:extLst>
+      <p:ext uri="{BB962C8B-B14F-4D97-AF65-F5344CB8AC3E}">
+        <p14:creationId xmlns:p14="http://schemas.microsoft.com/office/powerpoint/2010/main" val="610356934"/>
+      </p:ext>
+    </p:extLst>
+  </p:cSld>
+  <p:clrMapOvr>
+    <a:masterClrMapping/>
+  </p:clrMapOvr>
+</p:sld>
+</file>
+
+<file path=ppt/slides/slide24.xml><?xml version="1.0" encoding="utf-8"?>
+<p:sld xmlns:a="http://schemas.openxmlformats.org/drawingml/2006/main" xmlns:r="http://schemas.openxmlformats.org/officeDocument/2006/relationships" xmlns:p="http://schemas.openxmlformats.org/presentationml/2006/main">
+  <p:cSld>
+    <p:spTree>
+      <p:nvGrpSpPr>
+        <p:cNvPr id="1" name=""/>
+        <p:cNvGrpSpPr/>
+        <p:nvPr/>
+      </p:nvGrpSpPr>
+      <p:grpSpPr>
+        <a:xfrm>
+          <a:off x="0" y="0"/>
+          <a:ext cx="0" cy="0"/>
+          <a:chOff x="0" y="0"/>
+          <a:chExt cx="0" cy="0"/>
+        </a:xfrm>
+      </p:grpSpPr>
+      <p:sp>
+        <p:nvSpPr>
+          <p:cNvPr id="2" name="Title 1">
+            <a:extLst>
+              <a:ext uri="{FF2B5EF4-FFF2-40B4-BE49-F238E27FC236}">
+                <a16:creationId xmlns:a16="http://schemas.microsoft.com/office/drawing/2014/main" id="{3F1773C8-46D8-90E7-B5E9-62D504C449E9}"/>
+              </a:ext>
+            </a:extLst>
+          </p:cNvPr>
+          <p:cNvSpPr>
+            <a:spLocks noGrp="1"/>
+          </p:cNvSpPr>
+          <p:nvPr>
+            <p:ph type="title"/>
+          </p:nvPr>
+        </p:nvSpPr>
+        <p:spPr/>
+        <p:txBody>
+          <a:bodyPr/>
+          <a:lstStyle/>
+          <a:p>
+            <a:r>
+              <a:rPr lang="en-US" dirty="0"/>
+              <a:t>R environments</a:t>
+            </a:r>
+            <a:endParaRPr lang="LID4096" dirty="0"/>
+          </a:p>
+        </p:txBody>
+      </p:sp>
+      <p:sp>
+        <p:nvSpPr>
+          <p:cNvPr id="3" name="Text Placeholder 2">
+            <a:extLst>
+              <a:ext uri="{FF2B5EF4-FFF2-40B4-BE49-F238E27FC236}">
+                <a16:creationId xmlns:a16="http://schemas.microsoft.com/office/drawing/2014/main" id="{82F0E4CA-5BB6-1598-DD80-47CD7BC0EF0D}"/>
+              </a:ext>
+            </a:extLst>
+          </p:cNvPr>
+          <p:cNvSpPr>
+            <a:spLocks noGrp="1"/>
+          </p:cNvSpPr>
+          <p:nvPr>
+            <p:ph type="body" idx="1"/>
+          </p:nvPr>
+        </p:nvSpPr>
+        <p:spPr/>
+        <p:txBody>
+          <a:bodyPr/>
+          <a:lstStyle/>
+          <a:p>
+            <a:endParaRPr lang="LID4096"/>
+          </a:p>
+        </p:txBody>
+      </p:sp>
+      <p:sp>
+        <p:nvSpPr>
+          <p:cNvPr id="4" name="Slide Number Placeholder 3">
+            <a:extLst>
+              <a:ext uri="{FF2B5EF4-FFF2-40B4-BE49-F238E27FC236}">
+                <a16:creationId xmlns:a16="http://schemas.microsoft.com/office/drawing/2014/main" id="{A0E158CA-C57F-993F-F8C2-17C8EAEE81CB}"/>
+              </a:ext>
+            </a:extLst>
+          </p:cNvPr>
+          <p:cNvSpPr>
+            <a:spLocks noGrp="1"/>
+          </p:cNvSpPr>
+          <p:nvPr>
+            <p:ph type="sldNum" sz="quarter" idx="12"/>
+          </p:nvPr>
+        </p:nvSpPr>
+        <p:spPr/>
+        <p:txBody>
+          <a:bodyPr/>
+          <a:lstStyle/>
+          <a:p>
+            <a:fld id="{9C7CE217-4467-4B8D-A735-B008FA7C4816}" type="slidenum">
+              <a:rPr lang="LID4096" smtClean="0"/>
+              <a:t>24</a:t>
+            </a:fld>
+            <a:endParaRPr lang="LID4096"/>
+          </a:p>
+        </p:txBody>
+      </p:sp>
+    </p:spTree>
+    <p:extLst>
+      <p:ext uri="{BB962C8B-B14F-4D97-AF65-F5344CB8AC3E}">
+        <p14:creationId xmlns:p14="http://schemas.microsoft.com/office/powerpoint/2010/main" val="4179265587"/>
+      </p:ext>
+    </p:extLst>
+  </p:cSld>
+  <p:clrMapOvr>
+    <a:masterClrMapping/>
+  </p:clrMapOvr>
+</p:sld>
+</file>
+
+<file path=ppt/slides/slide25.xml><?xml version="1.0" encoding="utf-8"?>
+<p:sld xmlns:a="http://schemas.openxmlformats.org/drawingml/2006/main" xmlns:r="http://schemas.openxmlformats.org/officeDocument/2006/relationships" xmlns:p="http://schemas.openxmlformats.org/presentationml/2006/main">
+  <p:cSld>
+    <p:spTree>
+      <p:nvGrpSpPr>
+        <p:cNvPr id="1" name=""/>
+        <p:cNvGrpSpPr/>
+        <p:nvPr/>
+      </p:nvGrpSpPr>
+      <p:grpSpPr>
+        <a:xfrm>
+          <a:off x="0" y="0"/>
+          <a:ext cx="0" cy="0"/>
+          <a:chOff x="0" y="0"/>
+          <a:chExt cx="0" cy="0"/>
+        </a:xfrm>
+      </p:grpSpPr>
+      <p:sp>
+        <p:nvSpPr>
+          <p:cNvPr id="2" name="Title 1">
+            <a:extLst>
+              <a:ext uri="{FF2B5EF4-FFF2-40B4-BE49-F238E27FC236}">
+                <a16:creationId xmlns:a16="http://schemas.microsoft.com/office/drawing/2014/main" id="{4B46706C-14A4-72C8-A65A-86B49BAD71E3}"/>
+              </a:ext>
+            </a:extLst>
+          </p:cNvPr>
+          <p:cNvSpPr>
+            <a:spLocks noGrp="1"/>
+          </p:cNvSpPr>
+          <p:nvPr>
+            <p:ph type="title"/>
+          </p:nvPr>
+        </p:nvSpPr>
+        <p:spPr/>
+        <p:txBody>
+          <a:bodyPr/>
+          <a:lstStyle/>
+          <a:p>
+            <a:r>
+              <a:rPr lang="en-US" dirty="0"/>
+              <a:t>R packages considerations</a:t>
+            </a:r>
+            <a:endParaRPr lang="LID4096" dirty="0"/>
+          </a:p>
+        </p:txBody>
+      </p:sp>
+      <p:sp>
+        <p:nvSpPr>
+          <p:cNvPr id="3" name="Content Placeholder 2">
+            <a:extLst>
+              <a:ext uri="{FF2B5EF4-FFF2-40B4-BE49-F238E27FC236}">
+                <a16:creationId xmlns:a16="http://schemas.microsoft.com/office/drawing/2014/main" id="{09391B18-A02C-168D-8533-6D6E74DEDB9F}"/>
+              </a:ext>
+            </a:extLst>
+          </p:cNvPr>
+          <p:cNvSpPr>
+            <a:spLocks noGrp="1"/>
+          </p:cNvSpPr>
+          <p:nvPr>
+            <p:ph idx="1"/>
+          </p:nvPr>
+        </p:nvSpPr>
+        <p:spPr/>
+        <p:txBody>
+          <a:bodyPr/>
+          <a:lstStyle/>
+          <a:p>
+            <a:r>
+              <a:rPr lang="en-US" dirty="0"/>
+              <a:t>Packages built hardware-specific!</a:t>
+            </a:r>
+          </a:p>
+          <a:p>
+            <a:pPr lvl="1"/>
+            <a:r>
+              <a:rPr lang="en-US" dirty="0"/>
+              <a:t>Install &amp; use on same hardware</a:t>
+            </a:r>
+          </a:p>
+          <a:p>
+            <a:pPr lvl="1"/>
+            <a:r>
+              <a:rPr lang="en-US" dirty="0"/>
+              <a:t>Installation on compute nodes</a:t>
+            </a:r>
+          </a:p>
+          <a:p>
+            <a:r>
+              <a:rPr lang="en-US" dirty="0"/>
+              <a:t>Packages built per R major release</a:t>
+            </a:r>
+          </a:p>
+          <a:p>
+            <a:r>
+              <a:rPr lang="en-US" dirty="0"/>
+              <a:t>Pure R packages: easy</a:t>
+            </a:r>
+          </a:p>
+          <a:p>
+            <a:r>
+              <a:rPr lang="en-US" dirty="0"/>
+              <a:t>Packages with library dependencies: not so easy</a:t>
+            </a:r>
+          </a:p>
+          <a:p>
+            <a:pPr lvl="1"/>
+            <a:r>
+              <a:rPr lang="en-US" dirty="0"/>
+              <a:t>Use modules</a:t>
+            </a:r>
+          </a:p>
+          <a:p>
+            <a:pPr lvl="1"/>
+            <a:r>
+              <a:rPr lang="en-US" dirty="0"/>
+              <a:t>Ask help if necessary</a:t>
+            </a:r>
+            <a:endParaRPr lang="LID4096" dirty="0"/>
+          </a:p>
+        </p:txBody>
+      </p:sp>
+      <p:sp>
+        <p:nvSpPr>
+          <p:cNvPr id="4" name="Slide Number Placeholder 3">
+            <a:extLst>
+              <a:ext uri="{FF2B5EF4-FFF2-40B4-BE49-F238E27FC236}">
+                <a16:creationId xmlns:a16="http://schemas.microsoft.com/office/drawing/2014/main" id="{01AC06B6-00B6-DF00-9500-8353D58910B0}"/>
+              </a:ext>
+            </a:extLst>
+          </p:cNvPr>
+          <p:cNvSpPr>
+            <a:spLocks noGrp="1"/>
+          </p:cNvSpPr>
+          <p:nvPr>
+            <p:ph type="sldNum" sz="quarter" idx="12"/>
+          </p:nvPr>
+        </p:nvSpPr>
+        <p:spPr/>
+        <p:txBody>
+          <a:bodyPr/>
+          <a:lstStyle/>
+          <a:p>
+            <a:fld id="{9C7CE217-4467-4B8D-A735-B008FA7C4816}" type="slidenum">
+              <a:rPr lang="LID4096" smtClean="0"/>
+              <a:t>25</a:t>
+            </a:fld>
+            <a:endParaRPr lang="LID4096"/>
+          </a:p>
+        </p:txBody>
+      </p:sp>
+      <p:pic>
+        <p:nvPicPr>
+          <p:cNvPr id="5" name="Picture 2" descr="C:\Users\lucg5005\AppData\Local\Microsoft\Windows\Temporary Internet Files\Content.IE5\CWZUAEH4\lgi01a201309290600[1].jpg">
+            <a:extLst>
+              <a:ext uri="{FF2B5EF4-FFF2-40B4-BE49-F238E27FC236}">
+                <a16:creationId xmlns:a16="http://schemas.microsoft.com/office/drawing/2014/main" id="{B8EE8CBC-1DD0-C5A6-DA64-FBD973601613}"/>
+              </a:ext>
+            </a:extLst>
+          </p:cNvPr>
+          <p:cNvPicPr>
+            <a:picLocks noChangeAspect="1" noChangeArrowheads="1"/>
+          </p:cNvPicPr>
+          <p:nvPr/>
+        </p:nvPicPr>
+        <p:blipFill>
+          <a:blip r:embed="rId2" cstate="print">
+            <a:extLst>
+              <a:ext uri="{28A0092B-C50C-407E-A947-70E740481C1C}">
+                <a14:useLocalDpi xmlns:a14="http://schemas.microsoft.com/office/drawing/2010/main" val="0"/>
+              </a:ext>
+            </a:extLst>
+          </a:blip>
+          <a:srcRect/>
+          <a:stretch>
+            <a:fillRect/>
+          </a:stretch>
+        </p:blipFill>
+        <p:spPr bwMode="auto">
+          <a:xfrm>
+            <a:off x="6474845" y="1995674"/>
+            <a:ext cx="566151" cy="580908"/>
+          </a:xfrm>
+          <a:prstGeom prst="rect">
+            <a:avLst/>
+          </a:prstGeom>
+          <a:noFill/>
+          <a:extLst>
+            <a:ext uri="{909E8E84-426E-40DD-AFC4-6F175D3DCCD1}">
+              <a14:hiddenFill xmlns:a14="http://schemas.microsoft.com/office/drawing/2010/main">
+                <a:solidFill>
+                  <a:srgbClr val="FFFFFF"/>
+                </a:solidFill>
+              </a14:hiddenFill>
+            </a:ext>
+          </a:extLst>
+        </p:spPr>
+      </p:pic>
+      <p:pic>
+        <p:nvPicPr>
+          <p:cNvPr id="6" name="Graphic 5" descr="Thumbs up sign with solid fill">
+            <a:extLst>
+              <a:ext uri="{FF2B5EF4-FFF2-40B4-BE49-F238E27FC236}">
+                <a16:creationId xmlns:a16="http://schemas.microsoft.com/office/drawing/2014/main" id="{7F4308D3-7387-3F06-E910-0CE1563229FB}"/>
+              </a:ext>
+            </a:extLst>
+          </p:cNvPr>
+          <p:cNvPicPr>
+            <a:picLocks noChangeAspect="1"/>
+          </p:cNvPicPr>
+          <p:nvPr/>
+        </p:nvPicPr>
+        <p:blipFill>
+          <a:blip r:embed="rId3">
+            <a:extLst>
+              <a:ext uri="{96DAC541-7B7A-43D3-8B79-37D633B846F1}">
+                <asvg:svgBlip xmlns:asvg="http://schemas.microsoft.com/office/drawing/2016/SVG/main" r:embed="rId4"/>
+              </a:ext>
+            </a:extLst>
+          </a:blip>
+          <a:stretch>
+            <a:fillRect/>
+          </a:stretch>
+        </p:blipFill>
+        <p:spPr>
+          <a:xfrm>
+            <a:off x="6395820" y="1284138"/>
+            <a:ext cx="724200" cy="724200"/>
+          </a:xfrm>
+          <a:prstGeom prst="rect">
+            <a:avLst/>
+          </a:prstGeom>
+        </p:spPr>
+      </p:pic>
+    </p:spTree>
+    <p:extLst>
+      <p:ext uri="{BB962C8B-B14F-4D97-AF65-F5344CB8AC3E}">
+        <p14:creationId xmlns:p14="http://schemas.microsoft.com/office/powerpoint/2010/main" val="3762485887"/>
+      </p:ext>
+    </p:extLst>
+  </p:cSld>
+  <p:clrMapOvr>
+    <a:masterClrMapping/>
+  </p:clrMapOvr>
+  <p:timing>
+    <p:tnLst>
+      <p:par>
+        <p:cTn id="1" dur="indefinite" restart="never" nodeType="tmRoot">
+          <p:childTnLst>
+            <p:seq concurrent="1" nextAc="seek">
+              <p:cTn id="2" dur="indefinite" nodeType="mainSeq">
+                <p:childTnLst>
+                  <p:par>
+                    <p:cTn id="3" fill="hold">
+                      <p:stCondLst>
+                        <p:cond delay="indefinite"/>
+                        <p:cond evt="onBegin" delay="0">
+                          <p:tn val="2"/>
+                        </p:cond>
+                      </p:stCondLst>
+                      <p:childTnLst>
+                        <p:par>
+                          <p:cTn id="4" fill="hold">
+                            <p:stCondLst>
+                              <p:cond delay="0"/>
+                            </p:stCondLst>
+                            <p:childTnLst>
+                              <p:par>
+                                <p:cTn id="5" presetID="1" presetClass="entr" presetSubtype="0" fill="hold" nodeType="withEffect">
+                                  <p:stCondLst>
+                                    <p:cond delay="0"/>
+                                  </p:stCondLst>
+                                  <p:childTnLst>
+                                    <p:set>
+                                      <p:cBhvr>
+                                        <p:cTn id="6" dur="1" fill="hold">
+                                          <p:stCondLst>
+                                            <p:cond delay="0"/>
+                                          </p:stCondLst>
+                                        </p:cTn>
+                                        <p:tgtEl>
+                                          <p:spTgt spid="5"/>
+                                        </p:tgtEl>
+                                        <p:attrNameLst>
+                                          <p:attrName>style.visibility</p:attrName>
+                                        </p:attrNameLst>
+                                      </p:cBhvr>
+                                      <p:to>
+                                        <p:strVal val="visible"/>
+                                      </p:to>
+                                    </p:set>
+                                  </p:childTnLst>
+                                </p:cTn>
+                              </p:par>
+                            </p:childTnLst>
+                          </p:cTn>
+                        </p:par>
+                      </p:childTnLst>
+                    </p:cTn>
+                  </p:par>
+                </p:childTnLst>
+              </p:cTn>
+              <p:prevCondLst>
+                <p:cond evt="onPrev" delay="0">
+                  <p:tgtEl>
+                    <p:sldTgt/>
+                  </p:tgtEl>
+                </p:cond>
+              </p:prevCondLst>
+              <p:nextCondLst>
+                <p:cond evt="onNext" delay="0">
+                  <p:tgtEl>
+                    <p:sldTgt/>
+                  </p:tgtEl>
+                </p:cond>
+              </p:nextCondLst>
+            </p:seq>
+          </p:childTnLst>
+        </p:cTn>
+      </p:par>
+    </p:tnLst>
+  </p:timing>
+</p:sld>
+</file>
+
+<file path=ppt/slides/slide26.xml><?xml version="1.0" encoding="utf-8"?>
+<p:sld xmlns:a="http://schemas.openxmlformats.org/drawingml/2006/main" xmlns:r="http://schemas.openxmlformats.org/officeDocument/2006/relationships" xmlns:p="http://schemas.openxmlformats.org/presentationml/2006/main">
+  <p:cSld>
+    <p:spTree>
+      <p:nvGrpSpPr>
+        <p:cNvPr id="1" name=""/>
+        <p:cNvGrpSpPr/>
+        <p:nvPr/>
+      </p:nvGrpSpPr>
+      <p:grpSpPr>
+        <a:xfrm>
+          <a:off x="0" y="0"/>
+          <a:ext cx="0" cy="0"/>
+          <a:chOff x="0" y="0"/>
+          <a:chExt cx="0" cy="0"/>
+        </a:xfrm>
+      </p:grpSpPr>
+      <p:sp>
+        <p:nvSpPr>
+          <p:cNvPr id="2" name="Title 1">
+            <a:extLst>
+              <a:ext uri="{FF2B5EF4-FFF2-40B4-BE49-F238E27FC236}">
+                <a16:creationId xmlns:a16="http://schemas.microsoft.com/office/drawing/2014/main" id="{AE908DB5-555C-7D44-C0FF-E465F81BDD4E}"/>
+              </a:ext>
+            </a:extLst>
+          </p:cNvPr>
+          <p:cNvSpPr>
+            <a:spLocks noGrp="1"/>
+          </p:cNvSpPr>
+          <p:nvPr>
+            <p:ph type="title"/>
+          </p:nvPr>
+        </p:nvSpPr>
+        <p:spPr/>
+        <p:txBody>
+          <a:bodyPr/>
+          <a:lstStyle/>
+          <a:p>
+            <a:r>
+              <a:rPr lang="en-US" dirty="0"/>
+              <a:t>Interactive install: setup</a:t>
+            </a:r>
+            <a:endParaRPr lang="LID4096" dirty="0"/>
+          </a:p>
+        </p:txBody>
+      </p:sp>
+      <p:sp>
+        <p:nvSpPr>
+          <p:cNvPr id="3" name="Content Placeholder 2">
+            <a:extLst>
+              <a:ext uri="{FF2B5EF4-FFF2-40B4-BE49-F238E27FC236}">
+                <a16:creationId xmlns:a16="http://schemas.microsoft.com/office/drawing/2014/main" id="{716C3C77-CF5F-C9F6-3818-A94F8E6BAB47}"/>
+              </a:ext>
+            </a:extLst>
+          </p:cNvPr>
+          <p:cNvSpPr>
+            <a:spLocks noGrp="1"/>
+          </p:cNvSpPr>
+          <p:nvPr>
+            <p:ph idx="1"/>
+          </p:nvPr>
+        </p:nvSpPr>
+        <p:spPr/>
+        <p:txBody>
+          <a:bodyPr/>
+          <a:lstStyle/>
+          <a:p>
+            <a:r>
+              <a:rPr lang="en-US" dirty="0"/>
+              <a:t>Use OnDemand:  interactive shell, or</a:t>
+            </a:r>
+          </a:p>
+          <a:p>
+            <a:r>
+              <a:rPr lang="en-US" dirty="0"/>
+              <a:t>From login node, submit interactive job</a:t>
+            </a:r>
+          </a:p>
+          <a:p>
+            <a:endParaRPr lang="en-US" dirty="0"/>
+          </a:p>
+          <a:p>
+            <a:endParaRPr lang="en-US" dirty="0"/>
+          </a:p>
+          <a:p>
+            <a:endParaRPr lang="en-US" dirty="0"/>
+          </a:p>
+          <a:p>
+            <a:endParaRPr lang="en-US" dirty="0"/>
+          </a:p>
+          <a:p>
+            <a:r>
+              <a:rPr lang="en-US" dirty="0"/>
+              <a:t>Load module</a:t>
+            </a:r>
+            <a:endParaRPr lang="LID4096" dirty="0"/>
+          </a:p>
+        </p:txBody>
+      </p:sp>
+      <p:sp>
+        <p:nvSpPr>
+          <p:cNvPr id="4" name="Slide Number Placeholder 3">
+            <a:extLst>
+              <a:ext uri="{FF2B5EF4-FFF2-40B4-BE49-F238E27FC236}">
+                <a16:creationId xmlns:a16="http://schemas.microsoft.com/office/drawing/2014/main" id="{231DB7A3-D2F0-B620-423C-C5F0AB3AD4C8}"/>
+              </a:ext>
+            </a:extLst>
+          </p:cNvPr>
+          <p:cNvSpPr>
+            <a:spLocks noGrp="1"/>
+          </p:cNvSpPr>
+          <p:nvPr>
+            <p:ph type="sldNum" sz="quarter" idx="12"/>
+          </p:nvPr>
+        </p:nvSpPr>
+        <p:spPr/>
+        <p:txBody>
+          <a:bodyPr/>
+          <a:lstStyle/>
+          <a:p>
+            <a:fld id="{9C7CE217-4467-4B8D-A735-B008FA7C4816}" type="slidenum">
+              <a:rPr lang="LID4096" smtClean="0"/>
+              <a:t>26</a:t>
+            </a:fld>
+            <a:endParaRPr lang="LID4096"/>
+          </a:p>
+        </p:txBody>
+      </p:sp>
+      <p:sp>
+        <p:nvSpPr>
+          <p:cNvPr id="5" name="TextBox 4">
+            <a:extLst>
+              <a:ext uri="{FF2B5EF4-FFF2-40B4-BE49-F238E27FC236}">
+                <a16:creationId xmlns:a16="http://schemas.microsoft.com/office/drawing/2014/main" id="{7FEF6901-D4B3-E574-B658-9CDCB6354246}"/>
+              </a:ext>
+            </a:extLst>
+          </p:cNvPr>
+          <p:cNvSpPr txBox="1"/>
+          <p:nvPr/>
+        </p:nvSpPr>
+        <p:spPr>
+          <a:xfrm>
+            <a:off x="1585645" y="2938414"/>
+            <a:ext cx="9243316" cy="1200329"/>
+          </a:xfrm>
+          <a:prstGeom prst="rect">
+            <a:avLst/>
+          </a:prstGeom>
+          <a:solidFill>
+            <a:schemeClr val="tx1"/>
+          </a:solidFill>
+          <a:ln>
+            <a:solidFill>
+              <a:schemeClr val="tx1"/>
+            </a:solidFill>
+          </a:ln>
+        </p:spPr>
+        <p:txBody>
+          <a:bodyPr wrap="square" rtlCol="0">
+            <a:spAutoFit/>
+          </a:bodyPr>
+          <a:lstStyle/>
+          <a:p>
+            <a:r>
+              <a:rPr lang="en-US" sz="2400" dirty="0">
+                <a:solidFill>
+                  <a:schemeClr val="bg1"/>
+                </a:solidFill>
+              </a:rPr>
+              <a:t>$  </a:t>
+            </a:r>
+            <a:r>
+              <a:rPr lang="en-US" sz="2400" dirty="0" err="1">
+                <a:solidFill>
+                  <a:schemeClr val="bg1"/>
+                </a:solidFill>
+              </a:rPr>
+              <a:t>srun</a:t>
+            </a:r>
+            <a:r>
+              <a:rPr lang="en-US" sz="2400" dirty="0">
+                <a:solidFill>
+                  <a:schemeClr val="bg1"/>
+                </a:solidFill>
+              </a:rPr>
+              <a:t>  --account=&lt;your-account&gt;  --time=00:30:00            \</a:t>
+            </a:r>
+          </a:p>
+          <a:p>
+            <a:r>
+              <a:rPr lang="en-US" sz="2400" dirty="0">
+                <a:solidFill>
+                  <a:schemeClr val="bg1"/>
+                </a:solidFill>
+              </a:rPr>
+              <a:t>                 --cluster=</a:t>
+            </a:r>
+            <a:r>
+              <a:rPr lang="en-US" sz="2400" dirty="0" err="1">
+                <a:solidFill>
+                  <a:schemeClr val="bg1"/>
+                </a:solidFill>
+              </a:rPr>
+              <a:t>wice</a:t>
+            </a:r>
+            <a:r>
+              <a:rPr lang="en-US" sz="2400" dirty="0">
+                <a:solidFill>
+                  <a:schemeClr val="bg1"/>
+                </a:solidFill>
+              </a:rPr>
+              <a:t>  --partition=</a:t>
+            </a:r>
+            <a:r>
+              <a:rPr lang="en-US" sz="2400" dirty="0" err="1">
+                <a:solidFill>
+                  <a:schemeClr val="bg1"/>
+                </a:solidFill>
+              </a:rPr>
+              <a:t>batch_sapphirerapids</a:t>
+            </a:r>
+            <a:r>
+              <a:rPr lang="en-US" sz="2400" dirty="0">
+                <a:solidFill>
+                  <a:schemeClr val="bg1"/>
+                </a:solidFill>
+              </a:rPr>
+              <a:t>  \</a:t>
+            </a:r>
+          </a:p>
+          <a:p>
+            <a:r>
+              <a:rPr lang="en-US" sz="2400" dirty="0">
+                <a:solidFill>
+                  <a:schemeClr val="bg1"/>
+                </a:solidFill>
+              </a:rPr>
+              <a:t>                 --</a:t>
+            </a:r>
+            <a:r>
+              <a:rPr lang="en-US" sz="2400" dirty="0" err="1">
+                <a:solidFill>
+                  <a:schemeClr val="bg1"/>
+                </a:solidFill>
+              </a:rPr>
+              <a:t>pty</a:t>
+            </a:r>
+            <a:r>
+              <a:rPr lang="en-US" sz="2400" dirty="0">
+                <a:solidFill>
+                  <a:schemeClr val="bg1"/>
+                </a:solidFill>
+              </a:rPr>
+              <a:t>  /bin/bash -l</a:t>
+            </a:r>
+            <a:endParaRPr lang="en-US" sz="2400" dirty="0">
+              <a:solidFill>
+                <a:schemeClr val="bg1"/>
+              </a:solidFill>
+              <a:latin typeface="Courier New" pitchFamily="49" charset="0"/>
+              <a:cs typeface="Courier New" pitchFamily="49" charset="0"/>
+            </a:endParaRPr>
+          </a:p>
+        </p:txBody>
+      </p:sp>
+      <p:grpSp>
+        <p:nvGrpSpPr>
+          <p:cNvPr id="6" name="Group 5">
+            <a:extLst>
+              <a:ext uri="{FF2B5EF4-FFF2-40B4-BE49-F238E27FC236}">
+                <a16:creationId xmlns:a16="http://schemas.microsoft.com/office/drawing/2014/main" id="{8149BEE2-664B-8079-3806-ED54F17A62B2}"/>
+              </a:ext>
+            </a:extLst>
+          </p:cNvPr>
+          <p:cNvGrpSpPr/>
+          <p:nvPr/>
+        </p:nvGrpSpPr>
+        <p:grpSpPr>
+          <a:xfrm>
+            <a:off x="7686379" y="4138743"/>
+            <a:ext cx="2295821" cy="1048024"/>
+            <a:chOff x="3707904" y="4856714"/>
+            <a:chExt cx="2295821" cy="1048024"/>
+          </a:xfrm>
+        </p:grpSpPr>
+        <p:sp>
+          <p:nvSpPr>
+            <p:cNvPr id="7" name="TextBox 6">
+              <a:extLst>
+                <a:ext uri="{FF2B5EF4-FFF2-40B4-BE49-F238E27FC236}">
+                  <a16:creationId xmlns:a16="http://schemas.microsoft.com/office/drawing/2014/main" id="{D95EE781-D831-B340-D7ED-AD5C8F27A0C3}"/>
+                </a:ext>
+              </a:extLst>
+            </p:cNvPr>
+            <p:cNvSpPr txBox="1"/>
+            <p:nvPr/>
+          </p:nvSpPr>
+          <p:spPr>
+            <a:xfrm>
+              <a:off x="3707904" y="5535406"/>
+              <a:ext cx="2295821" cy="369332"/>
+            </a:xfrm>
+            <a:prstGeom prst="rect">
+              <a:avLst/>
+            </a:prstGeom>
+            <a:solidFill>
+              <a:schemeClr val="bg1"/>
+            </a:solidFill>
+            <a:ln w="19050">
+              <a:solidFill>
+                <a:schemeClr val="tx1"/>
+              </a:solidFill>
+            </a:ln>
+          </p:spPr>
+          <p:txBody>
+            <a:bodyPr wrap="none" rtlCol="0">
+              <a:spAutoFit/>
+            </a:bodyPr>
+            <a:lstStyle/>
+            <a:p>
+              <a:pPr marL="0" marR="0" lvl="0" indent="0" algn="l" defTabSz="914400" rtl="0" eaLnBrk="1" fontAlgn="auto" latinLnBrk="0" hangingPunct="1">
+                <a:lnSpc>
+                  <a:spcPct val="100000"/>
+                </a:lnSpc>
+                <a:spcBef>
+                  <a:spcPts val="0"/>
+                </a:spcBef>
+                <a:spcAft>
+                  <a:spcPts val="0"/>
+                </a:spcAft>
+                <a:buClrTx/>
+                <a:buSzTx/>
+                <a:buFontTx/>
+                <a:buNone/>
+                <a:tabLst/>
+                <a:defRPr/>
+              </a:pPr>
+              <a:r>
+                <a:rPr kumimoji="0" lang="en-US" sz="1800" b="0" i="0" u="none" strike="noStrike" kern="1200" cap="none" spc="0" normalizeH="0" baseline="0" noProof="0" dirty="0">
+                  <a:ln>
+                    <a:noFill/>
+                  </a:ln>
+                  <a:solidFill>
+                    <a:prstClr val="black"/>
+                  </a:solidFill>
+                  <a:effectLst/>
+                  <a:uLnTx/>
+                  <a:uFillTx/>
+                  <a:latin typeface="Calibri" panose="020F0502020204030204"/>
+                  <a:ea typeface="+mn-ea"/>
+                  <a:cs typeface="+mn-cs"/>
+                </a:rPr>
+                <a:t>Hardware architecture</a:t>
+              </a:r>
+              <a:endParaRPr kumimoji="0" lang="nl-BE" sz="1800" b="0" i="0" u="none" strike="noStrike" kern="1200" cap="none" spc="0" normalizeH="0" baseline="0" noProof="0" dirty="0">
+                <a:ln>
+                  <a:noFill/>
+                </a:ln>
+                <a:solidFill>
+                  <a:prstClr val="black"/>
+                </a:solidFill>
+                <a:effectLst/>
+                <a:uLnTx/>
+                <a:uFillTx/>
+                <a:latin typeface="Calibri" panose="020F0502020204030204"/>
+                <a:ea typeface="+mn-ea"/>
+                <a:cs typeface="+mn-cs"/>
+              </a:endParaRPr>
+            </a:p>
+          </p:txBody>
+        </p:sp>
+        <p:cxnSp>
+          <p:nvCxnSpPr>
+            <p:cNvPr id="8" name="Straight Arrow Connector 7">
+              <a:extLst>
+                <a:ext uri="{FF2B5EF4-FFF2-40B4-BE49-F238E27FC236}">
+                  <a16:creationId xmlns:a16="http://schemas.microsoft.com/office/drawing/2014/main" id="{ED53D276-10EA-ACFD-5755-65F16F506FD8}"/>
+                </a:ext>
+              </a:extLst>
+            </p:cNvPr>
+            <p:cNvCxnSpPr>
+              <a:cxnSpLocks/>
+              <a:stCxn id="7" idx="0"/>
+            </p:cNvCxnSpPr>
+            <p:nvPr/>
+          </p:nvCxnSpPr>
+          <p:spPr>
+            <a:xfrm flipH="1" flipV="1">
+              <a:off x="4275581" y="4856714"/>
+              <a:ext cx="580234" cy="678692"/>
+            </a:xfrm>
+            <a:prstGeom prst="straightConnector1">
+              <a:avLst/>
+            </a:prstGeom>
+            <a:ln w="28575">
+              <a:solidFill>
+                <a:schemeClr val="tx1"/>
+              </a:solidFill>
+              <a:tailEnd type="stealth" w="lg" len="lg"/>
+            </a:ln>
+          </p:spPr>
+          <p:style>
+            <a:lnRef idx="1">
+              <a:schemeClr val="accent1"/>
+            </a:lnRef>
+            <a:fillRef idx="0">
+              <a:schemeClr val="accent1"/>
+            </a:fillRef>
+            <a:effectRef idx="0">
+              <a:schemeClr val="accent1"/>
+            </a:effectRef>
+            <a:fontRef idx="minor">
+              <a:schemeClr val="tx1"/>
+            </a:fontRef>
+          </p:style>
+        </p:cxnSp>
+      </p:grpSp>
+      <p:sp>
+        <p:nvSpPr>
+          <p:cNvPr id="12" name="TextBox 11">
+            <a:extLst>
+              <a:ext uri="{FF2B5EF4-FFF2-40B4-BE49-F238E27FC236}">
+                <a16:creationId xmlns:a16="http://schemas.microsoft.com/office/drawing/2014/main" id="{7FC2DCE3-C525-998F-E1F7-129BFD885251}"/>
+              </a:ext>
+            </a:extLst>
+          </p:cNvPr>
+          <p:cNvSpPr txBox="1"/>
+          <p:nvPr/>
+        </p:nvSpPr>
+        <p:spPr>
+          <a:xfrm>
+            <a:off x="1585645" y="5417599"/>
+            <a:ext cx="9243317" cy="461665"/>
+          </a:xfrm>
+          <a:prstGeom prst="rect">
+            <a:avLst/>
+          </a:prstGeom>
+          <a:solidFill>
+            <a:schemeClr val="tx1"/>
+          </a:solidFill>
+          <a:ln>
+            <a:solidFill>
+              <a:schemeClr val="tx1"/>
+            </a:solidFill>
+          </a:ln>
+        </p:spPr>
+        <p:txBody>
+          <a:bodyPr wrap="square" rtlCol="0">
+            <a:spAutoFit/>
+          </a:bodyPr>
+          <a:lstStyle/>
+          <a:p>
+            <a:r>
+              <a:rPr lang="en-US" sz="2400" dirty="0">
+                <a:solidFill>
+                  <a:schemeClr val="bg1"/>
+                </a:solidFill>
+              </a:rPr>
+              <a:t>compute-node $  </a:t>
+            </a:r>
+            <a:r>
+              <a:rPr lang="fr-BE" sz="2400" dirty="0">
+                <a:solidFill>
+                  <a:schemeClr val="bg1"/>
+                </a:solidFill>
+              </a:rPr>
+              <a:t>module </a:t>
+            </a:r>
+            <a:r>
+              <a:rPr lang="fr-BE" sz="2400" dirty="0" err="1">
+                <a:solidFill>
+                  <a:schemeClr val="bg1"/>
+                </a:solidFill>
+              </a:rPr>
+              <a:t>load</a:t>
+            </a:r>
+            <a:r>
+              <a:rPr lang="fr-BE" sz="2400" dirty="0">
+                <a:solidFill>
+                  <a:schemeClr val="bg1"/>
+                </a:solidFill>
+              </a:rPr>
+              <a:t> R-bundle-CRAN/2023.12-foss-2023a</a:t>
+            </a:r>
+            <a:r>
+              <a:rPr lang="en-US" sz="2400" dirty="0">
+                <a:solidFill>
+                  <a:schemeClr val="bg1"/>
+                </a:solidFill>
+              </a:rPr>
+              <a:t> </a:t>
+            </a:r>
+            <a:endParaRPr lang="en-US" sz="2400" dirty="0">
+              <a:solidFill>
+                <a:schemeClr val="bg1"/>
+              </a:solidFill>
+              <a:latin typeface="Courier New" pitchFamily="49" charset="0"/>
+              <a:cs typeface="Courier New" pitchFamily="49" charset="0"/>
+            </a:endParaRPr>
+          </a:p>
+        </p:txBody>
+      </p:sp>
+    </p:spTree>
+    <p:extLst>
+      <p:ext uri="{BB962C8B-B14F-4D97-AF65-F5344CB8AC3E}">
+        <p14:creationId xmlns:p14="http://schemas.microsoft.com/office/powerpoint/2010/main" val="3430841435"/>
+      </p:ext>
+    </p:extLst>
+  </p:cSld>
+  <p:clrMapOvr>
+    <a:masterClrMapping/>
+  </p:clrMapOvr>
+  <p:timing>
+    <p:tnLst>
+      <p:par>
+        <p:cTn id="1" dur="indefinite" restart="never" nodeType="tmRoot">
+          <p:childTnLst>
+            <p:seq concurrent="1" nextAc="seek">
+              <p:cTn id="2" dur="indefinite" nodeType="mainSeq">
+                <p:childTnLst>
+                  <p:par>
+                    <p:cTn id="3" fill="hold">
+                      <p:stCondLst>
+                        <p:cond delay="indefinite"/>
+                        <p:cond evt="onBegin" delay="0">
+                          <p:tn val="2"/>
+                        </p:cond>
+                      </p:stCondLst>
+                      <p:childTnLst>
+                        <p:par>
+                          <p:cTn id="4" fill="hold">
+                            <p:stCondLst>
+                              <p:cond delay="0"/>
+                            </p:stCondLst>
+                            <p:childTnLst>
+                              <p:par>
+                                <p:cTn id="5" presetID="1" presetClass="entr" presetSubtype="0" fill="hold" grpId="0" nodeType="withEffect">
+                                  <p:stCondLst>
+                                    <p:cond delay="0"/>
+                                  </p:stCondLst>
+                                  <p:childTnLst>
+                                    <p:set>
+                                      <p:cBhvr>
+                                        <p:cTn id="6" dur="1" fill="hold">
+                                          <p:stCondLst>
+                                            <p:cond delay="0"/>
+                                          </p:stCondLst>
+                                        </p:cTn>
+                                        <p:tgtEl>
+                                          <p:spTgt spid="5"/>
+                                        </p:tgtEl>
+                                        <p:attrNameLst>
+                                          <p:attrName>style.visibility</p:attrName>
+                                        </p:attrNameLst>
+                                      </p:cBhvr>
+                                      <p:to>
+                                        <p:strVal val="visible"/>
+                                      </p:to>
+                                    </p:set>
+                                  </p:childTnLst>
+                                </p:cTn>
+                              </p:par>
+                              <p:par>
+                                <p:cTn id="7" presetID="1" presetClass="entr" presetSubtype="0" fill="hold" grpId="0" nodeType="withEffect">
+                                  <p:stCondLst>
+                                    <p:cond delay="0"/>
+                                  </p:stCondLst>
+                                  <p:childTnLst>
+                                    <p:set>
+                                      <p:cBhvr>
+                                        <p:cTn id="8" dur="1" fill="hold">
+                                          <p:stCondLst>
+                                            <p:cond delay="0"/>
+                                          </p:stCondLst>
+                                        </p:cTn>
+                                        <p:tgtEl>
+                                          <p:spTgt spid="12"/>
+                                        </p:tgtEl>
+                                        <p:attrNameLst>
+                                          <p:attrName>style.visibility</p:attrName>
+                                        </p:attrNameLst>
+                                      </p:cBhvr>
+                                      <p:to>
+                                        <p:strVal val="visible"/>
+                                      </p:to>
+                                    </p:set>
+                                  </p:childTnLst>
+                                </p:cTn>
+                              </p:par>
+                            </p:childTnLst>
+                          </p:cTn>
+                        </p:par>
+                      </p:childTnLst>
+                    </p:cTn>
+                  </p:par>
+                </p:childTnLst>
+              </p:cTn>
+              <p:prevCondLst>
+                <p:cond evt="onPrev" delay="0">
+                  <p:tgtEl>
+                    <p:sldTgt/>
+                  </p:tgtEl>
+                </p:cond>
+              </p:prevCondLst>
+              <p:nextCondLst>
+                <p:cond evt="onNext" delay="0">
+                  <p:tgtEl>
+                    <p:sldTgt/>
+                  </p:tgtEl>
+                </p:cond>
+              </p:nextCondLst>
+            </p:seq>
+          </p:childTnLst>
+        </p:cTn>
+      </p:par>
+    </p:tnLst>
+    <p:bldLst>
+      <p:bldP spid="5" grpId="0" animBg="1"/>
+      <p:bldP spid="12" grpId="0" animBg="1"/>
+    </p:bldLst>
+  </p:timing>
+</p:sld>
+</file>
+
+<file path=ppt/slides/slide27.xml><?xml version="1.0" encoding="utf-8"?>
+<p:sld xmlns:a="http://schemas.openxmlformats.org/drawingml/2006/main" xmlns:r="http://schemas.openxmlformats.org/officeDocument/2006/relationships" xmlns:p="http://schemas.openxmlformats.org/presentationml/2006/main">
+  <p:cSld>
+    <p:spTree>
+      <p:nvGrpSpPr>
+        <p:cNvPr id="1" name=""/>
+        <p:cNvGrpSpPr/>
+        <p:nvPr/>
+      </p:nvGrpSpPr>
+      <p:grpSpPr>
+        <a:xfrm>
+          <a:off x="0" y="0"/>
+          <a:ext cx="0" cy="0"/>
+          <a:chOff x="0" y="0"/>
+          <a:chExt cx="0" cy="0"/>
+        </a:xfrm>
+      </p:grpSpPr>
+      <p:sp>
+        <p:nvSpPr>
+          <p:cNvPr id="2" name="Title 1">
+            <a:extLst>
+              <a:ext uri="{FF2B5EF4-FFF2-40B4-BE49-F238E27FC236}">
+                <a16:creationId xmlns:a16="http://schemas.microsoft.com/office/drawing/2014/main" id="{0DDA07A7-C1D6-C5AD-974C-76B8BB93A120}"/>
+              </a:ext>
+            </a:extLst>
+          </p:cNvPr>
+          <p:cNvSpPr>
+            <a:spLocks noGrp="1"/>
+          </p:cNvSpPr>
+          <p:nvPr>
+            <p:ph type="title"/>
+          </p:nvPr>
+        </p:nvSpPr>
+        <p:spPr/>
+        <p:txBody>
+          <a:bodyPr/>
+          <a:lstStyle/>
+          <a:p>
+            <a:r>
+              <a:rPr lang="en-US" dirty="0"/>
+              <a:t>Prepare environment</a:t>
+            </a:r>
+            <a:endParaRPr lang="LID4096" dirty="0"/>
+          </a:p>
+        </p:txBody>
+      </p:sp>
+      <p:sp>
+        <p:nvSpPr>
+          <p:cNvPr id="3" name="Content Placeholder 2">
+            <a:extLst>
+              <a:ext uri="{FF2B5EF4-FFF2-40B4-BE49-F238E27FC236}">
+                <a16:creationId xmlns:a16="http://schemas.microsoft.com/office/drawing/2014/main" id="{929C8AF7-A821-4467-9E16-EE82BB3297EE}"/>
+              </a:ext>
+            </a:extLst>
+          </p:cNvPr>
+          <p:cNvSpPr>
+            <a:spLocks noGrp="1"/>
+          </p:cNvSpPr>
+          <p:nvPr>
+            <p:ph idx="1"/>
+          </p:nvPr>
+        </p:nvSpPr>
+        <p:spPr/>
+        <p:txBody>
+          <a:bodyPr/>
+          <a:lstStyle/>
+          <a:p>
+            <a:r>
+              <a:rPr lang="en-US" dirty="0"/>
+              <a:t>Define installation location</a:t>
+            </a:r>
+          </a:p>
+          <a:p>
+            <a:endParaRPr lang="en-US" dirty="0"/>
+          </a:p>
+          <a:p>
+            <a:endParaRPr lang="en-US" dirty="0"/>
+          </a:p>
+          <a:p>
+            <a:r>
+              <a:rPr lang="en-US" dirty="0"/>
+              <a:t>Create the directory</a:t>
+            </a:r>
+          </a:p>
+          <a:p>
+            <a:endParaRPr lang="en-US" dirty="0"/>
+          </a:p>
+          <a:p>
+            <a:endParaRPr lang="en-US" dirty="0"/>
+          </a:p>
+          <a:p>
+            <a:r>
+              <a:rPr lang="en-US" dirty="0"/>
+              <a:t>Create </a:t>
+            </a:r>
+            <a:r>
+              <a:rPr lang="en-US" dirty="0">
+                <a:latin typeface="Courier New" panose="02070309020205020404" pitchFamily="49" charset="0"/>
+                <a:cs typeface="Courier New" panose="02070309020205020404" pitchFamily="49" charset="0"/>
+              </a:rPr>
+              <a:t>.</a:t>
+            </a:r>
+            <a:r>
+              <a:rPr lang="en-US" dirty="0" err="1">
+                <a:latin typeface="Courier New" panose="02070309020205020404" pitchFamily="49" charset="0"/>
+                <a:cs typeface="Courier New" panose="02070309020205020404" pitchFamily="49" charset="0"/>
+              </a:rPr>
+              <a:t>Renviron</a:t>
+            </a:r>
+            <a:r>
+              <a:rPr lang="en-US" dirty="0"/>
+              <a:t> file in </a:t>
+            </a:r>
+            <a:r>
+              <a:rPr lang="en-US" dirty="0">
+                <a:latin typeface="Courier New" panose="02070309020205020404" pitchFamily="49" charset="0"/>
+                <a:cs typeface="Courier New" panose="02070309020205020404" pitchFamily="49" charset="0"/>
+              </a:rPr>
+              <a:t>$VSC_HOME</a:t>
+            </a:r>
+            <a:endParaRPr lang="LID4096" dirty="0">
+              <a:latin typeface="Courier New" panose="02070309020205020404" pitchFamily="49" charset="0"/>
+              <a:cs typeface="Courier New" panose="02070309020205020404" pitchFamily="49" charset="0"/>
+            </a:endParaRPr>
+          </a:p>
+        </p:txBody>
+      </p:sp>
+      <p:sp>
+        <p:nvSpPr>
+          <p:cNvPr id="4" name="Slide Number Placeholder 3">
+            <a:extLst>
+              <a:ext uri="{FF2B5EF4-FFF2-40B4-BE49-F238E27FC236}">
+                <a16:creationId xmlns:a16="http://schemas.microsoft.com/office/drawing/2014/main" id="{BA387192-A981-AB47-2719-7D63C24E0195}"/>
+              </a:ext>
+            </a:extLst>
+          </p:cNvPr>
+          <p:cNvSpPr>
+            <a:spLocks noGrp="1"/>
+          </p:cNvSpPr>
+          <p:nvPr>
+            <p:ph type="sldNum" sz="quarter" idx="12"/>
+          </p:nvPr>
+        </p:nvSpPr>
+        <p:spPr/>
+        <p:txBody>
+          <a:bodyPr/>
+          <a:lstStyle/>
+          <a:p>
+            <a:fld id="{9C7CE217-4467-4B8D-A735-B008FA7C4816}" type="slidenum">
+              <a:rPr lang="LID4096" smtClean="0"/>
+              <a:t>27</a:t>
+            </a:fld>
+            <a:endParaRPr lang="LID4096"/>
+          </a:p>
+        </p:txBody>
+      </p:sp>
+      <p:sp>
+        <p:nvSpPr>
+          <p:cNvPr id="5" name="TextBox 4">
+            <a:extLst>
+              <a:ext uri="{FF2B5EF4-FFF2-40B4-BE49-F238E27FC236}">
+                <a16:creationId xmlns:a16="http://schemas.microsoft.com/office/drawing/2014/main" id="{8012222A-C647-EC32-1F3F-101179EEBBA9}"/>
+              </a:ext>
+            </a:extLst>
+          </p:cNvPr>
+          <p:cNvSpPr txBox="1"/>
+          <p:nvPr/>
+        </p:nvSpPr>
+        <p:spPr>
+          <a:xfrm>
+            <a:off x="1195227" y="2407271"/>
+            <a:ext cx="10671425" cy="400110"/>
+          </a:xfrm>
+          <a:prstGeom prst="rect">
+            <a:avLst/>
+          </a:prstGeom>
+          <a:solidFill>
+            <a:schemeClr val="tx1"/>
+          </a:solidFill>
+          <a:ln>
+            <a:solidFill>
+              <a:schemeClr val="tx1"/>
+            </a:solidFill>
+          </a:ln>
+        </p:spPr>
+        <p:txBody>
+          <a:bodyPr wrap="square" rtlCol="0">
+            <a:spAutoFit/>
+          </a:bodyPr>
+          <a:lstStyle/>
+          <a:p>
+            <a:r>
+              <a:rPr lang="en-US" sz="2000" dirty="0">
+                <a:solidFill>
+                  <a:schemeClr val="bg1"/>
+                </a:solidFill>
+              </a:rPr>
+              <a:t>compute-node $  </a:t>
+            </a:r>
+            <a:r>
+              <a:rPr lang="pt-BR" sz="2000" dirty="0">
+                <a:solidFill>
+                  <a:schemeClr val="bg1"/>
+                </a:solidFill>
+              </a:rPr>
+              <a:t>export R_LIBS_USER=$VSC_DATA/R/$VSC_ARCH_LOCAL/$EBVERSIONR</a:t>
+            </a:r>
+            <a:endParaRPr lang="en-US" sz="2000" dirty="0">
+              <a:solidFill>
+                <a:schemeClr val="bg1"/>
+              </a:solidFill>
+              <a:latin typeface="Courier New" pitchFamily="49" charset="0"/>
+              <a:cs typeface="Courier New" pitchFamily="49" charset="0"/>
+            </a:endParaRPr>
+          </a:p>
+        </p:txBody>
+      </p:sp>
+      <p:sp>
+        <p:nvSpPr>
+          <p:cNvPr id="6" name="TextBox 5">
+            <a:extLst>
+              <a:ext uri="{FF2B5EF4-FFF2-40B4-BE49-F238E27FC236}">
+                <a16:creationId xmlns:a16="http://schemas.microsoft.com/office/drawing/2014/main" id="{9447A6EF-E1CE-D6C4-8153-C015150AD2DF}"/>
+              </a:ext>
+            </a:extLst>
+          </p:cNvPr>
+          <p:cNvSpPr txBox="1"/>
+          <p:nvPr/>
+        </p:nvSpPr>
+        <p:spPr>
+          <a:xfrm>
+            <a:off x="1195227" y="3981700"/>
+            <a:ext cx="10671425" cy="400110"/>
+          </a:xfrm>
+          <a:prstGeom prst="rect">
+            <a:avLst/>
+          </a:prstGeom>
+          <a:solidFill>
+            <a:schemeClr val="tx1"/>
+          </a:solidFill>
+          <a:ln>
+            <a:solidFill>
+              <a:schemeClr val="tx1"/>
+            </a:solidFill>
+          </a:ln>
+        </p:spPr>
+        <p:txBody>
+          <a:bodyPr wrap="square" rtlCol="0">
+            <a:spAutoFit/>
+          </a:bodyPr>
+          <a:lstStyle/>
+          <a:p>
+            <a:r>
+              <a:rPr lang="en-US" sz="2000" dirty="0">
+                <a:solidFill>
+                  <a:schemeClr val="bg1"/>
+                </a:solidFill>
+              </a:rPr>
+              <a:t>compute-node $  </a:t>
+            </a:r>
+            <a:r>
+              <a:rPr lang="pt-BR" sz="2000" dirty="0">
+                <a:solidFill>
+                  <a:schemeClr val="bg1"/>
+                </a:solidFill>
+              </a:rPr>
+              <a:t>mkdir  -p  $R_LIBS_USER</a:t>
+            </a:r>
+            <a:endParaRPr lang="en-US" sz="2000" dirty="0">
+              <a:solidFill>
+                <a:schemeClr val="bg1"/>
+              </a:solidFill>
+              <a:latin typeface="Courier New" pitchFamily="49" charset="0"/>
+              <a:cs typeface="Courier New" pitchFamily="49" charset="0"/>
+            </a:endParaRPr>
+          </a:p>
+        </p:txBody>
+      </p:sp>
+      <p:sp>
+        <p:nvSpPr>
+          <p:cNvPr id="7" name="TextBox 6">
+            <a:extLst>
+              <a:ext uri="{FF2B5EF4-FFF2-40B4-BE49-F238E27FC236}">
+                <a16:creationId xmlns:a16="http://schemas.microsoft.com/office/drawing/2014/main" id="{8E2592C6-6328-99E8-B9EC-ED364A00875A}"/>
+              </a:ext>
+            </a:extLst>
+          </p:cNvPr>
+          <p:cNvSpPr txBox="1"/>
+          <p:nvPr/>
+        </p:nvSpPr>
+        <p:spPr>
+          <a:xfrm>
+            <a:off x="1195226" y="5469741"/>
+            <a:ext cx="10671425" cy="400110"/>
+          </a:xfrm>
+          <a:prstGeom prst="rect">
+            <a:avLst/>
+          </a:prstGeom>
+          <a:solidFill>
+            <a:schemeClr val="tx1"/>
+          </a:solidFill>
+          <a:ln>
+            <a:solidFill>
+              <a:schemeClr val="tx1"/>
+            </a:solidFill>
+          </a:ln>
+        </p:spPr>
+        <p:txBody>
+          <a:bodyPr wrap="square" rtlCol="0">
+            <a:spAutoFit/>
+          </a:bodyPr>
+          <a:lstStyle/>
+          <a:p>
+            <a:r>
+              <a:rPr lang="en-US" sz="2000" b="1" dirty="0">
+                <a:solidFill>
+                  <a:schemeClr val="bg1"/>
+                </a:solidFill>
+              </a:rPr>
+              <a:t>compute-node $  </a:t>
+            </a:r>
+            <a:r>
+              <a:rPr lang="pt-BR" b="1" dirty="0">
+                <a:solidFill>
+                  <a:schemeClr val="bg1"/>
+                </a:solidFill>
+              </a:rPr>
+              <a:t>echo "R_LIBS_USER=$R_LIBS_USER"  &gt;  $VSC_HOME/.Renviron</a:t>
+            </a:r>
+            <a:endParaRPr lang="en-US" sz="2000" b="1" dirty="0">
+              <a:solidFill>
+                <a:schemeClr val="bg1"/>
+              </a:solidFill>
+              <a:latin typeface="Courier New" pitchFamily="49" charset="0"/>
+              <a:cs typeface="Courier New" pitchFamily="49" charset="0"/>
+            </a:endParaRPr>
+          </a:p>
+        </p:txBody>
+      </p:sp>
+    </p:spTree>
+    <p:extLst>
+      <p:ext uri="{BB962C8B-B14F-4D97-AF65-F5344CB8AC3E}">
+        <p14:creationId xmlns:p14="http://schemas.microsoft.com/office/powerpoint/2010/main" val="1201046302"/>
+      </p:ext>
+    </p:extLst>
+  </p:cSld>
+  <p:clrMapOvr>
+    <a:masterClrMapping/>
+  </p:clrMapOvr>
+  <p:timing>
+    <p:tnLst>
+      <p:par>
+        <p:cTn id="1" dur="indefinite" restart="never" nodeType="tmRoot">
+          <p:childTnLst>
+            <p:seq concurrent="1" nextAc="seek">
+              <p:cTn id="2" dur="indefinite" nodeType="mainSeq">
+                <p:childTnLst>
+                  <p:par>
+                    <p:cTn id="3" fill="hold">
+                      <p:stCondLst>
+                        <p:cond delay="indefinite"/>
+                        <p:cond evt="onBegin" delay="0">
+                          <p:tn val="2"/>
+                        </p:cond>
+                      </p:stCondLst>
+                      <p:childTnLst>
+                        <p:par>
+                          <p:cTn id="4" fill="hold">
+                            <p:stCondLst>
+                              <p:cond delay="0"/>
+                            </p:stCondLst>
+                            <p:childTnLst>
+                              <p:par>
+                                <p:cTn id="5" presetID="1" presetClass="entr" presetSubtype="0" fill="hold" grpId="0" nodeType="withEffect">
+                                  <p:stCondLst>
+                                    <p:cond delay="0"/>
+                                  </p:stCondLst>
+                                  <p:childTnLst>
+                                    <p:set>
+                                      <p:cBhvr>
+                                        <p:cTn id="6" dur="1" fill="hold">
+                                          <p:stCondLst>
+                                            <p:cond delay="0"/>
+                                          </p:stCondLst>
+                                        </p:cTn>
+                                        <p:tgtEl>
+                                          <p:spTgt spid="5"/>
+                                        </p:tgtEl>
+                                        <p:attrNameLst>
+                                          <p:attrName>style.visibility</p:attrName>
+                                        </p:attrNameLst>
+                                      </p:cBhvr>
+                                      <p:to>
+                                        <p:strVal val="visible"/>
+                                      </p:to>
+                                    </p:set>
+                                  </p:childTnLst>
+                                </p:cTn>
+                              </p:par>
+                              <p:par>
+                                <p:cTn id="7" presetID="1" presetClass="entr" presetSubtype="0" fill="hold" grpId="0" nodeType="withEffect">
+                                  <p:stCondLst>
+                                    <p:cond delay="0"/>
+                                  </p:stCondLst>
+                                  <p:childTnLst>
+                                    <p:set>
+                                      <p:cBhvr>
+                                        <p:cTn id="8" dur="1" fill="hold">
+                                          <p:stCondLst>
+                                            <p:cond delay="0"/>
+                                          </p:stCondLst>
+                                        </p:cTn>
+                                        <p:tgtEl>
+                                          <p:spTgt spid="6"/>
+                                        </p:tgtEl>
+                                        <p:attrNameLst>
+                                          <p:attrName>style.visibility</p:attrName>
+                                        </p:attrNameLst>
+                                      </p:cBhvr>
+                                      <p:to>
+                                        <p:strVal val="visible"/>
+                                      </p:to>
+                                    </p:set>
+                                  </p:childTnLst>
+                                </p:cTn>
+                              </p:par>
+                              <p:par>
+                                <p:cTn id="9" presetID="1" presetClass="entr" presetSubtype="0" fill="hold" grpId="0" nodeType="withEffect">
+                                  <p:stCondLst>
+                                    <p:cond delay="0"/>
+                                  </p:stCondLst>
+                                  <p:childTnLst>
+                                    <p:set>
+                                      <p:cBhvr>
+                                        <p:cTn id="10" dur="1" fill="hold">
+                                          <p:stCondLst>
+                                            <p:cond delay="0"/>
+                                          </p:stCondLst>
+                                        </p:cTn>
+                                        <p:tgtEl>
+                                          <p:spTgt spid="7"/>
+                                        </p:tgtEl>
+                                        <p:attrNameLst>
+                                          <p:attrName>style.visibility</p:attrName>
+                                        </p:attrNameLst>
+                                      </p:cBhvr>
+                                      <p:to>
+                                        <p:strVal val="visible"/>
+                                      </p:to>
+                                    </p:set>
+                                  </p:childTnLst>
+                                </p:cTn>
+                              </p:par>
+                            </p:childTnLst>
+                          </p:cTn>
+                        </p:par>
+                      </p:childTnLst>
+                    </p:cTn>
+                  </p:par>
+                </p:childTnLst>
+              </p:cTn>
+              <p:prevCondLst>
+                <p:cond evt="onPrev" delay="0">
+                  <p:tgtEl>
+                    <p:sldTgt/>
+                  </p:tgtEl>
+                </p:cond>
+              </p:prevCondLst>
+              <p:nextCondLst>
+                <p:cond evt="onNext" delay="0">
+                  <p:tgtEl>
+                    <p:sldTgt/>
+                  </p:tgtEl>
+                </p:cond>
+              </p:nextCondLst>
+            </p:seq>
+          </p:childTnLst>
+        </p:cTn>
+      </p:par>
+    </p:tnLst>
+    <p:bldLst>
+      <p:bldP spid="5" grpId="0" animBg="1"/>
+      <p:bldP spid="6" grpId="0" animBg="1"/>
+      <p:bldP spid="7" grpId="0" animBg="1"/>
+    </p:bldLst>
+  </p:timing>
+</p:sld>
+</file>
+
+<file path=ppt/slides/slide28.xml><?xml version="1.0" encoding="utf-8"?>
+<p:sld xmlns:a="http://schemas.openxmlformats.org/drawingml/2006/main" xmlns:r="http://schemas.openxmlformats.org/officeDocument/2006/relationships" xmlns:p="http://schemas.openxmlformats.org/presentationml/2006/main">
+  <p:cSld>
+    <p:spTree>
+      <p:nvGrpSpPr>
+        <p:cNvPr id="1" name=""/>
+        <p:cNvGrpSpPr/>
+        <p:nvPr/>
+      </p:nvGrpSpPr>
+      <p:grpSpPr>
+        <a:xfrm>
+          <a:off x="0" y="0"/>
+          <a:ext cx="0" cy="0"/>
+          <a:chOff x="0" y="0"/>
+          <a:chExt cx="0" cy="0"/>
+        </a:xfrm>
+      </p:grpSpPr>
+      <p:sp>
+        <p:nvSpPr>
+          <p:cNvPr id="2" name="Title 1">
+            <a:extLst>
+              <a:ext uri="{FF2B5EF4-FFF2-40B4-BE49-F238E27FC236}">
+                <a16:creationId xmlns:a16="http://schemas.microsoft.com/office/drawing/2014/main" id="{D83B28F6-0CF1-1FBC-AA5C-8F4D8C201178}"/>
+              </a:ext>
+            </a:extLst>
+          </p:cNvPr>
+          <p:cNvSpPr>
+            <a:spLocks noGrp="1"/>
+          </p:cNvSpPr>
+          <p:nvPr>
+            <p:ph type="title"/>
+          </p:nvPr>
+        </p:nvSpPr>
+        <p:spPr/>
+        <p:txBody>
+          <a:bodyPr/>
+          <a:lstStyle/>
+          <a:p>
+            <a:r>
+              <a:rPr lang="en-US" dirty="0"/>
+              <a:t>Package installation</a:t>
+            </a:r>
+            <a:endParaRPr lang="LID4096" dirty="0"/>
+          </a:p>
+        </p:txBody>
+      </p:sp>
+      <p:sp>
+        <p:nvSpPr>
+          <p:cNvPr id="3" name="Content Placeholder 2">
+            <a:extLst>
+              <a:ext uri="{FF2B5EF4-FFF2-40B4-BE49-F238E27FC236}">
+                <a16:creationId xmlns:a16="http://schemas.microsoft.com/office/drawing/2014/main" id="{62B8A967-E104-11B7-B582-69C99454672A}"/>
+              </a:ext>
+            </a:extLst>
+          </p:cNvPr>
+          <p:cNvSpPr>
+            <a:spLocks noGrp="1"/>
+          </p:cNvSpPr>
+          <p:nvPr>
+            <p:ph idx="1"/>
+          </p:nvPr>
+        </p:nvSpPr>
+        <p:spPr/>
+        <p:txBody>
+          <a:bodyPr/>
+          <a:lstStyle/>
+          <a:p>
+            <a:r>
+              <a:rPr lang="en-US" dirty="0"/>
+              <a:t>Install required packages</a:t>
+            </a:r>
+            <a:endParaRPr lang="LID4096" dirty="0"/>
+          </a:p>
+        </p:txBody>
+      </p:sp>
+      <p:sp>
+        <p:nvSpPr>
+          <p:cNvPr id="4" name="Slide Number Placeholder 3">
+            <a:extLst>
+              <a:ext uri="{FF2B5EF4-FFF2-40B4-BE49-F238E27FC236}">
+                <a16:creationId xmlns:a16="http://schemas.microsoft.com/office/drawing/2014/main" id="{B107F16B-6446-02C5-8380-DC9EE6AA9C08}"/>
+              </a:ext>
+            </a:extLst>
+          </p:cNvPr>
+          <p:cNvSpPr>
+            <a:spLocks noGrp="1"/>
+          </p:cNvSpPr>
+          <p:nvPr>
+            <p:ph type="sldNum" sz="quarter" idx="12"/>
+          </p:nvPr>
+        </p:nvSpPr>
+        <p:spPr/>
+        <p:txBody>
+          <a:bodyPr/>
+          <a:lstStyle/>
+          <a:p>
+            <a:fld id="{9C7CE217-4467-4B8D-A735-B008FA7C4816}" type="slidenum">
+              <a:rPr lang="LID4096" smtClean="0"/>
+              <a:t>28</a:t>
+            </a:fld>
+            <a:endParaRPr lang="LID4096"/>
+          </a:p>
+        </p:txBody>
+      </p:sp>
+      <p:sp>
+        <p:nvSpPr>
+          <p:cNvPr id="5" name="TextBox 4">
+            <a:extLst>
+              <a:ext uri="{FF2B5EF4-FFF2-40B4-BE49-F238E27FC236}">
+                <a16:creationId xmlns:a16="http://schemas.microsoft.com/office/drawing/2014/main" id="{78CBE854-556F-83DC-7D36-F0D30798AD35}"/>
+              </a:ext>
+            </a:extLst>
+          </p:cNvPr>
+          <p:cNvSpPr txBox="1"/>
+          <p:nvPr/>
+        </p:nvSpPr>
+        <p:spPr>
+          <a:xfrm>
+            <a:off x="1092485" y="2366946"/>
+            <a:ext cx="10671425" cy="707886"/>
+          </a:xfrm>
+          <a:prstGeom prst="rect">
+            <a:avLst/>
+          </a:prstGeom>
+          <a:solidFill>
+            <a:schemeClr val="tx1"/>
+          </a:solidFill>
+          <a:ln>
+            <a:solidFill>
+              <a:schemeClr val="tx1"/>
+            </a:solidFill>
+          </a:ln>
+        </p:spPr>
+        <p:txBody>
+          <a:bodyPr wrap="square" rtlCol="0">
+            <a:spAutoFit/>
+          </a:bodyPr>
+          <a:lstStyle/>
+          <a:p>
+            <a:r>
+              <a:rPr lang="en-US" sz="2000" b="1" dirty="0">
+                <a:solidFill>
+                  <a:schemeClr val="bg1"/>
+                </a:solidFill>
+              </a:rPr>
+              <a:t>compute-node $  </a:t>
+            </a:r>
+            <a:r>
+              <a:rPr lang="pt-BR" b="1" dirty="0">
+                <a:solidFill>
+                  <a:schemeClr val="bg1"/>
+                </a:solidFill>
+              </a:rPr>
+              <a:t>R</a:t>
+            </a:r>
+          </a:p>
+          <a:p>
+            <a:r>
+              <a:rPr lang="pt-BR" sz="2000" b="1" dirty="0">
+                <a:solidFill>
+                  <a:schemeClr val="bg1"/>
+                </a:solidFill>
+                <a:latin typeface="Courier New" pitchFamily="49" charset="0"/>
+                <a:cs typeface="Courier New" pitchFamily="49" charset="0"/>
+              </a:rPr>
+              <a:t>&gt;  install.packages("optpares")</a:t>
+            </a:r>
+            <a:endParaRPr lang="en-US" sz="2000" b="1" dirty="0">
+              <a:solidFill>
+                <a:schemeClr val="bg1"/>
+              </a:solidFill>
+              <a:latin typeface="Courier New" pitchFamily="49" charset="0"/>
+              <a:cs typeface="Courier New" pitchFamily="49" charset="0"/>
+            </a:endParaRPr>
+          </a:p>
+        </p:txBody>
+      </p:sp>
+    </p:spTree>
+    <p:extLst>
+      <p:ext uri="{BB962C8B-B14F-4D97-AF65-F5344CB8AC3E}">
+        <p14:creationId xmlns:p14="http://schemas.microsoft.com/office/powerpoint/2010/main" val="293399636"/>
+      </p:ext>
+    </p:extLst>
+  </p:cSld>
+  <p:clrMapOvr>
+    <a:masterClrMapping/>
+  </p:clrMapOvr>
+  <p:timing>
+    <p:tnLst>
+      <p:par>
+        <p:cTn id="1" dur="indefinite" restart="never" nodeType="tmRoot">
+          <p:childTnLst>
+            <p:seq concurrent="1" nextAc="seek">
+              <p:cTn id="2" dur="indefinite" nodeType="mainSeq">
+                <p:childTnLst>
+                  <p:par>
+                    <p:cTn id="3" fill="hold">
+                      <p:stCondLst>
+                        <p:cond delay="indefinite"/>
+                        <p:cond evt="onBegin" delay="0">
+                          <p:tn val="2"/>
+                        </p:cond>
+                      </p:stCondLst>
+                      <p:childTnLst>
+                        <p:par>
+                          <p:cTn id="4" fill="hold">
+                            <p:stCondLst>
+                              <p:cond delay="0"/>
+                            </p:stCondLst>
+                            <p:childTnLst>
+                              <p:par>
+                                <p:cTn id="5" presetID="1" presetClass="entr" presetSubtype="0" fill="hold" grpId="0" nodeType="withEffect">
+                                  <p:stCondLst>
+                                    <p:cond delay="0"/>
+                                  </p:stCondLst>
+                                  <p:childTnLst>
+                                    <p:set>
+                                      <p:cBhvr>
+                                        <p:cTn id="6" dur="1" fill="hold">
+                                          <p:stCondLst>
+                                            <p:cond delay="0"/>
+                                          </p:stCondLst>
+                                        </p:cTn>
+                                        <p:tgtEl>
+                                          <p:spTgt spid="5"/>
+                                        </p:tgtEl>
+                                        <p:attrNameLst>
+                                          <p:attrName>style.visibility</p:attrName>
+                                        </p:attrNameLst>
+                                      </p:cBhvr>
+                                      <p:to>
+                                        <p:strVal val="visible"/>
+                                      </p:to>
+                                    </p:set>
+                                  </p:childTnLst>
+                                </p:cTn>
+                              </p:par>
+                            </p:childTnLst>
+                          </p:cTn>
+                        </p:par>
+                      </p:childTnLst>
+                    </p:cTn>
+                  </p:par>
+                </p:childTnLst>
+              </p:cTn>
+              <p:prevCondLst>
+                <p:cond evt="onPrev" delay="0">
+                  <p:tgtEl>
+                    <p:sldTgt/>
+                  </p:tgtEl>
+                </p:cond>
+              </p:prevCondLst>
+              <p:nextCondLst>
+                <p:cond evt="onNext" delay="0">
+                  <p:tgtEl>
+                    <p:sldTgt/>
+                  </p:tgtEl>
+                </p:cond>
+              </p:nextCondLst>
+            </p:seq>
+          </p:childTnLst>
+        </p:cTn>
+      </p:par>
+    </p:tnLst>
+    <p:bldLst>
+      <p:bldP spid="5" grpId="0" animBg="1"/>
     </p:bldLst>
   </p:timing>
 </p:sld>

</xml_diff>

<commit_message>
Add slides on condad and R environments
</commit_message>
<xml_diff>
--- a/best_practices_for_data_science_on_hpc.pptx
+++ b/best_practices_for_data_science_on_hpc.pptx
@@ -5,7 +5,7 @@
     <p:sldMasterId id="2147483648" r:id="rId1"/>
   </p:sldMasterIdLst>
   <p:notesMasterIdLst>
-    <p:notesMasterId r:id="rId30"/>
+    <p:notesMasterId r:id="rId32"/>
   </p:notesMasterIdLst>
   <p:sldIdLst>
     <p:sldId id="257" r:id="rId2"/>
@@ -29,13 +29,15 @@
     <p:sldId id="364" r:id="rId20"/>
     <p:sldId id="365" r:id="rId21"/>
     <p:sldId id="374" r:id="rId22"/>
-    <p:sldId id="375" r:id="rId23"/>
+    <p:sldId id="383" r:id="rId23"/>
     <p:sldId id="376" r:id="rId24"/>
-    <p:sldId id="377" r:id="rId25"/>
-    <p:sldId id="378" r:id="rId26"/>
-    <p:sldId id="379" r:id="rId27"/>
-    <p:sldId id="380" r:id="rId28"/>
-    <p:sldId id="381" r:id="rId29"/>
+    <p:sldId id="375" r:id="rId25"/>
+    <p:sldId id="377" r:id="rId26"/>
+    <p:sldId id="378" r:id="rId27"/>
+    <p:sldId id="379" r:id="rId28"/>
+    <p:sldId id="380" r:id="rId29"/>
+    <p:sldId id="381" r:id="rId30"/>
+    <p:sldId id="382" r:id="rId31"/>
   </p:sldIdLst>
   <p:sldSz cx="12192000" cy="6858000"/>
   <p:notesSz cx="6858000" cy="9144000"/>
@@ -369,7 +371,7 @@
           <a:p>
             <a:fld id="{AFA0CAC4-3EE0-4DC7-ABD6-D3D6E5AAAB9D}" type="datetimeFigureOut">
               <a:rPr lang="LID4096" smtClean="0"/>
-              <a:t>05/22/2025</a:t>
+              <a:t>05/26/2025</a:t>
             </a:fld>
             <a:endParaRPr lang="LID4096"/>
           </a:p>
@@ -786,7 +788,7 @@
           <a:p>
             <a:fld id="{D44F87C4-D0FF-4ABC-B333-BDD4A889DCA1}" type="datetime1">
               <a:rPr lang="LID4096" smtClean="0"/>
-              <a:t>05/22/2025</a:t>
+              <a:t>05/26/2025</a:t>
             </a:fld>
             <a:endParaRPr lang="LID4096"/>
           </a:p>
@@ -986,7 +988,7 @@
           <a:p>
             <a:fld id="{C798A9AB-7D13-4A1F-BEC7-C733FF8E3B84}" type="datetime1">
               <a:rPr lang="LID4096" smtClean="0"/>
-              <a:t>05/22/2025</a:t>
+              <a:t>05/26/2025</a:t>
             </a:fld>
             <a:endParaRPr lang="LID4096"/>
           </a:p>
@@ -1196,7 +1198,7 @@
           <a:p>
             <a:fld id="{DB9488E1-5B48-4482-9C1F-FB8A64529493}" type="datetime1">
               <a:rPr lang="LID4096" smtClean="0"/>
-              <a:t>05/22/2025</a:t>
+              <a:t>05/26/2025</a:t>
             </a:fld>
             <a:endParaRPr lang="LID4096"/>
           </a:p>
@@ -1396,7 +1398,7 @@
           <a:p>
             <a:fld id="{02E48E22-1479-48C4-B746-780F47AD5EC9}" type="datetime1">
               <a:rPr lang="LID4096" smtClean="0"/>
-              <a:t>05/22/2025</a:t>
+              <a:t>05/26/2025</a:t>
             </a:fld>
             <a:endParaRPr lang="LID4096"/>
           </a:p>
@@ -1672,7 +1674,7 @@
           <a:p>
             <a:fld id="{ACFA5FA8-46CB-46C5-AAB0-0D899A830AB1}" type="datetime1">
               <a:rPr lang="LID4096" smtClean="0"/>
-              <a:t>05/22/2025</a:t>
+              <a:t>05/26/2025</a:t>
             </a:fld>
             <a:endParaRPr lang="LID4096"/>
           </a:p>
@@ -1940,7 +1942,7 @@
           <a:p>
             <a:fld id="{C8250588-C4C6-4E7A-B27D-46BD5B8159A8}" type="datetime1">
               <a:rPr lang="LID4096" smtClean="0"/>
-              <a:t>05/22/2025</a:t>
+              <a:t>05/26/2025</a:t>
             </a:fld>
             <a:endParaRPr lang="LID4096"/>
           </a:p>
@@ -2355,7 +2357,7 @@
           <a:p>
             <a:fld id="{72985A48-4465-48A8-AAD4-B9BEB580B31E}" type="datetime1">
               <a:rPr lang="LID4096" smtClean="0"/>
-              <a:t>05/22/2025</a:t>
+              <a:t>05/26/2025</a:t>
             </a:fld>
             <a:endParaRPr lang="LID4096"/>
           </a:p>
@@ -2497,7 +2499,7 @@
           <a:p>
             <a:fld id="{566EFD7D-974A-4FEA-9103-2A0F722D35E4}" type="datetime1">
               <a:rPr lang="LID4096" smtClean="0"/>
-              <a:t>05/22/2025</a:t>
+              <a:t>05/26/2025</a:t>
             </a:fld>
             <a:endParaRPr lang="LID4096"/>
           </a:p>
@@ -2610,7 +2612,7 @@
           <a:p>
             <a:fld id="{4601B35C-61E9-41E8-9D04-B075C63E69AD}" type="datetime1">
               <a:rPr lang="LID4096" smtClean="0"/>
-              <a:t>05/22/2025</a:t>
+              <a:t>05/26/2025</a:t>
             </a:fld>
             <a:endParaRPr lang="LID4096"/>
           </a:p>
@@ -2923,7 +2925,7 @@
           <a:p>
             <a:fld id="{69A9A7E0-60EF-4A8E-B5EF-6F8166A81BDD}" type="datetime1">
               <a:rPr lang="LID4096" smtClean="0"/>
-              <a:t>05/22/2025</a:t>
+              <a:t>05/26/2025</a:t>
             </a:fld>
             <a:endParaRPr lang="LID4096"/>
           </a:p>
@@ -3212,7 +3214,7 @@
           <a:p>
             <a:fld id="{437CDF53-035C-4F7E-91D9-70126BA0C501}" type="datetime1">
               <a:rPr lang="LID4096" smtClean="0"/>
-              <a:t>05/22/2025</a:t>
+              <a:t>05/26/2025</a:t>
             </a:fld>
             <a:endParaRPr lang="LID4096"/>
           </a:p>
@@ -3455,7 +3457,7 @@
           <a:p>
             <a:fld id="{C4428A7A-D2AE-4E58-ACE6-968F47E7F9F9}" type="datetime1">
               <a:rPr lang="LID4096" smtClean="0"/>
-              <a:t>05/22/2025</a:t>
+              <a:t>05/26/2025</a:t>
             </a:fld>
             <a:endParaRPr lang="LID4096"/>
           </a:p>
@@ -8255,7 +8257,7 @@
           <a:p>
             <a:r>
               <a:rPr lang="en-US" dirty="0"/>
-              <a:t>Environment</a:t>
+              <a:t>Environments</a:t>
             </a:r>
             <a:endParaRPr lang="LID4096" dirty="0"/>
           </a:p>
@@ -10014,7 +10016,7 @@
           <p:cNvPr id="2" name="Title 1">
             <a:extLst>
               <a:ext uri="{FF2B5EF4-FFF2-40B4-BE49-F238E27FC236}">
-                <a16:creationId xmlns:a16="http://schemas.microsoft.com/office/drawing/2014/main" id="{45CED853-DFDF-BC51-50DF-3D49D1CA23DA}"/>
+                <a16:creationId xmlns:a16="http://schemas.microsoft.com/office/drawing/2014/main" id="{B4B0C666-ADD6-2C01-CCB6-FE56FE663B1D}"/>
               </a:ext>
             </a:extLst>
           </p:cNvPr>
@@ -10032,7 +10034,7 @@
           <a:p>
             <a:r>
               <a:rPr lang="en-US" dirty="0"/>
-              <a:t>Conda</a:t>
+              <a:t>Conda environments</a:t>
             </a:r>
             <a:endParaRPr lang="LID4096" dirty="0"/>
           </a:p>
@@ -10043,7 +10045,7 @@
           <p:cNvPr id="3" name="Content Placeholder 2">
             <a:extLst>
               <a:ext uri="{FF2B5EF4-FFF2-40B4-BE49-F238E27FC236}">
-                <a16:creationId xmlns:a16="http://schemas.microsoft.com/office/drawing/2014/main" id="{8FF9386A-C977-D456-C782-86154FC4D825}"/>
+                <a16:creationId xmlns:a16="http://schemas.microsoft.com/office/drawing/2014/main" id="{CF2D5358-76B5-F230-33C5-1483168BB89F}"/>
               </a:ext>
             </a:extLst>
           </p:cNvPr>
@@ -10057,109 +10059,91 @@
         <p:spPr/>
         <p:txBody>
           <a:bodyPr>
-            <a:normAutofit lnSpcReduction="10000"/>
+            <a:normAutofit fontScale="92500" lnSpcReduction="20000"/>
           </a:bodyPr>
           <a:lstStyle/>
           <a:p>
             <a:r>
               <a:rPr lang="en-US" dirty="0"/>
-              <a:t>Best practices</a:t>
-            </a:r>
-          </a:p>
-          <a:p>
-            <a:pPr lvl="1"/>
+              <a:t>Install </a:t>
+            </a:r>
+            <a:r>
+              <a:rPr lang="en-US" dirty="0" err="1"/>
+              <a:t>conda</a:t>
+            </a:r>
+            <a:endParaRPr lang="en-US" dirty="0"/>
+          </a:p>
+          <a:p>
+            <a:endParaRPr lang="en-US" dirty="0"/>
+          </a:p>
+          <a:p>
+            <a:endParaRPr lang="en-US" dirty="0"/>
+          </a:p>
+          <a:p>
             <a:r>
               <a:rPr lang="en-US" dirty="0"/>
-              <a:t>Lean, single purpose environments</a:t>
-            </a:r>
-          </a:p>
-          <a:p>
-            <a:pPr lvl="1"/>
+              <a:t>Create environment with </a:t>
+            </a:r>
+            <a:r>
+              <a:rPr lang="en-US" dirty="0" err="1">
+                <a:latin typeface="Courier New" panose="02070309020205020404" pitchFamily="49" charset="0"/>
+                <a:cs typeface="Courier New" panose="02070309020205020404" pitchFamily="49" charset="0"/>
+              </a:rPr>
+              <a:t>numpy</a:t>
+            </a:r>
             <a:r>
               <a:rPr lang="en-US" dirty="0"/>
-              <a:t>Keep under version control: </a:t>
-            </a:r>
-            <a:r>
-              <a:rPr lang="en-US" i="1" dirty="0">
-                <a:solidFill>
-                  <a:srgbClr val="00B050"/>
-                </a:solidFill>
+              <a:t>, </a:t>
+            </a:r>
+            <a:r>
+              <a:rPr lang="en-US" dirty="0">
+                <a:latin typeface="Courier New" panose="02070309020205020404" pitchFamily="49" charset="0"/>
+                <a:cs typeface="Courier New" panose="02070309020205020404" pitchFamily="49" charset="0"/>
               </a:rPr>
-              <a:t>reproducible</a:t>
-            </a:r>
-            <a:endParaRPr lang="en-US" i="1" dirty="0"/>
-          </a:p>
-          <a:p>
-            <a:pPr lvl="1"/>
-            <a:endParaRPr lang="en-US" i="1" dirty="0"/>
-          </a:p>
-          <a:p>
-            <a:pPr lvl="1"/>
-            <a:endParaRPr lang="en-US" i="1" dirty="0"/>
-          </a:p>
-          <a:p>
-            <a:pPr lvl="1"/>
-            <a:r>
-              <a:rPr lang="en-US" dirty="0"/>
-              <a:t>Keep laptop and HPC in sync: </a:t>
-            </a:r>
-            <a:r>
-              <a:rPr lang="en-US" i="1" dirty="0">
-                <a:solidFill>
-                  <a:srgbClr val="00B050"/>
-                </a:solidFill>
+              <a:t>matplotlib</a:t>
+            </a:r>
+          </a:p>
+          <a:p>
+            <a:endParaRPr lang="en-US" dirty="0">
+              <a:latin typeface="Courier New" panose="02070309020205020404" pitchFamily="49" charset="0"/>
+              <a:cs typeface="Courier New" panose="02070309020205020404" pitchFamily="49" charset="0"/>
+            </a:endParaRPr>
+          </a:p>
+          <a:p>
+            <a:r>
+              <a:rPr lang="en-US" dirty="0">
+                <a:cs typeface="Courier New" panose="02070309020205020404" pitchFamily="49" charset="0"/>
               </a:rPr>
-              <a:t>portability</a:t>
-            </a:r>
-            <a:endParaRPr lang="en-US" dirty="0"/>
-          </a:p>
-          <a:p>
-            <a:pPr lvl="1"/>
-            <a:endParaRPr lang="en-US" dirty="0"/>
-          </a:p>
-          <a:p>
-            <a:pPr lvl="1"/>
-            <a:endParaRPr lang="en-US" dirty="0"/>
-          </a:p>
-          <a:p>
-            <a:r>
-              <a:rPr lang="en-US" dirty="0"/>
-              <a:t>Pitfall: installation directory, see documentation</a:t>
-            </a:r>
-            <a:br>
-              <a:rPr lang="en-US" dirty="0"/>
-            </a:br>
-            <a:r>
-              <a:rPr lang="en-US" sz="2000" dirty="0">
-                <a:hlinkClick r:id="rId2"/>
+              <a:t>Activate environment</a:t>
+            </a:r>
+          </a:p>
+          <a:p>
+            <a:endParaRPr lang="en-US" dirty="0">
+              <a:cs typeface="Courier New" panose="02070309020205020404" pitchFamily="49" charset="0"/>
+            </a:endParaRPr>
+          </a:p>
+          <a:p>
+            <a:r>
+              <a:rPr lang="en-US" dirty="0">
+                <a:cs typeface="Courier New" panose="02070309020205020404" pitchFamily="49" charset="0"/>
               </a:rPr>
-              <a:t>https://docs.vscentrum.be/compute/software/python_package_management.html</a:t>
-            </a:r>
-            <a:endParaRPr lang="en-US" sz="2000" dirty="0"/>
-          </a:p>
-          <a:p>
-            <a:r>
-              <a:rPr lang="en-US" dirty="0"/>
-              <a:t>For performance on CPU, use Intel </a:t>
-            </a:r>
-            <a:r>
-              <a:rPr lang="en-US" dirty="0" err="1"/>
-              <a:t>OneAPI</a:t>
-            </a:r>
-            <a:r>
-              <a:rPr lang="en-US" dirty="0"/>
-              <a:t> distribution</a:t>
-            </a:r>
-            <a:r>
-              <a:rPr lang="en-US" sz="2000" dirty="0"/>
-              <a:t> </a:t>
-            </a:r>
-          </a:p>
-          <a:p>
-            <a:endParaRPr lang="en-US" i="1" dirty="0">
-              <a:solidFill>
-                <a:srgbClr val="00B050"/>
-              </a:solidFill>
+              <a:t>Install additional packages</a:t>
+            </a:r>
+          </a:p>
+          <a:p>
+            <a:endParaRPr lang="en-US" dirty="0">
+              <a:cs typeface="Courier New" panose="02070309020205020404" pitchFamily="49" charset="0"/>
+            </a:endParaRPr>
+          </a:p>
+          <a:p>
+            <a:r>
+              <a:rPr lang="en-US" dirty="0">
+                <a:cs typeface="Courier New" panose="02070309020205020404" pitchFamily="49" charset="0"/>
+              </a:rPr>
+              <a:t>Update </a:t>
+            </a:r>
+            <a:endParaRPr lang="LID4096" dirty="0">
+              <a:cs typeface="Courier New" panose="02070309020205020404" pitchFamily="49" charset="0"/>
             </a:endParaRPr>
           </a:p>
         </p:txBody>
@@ -10169,7 +10153,7 @@
           <p:cNvPr id="4" name="Slide Number Placeholder 3">
             <a:extLst>
               <a:ext uri="{FF2B5EF4-FFF2-40B4-BE49-F238E27FC236}">
-                <a16:creationId xmlns:a16="http://schemas.microsoft.com/office/drawing/2014/main" id="{A38D5F06-910B-6523-67A4-F713CB9C6F36}"/>
+                <a16:creationId xmlns:a16="http://schemas.microsoft.com/office/drawing/2014/main" id="{7C89B369-6BD2-C882-3BEA-42338E983D86}"/>
               </a:ext>
             </a:extLst>
           </p:cNvPr>
@@ -10198,7 +10182,7 @@
           <p:cNvPr id="5" name="TextBox 4">
             <a:extLst>
               <a:ext uri="{FF2B5EF4-FFF2-40B4-BE49-F238E27FC236}">
-                <a16:creationId xmlns:a16="http://schemas.microsoft.com/office/drawing/2014/main" id="{4A96AB11-9ECF-D5E6-6532-B07AB9001B2D}"/>
+                <a16:creationId xmlns:a16="http://schemas.microsoft.com/office/drawing/2014/main" id="{16623DDC-C9F5-61CF-6F3F-2A40A3CFD90E}"/>
               </a:ext>
             </a:extLst>
           </p:cNvPr>
@@ -10207,8 +10191,8 @@
         </p:nvSpPr>
         <p:spPr>
           <a:xfrm>
-            <a:off x="1585645" y="3174716"/>
-            <a:ext cx="7938498" cy="369332"/>
+            <a:off x="1121229" y="2129683"/>
+            <a:ext cx="10874828" cy="923330"/>
           </a:xfrm>
           <a:prstGeom prst="rect">
             <a:avLst/>
@@ -10246,7 +10230,7 @@
                 <a:latin typeface="Courier New" pitchFamily="49" charset="0"/>
                 <a:cs typeface="Courier New" pitchFamily="49" charset="0"/>
               </a:rPr>
-              <a:t>conda</a:t>
+              <a:t>wget</a:t>
             </a:r>
             <a:r>
               <a:rPr lang="en-US" b="1" dirty="0">
@@ -10256,9 +10240,43 @@
                 <a:latin typeface="Courier New" pitchFamily="49" charset="0"/>
                 <a:cs typeface="Courier New" pitchFamily="49" charset="0"/>
               </a:rPr>
-              <a:t> list  --explicit  &gt;  environment_spec.txt</a:t>
-            </a:r>
-            <a:endParaRPr lang="en-US" dirty="0">
+              <a:t> https://repo.continuum.io/miniconda/Miniconda3-latest-Linux-x86_64.sh</a:t>
+            </a:r>
+          </a:p>
+          <a:p>
+            <a:r>
+              <a:rPr lang="en-US" b="1" dirty="0">
+                <a:solidFill>
+                  <a:schemeClr val="bg1"/>
+                </a:solidFill>
+                <a:latin typeface="Courier New" pitchFamily="49" charset="0"/>
+                <a:cs typeface="Courier New" pitchFamily="49" charset="0"/>
+              </a:rPr>
+              <a:t>$  </a:t>
+            </a:r>
+            <a:r>
+              <a:rPr lang="it-IT" b="1" dirty="0">
+                <a:solidFill>
+                  <a:schemeClr val="bg1"/>
+                </a:solidFill>
+                <a:latin typeface="Courier New" pitchFamily="49" charset="0"/>
+                <a:cs typeface="Courier New" pitchFamily="49" charset="0"/>
+              </a:rPr>
+              <a:t>bash Miniconda3-latest-Linux-x86_64.sh  -b  -p $VSC_DATA/miniconda3</a:t>
+            </a:r>
+          </a:p>
+          <a:p>
+            <a:r>
+              <a:rPr lang="it-IT" b="1" dirty="0">
+                <a:solidFill>
+                  <a:schemeClr val="bg1"/>
+                </a:solidFill>
+                <a:latin typeface="Courier New" pitchFamily="49" charset="0"/>
+                <a:cs typeface="Courier New" pitchFamily="49" charset="0"/>
+              </a:rPr>
+              <a:t>$  source ~/.bashrc</a:t>
+            </a:r>
+            <a:endParaRPr lang="en-US" b="1" dirty="0">
               <a:solidFill>
                 <a:schemeClr val="bg1"/>
               </a:solidFill>
@@ -10268,48 +10286,12 @@
           </a:p>
         </p:txBody>
       </p:sp>
-      <p:pic>
-        <p:nvPicPr>
-          <p:cNvPr id="6" name="Graphic 5" descr="Thumbs up sign with solid fill">
-            <a:extLst>
-              <a:ext uri="{FF2B5EF4-FFF2-40B4-BE49-F238E27FC236}">
-                <a16:creationId xmlns:a16="http://schemas.microsoft.com/office/drawing/2014/main" id="{8AC9E7C1-BCDB-9C8E-7382-EFB639E5A884}"/>
-              </a:ext>
-            </a:extLst>
-          </p:cNvPr>
-          <p:cNvPicPr>
-            <a:picLocks noChangeAspect="1"/>
-          </p:cNvPicPr>
-          <p:nvPr/>
-        </p:nvPicPr>
-        <p:blipFill>
-          <a:blip r:embed="rId3">
-            <a:extLst>
-              <a:ext uri="{96DAC541-7B7A-43D3-8B79-37D633B846F1}">
-                <asvg:svgBlip xmlns:asvg="http://schemas.microsoft.com/office/drawing/2016/SVG/main" r:embed="rId4"/>
-              </a:ext>
-            </a:extLst>
-          </a:blip>
-          <a:stretch>
-            <a:fillRect/>
-          </a:stretch>
-        </p:blipFill>
-        <p:spPr>
-          <a:xfrm>
-            <a:off x="9644871" y="2578254"/>
-            <a:ext cx="724200" cy="724200"/>
-          </a:xfrm>
-          <a:prstGeom prst="rect">
-            <a:avLst/>
-          </a:prstGeom>
-        </p:spPr>
-      </p:pic>
       <p:sp>
         <p:nvSpPr>
-          <p:cNvPr id="7" name="TextBox 6">
-            <a:extLst>
-              <a:ext uri="{FF2B5EF4-FFF2-40B4-BE49-F238E27FC236}">
-                <a16:creationId xmlns:a16="http://schemas.microsoft.com/office/drawing/2014/main" id="{0B60F4B9-0DC7-9C46-5D2A-B83B61031A04}"/>
+          <p:cNvPr id="11" name="TextBox 10">
+            <a:extLst>
+              <a:ext uri="{FF2B5EF4-FFF2-40B4-BE49-F238E27FC236}">
+                <a16:creationId xmlns:a16="http://schemas.microsoft.com/office/drawing/2014/main" id="{41A70E4F-5973-DA8C-52BF-8065FC80FD81}"/>
               </a:ext>
             </a:extLst>
           </p:cNvPr>
@@ -10318,8 +10300,8 @@
         </p:nvSpPr>
         <p:spPr>
           <a:xfrm>
-            <a:off x="1585644" y="4281390"/>
-            <a:ext cx="7938499" cy="369332"/>
+            <a:off x="1121229" y="3383150"/>
+            <a:ext cx="10874828" cy="369332"/>
           </a:xfrm>
           <a:prstGeom prst="rect">
             <a:avLst/>
@@ -10367,7 +10349,7 @@
                 <a:latin typeface="Courier New" pitchFamily="49" charset="0"/>
                 <a:cs typeface="Courier New" pitchFamily="49" charset="0"/>
               </a:rPr>
-              <a:t> env export  --from-history  &gt;  </a:t>
+              <a:t> create  -n </a:t>
             </a:r>
             <a:r>
               <a:rPr lang="en-US" b="1" dirty="0" err="1">
@@ -10377,107 +10359,47 @@
                 <a:latin typeface="Courier New" pitchFamily="49" charset="0"/>
                 <a:cs typeface="Courier New" pitchFamily="49" charset="0"/>
               </a:rPr>
-              <a:t>environment.yml</a:t>
-            </a:r>
-            <a:endParaRPr lang="en-US" dirty="0">
-              <a:solidFill>
-                <a:schemeClr val="bg1"/>
-              </a:solidFill>
-              <a:latin typeface="Courier New" pitchFamily="49" charset="0"/>
-              <a:cs typeface="Courier New" pitchFamily="49" charset="0"/>
-            </a:endParaRPr>
+              <a:t>my_env</a:t>
+            </a:r>
+            <a:r>
+              <a:rPr lang="en-US" b="1" dirty="0">
+                <a:solidFill>
+                  <a:schemeClr val="bg1"/>
+                </a:solidFill>
+                <a:latin typeface="Courier New" pitchFamily="49" charset="0"/>
+                <a:cs typeface="Courier New" pitchFamily="49" charset="0"/>
+              </a:rPr>
+              <a:t>  </a:t>
+            </a:r>
+            <a:r>
+              <a:rPr lang="en-US" b="1" dirty="0" err="1">
+                <a:solidFill>
+                  <a:schemeClr val="bg1"/>
+                </a:solidFill>
+                <a:latin typeface="Courier New" pitchFamily="49" charset="0"/>
+                <a:cs typeface="Courier New" pitchFamily="49" charset="0"/>
+              </a:rPr>
+              <a:t>numpy</a:t>
+            </a:r>
+            <a:r>
+              <a:rPr lang="en-US" b="1" dirty="0">
+                <a:solidFill>
+                  <a:schemeClr val="bg1"/>
+                </a:solidFill>
+                <a:latin typeface="Courier New" pitchFamily="49" charset="0"/>
+                <a:cs typeface="Courier New" pitchFamily="49" charset="0"/>
+              </a:rPr>
+              <a:t> matplotlib</a:t>
+            </a:r>
           </a:p>
         </p:txBody>
       </p:sp>
-      <p:pic>
-        <p:nvPicPr>
-          <p:cNvPr id="8" name="Graphic 7" descr="Thumbs up sign with solid fill">
-            <a:extLst>
-              <a:ext uri="{FF2B5EF4-FFF2-40B4-BE49-F238E27FC236}">
-                <a16:creationId xmlns:a16="http://schemas.microsoft.com/office/drawing/2014/main" id="{1D398045-43A7-2AA1-18C7-C55F19288CFC}"/>
-              </a:ext>
-            </a:extLst>
-          </p:cNvPr>
-          <p:cNvPicPr>
-            <a:picLocks noChangeAspect="1"/>
-          </p:cNvPicPr>
-          <p:nvPr/>
-        </p:nvPicPr>
-        <p:blipFill>
-          <a:blip r:embed="rId3">
-            <a:extLst>
-              <a:ext uri="{96DAC541-7B7A-43D3-8B79-37D633B846F1}">
-                <asvg:svgBlip xmlns:asvg="http://schemas.microsoft.com/office/drawing/2016/SVG/main" r:embed="rId4"/>
-              </a:ext>
-            </a:extLst>
-          </a:blip>
-          <a:stretch>
-            <a:fillRect/>
-          </a:stretch>
-        </p:blipFill>
-        <p:spPr>
-          <a:xfrm>
-            <a:off x="9644871" y="3687884"/>
-            <a:ext cx="724200" cy="724200"/>
-          </a:xfrm>
-          <a:prstGeom prst="rect">
-            <a:avLst/>
-          </a:prstGeom>
-        </p:spPr>
-      </p:pic>
-      <p:pic>
-        <p:nvPicPr>
-          <p:cNvPr id="10" name="Picture 2" descr="C:\Users\lucg5005\AppData\Local\Microsoft\Windows\Temporary Internet Files\Content.IE5\CWZUAEH4\lgi01a201309290600[1].jpg">
-            <a:extLst>
-              <a:ext uri="{FF2B5EF4-FFF2-40B4-BE49-F238E27FC236}">
-                <a16:creationId xmlns:a16="http://schemas.microsoft.com/office/drawing/2014/main" id="{9EE27DB5-9280-E132-F5DF-4224354B4EB3}"/>
-              </a:ext>
-            </a:extLst>
-          </p:cNvPr>
-          <p:cNvPicPr>
-            <a:picLocks noChangeAspect="1" noChangeArrowheads="1"/>
-          </p:cNvPicPr>
-          <p:nvPr/>
-        </p:nvPicPr>
-        <p:blipFill>
-          <a:blip r:embed="rId5" cstate="print">
-            <a:extLst>
-              <a:ext uri="{28A0092B-C50C-407E-A947-70E740481C1C}">
-                <a14:useLocalDpi xmlns:a14="http://schemas.microsoft.com/office/drawing/2010/main" val="0"/>
-              </a:ext>
-            </a:extLst>
-          </a:blip>
-          <a:srcRect/>
-          <a:stretch>
-            <a:fillRect/>
-          </a:stretch>
-        </p:blipFill>
-        <p:spPr bwMode="auto">
-          <a:xfrm>
-            <a:off x="10437245" y="4869503"/>
-            <a:ext cx="566151" cy="580908"/>
-          </a:xfrm>
-          <a:prstGeom prst="rect">
-            <a:avLst/>
-          </a:prstGeom>
-          <a:noFill/>
-          <a:extLst>
-            <a:ext uri="{909E8E84-426E-40DD-AFC4-6F175D3DCCD1}">
-              <a14:hiddenFill xmlns:a14="http://schemas.microsoft.com/office/drawing/2010/main">
-                <a:solidFill>
-                  <a:srgbClr val="FFFFFF"/>
-                </a:solidFill>
-              </a14:hiddenFill>
-            </a:ext>
-          </a:extLst>
-        </p:spPr>
-      </p:pic>
       <p:sp>
         <p:nvSpPr>
-          <p:cNvPr id="11" name="TextBox 10">
-            <a:extLst>
-              <a:ext uri="{FF2B5EF4-FFF2-40B4-BE49-F238E27FC236}">
-                <a16:creationId xmlns:a16="http://schemas.microsoft.com/office/drawing/2014/main" id="{CD81AE5F-0855-5FB4-03BF-AEFBCD80C180}"/>
+          <p:cNvPr id="12" name="TextBox 11">
+            <a:extLst>
+              <a:ext uri="{FF2B5EF4-FFF2-40B4-BE49-F238E27FC236}">
+                <a16:creationId xmlns:a16="http://schemas.microsoft.com/office/drawing/2014/main" id="{4A63A3C0-7C5A-1520-081C-7199DEB307CF}"/>
               </a:ext>
             </a:extLst>
           </p:cNvPr>
@@ -10486,8 +10408,8 @@
         </p:nvSpPr>
         <p:spPr>
           <a:xfrm>
-            <a:off x="1585645" y="6006789"/>
-            <a:ext cx="7938498" cy="369332"/>
+            <a:off x="1121229" y="4203980"/>
+            <a:ext cx="10874828" cy="369332"/>
           </a:xfrm>
           <a:prstGeom prst="rect">
             <a:avLst/>
@@ -10535,7 +10457,7 @@
                 <a:latin typeface="Courier New" pitchFamily="49" charset="0"/>
                 <a:cs typeface="Courier New" pitchFamily="49" charset="0"/>
               </a:rPr>
-              <a:t> create  -n </a:t>
+              <a:t> activate  </a:t>
             </a:r>
             <a:r>
               <a:rPr lang="en-US" b="1" dirty="0" err="1">
@@ -10547,6 +10469,51 @@
               </a:rPr>
               <a:t>my_env</a:t>
             </a:r>
+            <a:endParaRPr lang="en-US" b="1" dirty="0">
+              <a:solidFill>
+                <a:schemeClr val="bg1"/>
+              </a:solidFill>
+              <a:latin typeface="Courier New" pitchFamily="49" charset="0"/>
+              <a:cs typeface="Courier New" pitchFamily="49" charset="0"/>
+            </a:endParaRPr>
+          </a:p>
+        </p:txBody>
+      </p:sp>
+      <p:sp>
+        <p:nvSpPr>
+          <p:cNvPr id="13" name="TextBox 12">
+            <a:extLst>
+              <a:ext uri="{FF2B5EF4-FFF2-40B4-BE49-F238E27FC236}">
+                <a16:creationId xmlns:a16="http://schemas.microsoft.com/office/drawing/2014/main" id="{3F92C237-E7DE-FFA1-1B9B-44B0C7790F22}"/>
+              </a:ext>
+            </a:extLst>
+          </p:cNvPr>
+          <p:cNvSpPr txBox="1"/>
+          <p:nvPr/>
+        </p:nvSpPr>
+        <p:spPr>
+          <a:xfrm>
+            <a:off x="1121229" y="4994999"/>
+            <a:ext cx="10874828" cy="369332"/>
+          </a:xfrm>
+          <a:prstGeom prst="rect">
+            <a:avLst/>
+          </a:prstGeom>
+          <a:solidFill>
+            <a:schemeClr val="tx1"/>
+          </a:solidFill>
+          <a:ln>
+            <a:solidFill>
+              <a:schemeClr val="tx1"/>
+            </a:solidFill>
+          </a:ln>
+        </p:spPr>
+        <p:txBody>
+          <a:bodyPr wrap="square" rtlCol="0">
+            <a:spAutoFit/>
+          </a:bodyPr>
+          <a:lstStyle/>
+          <a:p>
             <a:r>
               <a:rPr lang="en-US" b="1" dirty="0">
                 <a:solidFill>
@@ -10555,17 +10522,17 @@
                 <a:latin typeface="Courier New" pitchFamily="49" charset="0"/>
                 <a:cs typeface="Courier New" pitchFamily="49" charset="0"/>
               </a:rPr>
-              <a:t>  -c intel  </a:t>
-            </a:r>
-            <a:r>
-              <a:rPr lang="en-US" b="1" dirty="0">
+              <a:t>$  </a:t>
+            </a:r>
+            <a:r>
+              <a:rPr lang="en-US" b="1" dirty="0" err="1">
                 <a:solidFill>
-                  <a:schemeClr val="bg2"/>
+                  <a:schemeClr val="bg1"/>
                 </a:solidFill>
                 <a:latin typeface="Courier New" pitchFamily="49" charset="0"/>
                 <a:cs typeface="Courier New" pitchFamily="49" charset="0"/>
               </a:rPr>
-              <a:t>intelpython3_full</a:t>
+              <a:t>conda</a:t>
             </a:r>
             <a:r>
               <a:rPr lang="en-US" b="1" dirty="0">
@@ -10575,58 +10542,83 @@
                 <a:latin typeface="Courier New" pitchFamily="49" charset="0"/>
                 <a:cs typeface="Courier New" pitchFamily="49" charset="0"/>
               </a:rPr>
-              <a:t> </a:t>
-            </a:r>
-            <a:endParaRPr lang="en-US" dirty="0">
-              <a:solidFill>
-                <a:schemeClr val="bg1"/>
-              </a:solidFill>
-              <a:latin typeface="Courier New" pitchFamily="49" charset="0"/>
-              <a:cs typeface="Courier New" pitchFamily="49" charset="0"/>
-            </a:endParaRPr>
+              <a:t> install  pandas</a:t>
+            </a:r>
           </a:p>
         </p:txBody>
       </p:sp>
-      <p:pic>
-        <p:nvPicPr>
-          <p:cNvPr id="12" name="Graphic 11" descr="Thumbs up sign with solid fill">
-            <a:extLst>
-              <a:ext uri="{FF2B5EF4-FFF2-40B4-BE49-F238E27FC236}">
-                <a16:creationId xmlns:a16="http://schemas.microsoft.com/office/drawing/2014/main" id="{87258E0F-A694-3C20-BAD8-2B7EC8722018}"/>
-              </a:ext>
-            </a:extLst>
-          </p:cNvPr>
-          <p:cNvPicPr>
-            <a:picLocks noChangeAspect="1"/>
-          </p:cNvPicPr>
+      <p:sp>
+        <p:nvSpPr>
+          <p:cNvPr id="14" name="TextBox 13">
+            <a:extLst>
+              <a:ext uri="{FF2B5EF4-FFF2-40B4-BE49-F238E27FC236}">
+                <a16:creationId xmlns:a16="http://schemas.microsoft.com/office/drawing/2014/main" id="{AE2FAF92-1A55-CF4B-81F7-19E1DEE82D56}"/>
+              </a:ext>
+            </a:extLst>
+          </p:cNvPr>
+          <p:cNvSpPr txBox="1"/>
           <p:nvPr/>
-        </p:nvPicPr>
-        <p:blipFill>
-          <a:blip r:embed="rId3">
-            <a:extLst>
-              <a:ext uri="{96DAC541-7B7A-43D3-8B79-37D633B846F1}">
-                <asvg:svgBlip xmlns:asvg="http://schemas.microsoft.com/office/drawing/2016/SVG/main" r:embed="rId4"/>
-              </a:ext>
-            </a:extLst>
-          </a:blip>
-          <a:stretch>
-            <a:fillRect/>
-          </a:stretch>
-        </p:blipFill>
+        </p:nvSpPr>
         <p:spPr>
           <a:xfrm>
-            <a:off x="9644871" y="5949800"/>
-            <a:ext cx="724200" cy="724200"/>
+            <a:off x="1121229" y="5848714"/>
+            <a:ext cx="10874828" cy="369332"/>
           </a:xfrm>
           <a:prstGeom prst="rect">
             <a:avLst/>
           </a:prstGeom>
+          <a:solidFill>
+            <a:schemeClr val="tx1"/>
+          </a:solidFill>
+          <a:ln>
+            <a:solidFill>
+              <a:schemeClr val="tx1"/>
+            </a:solidFill>
+          </a:ln>
         </p:spPr>
-      </p:pic>
+        <p:txBody>
+          <a:bodyPr wrap="square" rtlCol="0">
+            <a:spAutoFit/>
+          </a:bodyPr>
+          <a:lstStyle/>
+          <a:p>
+            <a:r>
+              <a:rPr lang="en-US" b="1" dirty="0">
+                <a:solidFill>
+                  <a:schemeClr val="bg1"/>
+                </a:solidFill>
+                <a:latin typeface="Courier New" pitchFamily="49" charset="0"/>
+                <a:cs typeface="Courier New" pitchFamily="49" charset="0"/>
+              </a:rPr>
+              <a:t>$  </a:t>
+            </a:r>
+            <a:r>
+              <a:rPr lang="en-US" b="1" dirty="0" err="1">
+                <a:solidFill>
+                  <a:schemeClr val="bg1"/>
+                </a:solidFill>
+                <a:latin typeface="Courier New" pitchFamily="49" charset="0"/>
+                <a:cs typeface="Courier New" pitchFamily="49" charset="0"/>
+              </a:rPr>
+              <a:t>conda</a:t>
+            </a:r>
+            <a:r>
+              <a:rPr lang="en-US" b="1" dirty="0">
+                <a:solidFill>
+                  <a:schemeClr val="bg1"/>
+                </a:solidFill>
+                <a:latin typeface="Courier New" pitchFamily="49" charset="0"/>
+                <a:cs typeface="Courier New" pitchFamily="49" charset="0"/>
+              </a:rPr>
+              <a:t> update  --all</a:t>
+            </a:r>
+          </a:p>
+        </p:txBody>
+      </p:sp>
     </p:spTree>
     <p:extLst>
       <p:ext uri="{BB962C8B-B14F-4D97-AF65-F5344CB8AC3E}">
-        <p14:creationId xmlns:p14="http://schemas.microsoft.com/office/powerpoint/2010/main" val="367057393"/>
+        <p14:creationId xmlns:p14="http://schemas.microsoft.com/office/powerpoint/2010/main" val="398758717"/>
       </p:ext>
     </p:extLst>
   </p:cSld>
@@ -10697,7 +10689,7 @@
                                           </p:stCondLst>
                                         </p:cTn>
                                         <p:tgtEl>
-                                          <p:spTgt spid="7"/>
+                                          <p:spTgt spid="11"/>
                                         </p:tgtEl>
                                         <p:attrNameLst>
                                           <p:attrName>style.visibility</p:attrName>
@@ -10711,7 +10703,7 @@
                                 </p:cTn>
                               </p:par>
                               <p:par>
-                                <p:cTn id="9" presetID="1" presetClass="entr" presetSubtype="0" fill="hold" nodeType="withEffect">
+                                <p:cTn id="9" presetID="1" presetClass="entr" presetSubtype="0" fill="hold" grpId="0" nodeType="withEffect">
                                   <p:stCondLst>
                                     <p:cond delay="0"/>
                                   </p:stCondLst>
@@ -10724,7 +10716,7 @@
                                           </p:stCondLst>
                                         </p:cTn>
                                         <p:tgtEl>
-                                          <p:spTgt spid="10"/>
+                                          <p:spTgt spid="12"/>
                                         </p:tgtEl>
                                         <p:attrNameLst>
                                           <p:attrName>style.visibility</p:attrName>
@@ -10751,7 +10743,34 @@
                                           </p:stCondLst>
                                         </p:cTn>
                                         <p:tgtEl>
-                                          <p:spTgt spid="11"/>
+                                          <p:spTgt spid="13"/>
+                                        </p:tgtEl>
+                                        <p:attrNameLst>
+                                          <p:attrName>style.visibility</p:attrName>
+                                        </p:attrNameLst>
+                                      </p:cBhvr>
+                                      <p:to>
+                                        <p:strVal val="visible"/>
+                                      </p:to>
+                                    </p:set>
+                                  </p:childTnLst>
+                                </p:cTn>
+                              </p:par>
+                              <p:par>
+                                <p:cTn id="13" presetID="1" presetClass="entr" presetSubtype="0" fill="hold" grpId="0" nodeType="withEffect">
+                                  <p:stCondLst>
+                                    <p:cond delay="0"/>
+                                  </p:stCondLst>
+                                  <p:childTnLst>
+                                    <p:set>
+                                      <p:cBhvr>
+                                        <p:cTn id="14" dur="1" fill="hold">
+                                          <p:stCondLst>
+                                            <p:cond delay="0"/>
+                                          </p:stCondLst>
+                                        </p:cTn>
+                                        <p:tgtEl>
+                                          <p:spTgt spid="14"/>
                                         </p:tgtEl>
                                         <p:attrNameLst>
                                           <p:attrName>style.visibility</p:attrName>
@@ -10793,8 +10812,10 @@
     </p:tnLst>
     <p:bldLst>
       <p:bldP spid="5" grpId="0" animBg="1"/>
-      <p:bldP spid="7" grpId="0" animBg="1"/>
       <p:bldP spid="11" grpId="0" animBg="1"/>
+      <p:bldP spid="12" grpId="0" animBg="1"/>
+      <p:bldP spid="13" grpId="0" animBg="1"/>
+      <p:bldP spid="14" grpId="0" animBg="1"/>
     </p:bldLst>
   </p:timing>
 </p:sld>
@@ -11374,7 +11395,7 @@
           <p:cNvPr id="2" name="Title 1">
             <a:extLst>
               <a:ext uri="{FF2B5EF4-FFF2-40B4-BE49-F238E27FC236}">
-                <a16:creationId xmlns:a16="http://schemas.microsoft.com/office/drawing/2014/main" id="{3F1773C8-46D8-90E7-B5E9-62D504C449E9}"/>
+                <a16:creationId xmlns:a16="http://schemas.microsoft.com/office/drawing/2014/main" id="{45CED853-DFDF-BC51-50DF-3D49D1CA23DA}"/>
               </a:ext>
             </a:extLst>
           </p:cNvPr>
@@ -11392,7 +11413,7 @@
           <a:p>
             <a:r>
               <a:rPr lang="en-US" dirty="0"/>
-              <a:t>R environments</a:t>
+              <a:t>Conda</a:t>
             </a:r>
             <a:endParaRPr lang="LID4096" dirty="0"/>
           </a:p>
@@ -11400,10 +11421,10 @@
       </p:sp>
       <p:sp>
         <p:nvSpPr>
-          <p:cNvPr id="3" name="Text Placeholder 2">
-            <a:extLst>
-              <a:ext uri="{FF2B5EF4-FFF2-40B4-BE49-F238E27FC236}">
-                <a16:creationId xmlns:a16="http://schemas.microsoft.com/office/drawing/2014/main" id="{82F0E4CA-5BB6-1598-DD80-47CD7BC0EF0D}"/>
+          <p:cNvPr id="3" name="Content Placeholder 2">
+            <a:extLst>
+              <a:ext uri="{FF2B5EF4-FFF2-40B4-BE49-F238E27FC236}">
+                <a16:creationId xmlns:a16="http://schemas.microsoft.com/office/drawing/2014/main" id="{8FF9386A-C977-D456-C782-86154FC4D825}"/>
               </a:ext>
             </a:extLst>
           </p:cNvPr>
@@ -11411,15 +11432,116 @@
             <a:spLocks noGrp="1"/>
           </p:cNvSpPr>
           <p:nvPr>
-            <p:ph type="body" idx="1"/>
+            <p:ph idx="1"/>
           </p:nvPr>
         </p:nvSpPr>
         <p:spPr/>
         <p:txBody>
-          <a:bodyPr/>
+          <a:bodyPr>
+            <a:normAutofit lnSpcReduction="10000"/>
+          </a:bodyPr>
           <a:lstStyle/>
           <a:p>
-            <a:endParaRPr lang="LID4096"/>
+            <a:r>
+              <a:rPr lang="en-US" dirty="0"/>
+              <a:t>Best practices</a:t>
+            </a:r>
+          </a:p>
+          <a:p>
+            <a:pPr lvl="1"/>
+            <a:r>
+              <a:rPr lang="en-US" dirty="0"/>
+              <a:t>Lean, single purpose environments</a:t>
+            </a:r>
+          </a:p>
+          <a:p>
+            <a:pPr lvl="1"/>
+            <a:r>
+              <a:rPr lang="en-US" dirty="0"/>
+              <a:t>Keep under version control: </a:t>
+            </a:r>
+            <a:r>
+              <a:rPr lang="en-US" i="1" dirty="0">
+                <a:solidFill>
+                  <a:srgbClr val="00B050"/>
+                </a:solidFill>
+              </a:rPr>
+              <a:t>reproducible</a:t>
+            </a:r>
+            <a:endParaRPr lang="en-US" i="1" dirty="0"/>
+          </a:p>
+          <a:p>
+            <a:pPr lvl="1"/>
+            <a:endParaRPr lang="en-US" i="1" dirty="0"/>
+          </a:p>
+          <a:p>
+            <a:pPr lvl="1"/>
+            <a:endParaRPr lang="en-US" i="1" dirty="0"/>
+          </a:p>
+          <a:p>
+            <a:pPr lvl="1"/>
+            <a:r>
+              <a:rPr lang="en-US" dirty="0"/>
+              <a:t>Keep laptop and HPC in sync: </a:t>
+            </a:r>
+            <a:r>
+              <a:rPr lang="en-US" i="1" dirty="0">
+                <a:solidFill>
+                  <a:srgbClr val="00B050"/>
+                </a:solidFill>
+              </a:rPr>
+              <a:t>portability</a:t>
+            </a:r>
+            <a:endParaRPr lang="en-US" dirty="0"/>
+          </a:p>
+          <a:p>
+            <a:pPr lvl="1"/>
+            <a:endParaRPr lang="en-US" dirty="0"/>
+          </a:p>
+          <a:p>
+            <a:pPr lvl="1"/>
+            <a:endParaRPr lang="en-US" dirty="0"/>
+          </a:p>
+          <a:p>
+            <a:r>
+              <a:rPr lang="en-US" dirty="0"/>
+              <a:t>Pitfall: installation directory, see documentation</a:t>
+            </a:r>
+            <a:br>
+              <a:rPr lang="en-US" dirty="0"/>
+            </a:br>
+            <a:r>
+              <a:rPr lang="en-US" sz="2000" dirty="0">
+                <a:hlinkClick r:id="rId2"/>
+              </a:rPr>
+              <a:t>https://docs.vscentrum.be/compute/software/python_package_management.html</a:t>
+            </a:r>
+            <a:endParaRPr lang="en-US" sz="2000" dirty="0"/>
+          </a:p>
+          <a:p>
+            <a:r>
+              <a:rPr lang="en-US" dirty="0"/>
+              <a:t>For performance on CPU, use Intel </a:t>
+            </a:r>
+            <a:r>
+              <a:rPr lang="en-US" dirty="0" err="1"/>
+              <a:t>OneAPI</a:t>
+            </a:r>
+            <a:r>
+              <a:rPr lang="en-US" dirty="0"/>
+              <a:t> distribution</a:t>
+            </a:r>
+            <a:r>
+              <a:rPr lang="en-US" sz="2000" dirty="0"/>
+              <a:t> </a:t>
+            </a:r>
+          </a:p>
+          <a:p>
+            <a:endParaRPr lang="en-US" i="1" dirty="0">
+              <a:solidFill>
+                <a:srgbClr val="00B050"/>
+              </a:solidFill>
+            </a:endParaRPr>
           </a:p>
         </p:txBody>
       </p:sp>
@@ -11428,7 +11550,7 @@
           <p:cNvPr id="4" name="Slide Number Placeholder 3">
             <a:extLst>
               <a:ext uri="{FF2B5EF4-FFF2-40B4-BE49-F238E27FC236}">
-                <a16:creationId xmlns:a16="http://schemas.microsoft.com/office/drawing/2014/main" id="{A0E158CA-C57F-993F-F8C2-17C8EAEE81CB}"/>
+                <a16:creationId xmlns:a16="http://schemas.microsoft.com/office/drawing/2014/main" id="{A38D5F06-910B-6523-67A4-F713CB9C6F36}"/>
               </a:ext>
             </a:extLst>
           </p:cNvPr>
@@ -11452,16 +11574,610 @@
           </a:p>
         </p:txBody>
       </p:sp>
+      <p:sp>
+        <p:nvSpPr>
+          <p:cNvPr id="5" name="TextBox 4">
+            <a:extLst>
+              <a:ext uri="{FF2B5EF4-FFF2-40B4-BE49-F238E27FC236}">
+                <a16:creationId xmlns:a16="http://schemas.microsoft.com/office/drawing/2014/main" id="{4A96AB11-9ECF-D5E6-6532-B07AB9001B2D}"/>
+              </a:ext>
+            </a:extLst>
+          </p:cNvPr>
+          <p:cNvSpPr txBox="1"/>
+          <p:nvPr/>
+        </p:nvSpPr>
+        <p:spPr>
+          <a:xfrm>
+            <a:off x="1585645" y="3054970"/>
+            <a:ext cx="7938498" cy="369332"/>
+          </a:xfrm>
+          <a:prstGeom prst="rect">
+            <a:avLst/>
+          </a:prstGeom>
+          <a:solidFill>
+            <a:schemeClr val="tx1"/>
+          </a:solidFill>
+          <a:ln>
+            <a:solidFill>
+              <a:schemeClr val="tx1"/>
+            </a:solidFill>
+          </a:ln>
+        </p:spPr>
+        <p:txBody>
+          <a:bodyPr wrap="square" rtlCol="0">
+            <a:spAutoFit/>
+          </a:bodyPr>
+          <a:lstStyle/>
+          <a:p>
+            <a:r>
+              <a:rPr lang="en-US" b="1" dirty="0">
+                <a:solidFill>
+                  <a:schemeClr val="bg1"/>
+                </a:solidFill>
+                <a:latin typeface="Courier New" pitchFamily="49" charset="0"/>
+                <a:cs typeface="Courier New" pitchFamily="49" charset="0"/>
+              </a:rPr>
+              <a:t>$  </a:t>
+            </a:r>
+            <a:r>
+              <a:rPr lang="en-US" b="1" dirty="0" err="1">
+                <a:solidFill>
+                  <a:schemeClr val="bg1"/>
+                </a:solidFill>
+                <a:latin typeface="Courier New" pitchFamily="49" charset="0"/>
+                <a:cs typeface="Courier New" pitchFamily="49" charset="0"/>
+              </a:rPr>
+              <a:t>conda</a:t>
+            </a:r>
+            <a:r>
+              <a:rPr lang="en-US" b="1" dirty="0">
+                <a:solidFill>
+                  <a:schemeClr val="bg1"/>
+                </a:solidFill>
+                <a:latin typeface="Courier New" pitchFamily="49" charset="0"/>
+                <a:cs typeface="Courier New" pitchFamily="49" charset="0"/>
+              </a:rPr>
+              <a:t> list  --explicit  &gt;  environment_spec.txt</a:t>
+            </a:r>
+            <a:endParaRPr lang="en-US" dirty="0">
+              <a:solidFill>
+                <a:schemeClr val="bg1"/>
+              </a:solidFill>
+              <a:latin typeface="Courier New" pitchFamily="49" charset="0"/>
+              <a:cs typeface="Courier New" pitchFamily="49" charset="0"/>
+            </a:endParaRPr>
+          </a:p>
+        </p:txBody>
+      </p:sp>
+      <p:pic>
+        <p:nvPicPr>
+          <p:cNvPr id="6" name="Graphic 5" descr="Thumbs up sign with solid fill">
+            <a:extLst>
+              <a:ext uri="{FF2B5EF4-FFF2-40B4-BE49-F238E27FC236}">
+                <a16:creationId xmlns:a16="http://schemas.microsoft.com/office/drawing/2014/main" id="{8AC9E7C1-BCDB-9C8E-7382-EFB639E5A884}"/>
+              </a:ext>
+            </a:extLst>
+          </p:cNvPr>
+          <p:cNvPicPr>
+            <a:picLocks noChangeAspect="1"/>
+          </p:cNvPicPr>
+          <p:nvPr/>
+        </p:nvPicPr>
+        <p:blipFill>
+          <a:blip r:embed="rId3">
+            <a:extLst>
+              <a:ext uri="{96DAC541-7B7A-43D3-8B79-37D633B846F1}">
+                <asvg:svgBlip xmlns:asvg="http://schemas.microsoft.com/office/drawing/2016/SVG/main" r:embed="rId4"/>
+              </a:ext>
+            </a:extLst>
+          </a:blip>
+          <a:stretch>
+            <a:fillRect/>
+          </a:stretch>
+        </p:blipFill>
+        <p:spPr>
+          <a:xfrm>
+            <a:off x="9644871" y="2578254"/>
+            <a:ext cx="724200" cy="724200"/>
+          </a:xfrm>
+          <a:prstGeom prst="rect">
+            <a:avLst/>
+          </a:prstGeom>
+        </p:spPr>
+      </p:pic>
+      <p:sp>
+        <p:nvSpPr>
+          <p:cNvPr id="7" name="TextBox 6">
+            <a:extLst>
+              <a:ext uri="{FF2B5EF4-FFF2-40B4-BE49-F238E27FC236}">
+                <a16:creationId xmlns:a16="http://schemas.microsoft.com/office/drawing/2014/main" id="{0B60F4B9-0DC7-9C46-5D2A-B83B61031A04}"/>
+              </a:ext>
+            </a:extLst>
+          </p:cNvPr>
+          <p:cNvSpPr txBox="1"/>
+          <p:nvPr/>
+        </p:nvSpPr>
+        <p:spPr>
+          <a:xfrm>
+            <a:off x="1585644" y="4107216"/>
+            <a:ext cx="7938499" cy="369332"/>
+          </a:xfrm>
+          <a:prstGeom prst="rect">
+            <a:avLst/>
+          </a:prstGeom>
+          <a:solidFill>
+            <a:schemeClr val="tx1"/>
+          </a:solidFill>
+          <a:ln>
+            <a:solidFill>
+              <a:schemeClr val="tx1"/>
+            </a:solidFill>
+          </a:ln>
+        </p:spPr>
+        <p:txBody>
+          <a:bodyPr wrap="square" rtlCol="0">
+            <a:spAutoFit/>
+          </a:bodyPr>
+          <a:lstStyle/>
+          <a:p>
+            <a:r>
+              <a:rPr lang="en-US" b="1" dirty="0">
+                <a:solidFill>
+                  <a:schemeClr val="bg1"/>
+                </a:solidFill>
+                <a:latin typeface="Courier New" pitchFamily="49" charset="0"/>
+                <a:cs typeface="Courier New" pitchFamily="49" charset="0"/>
+              </a:rPr>
+              <a:t>$  </a:t>
+            </a:r>
+            <a:r>
+              <a:rPr lang="en-US" b="1" dirty="0" err="1">
+                <a:solidFill>
+                  <a:schemeClr val="bg1"/>
+                </a:solidFill>
+                <a:latin typeface="Courier New" pitchFamily="49" charset="0"/>
+                <a:cs typeface="Courier New" pitchFamily="49" charset="0"/>
+              </a:rPr>
+              <a:t>conda</a:t>
+            </a:r>
+            <a:r>
+              <a:rPr lang="en-US" b="1" dirty="0">
+                <a:solidFill>
+                  <a:schemeClr val="bg1"/>
+                </a:solidFill>
+                <a:latin typeface="Courier New" pitchFamily="49" charset="0"/>
+                <a:cs typeface="Courier New" pitchFamily="49" charset="0"/>
+              </a:rPr>
+              <a:t> env export  --from-history  &gt;  </a:t>
+            </a:r>
+            <a:r>
+              <a:rPr lang="en-US" b="1" dirty="0" err="1">
+                <a:solidFill>
+                  <a:schemeClr val="bg1"/>
+                </a:solidFill>
+                <a:latin typeface="Courier New" pitchFamily="49" charset="0"/>
+                <a:cs typeface="Courier New" pitchFamily="49" charset="0"/>
+              </a:rPr>
+              <a:t>environment.yml</a:t>
+            </a:r>
+            <a:endParaRPr lang="en-US" dirty="0">
+              <a:solidFill>
+                <a:schemeClr val="bg1"/>
+              </a:solidFill>
+              <a:latin typeface="Courier New" pitchFamily="49" charset="0"/>
+              <a:cs typeface="Courier New" pitchFamily="49" charset="0"/>
+            </a:endParaRPr>
+          </a:p>
+        </p:txBody>
+      </p:sp>
+      <p:pic>
+        <p:nvPicPr>
+          <p:cNvPr id="8" name="Graphic 7" descr="Thumbs up sign with solid fill">
+            <a:extLst>
+              <a:ext uri="{FF2B5EF4-FFF2-40B4-BE49-F238E27FC236}">
+                <a16:creationId xmlns:a16="http://schemas.microsoft.com/office/drawing/2014/main" id="{1D398045-43A7-2AA1-18C7-C55F19288CFC}"/>
+              </a:ext>
+            </a:extLst>
+          </p:cNvPr>
+          <p:cNvPicPr>
+            <a:picLocks noChangeAspect="1"/>
+          </p:cNvPicPr>
+          <p:nvPr/>
+        </p:nvPicPr>
+        <p:blipFill>
+          <a:blip r:embed="rId3">
+            <a:extLst>
+              <a:ext uri="{96DAC541-7B7A-43D3-8B79-37D633B846F1}">
+                <asvg:svgBlip xmlns:asvg="http://schemas.microsoft.com/office/drawing/2016/SVG/main" r:embed="rId4"/>
+              </a:ext>
+            </a:extLst>
+          </a:blip>
+          <a:stretch>
+            <a:fillRect/>
+          </a:stretch>
+        </p:blipFill>
+        <p:spPr>
+          <a:xfrm>
+            <a:off x="9644871" y="3687884"/>
+            <a:ext cx="724200" cy="724200"/>
+          </a:xfrm>
+          <a:prstGeom prst="rect">
+            <a:avLst/>
+          </a:prstGeom>
+        </p:spPr>
+      </p:pic>
+      <p:pic>
+        <p:nvPicPr>
+          <p:cNvPr id="10" name="Picture 2" descr="C:\Users\lucg5005\AppData\Local\Microsoft\Windows\Temporary Internet Files\Content.IE5\CWZUAEH4\lgi01a201309290600[1].jpg">
+            <a:extLst>
+              <a:ext uri="{FF2B5EF4-FFF2-40B4-BE49-F238E27FC236}">
+                <a16:creationId xmlns:a16="http://schemas.microsoft.com/office/drawing/2014/main" id="{9EE27DB5-9280-E132-F5DF-4224354B4EB3}"/>
+              </a:ext>
+            </a:extLst>
+          </p:cNvPr>
+          <p:cNvPicPr>
+            <a:picLocks noChangeAspect="1" noChangeArrowheads="1"/>
+          </p:cNvPicPr>
+          <p:nvPr/>
+        </p:nvPicPr>
+        <p:blipFill>
+          <a:blip r:embed="rId5" cstate="print">
+            <a:extLst>
+              <a:ext uri="{28A0092B-C50C-407E-A947-70E740481C1C}">
+                <a14:useLocalDpi xmlns:a14="http://schemas.microsoft.com/office/drawing/2010/main" val="0"/>
+              </a:ext>
+            </a:extLst>
+          </a:blip>
+          <a:srcRect/>
+          <a:stretch>
+            <a:fillRect/>
+          </a:stretch>
+        </p:blipFill>
+        <p:spPr bwMode="auto">
+          <a:xfrm>
+            <a:off x="10437245" y="4869503"/>
+            <a:ext cx="566151" cy="580908"/>
+          </a:xfrm>
+          <a:prstGeom prst="rect">
+            <a:avLst/>
+          </a:prstGeom>
+          <a:noFill/>
+          <a:extLst>
+            <a:ext uri="{909E8E84-426E-40DD-AFC4-6F175D3DCCD1}">
+              <a14:hiddenFill xmlns:a14="http://schemas.microsoft.com/office/drawing/2010/main">
+                <a:solidFill>
+                  <a:srgbClr val="FFFFFF"/>
+                </a:solidFill>
+              </a14:hiddenFill>
+            </a:ext>
+          </a:extLst>
+        </p:spPr>
+      </p:pic>
+      <p:sp>
+        <p:nvSpPr>
+          <p:cNvPr id="11" name="TextBox 10">
+            <a:extLst>
+              <a:ext uri="{FF2B5EF4-FFF2-40B4-BE49-F238E27FC236}">
+                <a16:creationId xmlns:a16="http://schemas.microsoft.com/office/drawing/2014/main" id="{CD81AE5F-0855-5FB4-03BF-AEFBCD80C180}"/>
+              </a:ext>
+            </a:extLst>
+          </p:cNvPr>
+          <p:cNvSpPr txBox="1"/>
+          <p:nvPr/>
+        </p:nvSpPr>
+        <p:spPr>
+          <a:xfrm>
+            <a:off x="1585645" y="6006789"/>
+            <a:ext cx="7938498" cy="369332"/>
+          </a:xfrm>
+          <a:prstGeom prst="rect">
+            <a:avLst/>
+          </a:prstGeom>
+          <a:solidFill>
+            <a:schemeClr val="tx1"/>
+          </a:solidFill>
+          <a:ln>
+            <a:solidFill>
+              <a:schemeClr val="tx1"/>
+            </a:solidFill>
+          </a:ln>
+        </p:spPr>
+        <p:txBody>
+          <a:bodyPr wrap="square" rtlCol="0">
+            <a:spAutoFit/>
+          </a:bodyPr>
+          <a:lstStyle/>
+          <a:p>
+            <a:r>
+              <a:rPr lang="en-US" b="1" dirty="0">
+                <a:solidFill>
+                  <a:schemeClr val="bg1"/>
+                </a:solidFill>
+                <a:latin typeface="Courier New" pitchFamily="49" charset="0"/>
+                <a:cs typeface="Courier New" pitchFamily="49" charset="0"/>
+              </a:rPr>
+              <a:t>$  </a:t>
+            </a:r>
+            <a:r>
+              <a:rPr lang="en-US" b="1" dirty="0" err="1">
+                <a:solidFill>
+                  <a:schemeClr val="bg1"/>
+                </a:solidFill>
+                <a:latin typeface="Courier New" pitchFamily="49" charset="0"/>
+                <a:cs typeface="Courier New" pitchFamily="49" charset="0"/>
+              </a:rPr>
+              <a:t>conda</a:t>
+            </a:r>
+            <a:r>
+              <a:rPr lang="en-US" b="1" dirty="0">
+                <a:solidFill>
+                  <a:schemeClr val="bg1"/>
+                </a:solidFill>
+                <a:latin typeface="Courier New" pitchFamily="49" charset="0"/>
+                <a:cs typeface="Courier New" pitchFamily="49" charset="0"/>
+              </a:rPr>
+              <a:t> create  -n </a:t>
+            </a:r>
+            <a:r>
+              <a:rPr lang="en-US" b="1" dirty="0" err="1">
+                <a:solidFill>
+                  <a:schemeClr val="bg1"/>
+                </a:solidFill>
+                <a:latin typeface="Courier New" pitchFamily="49" charset="0"/>
+                <a:cs typeface="Courier New" pitchFamily="49" charset="0"/>
+              </a:rPr>
+              <a:t>my_env</a:t>
+            </a:r>
+            <a:r>
+              <a:rPr lang="en-US" b="1" dirty="0">
+                <a:solidFill>
+                  <a:schemeClr val="bg1"/>
+                </a:solidFill>
+                <a:latin typeface="Courier New" pitchFamily="49" charset="0"/>
+                <a:cs typeface="Courier New" pitchFamily="49" charset="0"/>
+              </a:rPr>
+              <a:t>  -c intel  </a:t>
+            </a:r>
+            <a:r>
+              <a:rPr lang="en-US" b="1" dirty="0">
+                <a:solidFill>
+                  <a:schemeClr val="bg2"/>
+                </a:solidFill>
+                <a:latin typeface="Courier New" pitchFamily="49" charset="0"/>
+                <a:cs typeface="Courier New" pitchFamily="49" charset="0"/>
+              </a:rPr>
+              <a:t>intelpython3_full</a:t>
+            </a:r>
+            <a:r>
+              <a:rPr lang="en-US" b="1" dirty="0">
+                <a:solidFill>
+                  <a:schemeClr val="bg1"/>
+                </a:solidFill>
+                <a:latin typeface="Courier New" pitchFamily="49" charset="0"/>
+                <a:cs typeface="Courier New" pitchFamily="49" charset="0"/>
+              </a:rPr>
+              <a:t> </a:t>
+            </a:r>
+            <a:endParaRPr lang="en-US" dirty="0">
+              <a:solidFill>
+                <a:schemeClr val="bg1"/>
+              </a:solidFill>
+              <a:latin typeface="Courier New" pitchFamily="49" charset="0"/>
+              <a:cs typeface="Courier New" pitchFamily="49" charset="0"/>
+            </a:endParaRPr>
+          </a:p>
+        </p:txBody>
+      </p:sp>
+      <p:pic>
+        <p:nvPicPr>
+          <p:cNvPr id="12" name="Graphic 11" descr="Thumbs up sign with solid fill">
+            <a:extLst>
+              <a:ext uri="{FF2B5EF4-FFF2-40B4-BE49-F238E27FC236}">
+                <a16:creationId xmlns:a16="http://schemas.microsoft.com/office/drawing/2014/main" id="{87258E0F-A694-3C20-BAD8-2B7EC8722018}"/>
+              </a:ext>
+            </a:extLst>
+          </p:cNvPr>
+          <p:cNvPicPr>
+            <a:picLocks noChangeAspect="1"/>
+          </p:cNvPicPr>
+          <p:nvPr/>
+        </p:nvPicPr>
+        <p:blipFill>
+          <a:blip r:embed="rId3">
+            <a:extLst>
+              <a:ext uri="{96DAC541-7B7A-43D3-8B79-37D633B846F1}">
+                <asvg:svgBlip xmlns:asvg="http://schemas.microsoft.com/office/drawing/2016/SVG/main" r:embed="rId4"/>
+              </a:ext>
+            </a:extLst>
+          </a:blip>
+          <a:stretch>
+            <a:fillRect/>
+          </a:stretch>
+        </p:blipFill>
+        <p:spPr>
+          <a:xfrm>
+            <a:off x="9644871" y="5949800"/>
+            <a:ext cx="724200" cy="724200"/>
+          </a:xfrm>
+          <a:prstGeom prst="rect">
+            <a:avLst/>
+          </a:prstGeom>
+        </p:spPr>
+      </p:pic>
     </p:spTree>
     <p:extLst>
       <p:ext uri="{BB962C8B-B14F-4D97-AF65-F5344CB8AC3E}">
-        <p14:creationId xmlns:p14="http://schemas.microsoft.com/office/powerpoint/2010/main" val="4179265587"/>
+        <p14:creationId xmlns:p14="http://schemas.microsoft.com/office/powerpoint/2010/main" val="367057393"/>
       </p:ext>
     </p:extLst>
   </p:cSld>
   <p:clrMapOvr>
     <a:masterClrMapping/>
   </p:clrMapOvr>
+  <p:timing>
+    <p:tnLst>
+      <p:par>
+        <p:cTn id="1" dur="indefinite" restart="never" nodeType="tmRoot">
+          <p:childTnLst>
+            <p:seq concurrent="1" nextAc="seek">
+              <p:cTn id="2" dur="indefinite" nodeType="mainSeq">
+                <p:childTnLst>
+                  <p:par>
+                    <p:cTn id="3" fill="hold">
+                      <p:stCondLst>
+                        <p:cond delay="indefinite"/>
+                        <p:cond evt="onBegin" delay="0">
+                          <p:tn val="2"/>
+                        </p:cond>
+                      </p:stCondLst>
+                      <p:childTnLst>
+                        <p:par>
+                          <p:cTn id="4" fill="hold">
+                            <p:stCondLst>
+                              <p:cond delay="0"/>
+                            </p:stCondLst>
+                            <p:childTnLst>
+                              <p:par>
+                                <p:cTn id="5" presetID="1" presetClass="entr" presetSubtype="0" fill="hold" grpId="0" nodeType="withEffect">
+                                  <p:stCondLst>
+                                    <p:cond delay="0"/>
+                                  </p:stCondLst>
+                                  <p:childTnLst>
+                                    <p:set>
+                                      <p:cBhvr>
+                                        <p:cTn id="6" dur="1" fill="hold">
+                                          <p:stCondLst>
+                                            <p:cond delay="0"/>
+                                          </p:stCondLst>
+                                        </p:cTn>
+                                        <p:tgtEl>
+                                          <p:spTgt spid="5"/>
+                                        </p:tgtEl>
+                                        <p:attrNameLst>
+                                          <p:attrName>style.visibility</p:attrName>
+                                        </p:attrNameLst>
+                                      </p:cBhvr>
+                                      <p:to>
+                                        <p:strVal val="visible"/>
+                                      </p:to>
+                                    </p:set>
+                                  </p:childTnLst>
+                                </p:cTn>
+                              </p:par>
+                              <p:par>
+                                <p:cTn id="7" presetID="1" presetClass="entr" presetSubtype="0" fill="hold" grpId="0" nodeType="withEffect">
+                                  <p:stCondLst>
+                                    <p:cond delay="0"/>
+                                  </p:stCondLst>
+                                  <p:childTnLst>
+                                    <p:set>
+                                      <p:cBhvr>
+                                        <p:cTn id="8" dur="1" fill="hold">
+                                          <p:stCondLst>
+                                            <p:cond delay="0"/>
+                                          </p:stCondLst>
+                                        </p:cTn>
+                                        <p:tgtEl>
+                                          <p:spTgt spid="7"/>
+                                        </p:tgtEl>
+                                        <p:attrNameLst>
+                                          <p:attrName>style.visibility</p:attrName>
+                                        </p:attrNameLst>
+                                      </p:cBhvr>
+                                      <p:to>
+                                        <p:strVal val="visible"/>
+                                      </p:to>
+                                    </p:set>
+                                  </p:childTnLst>
+                                </p:cTn>
+                              </p:par>
+                              <p:par>
+                                <p:cTn id="9" presetID="1" presetClass="entr" presetSubtype="0" fill="hold" nodeType="withEffect">
+                                  <p:stCondLst>
+                                    <p:cond delay="0"/>
+                                  </p:stCondLst>
+                                  <p:childTnLst>
+                                    <p:set>
+                                      <p:cBhvr>
+                                        <p:cTn id="10" dur="1" fill="hold">
+                                          <p:stCondLst>
+                                            <p:cond delay="0"/>
+                                          </p:stCondLst>
+                                        </p:cTn>
+                                        <p:tgtEl>
+                                          <p:spTgt spid="10"/>
+                                        </p:tgtEl>
+                                        <p:attrNameLst>
+                                          <p:attrName>style.visibility</p:attrName>
+                                        </p:attrNameLst>
+                                      </p:cBhvr>
+                                      <p:to>
+                                        <p:strVal val="visible"/>
+                                      </p:to>
+                                    </p:set>
+                                  </p:childTnLst>
+                                </p:cTn>
+                              </p:par>
+                              <p:par>
+                                <p:cTn id="11" presetID="1" presetClass="entr" presetSubtype="0" fill="hold" grpId="0" nodeType="withEffect">
+                                  <p:stCondLst>
+                                    <p:cond delay="0"/>
+                                  </p:stCondLst>
+                                  <p:childTnLst>
+                                    <p:set>
+                                      <p:cBhvr>
+                                        <p:cTn id="12" dur="1" fill="hold">
+                                          <p:stCondLst>
+                                            <p:cond delay="0"/>
+                                          </p:stCondLst>
+                                        </p:cTn>
+                                        <p:tgtEl>
+                                          <p:spTgt spid="11"/>
+                                        </p:tgtEl>
+                                        <p:attrNameLst>
+                                          <p:attrName>style.visibility</p:attrName>
+                                        </p:attrNameLst>
+                                      </p:cBhvr>
+                                      <p:to>
+                                        <p:strVal val="visible"/>
+                                      </p:to>
+                                    </p:set>
+                                  </p:childTnLst>
+                                </p:cTn>
+                              </p:par>
+                            </p:childTnLst>
+                          </p:cTn>
+                        </p:par>
+                      </p:childTnLst>
+                    </p:cTn>
+                  </p:par>
+                </p:childTnLst>
+              </p:cTn>
+              <p:prevCondLst>
+                <p:cond evt="onPrev" delay="0">
+                  <p:tgtEl>
+                    <p:sldTgt/>
+                  </p:tgtEl>
+                </p:cond>
+              </p:prevCondLst>
+              <p:nextCondLst>
+                <p:cond evt="onNext" delay="0">
+                  <p:tgtEl>
+                    <p:sldTgt/>
+                  </p:tgtEl>
+                </p:cond>
+              </p:nextCondLst>
+            </p:seq>
+          </p:childTnLst>
+        </p:cTn>
+      </p:par>
+    </p:tnLst>
+    <p:bldLst>
+      <p:bldP spid="5" grpId="0" animBg="1"/>
+      <p:bldP spid="7" grpId="0" animBg="1"/>
+      <p:bldP spid="11" grpId="0" animBg="1"/>
+    </p:bldLst>
+  </p:timing>
 </p:sld>
 </file>
 
@@ -11487,7 +12203,7 @@
           <p:cNvPr id="2" name="Title 1">
             <a:extLst>
               <a:ext uri="{FF2B5EF4-FFF2-40B4-BE49-F238E27FC236}">
-                <a16:creationId xmlns:a16="http://schemas.microsoft.com/office/drawing/2014/main" id="{4B46706C-14A4-72C8-A65A-86B49BAD71E3}"/>
+                <a16:creationId xmlns:a16="http://schemas.microsoft.com/office/drawing/2014/main" id="{3F1773C8-46D8-90E7-B5E9-62D504C449E9}"/>
               </a:ext>
             </a:extLst>
           </p:cNvPr>
@@ -11505,6 +12221,119 @@
           <a:p>
             <a:r>
               <a:rPr lang="en-US" dirty="0"/>
+              <a:t>R environments</a:t>
+            </a:r>
+            <a:endParaRPr lang="LID4096" dirty="0"/>
+          </a:p>
+        </p:txBody>
+      </p:sp>
+      <p:sp>
+        <p:nvSpPr>
+          <p:cNvPr id="3" name="Text Placeholder 2">
+            <a:extLst>
+              <a:ext uri="{FF2B5EF4-FFF2-40B4-BE49-F238E27FC236}">
+                <a16:creationId xmlns:a16="http://schemas.microsoft.com/office/drawing/2014/main" id="{82F0E4CA-5BB6-1598-DD80-47CD7BC0EF0D}"/>
+              </a:ext>
+            </a:extLst>
+          </p:cNvPr>
+          <p:cNvSpPr>
+            <a:spLocks noGrp="1"/>
+          </p:cNvSpPr>
+          <p:nvPr>
+            <p:ph type="body" idx="1"/>
+          </p:nvPr>
+        </p:nvSpPr>
+        <p:spPr/>
+        <p:txBody>
+          <a:bodyPr/>
+          <a:lstStyle/>
+          <a:p>
+            <a:endParaRPr lang="LID4096"/>
+          </a:p>
+        </p:txBody>
+      </p:sp>
+      <p:sp>
+        <p:nvSpPr>
+          <p:cNvPr id="4" name="Slide Number Placeholder 3">
+            <a:extLst>
+              <a:ext uri="{FF2B5EF4-FFF2-40B4-BE49-F238E27FC236}">
+                <a16:creationId xmlns:a16="http://schemas.microsoft.com/office/drawing/2014/main" id="{A0E158CA-C57F-993F-F8C2-17C8EAEE81CB}"/>
+              </a:ext>
+            </a:extLst>
+          </p:cNvPr>
+          <p:cNvSpPr>
+            <a:spLocks noGrp="1"/>
+          </p:cNvSpPr>
+          <p:nvPr>
+            <p:ph type="sldNum" sz="quarter" idx="12"/>
+          </p:nvPr>
+        </p:nvSpPr>
+        <p:spPr/>
+        <p:txBody>
+          <a:bodyPr/>
+          <a:lstStyle/>
+          <a:p>
+            <a:fld id="{9C7CE217-4467-4B8D-A735-B008FA7C4816}" type="slidenum">
+              <a:rPr lang="LID4096" smtClean="0"/>
+              <a:t>25</a:t>
+            </a:fld>
+            <a:endParaRPr lang="LID4096"/>
+          </a:p>
+        </p:txBody>
+      </p:sp>
+    </p:spTree>
+    <p:extLst>
+      <p:ext uri="{BB962C8B-B14F-4D97-AF65-F5344CB8AC3E}">
+        <p14:creationId xmlns:p14="http://schemas.microsoft.com/office/powerpoint/2010/main" val="4179265587"/>
+      </p:ext>
+    </p:extLst>
+  </p:cSld>
+  <p:clrMapOvr>
+    <a:masterClrMapping/>
+  </p:clrMapOvr>
+</p:sld>
+</file>
+
+<file path=ppt/slides/slide26.xml><?xml version="1.0" encoding="utf-8"?>
+<p:sld xmlns:a="http://schemas.openxmlformats.org/drawingml/2006/main" xmlns:r="http://schemas.openxmlformats.org/officeDocument/2006/relationships" xmlns:p="http://schemas.openxmlformats.org/presentationml/2006/main">
+  <p:cSld>
+    <p:spTree>
+      <p:nvGrpSpPr>
+        <p:cNvPr id="1" name=""/>
+        <p:cNvGrpSpPr/>
+        <p:nvPr/>
+      </p:nvGrpSpPr>
+      <p:grpSpPr>
+        <a:xfrm>
+          <a:off x="0" y="0"/>
+          <a:ext cx="0" cy="0"/>
+          <a:chOff x="0" y="0"/>
+          <a:chExt cx="0" cy="0"/>
+        </a:xfrm>
+      </p:grpSpPr>
+      <p:sp>
+        <p:nvSpPr>
+          <p:cNvPr id="2" name="Title 1">
+            <a:extLst>
+              <a:ext uri="{FF2B5EF4-FFF2-40B4-BE49-F238E27FC236}">
+                <a16:creationId xmlns:a16="http://schemas.microsoft.com/office/drawing/2014/main" id="{4B46706C-14A4-72C8-A65A-86B49BAD71E3}"/>
+              </a:ext>
+            </a:extLst>
+          </p:cNvPr>
+          <p:cNvSpPr>
+            <a:spLocks noGrp="1"/>
+          </p:cNvSpPr>
+          <p:nvPr>
+            <p:ph type="title"/>
+          </p:nvPr>
+        </p:nvSpPr>
+        <p:spPr/>
+        <p:txBody>
+          <a:bodyPr/>
+          <a:lstStyle/>
+          <a:p>
+            <a:r>
+              <a:rPr lang="en-US" dirty="0"/>
               <a:t>R packages considerations</a:t>
             </a:r>
             <a:endParaRPr lang="LID4096" dirty="0"/>
@@ -11609,7 +12438,7 @@
           <a:p>
             <a:fld id="{9C7CE217-4467-4B8D-A735-B008FA7C4816}" type="slidenum">
               <a:rPr lang="LID4096" smtClean="0"/>
-              <a:t>25</a:t>
+              <a:t>26</a:t>
             </a:fld>
             <a:endParaRPr lang="LID4096"/>
           </a:p>
@@ -11789,7 +12618,7 @@
 </p:sld>
 </file>
 
-<file path=ppt/slides/slide26.xml><?xml version="1.0" encoding="utf-8"?>
+<file path=ppt/slides/slide27.xml><?xml version="1.0" encoding="utf-8"?>
 <p:sld xmlns:a="http://schemas.openxmlformats.org/drawingml/2006/main" xmlns:r="http://schemas.openxmlformats.org/officeDocument/2006/relationships" xmlns:p="http://schemas.openxmlformats.org/presentationml/2006/main">
   <p:cSld>
     <p:spTree>
@@ -11911,7 +12740,7 @@
           <a:p>
             <a:fld id="{9C7CE217-4467-4B8D-A735-B008FA7C4816}" type="slidenum">
               <a:rPr lang="LID4096" smtClean="0"/>
-              <a:t>26</a:t>
+              <a:t>27</a:t>
             </a:fld>
             <a:endParaRPr lang="LID4096"/>
           </a:p>
@@ -11932,7 +12761,7 @@
         <p:spPr>
           <a:xfrm>
             <a:off x="1585645" y="2938414"/>
-            <a:ext cx="9243316" cy="1200329"/>
+            <a:ext cx="8592498" cy="1200329"/>
           </a:xfrm>
           <a:prstGeom prst="rect">
             <a:avLst/>
@@ -12220,8 +13049,8 @@
         </p:nvSpPr>
         <p:spPr>
           <a:xfrm>
-            <a:off x="1585645" y="5417599"/>
-            <a:ext cx="9243317" cy="461665"/>
+            <a:off x="1585646" y="5417599"/>
+            <a:ext cx="8592498" cy="461665"/>
           </a:xfrm>
           <a:prstGeom prst="rect">
             <a:avLst/>
@@ -12247,7 +13076,7 @@
                   <a:schemeClr val="bg1"/>
                 </a:solidFill>
               </a:rPr>
-              <a:t>compute-node $  </a:t>
+              <a:t>node $  </a:t>
             </a:r>
             <a:r>
               <a:rPr lang="fr-BE" sz="2400" dirty="0">
@@ -12413,7 +13242,7 @@
 </p:sld>
 </file>
 
-<file path=ppt/slides/slide27.xml><?xml version="1.0" encoding="utf-8"?>
+<file path=ppt/slides/slide28.xml><?xml version="1.0" encoding="utf-8"?>
 <p:sld xmlns:a="http://schemas.openxmlformats.org/drawingml/2006/main" xmlns:r="http://schemas.openxmlformats.org/officeDocument/2006/relationships" xmlns:p="http://schemas.openxmlformats.org/presentationml/2006/main">
   <p:cSld>
     <p:spTree>
@@ -12453,7 +13282,7 @@
           <a:p>
             <a:r>
               <a:rPr lang="en-US" dirty="0"/>
-              <a:t>Prepare environment</a:t>
+              <a:t>Interactive install: setup &amp; install</a:t>
             </a:r>
             <a:endParaRPr lang="LID4096" dirty="0"/>
           </a:p>
@@ -12506,32 +13335,7 @@
           <a:p>
             <a:r>
               <a:rPr lang="en-US" dirty="0"/>
-              <a:t>Create </a:t>
-            </a:r>
-            <a:r>
-              <a:rPr lang="en-US" dirty="0">
-                <a:latin typeface="Courier New" panose="02070309020205020404" pitchFamily="49" charset="0"/>
-                <a:cs typeface="Courier New" panose="02070309020205020404" pitchFamily="49" charset="0"/>
-              </a:rPr>
-              <a:t>.</a:t>
-            </a:r>
-            <a:r>
-              <a:rPr lang="en-US" dirty="0" err="1">
-                <a:latin typeface="Courier New" panose="02070309020205020404" pitchFamily="49" charset="0"/>
-                <a:cs typeface="Courier New" panose="02070309020205020404" pitchFamily="49" charset="0"/>
-              </a:rPr>
-              <a:t>Renviron</a:t>
-            </a:r>
-            <a:r>
-              <a:rPr lang="en-US" dirty="0"/>
-              <a:t> file in </a:t>
-            </a:r>
-            <a:r>
-              <a:rPr lang="en-US" dirty="0">
-                <a:latin typeface="Courier New" panose="02070309020205020404" pitchFamily="49" charset="0"/>
-                <a:cs typeface="Courier New" panose="02070309020205020404" pitchFamily="49" charset="0"/>
-              </a:rPr>
-              <a:t>$VSC_HOME</a:t>
+              <a:t>Start R and install package(s)</a:t>
             </a:r>
             <a:endParaRPr lang="LID4096" dirty="0">
               <a:latin typeface="Courier New" panose="02070309020205020404" pitchFamily="49" charset="0"/>
@@ -12563,7 +13367,7 @@
           <a:p>
             <a:fld id="{9C7CE217-4467-4B8D-A735-B008FA7C4816}" type="slidenum">
               <a:rPr lang="LID4096" smtClean="0"/>
-              <a:t>27</a:t>
+              <a:t>28</a:t>
             </a:fld>
             <a:endParaRPr lang="LID4096"/>
           </a:p>
@@ -12583,8 +13387,8 @@
         </p:nvSpPr>
         <p:spPr>
           <a:xfrm>
-            <a:off x="1195227" y="2407271"/>
-            <a:ext cx="10671425" cy="400110"/>
+            <a:off x="1195228" y="2407271"/>
+            <a:ext cx="10049716" cy="369332"/>
           </a:xfrm>
           <a:prstGeom prst="rect">
             <a:avLst/>
@@ -12605,22 +13409,22 @@
           <a:lstStyle/>
           <a:p>
             <a:r>
-              <a:rPr lang="en-US" sz="2000" dirty="0">
+              <a:rPr lang="en-US" dirty="0">
                 <a:solidFill>
                   <a:schemeClr val="bg1"/>
                 </a:solidFill>
               </a:rPr>
-              <a:t>compute-node $  </a:t>
-            </a:r>
-            <a:r>
-              <a:rPr lang="pt-BR" sz="2000" dirty="0">
+              <a:t>node$  </a:t>
+            </a:r>
+            <a:r>
+              <a:rPr lang="pt-BR" dirty="0">
                 <a:solidFill>
                   <a:schemeClr val="bg1"/>
                 </a:solidFill>
               </a:rPr>
-              <a:t>export R_LIBS_USER=$VSC_DATA/R/$VSC_ARCH_LOCAL/$EBVERSIONR</a:t>
-            </a:r>
-            <a:endParaRPr lang="en-US" sz="2000" dirty="0">
+              <a:t>export R_LIBS_USER=$VSC_DATA/R/$VSC_OS_LOCAL/$VSC_ARCH_LOCAL/$EBVERSIONR</a:t>
+            </a:r>
+            <a:endParaRPr lang="en-US" dirty="0">
               <a:solidFill>
                 <a:schemeClr val="bg1"/>
               </a:solidFill>
@@ -12645,7 +13449,7 @@
         <p:spPr>
           <a:xfrm>
             <a:off x="1195227" y="3981700"/>
-            <a:ext cx="10671425" cy="400110"/>
+            <a:ext cx="10158573" cy="400110"/>
           </a:xfrm>
           <a:prstGeom prst="rect">
             <a:avLst/>
@@ -12671,7 +13475,7 @@
                   <a:schemeClr val="bg1"/>
                 </a:solidFill>
               </a:rPr>
-              <a:t>compute-node $  </a:t>
+              <a:t>node $  </a:t>
             </a:r>
             <a:r>
               <a:rPr lang="pt-BR" sz="2000" dirty="0">
@@ -12705,8 +13509,8 @@
         </p:nvSpPr>
         <p:spPr>
           <a:xfrm>
-            <a:off x="1195226" y="5469741"/>
-            <a:ext cx="10671425" cy="400110"/>
+            <a:off x="1195227" y="5469741"/>
+            <a:ext cx="10158574" cy="707886"/>
           </a:xfrm>
           <a:prstGeom prst="rect">
             <a:avLst/>
@@ -12732,7 +13536,7 @@
                   <a:schemeClr val="bg1"/>
                 </a:solidFill>
               </a:rPr>
-              <a:t>compute-node $  </a:t>
+              <a:t>node $  </a:t>
             </a:r>
             <a:r>
               <a:rPr lang="pt-BR" b="1" dirty="0">
@@ -12740,7 +13544,19 @@
                   <a:schemeClr val="bg1"/>
                 </a:solidFill>
               </a:rPr>
-              <a:t>echo "R_LIBS_USER=$R_LIBS_USER"  &gt;  $VSC_HOME/.Renviron</a:t>
+              <a:t>R_LIBS_USER=$R_LIBS_USER  R</a:t>
+            </a:r>
+          </a:p>
+          <a:p>
+            <a:r>
+              <a:rPr lang="pt-BR" sz="2000" b="1" dirty="0">
+                <a:solidFill>
+                  <a:schemeClr val="bg1"/>
+                </a:solidFill>
+                <a:latin typeface="Courier New" pitchFamily="49" charset="0"/>
+                <a:cs typeface="Courier New" pitchFamily="49" charset="0"/>
+              </a:rPr>
+              <a:t>&gt; install.packages("dplyr")</a:t>
             </a:r>
             <a:endParaRPr lang="en-US" sz="2000" b="1" dirty="0">
               <a:solidFill>
@@ -12902,7 +13718,7 @@
 </p:sld>
 </file>
 
-<file path=ppt/slides/slide28.xml><?xml version="1.0" encoding="utf-8"?>
+<file path=ppt/slides/slide29.xml><?xml version="1.0" encoding="utf-8"?>
 <p:sld xmlns:a="http://schemas.openxmlformats.org/drawingml/2006/main" xmlns:r="http://schemas.openxmlformats.org/officeDocument/2006/relationships" xmlns:p="http://schemas.openxmlformats.org/presentationml/2006/main">
   <p:cSld>
     <p:spTree>
@@ -12942,36 +13758,7 @@
           <a:p>
             <a:r>
               <a:rPr lang="en-US" dirty="0"/>
-              <a:t>Package installation</a:t>
-            </a:r>
-            <a:endParaRPr lang="LID4096" dirty="0"/>
-          </a:p>
-        </p:txBody>
-      </p:sp>
-      <p:sp>
-        <p:nvSpPr>
-          <p:cNvPr id="3" name="Content Placeholder 2">
-            <a:extLst>
-              <a:ext uri="{FF2B5EF4-FFF2-40B4-BE49-F238E27FC236}">
-                <a16:creationId xmlns:a16="http://schemas.microsoft.com/office/drawing/2014/main" id="{62B8A967-E104-11B7-B582-69C99454672A}"/>
-              </a:ext>
-            </a:extLst>
-          </p:cNvPr>
-          <p:cNvSpPr>
-            <a:spLocks noGrp="1"/>
-          </p:cNvSpPr>
-          <p:nvPr>
-            <p:ph idx="1"/>
-          </p:nvPr>
-        </p:nvSpPr>
-        <p:spPr/>
-        <p:txBody>
-          <a:bodyPr/>
-          <a:lstStyle/>
-          <a:p>
-            <a:r>
-              <a:rPr lang="en-US" dirty="0"/>
-              <a:t>Install required packages</a:t>
+              <a:t>Install in batch job</a:t>
             </a:r>
             <a:endParaRPr lang="LID4096" dirty="0"/>
           </a:p>
@@ -13000,18 +13787,437 @@
           <a:p>
             <a:fld id="{9C7CE217-4467-4B8D-A735-B008FA7C4816}" type="slidenum">
               <a:rPr lang="LID4096" smtClean="0"/>
-              <a:t>28</a:t>
+              <a:t>29</a:t>
             </a:fld>
             <a:endParaRPr lang="LID4096"/>
           </a:p>
         </p:txBody>
       </p:sp>
+      <p:grpSp>
+        <p:nvGrpSpPr>
+          <p:cNvPr id="6" name="Group 5">
+            <a:extLst>
+              <a:ext uri="{FF2B5EF4-FFF2-40B4-BE49-F238E27FC236}">
+                <a16:creationId xmlns:a16="http://schemas.microsoft.com/office/drawing/2014/main" id="{4612455B-832D-E73D-D1D5-076E115D2BEF}"/>
+              </a:ext>
+            </a:extLst>
+          </p:cNvPr>
+          <p:cNvGrpSpPr/>
+          <p:nvPr/>
+        </p:nvGrpSpPr>
+        <p:grpSpPr>
+          <a:xfrm>
+            <a:off x="457201" y="1377353"/>
+            <a:ext cx="11517983" cy="4524315"/>
+            <a:chOff x="-43542" y="2169659"/>
+            <a:chExt cx="11517983" cy="4524315"/>
+          </a:xfrm>
+        </p:grpSpPr>
+        <p:sp>
+          <p:nvSpPr>
+            <p:cNvPr id="7" name="TextBox 6">
+              <a:extLst>
+                <a:ext uri="{FF2B5EF4-FFF2-40B4-BE49-F238E27FC236}">
+                  <a16:creationId xmlns:a16="http://schemas.microsoft.com/office/drawing/2014/main" id="{30D28F47-723E-F8A0-3251-44D5758BF97F}"/>
+                </a:ext>
+              </a:extLst>
+            </p:cNvPr>
+            <p:cNvSpPr txBox="1"/>
+            <p:nvPr/>
+          </p:nvSpPr>
+          <p:spPr>
+            <a:xfrm>
+              <a:off x="-43542" y="2169659"/>
+              <a:ext cx="11517084" cy="4524315"/>
+            </a:xfrm>
+            <a:prstGeom prst="rect">
+              <a:avLst/>
+            </a:prstGeom>
+            <a:solidFill>
+              <a:schemeClr val="bg1">
+                <a:lumMod val="85000"/>
+              </a:schemeClr>
+            </a:solidFill>
+            <a:ln>
+              <a:solidFill>
+                <a:schemeClr val="tx1"/>
+              </a:solidFill>
+            </a:ln>
+          </p:spPr>
+          <p:txBody>
+            <a:bodyPr wrap="square" rtlCol="0">
+              <a:spAutoFit/>
+            </a:bodyPr>
+            <a:lstStyle/>
+            <a:p>
+              <a:pPr lvl="0">
+                <a:defRPr/>
+              </a:pPr>
+              <a:r>
+                <a:rPr lang="en-US" dirty="0">
+                  <a:solidFill>
+                    <a:prstClr val="black"/>
+                  </a:solidFill>
+                  <a:latin typeface="Courier New" pitchFamily="49" charset="0"/>
+                  <a:cs typeface="Courier New" pitchFamily="49" charset="0"/>
+                </a:rPr>
+                <a:t>#!/usr/bin/env -S bash -l</a:t>
+              </a:r>
+            </a:p>
+            <a:p>
+              <a:pPr lvl="0">
+                <a:defRPr/>
+              </a:pPr>
+              <a:r>
+                <a:rPr lang="en-US" dirty="0">
+                  <a:solidFill>
+                    <a:prstClr val="black"/>
+                  </a:solidFill>
+                  <a:latin typeface="Courier New" pitchFamily="49" charset="0"/>
+                  <a:cs typeface="Courier New" pitchFamily="49" charset="0"/>
+                </a:rPr>
+                <a:t>#SBATCH --account=&lt;</a:t>
+              </a:r>
+              <a:r>
+                <a:rPr lang="en-US" dirty="0" err="1">
+                  <a:solidFill>
+                    <a:prstClr val="black"/>
+                  </a:solidFill>
+                  <a:latin typeface="Courier New" pitchFamily="49" charset="0"/>
+                  <a:cs typeface="Courier New" pitchFamily="49" charset="0"/>
+                </a:rPr>
+                <a:t>your_account</a:t>
+              </a:r>
+              <a:r>
+                <a:rPr lang="en-US" dirty="0">
+                  <a:solidFill>
+                    <a:prstClr val="black"/>
+                  </a:solidFill>
+                  <a:latin typeface="Courier New" pitchFamily="49" charset="0"/>
+                  <a:cs typeface="Courier New" pitchFamily="49" charset="0"/>
+                </a:rPr>
+                <a:t>&gt;</a:t>
+              </a:r>
+            </a:p>
+            <a:p>
+              <a:pPr lvl="0">
+                <a:defRPr/>
+              </a:pPr>
+              <a:r>
+                <a:rPr lang="en-US" dirty="0">
+                  <a:solidFill>
+                    <a:prstClr val="black"/>
+                  </a:solidFill>
+                  <a:latin typeface="Courier New" pitchFamily="49" charset="0"/>
+                  <a:cs typeface="Courier New" pitchFamily="49" charset="0"/>
+                </a:rPr>
+                <a:t>#SBATCH --time=00:30:00</a:t>
+              </a:r>
+            </a:p>
+            <a:p>
+              <a:pPr lvl="0">
+                <a:defRPr/>
+              </a:pPr>
+              <a:r>
+                <a:rPr lang="en-US" dirty="0">
+                  <a:solidFill>
+                    <a:prstClr val="black"/>
+                  </a:solidFill>
+                  <a:latin typeface="Courier New" pitchFamily="49" charset="0"/>
+                  <a:cs typeface="Courier New" pitchFamily="49" charset="0"/>
+                </a:rPr>
+                <a:t>#SBATCH --</a:t>
+              </a:r>
+              <a:r>
+                <a:rPr lang="en-US" dirty="0" err="1">
+                  <a:solidFill>
+                    <a:prstClr val="black"/>
+                  </a:solidFill>
+                  <a:latin typeface="Courier New" pitchFamily="49" charset="0"/>
+                  <a:cs typeface="Courier New" pitchFamily="49" charset="0"/>
+                </a:rPr>
+                <a:t>cpus</a:t>
+              </a:r>
+              <a:r>
+                <a:rPr lang="en-US" dirty="0">
+                  <a:solidFill>
+                    <a:prstClr val="black"/>
+                  </a:solidFill>
+                  <a:latin typeface="Courier New" pitchFamily="49" charset="0"/>
+                  <a:cs typeface="Courier New" pitchFamily="49" charset="0"/>
+                </a:rPr>
+                <a:t>-per-task=4</a:t>
+              </a:r>
+            </a:p>
+            <a:p>
+              <a:pPr lvl="0">
+                <a:defRPr/>
+              </a:pPr>
+              <a:endParaRPr lang="en-US" dirty="0">
+                <a:solidFill>
+                  <a:prstClr val="black"/>
+                </a:solidFill>
+                <a:latin typeface="Courier New" pitchFamily="49" charset="0"/>
+                <a:cs typeface="Courier New" pitchFamily="49" charset="0"/>
+              </a:endParaRPr>
+            </a:p>
+            <a:p>
+              <a:pPr lvl="0">
+                <a:defRPr/>
+              </a:pPr>
+              <a:r>
+                <a:rPr lang="en-US" dirty="0">
+                  <a:solidFill>
+                    <a:prstClr val="black"/>
+                  </a:solidFill>
+                  <a:latin typeface="Courier New" pitchFamily="49" charset="0"/>
+                  <a:cs typeface="Courier New" pitchFamily="49" charset="0"/>
+                </a:rPr>
+                <a:t>module purge &amp;&gt; /dev/null</a:t>
+              </a:r>
+            </a:p>
+            <a:p>
+              <a:pPr lvl="0">
+                <a:defRPr/>
+              </a:pPr>
+              <a:r>
+                <a:rPr lang="en-US" dirty="0">
+                  <a:solidFill>
+                    <a:prstClr val="black"/>
+                  </a:solidFill>
+                  <a:latin typeface="Courier New" pitchFamily="49" charset="0"/>
+                  <a:cs typeface="Courier New" pitchFamily="49" charset="0"/>
+                </a:rPr>
+                <a:t>module load R-bundle-CRAN/2023.12-foss-2023a</a:t>
+              </a:r>
+            </a:p>
+            <a:p>
+              <a:pPr lvl="0">
+                <a:defRPr/>
+              </a:pPr>
+              <a:endParaRPr lang="en-US" dirty="0">
+                <a:solidFill>
+                  <a:prstClr val="black"/>
+                </a:solidFill>
+                <a:latin typeface="Courier New" pitchFamily="49" charset="0"/>
+                <a:cs typeface="Courier New" pitchFamily="49" charset="0"/>
+              </a:endParaRPr>
+            </a:p>
+            <a:p>
+              <a:pPr lvl="0">
+                <a:defRPr/>
+              </a:pPr>
+              <a:r>
+                <a:rPr lang="en-US" dirty="0">
+                  <a:solidFill>
+                    <a:prstClr val="black"/>
+                  </a:solidFill>
+                  <a:latin typeface="Courier New" pitchFamily="49" charset="0"/>
+                  <a:cs typeface="Courier New" pitchFamily="49" charset="0"/>
+                </a:rPr>
+                <a:t>export R_LIBS_USER="${VSC_DATA}/R/${VSC_OS_LOCAL}/${VSC_ARCH_LOCAL}/${EBVERSIONR}"</a:t>
+              </a:r>
+            </a:p>
+            <a:p>
+              <a:pPr lvl="0">
+                <a:defRPr/>
+              </a:pPr>
+              <a:r>
+                <a:rPr lang="en-US" dirty="0">
+                  <a:solidFill>
+                    <a:prstClr val="black"/>
+                  </a:solidFill>
+                  <a:latin typeface="Courier New" pitchFamily="49" charset="0"/>
+                  <a:cs typeface="Courier New" pitchFamily="49" charset="0"/>
+                </a:rPr>
+                <a:t>LOG_FILE="install_${VSC_OS_LOCAL}_${VSC_ARCH_LOCAL}_${EBVERSIONR}.log"</a:t>
+              </a:r>
+            </a:p>
+            <a:p>
+              <a:pPr lvl="0">
+                <a:defRPr/>
+              </a:pPr>
+              <a:r>
+                <a:rPr lang="en-US" dirty="0" err="1">
+                  <a:solidFill>
+                    <a:prstClr val="black"/>
+                  </a:solidFill>
+                  <a:latin typeface="Courier New" pitchFamily="49" charset="0"/>
+                  <a:cs typeface="Courier New" pitchFamily="49" charset="0"/>
+                </a:rPr>
+                <a:t>mkdir</a:t>
+              </a:r>
+              <a:r>
+                <a:rPr lang="en-US" dirty="0">
+                  <a:solidFill>
+                    <a:prstClr val="black"/>
+                  </a:solidFill>
+                  <a:latin typeface="Courier New" pitchFamily="49" charset="0"/>
+                  <a:cs typeface="Courier New" pitchFamily="49" charset="0"/>
+                </a:rPr>
+                <a:t> -p $R_LIBS_USER</a:t>
+              </a:r>
+            </a:p>
+            <a:p>
+              <a:pPr lvl="0">
+                <a:defRPr/>
+              </a:pPr>
+              <a:endParaRPr lang="en-US" dirty="0">
+                <a:solidFill>
+                  <a:prstClr val="black"/>
+                </a:solidFill>
+                <a:latin typeface="Courier New" pitchFamily="49" charset="0"/>
+                <a:cs typeface="Courier New" pitchFamily="49" charset="0"/>
+              </a:endParaRPr>
+            </a:p>
+            <a:p>
+              <a:pPr lvl="0">
+                <a:defRPr/>
+              </a:pPr>
+              <a:r>
+                <a:rPr lang="en-US" dirty="0">
+                  <a:solidFill>
+                    <a:prstClr val="black"/>
+                  </a:solidFill>
+                  <a:latin typeface="Courier New" pitchFamily="49" charset="0"/>
+                  <a:cs typeface="Courier New" pitchFamily="49" charset="0"/>
+                </a:rPr>
+                <a:t>R_LIBS_USER=$R_LIBS_USER R  --no-save  &amp;&gt; $LOG_FILE  &lt;&lt;EOI</a:t>
+              </a:r>
+            </a:p>
+            <a:p>
+              <a:pPr lvl="0">
+                <a:defRPr/>
+              </a:pPr>
+              <a:r>
+                <a:rPr lang="en-US" dirty="0">
+                  <a:solidFill>
+                    <a:prstClr val="black"/>
+                  </a:solidFill>
+                  <a:latin typeface="Courier New" pitchFamily="49" charset="0"/>
+                  <a:cs typeface="Courier New" pitchFamily="49" charset="0"/>
+                </a:rPr>
+                <a:t>options(repos = c(CRAN = "https://cloud.r-project.org"))</a:t>
+              </a:r>
+            </a:p>
+            <a:p>
+              <a:pPr lvl="0">
+                <a:defRPr/>
+              </a:pPr>
+              <a:r>
+                <a:rPr lang="en-US" b="1" dirty="0" err="1">
+                  <a:solidFill>
+                    <a:srgbClr val="FF0000"/>
+                  </a:solidFill>
+                  <a:latin typeface="Courier New" pitchFamily="49" charset="0"/>
+                  <a:cs typeface="Courier New" pitchFamily="49" charset="0"/>
+                </a:rPr>
+                <a:t>install.packages</a:t>
+              </a:r>
+              <a:r>
+                <a:rPr lang="en-US" b="1" dirty="0">
+                  <a:solidFill>
+                    <a:srgbClr val="FF0000"/>
+                  </a:solidFill>
+                  <a:latin typeface="Courier New" pitchFamily="49" charset="0"/>
+                  <a:cs typeface="Courier New" pitchFamily="49" charset="0"/>
+                </a:rPr>
+                <a:t>("</a:t>
+              </a:r>
+              <a:r>
+                <a:rPr lang="en-US" b="1" dirty="0" err="1">
+                  <a:solidFill>
+                    <a:srgbClr val="FF0000"/>
+                  </a:solidFill>
+                  <a:latin typeface="Courier New" pitchFamily="49" charset="0"/>
+                  <a:cs typeface="Courier New" pitchFamily="49" charset="0"/>
+                </a:rPr>
+                <a:t>dplyr</a:t>
+              </a:r>
+              <a:r>
+                <a:rPr lang="en-US" b="1" dirty="0">
+                  <a:solidFill>
+                    <a:srgbClr val="FF0000"/>
+                  </a:solidFill>
+                  <a:latin typeface="Courier New" pitchFamily="49" charset="0"/>
+                  <a:cs typeface="Courier New" pitchFamily="49" charset="0"/>
+                </a:rPr>
+                <a:t>")</a:t>
+              </a:r>
+            </a:p>
+            <a:p>
+              <a:pPr lvl="0">
+                <a:defRPr/>
+              </a:pPr>
+              <a:r>
+                <a:rPr lang="en-US" dirty="0">
+                  <a:solidFill>
+                    <a:prstClr val="black"/>
+                  </a:solidFill>
+                  <a:latin typeface="Courier New" pitchFamily="49" charset="0"/>
+                  <a:cs typeface="Courier New" pitchFamily="49" charset="0"/>
+                </a:rPr>
+                <a:t>EOI</a:t>
+              </a:r>
+            </a:p>
+          </p:txBody>
+        </p:sp>
+        <p:sp>
+          <p:nvSpPr>
+            <p:cNvPr id="8" name="TextBox 7">
+              <a:extLst>
+                <a:ext uri="{FF2B5EF4-FFF2-40B4-BE49-F238E27FC236}">
+                  <a16:creationId xmlns:a16="http://schemas.microsoft.com/office/drawing/2014/main" id="{6881F380-DF26-6D79-D0F9-B2113D9498E0}"/>
+                </a:ext>
+              </a:extLst>
+            </p:cNvPr>
+            <p:cNvSpPr txBox="1"/>
+            <p:nvPr/>
+          </p:nvSpPr>
+          <p:spPr>
+            <a:xfrm>
+              <a:off x="8327426" y="2169659"/>
+              <a:ext cx="3147015" cy="338554"/>
+            </a:xfrm>
+            <a:prstGeom prst="rect">
+              <a:avLst/>
+            </a:prstGeom>
+            <a:solidFill>
+              <a:schemeClr val="bg1"/>
+            </a:solidFill>
+            <a:ln>
+              <a:solidFill>
+                <a:schemeClr val="tx1"/>
+              </a:solidFill>
+            </a:ln>
+          </p:spPr>
+          <p:txBody>
+            <a:bodyPr wrap="none" rtlCol="0">
+              <a:spAutoFit/>
+            </a:bodyPr>
+            <a:lstStyle/>
+            <a:p>
+              <a:r>
+                <a:rPr lang="en-US" sz="1600" dirty="0" err="1">
+                  <a:latin typeface="Courier New" panose="02070309020205020404" pitchFamily="49" charset="0"/>
+                  <a:cs typeface="Courier New" panose="02070309020205020404" pitchFamily="49" charset="0"/>
+                </a:rPr>
+                <a:t>install_r_packages.slurm</a:t>
+              </a:r>
+              <a:endParaRPr lang="LID4096" sz="1600" dirty="0">
+                <a:latin typeface="Courier New" panose="02070309020205020404" pitchFamily="49" charset="0"/>
+                <a:cs typeface="Courier New" panose="02070309020205020404" pitchFamily="49" charset="0"/>
+              </a:endParaRPr>
+            </a:p>
+          </p:txBody>
+        </p:sp>
+      </p:grpSp>
       <p:sp>
         <p:nvSpPr>
-          <p:cNvPr id="5" name="TextBox 4">
-            <a:extLst>
-              <a:ext uri="{FF2B5EF4-FFF2-40B4-BE49-F238E27FC236}">
-                <a16:creationId xmlns:a16="http://schemas.microsoft.com/office/drawing/2014/main" id="{78CBE854-556F-83DC-7D36-F0D30798AD35}"/>
+          <p:cNvPr id="9" name="TextBox 8">
+            <a:extLst>
+              <a:ext uri="{FF2B5EF4-FFF2-40B4-BE49-F238E27FC236}">
+                <a16:creationId xmlns:a16="http://schemas.microsoft.com/office/drawing/2014/main" id="{0848FFD6-7840-C160-720A-49E930760A1E}"/>
               </a:ext>
             </a:extLst>
           </p:cNvPr>
@@ -13020,8 +14226,8 @@
         </p:nvSpPr>
         <p:spPr>
           <a:xfrm>
-            <a:off x="1092485" y="2366946"/>
-            <a:ext cx="10671425" cy="707886"/>
+            <a:off x="457201" y="6156295"/>
+            <a:ext cx="9550441" cy="400110"/>
           </a:xfrm>
           <a:prstGeom prst="rect">
             <a:avLst/>
@@ -13042,43 +14248,841 @@
           <a:lstStyle/>
           <a:p>
             <a:r>
-              <a:rPr lang="en-US" sz="2000" b="1" dirty="0">
+              <a:rPr lang="en-US" sz="2000" dirty="0">
                 <a:solidFill>
                   <a:schemeClr val="bg1"/>
                 </a:solidFill>
               </a:rPr>
-              <a:t>compute-node $  </a:t>
-            </a:r>
-            <a:r>
-              <a:rPr lang="pt-BR" b="1" dirty="0">
+              <a:t>$  </a:t>
+            </a:r>
+            <a:r>
+              <a:rPr lang="en-US" sz="2000" dirty="0" err="1">
                 <a:solidFill>
                   <a:schemeClr val="bg1"/>
                 </a:solidFill>
               </a:rPr>
-              <a:t>R</a:t>
-            </a:r>
-          </a:p>
-          <a:p>
-            <a:r>
-              <a:rPr lang="pt-BR" sz="2000" b="1" dirty="0">
+              <a:t>sbatch</a:t>
+            </a:r>
+            <a:r>
+              <a:rPr lang="en-US" sz="2000" dirty="0">
                 <a:solidFill>
                   <a:schemeClr val="bg1"/>
                 </a:solidFill>
-                <a:latin typeface="Courier New" pitchFamily="49" charset="0"/>
-                <a:cs typeface="Courier New" pitchFamily="49" charset="0"/>
               </a:rPr>
-              <a:t>&gt;  install.packages("optpares")</a:t>
-            </a:r>
-            <a:endParaRPr lang="en-US" sz="2000" b="1" dirty="0">
+              <a:t>  --cluster=</a:t>
+            </a:r>
+            <a:r>
+              <a:rPr lang="en-US" sz="2000" dirty="0" err="1">
+                <a:solidFill>
+                  <a:schemeClr val="bg1"/>
+                </a:solidFill>
+              </a:rPr>
+              <a:t>wice</a:t>
+            </a:r>
+            <a:r>
+              <a:rPr lang="en-US" sz="2000" dirty="0">
+                <a:solidFill>
+                  <a:schemeClr val="bg1"/>
+                </a:solidFill>
+              </a:rPr>
+              <a:t>  --partition=</a:t>
+            </a:r>
+            <a:r>
+              <a:rPr lang="en-US" sz="2000" dirty="0" err="1">
+                <a:solidFill>
+                  <a:schemeClr val="bg1"/>
+                </a:solidFill>
+              </a:rPr>
+              <a:t>batch_sapphirerapids</a:t>
+            </a:r>
+            <a:r>
+              <a:rPr lang="en-US" sz="2000" dirty="0">
+                <a:solidFill>
+                  <a:schemeClr val="bg1"/>
+                </a:solidFill>
+              </a:rPr>
+              <a:t>   </a:t>
+            </a:r>
+            <a:r>
+              <a:rPr lang="en-US" sz="2000" dirty="0" err="1">
+                <a:solidFill>
+                  <a:schemeClr val="bg1"/>
+                </a:solidFill>
+              </a:rPr>
+              <a:t>install_r_packages.slurm</a:t>
+            </a:r>
+            <a:endParaRPr lang="en-US" sz="2000" dirty="0">
               <a:solidFill>
                 <a:schemeClr val="bg1"/>
               </a:solidFill>
-              <a:latin typeface="Courier New" pitchFamily="49" charset="0"/>
-              <a:cs typeface="Courier New" pitchFamily="49" charset="0"/>
             </a:endParaRPr>
           </a:p>
         </p:txBody>
       </p:sp>
+      <p:grpSp>
+        <p:nvGrpSpPr>
+          <p:cNvPr id="10" name="Group 9">
+            <a:extLst>
+              <a:ext uri="{FF2B5EF4-FFF2-40B4-BE49-F238E27FC236}">
+                <a16:creationId xmlns:a16="http://schemas.microsoft.com/office/drawing/2014/main" id="{2801CE53-C4D5-8AB2-457E-F24FAC25802B}"/>
+              </a:ext>
+            </a:extLst>
+          </p:cNvPr>
+          <p:cNvGrpSpPr/>
+          <p:nvPr/>
+        </p:nvGrpSpPr>
+        <p:grpSpPr>
+          <a:xfrm>
+            <a:off x="5237033" y="2145370"/>
+            <a:ext cx="6128437" cy="889068"/>
+            <a:chOff x="-834843" y="5535406"/>
+            <a:chExt cx="6128437" cy="889068"/>
+          </a:xfrm>
+        </p:grpSpPr>
+        <p:sp>
+          <p:nvSpPr>
+            <p:cNvPr id="11" name="TextBox 10">
+              <a:extLst>
+                <a:ext uri="{FF2B5EF4-FFF2-40B4-BE49-F238E27FC236}">
+                  <a16:creationId xmlns:a16="http://schemas.microsoft.com/office/drawing/2014/main" id="{6744AB5F-B83C-1ABF-2784-7709B639365A}"/>
+                </a:ext>
+              </a:extLst>
+            </p:cNvPr>
+            <p:cNvSpPr txBox="1"/>
+            <p:nvPr/>
+          </p:nvSpPr>
+          <p:spPr>
+            <a:xfrm>
+              <a:off x="3707904" y="5535406"/>
+              <a:ext cx="1585690" cy="369332"/>
+            </a:xfrm>
+            <a:prstGeom prst="rect">
+              <a:avLst/>
+            </a:prstGeom>
+            <a:solidFill>
+              <a:schemeClr val="bg1"/>
+            </a:solidFill>
+            <a:ln w="19050">
+              <a:solidFill>
+                <a:schemeClr val="tx1"/>
+              </a:solidFill>
+            </a:ln>
+          </p:spPr>
+          <p:txBody>
+            <a:bodyPr wrap="none" rtlCol="0">
+              <a:spAutoFit/>
+            </a:bodyPr>
+            <a:lstStyle/>
+            <a:p>
+              <a:pPr marL="0" marR="0" lvl="0" indent="0" algn="l" defTabSz="914400" rtl="0" eaLnBrk="1" fontAlgn="auto" latinLnBrk="0" hangingPunct="1">
+                <a:lnSpc>
+                  <a:spcPct val="100000"/>
+                </a:lnSpc>
+                <a:spcBef>
+                  <a:spcPts val="0"/>
+                </a:spcBef>
+                <a:spcAft>
+                  <a:spcPts val="0"/>
+                </a:spcAft>
+                <a:buClrTx/>
+                <a:buSzTx/>
+                <a:buFontTx/>
+                <a:buNone/>
+                <a:tabLst/>
+                <a:defRPr/>
+              </a:pPr>
+              <a:r>
+                <a:rPr kumimoji="0" lang="en-US" sz="1800" b="0" i="0" u="none" strike="noStrike" kern="1200" cap="none" spc="0" normalizeH="0" baseline="0" noProof="0" dirty="0">
+                  <a:ln>
+                    <a:noFill/>
+                  </a:ln>
+                  <a:solidFill>
+                    <a:prstClr val="black"/>
+                  </a:solidFill>
+                  <a:effectLst/>
+                  <a:uLnTx/>
+                  <a:uFillTx/>
+                  <a:latin typeface="Calibri" panose="020F0502020204030204"/>
+                  <a:ea typeface="+mn-ea"/>
+                  <a:cs typeface="+mn-cs"/>
+                </a:rPr>
+                <a:t>Load R module</a:t>
+              </a:r>
+              <a:endParaRPr kumimoji="0" lang="nl-BE" sz="1800" b="0" i="0" u="none" strike="noStrike" kern="1200" cap="none" spc="0" normalizeH="0" baseline="0" noProof="0" dirty="0">
+                <a:ln>
+                  <a:noFill/>
+                </a:ln>
+                <a:solidFill>
+                  <a:prstClr val="black"/>
+                </a:solidFill>
+                <a:effectLst/>
+                <a:uLnTx/>
+                <a:uFillTx/>
+                <a:latin typeface="Calibri" panose="020F0502020204030204"/>
+                <a:ea typeface="+mn-ea"/>
+                <a:cs typeface="+mn-cs"/>
+              </a:endParaRPr>
+            </a:p>
+          </p:txBody>
+        </p:sp>
+        <p:cxnSp>
+          <p:nvCxnSpPr>
+            <p:cNvPr id="12" name="Straight Arrow Connector 11">
+              <a:extLst>
+                <a:ext uri="{FF2B5EF4-FFF2-40B4-BE49-F238E27FC236}">
+                  <a16:creationId xmlns:a16="http://schemas.microsoft.com/office/drawing/2014/main" id="{980BE172-E565-9122-1B38-6B4C2278726D}"/>
+                </a:ext>
+              </a:extLst>
+            </p:cNvPr>
+            <p:cNvCxnSpPr>
+              <a:cxnSpLocks/>
+              <a:stCxn id="11" idx="1"/>
+            </p:cNvCxnSpPr>
+            <p:nvPr/>
+          </p:nvCxnSpPr>
+          <p:spPr>
+            <a:xfrm flipH="1">
+              <a:off x="-834843" y="5720072"/>
+              <a:ext cx="4542747" cy="704402"/>
+            </a:xfrm>
+            <a:prstGeom prst="straightConnector1">
+              <a:avLst/>
+            </a:prstGeom>
+            <a:ln w="28575">
+              <a:solidFill>
+                <a:schemeClr val="tx1"/>
+              </a:solidFill>
+              <a:tailEnd type="stealth" w="lg" len="lg"/>
+            </a:ln>
+          </p:spPr>
+          <p:style>
+            <a:lnRef idx="1">
+              <a:schemeClr val="accent1"/>
+            </a:lnRef>
+            <a:fillRef idx="0">
+              <a:schemeClr val="accent1"/>
+            </a:fillRef>
+            <a:effectRef idx="0">
+              <a:schemeClr val="accent1"/>
+            </a:effectRef>
+            <a:fontRef idx="minor">
+              <a:schemeClr val="tx1"/>
+            </a:fontRef>
+          </p:style>
+        </p:cxnSp>
+      </p:grpSp>
+      <p:grpSp>
+        <p:nvGrpSpPr>
+          <p:cNvPr id="13" name="Group 12">
+            <a:extLst>
+              <a:ext uri="{FF2B5EF4-FFF2-40B4-BE49-F238E27FC236}">
+                <a16:creationId xmlns:a16="http://schemas.microsoft.com/office/drawing/2014/main" id="{55EDB928-D024-1D66-48A6-AD4FC2696F93}"/>
+              </a:ext>
+            </a:extLst>
+          </p:cNvPr>
+          <p:cNvGrpSpPr/>
+          <p:nvPr/>
+        </p:nvGrpSpPr>
+        <p:grpSpPr>
+          <a:xfrm>
+            <a:off x="4593771" y="5095135"/>
+            <a:ext cx="6771699" cy="646331"/>
+            <a:chOff x="-1163403" y="5535406"/>
+            <a:chExt cx="6771699" cy="646331"/>
+          </a:xfrm>
+        </p:grpSpPr>
+        <p:sp>
+          <p:nvSpPr>
+            <p:cNvPr id="14" name="TextBox 13">
+              <a:extLst>
+                <a:ext uri="{FF2B5EF4-FFF2-40B4-BE49-F238E27FC236}">
+                  <a16:creationId xmlns:a16="http://schemas.microsoft.com/office/drawing/2014/main" id="{E58D3457-5A1F-FB2D-CE59-D68046163A4C}"/>
+                </a:ext>
+              </a:extLst>
+            </p:cNvPr>
+            <p:cNvSpPr txBox="1"/>
+            <p:nvPr/>
+          </p:nvSpPr>
+          <p:spPr>
+            <a:xfrm>
+              <a:off x="3707904" y="5535406"/>
+              <a:ext cx="1900392" cy="646331"/>
+            </a:xfrm>
+            <a:prstGeom prst="rect">
+              <a:avLst/>
+            </a:prstGeom>
+            <a:solidFill>
+              <a:schemeClr val="bg1"/>
+            </a:solidFill>
+            <a:ln w="19050">
+              <a:solidFill>
+                <a:schemeClr val="tx1"/>
+              </a:solidFill>
+            </a:ln>
+          </p:spPr>
+          <p:txBody>
+            <a:bodyPr wrap="none" rtlCol="0">
+              <a:spAutoFit/>
+            </a:bodyPr>
+            <a:lstStyle/>
+            <a:p>
+              <a:pPr marL="0" marR="0" lvl="0" indent="0" algn="l" defTabSz="914400" rtl="0" eaLnBrk="1" fontAlgn="auto" latinLnBrk="0" hangingPunct="1">
+                <a:lnSpc>
+                  <a:spcPct val="100000"/>
+                </a:lnSpc>
+                <a:spcBef>
+                  <a:spcPts val="0"/>
+                </a:spcBef>
+                <a:spcAft>
+                  <a:spcPts val="0"/>
+                </a:spcAft>
+                <a:buClrTx/>
+                <a:buSzTx/>
+                <a:buFontTx/>
+                <a:buNone/>
+                <a:tabLst/>
+                <a:defRPr/>
+              </a:pPr>
+              <a:r>
+                <a:rPr lang="en-US" dirty="0">
+                  <a:solidFill>
+                    <a:prstClr val="black"/>
+                  </a:solidFill>
+                  <a:latin typeface="Calibri" panose="020F0502020204030204"/>
+                </a:rPr>
+                <a:t>List of packages to</a:t>
+              </a:r>
+              <a:br>
+                <a:rPr lang="en-US" dirty="0">
+                  <a:solidFill>
+                    <a:prstClr val="black"/>
+                  </a:solidFill>
+                  <a:latin typeface="Calibri" panose="020F0502020204030204"/>
+                </a:rPr>
+              </a:br>
+              <a:r>
+                <a:rPr lang="en-US" dirty="0">
+                  <a:solidFill>
+                    <a:prstClr val="black"/>
+                  </a:solidFill>
+                  <a:latin typeface="Calibri" panose="020F0502020204030204"/>
+                </a:rPr>
+                <a:t>install</a:t>
+              </a:r>
+              <a:endParaRPr kumimoji="0" lang="nl-BE" sz="1800" b="0" i="0" u="none" strike="noStrike" kern="1200" cap="none" spc="0" normalizeH="0" baseline="0" noProof="0" dirty="0">
+                <a:ln>
+                  <a:noFill/>
+                </a:ln>
+                <a:solidFill>
+                  <a:prstClr val="black"/>
+                </a:solidFill>
+                <a:effectLst/>
+                <a:uLnTx/>
+                <a:uFillTx/>
+                <a:latin typeface="Calibri" panose="020F0502020204030204"/>
+                <a:ea typeface="+mn-ea"/>
+                <a:cs typeface="+mn-cs"/>
+              </a:endParaRPr>
+            </a:p>
+          </p:txBody>
+        </p:sp>
+        <p:cxnSp>
+          <p:nvCxnSpPr>
+            <p:cNvPr id="15" name="Straight Arrow Connector 14">
+              <a:extLst>
+                <a:ext uri="{FF2B5EF4-FFF2-40B4-BE49-F238E27FC236}">
+                  <a16:creationId xmlns:a16="http://schemas.microsoft.com/office/drawing/2014/main" id="{E97E548D-4637-709C-27E9-D4532772BA39}"/>
+                </a:ext>
+              </a:extLst>
+            </p:cNvPr>
+            <p:cNvCxnSpPr>
+              <a:cxnSpLocks/>
+              <a:stCxn id="14" idx="1"/>
+            </p:cNvCxnSpPr>
+            <p:nvPr/>
+          </p:nvCxnSpPr>
+          <p:spPr>
+            <a:xfrm flipH="1" flipV="1">
+              <a:off x="-1163403" y="5858571"/>
+              <a:ext cx="4871307" cy="1"/>
+            </a:xfrm>
+            <a:prstGeom prst="straightConnector1">
+              <a:avLst/>
+            </a:prstGeom>
+            <a:ln w="28575">
+              <a:solidFill>
+                <a:schemeClr val="tx1"/>
+              </a:solidFill>
+              <a:tailEnd type="stealth" w="lg" len="lg"/>
+            </a:ln>
+          </p:spPr>
+          <p:style>
+            <a:lnRef idx="1">
+              <a:schemeClr val="accent1"/>
+            </a:lnRef>
+            <a:fillRef idx="0">
+              <a:schemeClr val="accent1"/>
+            </a:fillRef>
+            <a:effectRef idx="0">
+              <a:schemeClr val="accent1"/>
+            </a:effectRef>
+            <a:fontRef idx="minor">
+              <a:schemeClr val="tx1"/>
+            </a:fontRef>
+          </p:style>
+        </p:cxnSp>
+      </p:grpSp>
+      <p:grpSp>
+        <p:nvGrpSpPr>
+          <p:cNvPr id="17" name="Group 16">
+            <a:extLst>
+              <a:ext uri="{FF2B5EF4-FFF2-40B4-BE49-F238E27FC236}">
+                <a16:creationId xmlns:a16="http://schemas.microsoft.com/office/drawing/2014/main" id="{1D684CDC-4A34-9F9E-9C19-290953F5212E}"/>
+              </a:ext>
+            </a:extLst>
+          </p:cNvPr>
+          <p:cNvGrpSpPr/>
+          <p:nvPr/>
+        </p:nvGrpSpPr>
+        <p:grpSpPr>
+          <a:xfrm>
+            <a:off x="4027714" y="4271121"/>
+            <a:ext cx="7326086" cy="646331"/>
+            <a:chOff x="-1919191" y="5535406"/>
+            <a:chExt cx="7326086" cy="646331"/>
+          </a:xfrm>
+        </p:grpSpPr>
+        <p:sp>
+          <p:nvSpPr>
+            <p:cNvPr id="18" name="TextBox 17">
+              <a:extLst>
+                <a:ext uri="{FF2B5EF4-FFF2-40B4-BE49-F238E27FC236}">
+                  <a16:creationId xmlns:a16="http://schemas.microsoft.com/office/drawing/2014/main" id="{135FD950-48FA-640E-7B1D-1C78BD3A9F28}"/>
+                </a:ext>
+              </a:extLst>
+            </p:cNvPr>
+            <p:cNvSpPr txBox="1"/>
+            <p:nvPr/>
+          </p:nvSpPr>
+          <p:spPr>
+            <a:xfrm>
+              <a:off x="3707904" y="5535406"/>
+              <a:ext cx="1698991" cy="646331"/>
+            </a:xfrm>
+            <a:prstGeom prst="rect">
+              <a:avLst/>
+            </a:prstGeom>
+            <a:solidFill>
+              <a:schemeClr val="bg1"/>
+            </a:solidFill>
+            <a:ln w="19050">
+              <a:solidFill>
+                <a:schemeClr val="tx1"/>
+              </a:solidFill>
+            </a:ln>
+          </p:spPr>
+          <p:txBody>
+            <a:bodyPr wrap="none" rtlCol="0">
+              <a:spAutoFit/>
+            </a:bodyPr>
+            <a:lstStyle/>
+            <a:p>
+              <a:pPr marL="0" marR="0" lvl="0" indent="0" algn="l" defTabSz="914400" rtl="0" eaLnBrk="1" fontAlgn="auto" latinLnBrk="0" hangingPunct="1">
+                <a:lnSpc>
+                  <a:spcPct val="100000"/>
+                </a:lnSpc>
+                <a:spcBef>
+                  <a:spcPts val="0"/>
+                </a:spcBef>
+                <a:spcAft>
+                  <a:spcPts val="0"/>
+                </a:spcAft>
+                <a:buClrTx/>
+                <a:buSzTx/>
+                <a:buFontTx/>
+                <a:buNone/>
+                <a:tabLst/>
+                <a:defRPr/>
+              </a:pPr>
+              <a:r>
+                <a:rPr kumimoji="0" lang="en-US" sz="1800" b="0" i="0" u="none" strike="noStrike" kern="1200" cap="none" spc="0" normalizeH="0" baseline="0" noProof="0" dirty="0">
+                  <a:ln>
+                    <a:noFill/>
+                  </a:ln>
+                  <a:solidFill>
+                    <a:prstClr val="black"/>
+                  </a:solidFill>
+                  <a:effectLst/>
+                  <a:uLnTx/>
+                  <a:uFillTx/>
+                  <a:latin typeface="Calibri" panose="020F0502020204030204"/>
+                  <a:ea typeface="+mn-ea"/>
+                  <a:cs typeface="+mn-cs"/>
+                </a:rPr>
+                <a:t>Create directory</a:t>
+              </a:r>
+              <a:br>
+                <a:rPr kumimoji="0" lang="en-US" sz="1800" b="0" i="0" u="none" strike="noStrike" kern="1200" cap="none" spc="0" normalizeH="0" baseline="0" noProof="0" dirty="0">
+                  <a:ln>
+                    <a:noFill/>
+                  </a:ln>
+                  <a:solidFill>
+                    <a:prstClr val="black"/>
+                  </a:solidFill>
+                  <a:effectLst/>
+                  <a:uLnTx/>
+                  <a:uFillTx/>
+                  <a:latin typeface="Calibri" panose="020F0502020204030204"/>
+                  <a:ea typeface="+mn-ea"/>
+                  <a:cs typeface="+mn-cs"/>
+                </a:rPr>
+              </a:br>
+              <a:r>
+                <a:rPr kumimoji="0" lang="en-US" sz="1800" b="0" i="0" u="none" strike="noStrike" kern="1200" cap="none" spc="0" normalizeH="0" baseline="0" noProof="0" dirty="0">
+                  <a:ln>
+                    <a:noFill/>
+                  </a:ln>
+                  <a:solidFill>
+                    <a:prstClr val="black"/>
+                  </a:solidFill>
+                  <a:effectLst/>
+                  <a:uLnTx/>
+                  <a:uFillTx/>
+                  <a:latin typeface="Calibri" panose="020F0502020204030204"/>
+                  <a:ea typeface="+mn-ea"/>
+                  <a:cs typeface="+mn-cs"/>
+                </a:rPr>
+                <a:t>if necessary</a:t>
+              </a:r>
+              <a:endParaRPr kumimoji="0" lang="nl-BE" sz="1800" b="0" i="0" u="none" strike="noStrike" kern="1200" cap="none" spc="0" normalizeH="0" baseline="0" noProof="0" dirty="0">
+                <a:ln>
+                  <a:noFill/>
+                </a:ln>
+                <a:solidFill>
+                  <a:prstClr val="black"/>
+                </a:solidFill>
+                <a:effectLst/>
+                <a:uLnTx/>
+                <a:uFillTx/>
+                <a:latin typeface="Calibri" panose="020F0502020204030204"/>
+                <a:ea typeface="+mn-ea"/>
+                <a:cs typeface="+mn-cs"/>
+              </a:endParaRPr>
+            </a:p>
+          </p:txBody>
+        </p:sp>
+        <p:cxnSp>
+          <p:nvCxnSpPr>
+            <p:cNvPr id="19" name="Straight Arrow Connector 18">
+              <a:extLst>
+                <a:ext uri="{FF2B5EF4-FFF2-40B4-BE49-F238E27FC236}">
+                  <a16:creationId xmlns:a16="http://schemas.microsoft.com/office/drawing/2014/main" id="{A87EE264-DD7F-5B9C-007B-A20327B27F7B}"/>
+                </a:ext>
+              </a:extLst>
+            </p:cNvPr>
+            <p:cNvCxnSpPr>
+              <a:cxnSpLocks/>
+              <a:stCxn id="18" idx="1"/>
+            </p:cNvCxnSpPr>
+            <p:nvPr/>
+          </p:nvCxnSpPr>
+          <p:spPr>
+            <a:xfrm flipH="1" flipV="1">
+              <a:off x="-1919191" y="5570355"/>
+              <a:ext cx="5627095" cy="288217"/>
+            </a:xfrm>
+            <a:prstGeom prst="straightConnector1">
+              <a:avLst/>
+            </a:prstGeom>
+            <a:ln w="28575">
+              <a:solidFill>
+                <a:schemeClr val="tx1"/>
+              </a:solidFill>
+              <a:tailEnd type="stealth" w="lg" len="lg"/>
+            </a:ln>
+          </p:spPr>
+          <p:style>
+            <a:lnRef idx="1">
+              <a:schemeClr val="accent1"/>
+            </a:lnRef>
+            <a:fillRef idx="0">
+              <a:schemeClr val="accent1"/>
+            </a:fillRef>
+            <a:effectRef idx="0">
+              <a:schemeClr val="accent1"/>
+            </a:effectRef>
+            <a:fontRef idx="minor">
+              <a:schemeClr val="tx1"/>
+            </a:fontRef>
+          </p:style>
+        </p:cxnSp>
+      </p:grpSp>
+      <p:grpSp>
+        <p:nvGrpSpPr>
+          <p:cNvPr id="22" name="Group 21">
+            <a:extLst>
+              <a:ext uri="{FF2B5EF4-FFF2-40B4-BE49-F238E27FC236}">
+                <a16:creationId xmlns:a16="http://schemas.microsoft.com/office/drawing/2014/main" id="{A9803D79-F2D6-83A8-D7E3-438DD5AD1908}"/>
+              </a:ext>
+            </a:extLst>
+          </p:cNvPr>
+          <p:cNvGrpSpPr/>
+          <p:nvPr/>
+        </p:nvGrpSpPr>
+        <p:grpSpPr>
+          <a:xfrm>
+            <a:off x="4833257" y="413083"/>
+            <a:ext cx="6520543" cy="1671071"/>
+            <a:chOff x="-563882" y="5535406"/>
+            <a:chExt cx="6520543" cy="1671071"/>
+          </a:xfrm>
+        </p:grpSpPr>
+        <p:sp>
+          <p:nvSpPr>
+            <p:cNvPr id="23" name="TextBox 22">
+              <a:extLst>
+                <a:ext uri="{FF2B5EF4-FFF2-40B4-BE49-F238E27FC236}">
+                  <a16:creationId xmlns:a16="http://schemas.microsoft.com/office/drawing/2014/main" id="{8427ECE2-CE0D-CF10-C623-DB3EBFE1183E}"/>
+                </a:ext>
+              </a:extLst>
+            </p:cNvPr>
+            <p:cNvSpPr txBox="1"/>
+            <p:nvPr/>
+          </p:nvSpPr>
+          <p:spPr>
+            <a:xfrm>
+              <a:off x="3707904" y="5535406"/>
+              <a:ext cx="2248757" cy="646331"/>
+            </a:xfrm>
+            <a:prstGeom prst="rect">
+              <a:avLst/>
+            </a:prstGeom>
+            <a:solidFill>
+              <a:schemeClr val="bg1"/>
+            </a:solidFill>
+            <a:ln w="19050">
+              <a:solidFill>
+                <a:schemeClr val="tx1"/>
+              </a:solidFill>
+            </a:ln>
+          </p:spPr>
+          <p:txBody>
+            <a:bodyPr wrap="none" rtlCol="0">
+              <a:spAutoFit/>
+            </a:bodyPr>
+            <a:lstStyle/>
+            <a:p>
+              <a:pPr marL="0" marR="0" lvl="0" indent="0" algn="l" defTabSz="914400" rtl="0" eaLnBrk="1" fontAlgn="auto" latinLnBrk="0" hangingPunct="1">
+                <a:lnSpc>
+                  <a:spcPct val="100000"/>
+                </a:lnSpc>
+                <a:spcBef>
+                  <a:spcPts val="0"/>
+                </a:spcBef>
+                <a:spcAft>
+                  <a:spcPts val="0"/>
+                </a:spcAft>
+                <a:buClrTx/>
+                <a:buSzTx/>
+                <a:buFontTx/>
+                <a:buNone/>
+                <a:tabLst/>
+                <a:defRPr/>
+              </a:pPr>
+              <a:r>
+                <a:rPr kumimoji="0" lang="en-US" sz="1800" b="0" i="0" u="none" strike="noStrike" kern="1200" cap="none" spc="0" normalizeH="0" baseline="0" noProof="0" dirty="0">
+                  <a:ln>
+                    <a:noFill/>
+                  </a:ln>
+                  <a:solidFill>
+                    <a:prstClr val="black"/>
+                  </a:solidFill>
+                  <a:effectLst/>
+                  <a:uLnTx/>
+                  <a:uFillTx/>
+                  <a:latin typeface="Calibri" panose="020F0502020204030204"/>
+                  <a:ea typeface="+mn-ea"/>
+                  <a:cs typeface="+mn-cs"/>
+                </a:rPr>
+                <a:t>Do </a:t>
+              </a:r>
+              <a:r>
+                <a:rPr kumimoji="0" lang="en-US" sz="1800" b="0" i="1" u="none" strike="noStrike" kern="1200" cap="none" spc="0" normalizeH="0" baseline="0" noProof="0" dirty="0">
+                  <a:ln>
+                    <a:noFill/>
+                  </a:ln>
+                  <a:solidFill>
+                    <a:prstClr val="black"/>
+                  </a:solidFill>
+                  <a:effectLst/>
+                  <a:uLnTx/>
+                  <a:uFillTx/>
+                  <a:latin typeface="Calibri" panose="020F0502020204030204"/>
+                  <a:ea typeface="+mn-ea"/>
+                  <a:cs typeface="+mn-cs"/>
+                </a:rPr>
+                <a:t>not</a:t>
+              </a:r>
+              <a:r>
+                <a:rPr kumimoji="0" lang="en-US" sz="1800" b="0" i="0" u="none" strike="noStrike" kern="1200" cap="none" spc="0" normalizeH="0" baseline="0" noProof="0" dirty="0">
+                  <a:ln>
+                    <a:noFill/>
+                  </a:ln>
+                  <a:solidFill>
+                    <a:prstClr val="black"/>
+                  </a:solidFill>
+                  <a:effectLst/>
+                  <a:uLnTx/>
+                  <a:uFillTx/>
+                  <a:latin typeface="Calibri" panose="020F0502020204030204"/>
+                  <a:ea typeface="+mn-ea"/>
+                  <a:cs typeface="+mn-cs"/>
+                </a:rPr>
+                <a:t> underestimate</a:t>
+              </a:r>
+              <a:br>
+                <a:rPr kumimoji="0" lang="en-US" sz="1800" b="0" i="0" u="none" strike="noStrike" kern="1200" cap="none" spc="0" normalizeH="0" baseline="0" noProof="0" dirty="0">
+                  <a:ln>
+                    <a:noFill/>
+                  </a:ln>
+                  <a:solidFill>
+                    <a:prstClr val="black"/>
+                  </a:solidFill>
+                  <a:effectLst/>
+                  <a:uLnTx/>
+                  <a:uFillTx/>
+                  <a:latin typeface="Calibri" panose="020F0502020204030204"/>
+                  <a:ea typeface="+mn-ea"/>
+                  <a:cs typeface="+mn-cs"/>
+                </a:rPr>
+              </a:br>
+              <a:r>
+                <a:rPr kumimoji="0" lang="en-US" sz="1800" b="0" i="0" u="none" strike="noStrike" kern="1200" cap="none" spc="0" normalizeH="0" baseline="0" noProof="0" dirty="0" err="1">
+                  <a:ln>
+                    <a:noFill/>
+                  </a:ln>
+                  <a:solidFill>
+                    <a:prstClr val="black"/>
+                  </a:solidFill>
+                  <a:effectLst/>
+                  <a:uLnTx/>
+                  <a:uFillTx/>
+                  <a:latin typeface="Calibri" panose="020F0502020204030204"/>
+                  <a:ea typeface="+mn-ea"/>
+                  <a:cs typeface="+mn-cs"/>
+                </a:rPr>
+                <a:t>walltime</a:t>
+              </a:r>
+              <a:endParaRPr kumimoji="0" lang="nl-BE" sz="1800" b="0" i="0" u="none" strike="noStrike" kern="1200" cap="none" spc="0" normalizeH="0" baseline="0" noProof="0" dirty="0">
+                <a:ln>
+                  <a:noFill/>
+                </a:ln>
+                <a:solidFill>
+                  <a:prstClr val="black"/>
+                </a:solidFill>
+                <a:effectLst/>
+                <a:uLnTx/>
+                <a:uFillTx/>
+                <a:latin typeface="Calibri" panose="020F0502020204030204"/>
+                <a:ea typeface="+mn-ea"/>
+                <a:cs typeface="+mn-cs"/>
+              </a:endParaRPr>
+            </a:p>
+          </p:txBody>
+        </p:sp>
+        <p:cxnSp>
+          <p:nvCxnSpPr>
+            <p:cNvPr id="24" name="Straight Arrow Connector 23">
+              <a:extLst>
+                <a:ext uri="{FF2B5EF4-FFF2-40B4-BE49-F238E27FC236}">
+                  <a16:creationId xmlns:a16="http://schemas.microsoft.com/office/drawing/2014/main" id="{37DEF83C-2A2D-AD26-BC08-E8A5DDEDC29B}"/>
+                </a:ext>
+              </a:extLst>
+            </p:cNvPr>
+            <p:cNvCxnSpPr>
+              <a:cxnSpLocks/>
+              <a:stCxn id="23" idx="1"/>
+            </p:cNvCxnSpPr>
+            <p:nvPr/>
+          </p:nvCxnSpPr>
+          <p:spPr>
+            <a:xfrm flipH="1">
+              <a:off x="-563882" y="5858572"/>
+              <a:ext cx="4271786" cy="1347905"/>
+            </a:xfrm>
+            <a:prstGeom prst="straightConnector1">
+              <a:avLst/>
+            </a:prstGeom>
+            <a:ln w="28575">
+              <a:solidFill>
+                <a:schemeClr val="tx1"/>
+              </a:solidFill>
+              <a:tailEnd type="stealth" w="lg" len="lg"/>
+            </a:ln>
+          </p:spPr>
+          <p:style>
+            <a:lnRef idx="1">
+              <a:schemeClr val="accent1"/>
+            </a:lnRef>
+            <a:fillRef idx="0">
+              <a:schemeClr val="accent1"/>
+            </a:fillRef>
+            <a:effectRef idx="0">
+              <a:schemeClr val="accent1"/>
+            </a:effectRef>
+            <a:fontRef idx="minor">
+              <a:schemeClr val="tx1"/>
+            </a:fontRef>
+          </p:style>
+        </p:cxnSp>
+      </p:grpSp>
+      <p:pic>
+        <p:nvPicPr>
+          <p:cNvPr id="26" name="Picture 2" descr="C:\Users\lucg5005\AppData\Local\Microsoft\Windows\Temporary Internet Files\Content.IE5\CWZUAEH4\lgi01a201309290600[1].jpg">
+            <a:extLst>
+              <a:ext uri="{FF2B5EF4-FFF2-40B4-BE49-F238E27FC236}">
+                <a16:creationId xmlns:a16="http://schemas.microsoft.com/office/drawing/2014/main" id="{D883271A-191F-A432-10EC-DFFB1DE4C849}"/>
+              </a:ext>
+            </a:extLst>
+          </p:cNvPr>
+          <p:cNvPicPr>
+            <a:picLocks noChangeAspect="1" noChangeArrowheads="1"/>
+          </p:cNvPicPr>
+          <p:nvPr/>
+        </p:nvPicPr>
+        <p:blipFill>
+          <a:blip r:embed="rId2" cstate="print">
+            <a:extLst>
+              <a:ext uri="{28A0092B-C50C-407E-A947-70E740481C1C}">
+                <a14:useLocalDpi xmlns:a14="http://schemas.microsoft.com/office/drawing/2010/main" val="0"/>
+              </a:ext>
+            </a:extLst>
+          </a:blip>
+          <a:srcRect/>
+          <a:stretch>
+            <a:fillRect/>
+          </a:stretch>
+        </p:blipFill>
+        <p:spPr bwMode="auto">
+          <a:xfrm>
+            <a:off x="11082394" y="657436"/>
+            <a:ext cx="566151" cy="580908"/>
+          </a:xfrm>
+          <a:prstGeom prst="rect">
+            <a:avLst/>
+          </a:prstGeom>
+          <a:noFill/>
+          <a:extLst>
+            <a:ext uri="{909E8E84-426E-40DD-AFC4-6F175D3DCCD1}">
+              <a14:hiddenFill xmlns:a14="http://schemas.microsoft.com/office/drawing/2010/main">
+                <a:solidFill>
+                  <a:srgbClr val="FFFFFF"/>
+                </a:solidFill>
+              </a14:hiddenFill>
+            </a:ext>
+          </a:extLst>
+        </p:spPr>
+      </p:pic>
     </p:spTree>
     <p:extLst>
       <p:ext uri="{BB962C8B-B14F-4D97-AF65-F5344CB8AC3E}">
@@ -13126,7 +15130,34 @@
                                           </p:stCondLst>
                                         </p:cTn>
                                         <p:tgtEl>
-                                          <p:spTgt spid="5"/>
+                                          <p:spTgt spid="9"/>
+                                        </p:tgtEl>
+                                        <p:attrNameLst>
+                                          <p:attrName>style.visibility</p:attrName>
+                                        </p:attrNameLst>
+                                      </p:cBhvr>
+                                      <p:to>
+                                        <p:strVal val="visible"/>
+                                      </p:to>
+                                    </p:set>
+                                  </p:childTnLst>
+                                </p:cTn>
+                              </p:par>
+                              <p:par>
+                                <p:cTn id="7" presetID="1" presetClass="entr" presetSubtype="0" fill="hold" nodeType="withEffect">
+                                  <p:stCondLst>
+                                    <p:cond delay="0"/>
+                                  </p:stCondLst>
+                                  <p:childTnLst>
+                                    <p:set>
+                                      <p:cBhvr>
+                                        <p:cTn id="8" dur="1" fill="hold">
+                                          <p:stCondLst>
+                                            <p:cond delay="0"/>
+                                          </p:stCondLst>
+                                        </p:cTn>
+                                        <p:tgtEl>
+                                          <p:spTgt spid="26"/>
                                         </p:tgtEl>
                                         <p:attrNameLst>
                                           <p:attrName>style.visibility</p:attrName>
@@ -13167,7 +15198,7 @@
       </p:par>
     </p:tnLst>
     <p:bldLst>
-      <p:bldP spid="5" grpId="0" animBg="1"/>
+      <p:bldP spid="9" grpId="0" animBg="1"/>
     </p:bldLst>
   </p:timing>
 </p:sld>
@@ -13259,6 +15290,593 @@
     <p:extLst>
       <p:ext uri="{BB962C8B-B14F-4D97-AF65-F5344CB8AC3E}">
         <p14:creationId xmlns:p14="http://schemas.microsoft.com/office/powerpoint/2010/main" val="2488509471"/>
+      </p:ext>
+    </p:extLst>
+  </p:cSld>
+  <p:clrMapOvr>
+    <a:masterClrMapping/>
+  </p:clrMapOvr>
+</p:sld>
+</file>
+
+<file path=ppt/slides/slide30.xml><?xml version="1.0" encoding="utf-8"?>
+<p:sld xmlns:a="http://schemas.openxmlformats.org/drawingml/2006/main" xmlns:r="http://schemas.openxmlformats.org/officeDocument/2006/relationships" xmlns:p="http://schemas.openxmlformats.org/presentationml/2006/main">
+  <p:cSld>
+    <p:spTree>
+      <p:nvGrpSpPr>
+        <p:cNvPr id="1" name="">
+          <a:extLst>
+            <a:ext uri="{FF2B5EF4-FFF2-40B4-BE49-F238E27FC236}">
+              <a16:creationId xmlns:a16="http://schemas.microsoft.com/office/drawing/2014/main" id="{DBE38C81-36FA-F8E5-06CC-DF408E28E6F9}"/>
+            </a:ext>
+          </a:extLst>
+        </p:cNvPr>
+        <p:cNvGrpSpPr/>
+        <p:nvPr/>
+      </p:nvGrpSpPr>
+      <p:grpSpPr>
+        <a:xfrm>
+          <a:off x="0" y="0"/>
+          <a:ext cx="0" cy="0"/>
+          <a:chOff x="0" y="0"/>
+          <a:chExt cx="0" cy="0"/>
+        </a:xfrm>
+      </p:grpSpPr>
+      <p:sp>
+        <p:nvSpPr>
+          <p:cNvPr id="2" name="Title 1">
+            <a:extLst>
+              <a:ext uri="{FF2B5EF4-FFF2-40B4-BE49-F238E27FC236}">
+                <a16:creationId xmlns:a16="http://schemas.microsoft.com/office/drawing/2014/main" id="{3AF20E12-6913-300E-60CA-7E6A91D653F4}"/>
+              </a:ext>
+            </a:extLst>
+          </p:cNvPr>
+          <p:cNvSpPr>
+            <a:spLocks noGrp="1"/>
+          </p:cNvSpPr>
+          <p:nvPr>
+            <p:ph type="title"/>
+          </p:nvPr>
+        </p:nvSpPr>
+        <p:spPr/>
+        <p:txBody>
+          <a:bodyPr/>
+          <a:lstStyle/>
+          <a:p>
+            <a:r>
+              <a:rPr lang="en-US" dirty="0"/>
+              <a:t>Using R environment</a:t>
+            </a:r>
+            <a:endParaRPr lang="LID4096" dirty="0"/>
+          </a:p>
+        </p:txBody>
+      </p:sp>
+      <p:sp>
+        <p:nvSpPr>
+          <p:cNvPr id="4" name="Slide Number Placeholder 3">
+            <a:extLst>
+              <a:ext uri="{FF2B5EF4-FFF2-40B4-BE49-F238E27FC236}">
+                <a16:creationId xmlns:a16="http://schemas.microsoft.com/office/drawing/2014/main" id="{8103FCD6-48BF-12C9-C811-E5A701180DB5}"/>
+              </a:ext>
+            </a:extLst>
+          </p:cNvPr>
+          <p:cNvSpPr>
+            <a:spLocks noGrp="1"/>
+          </p:cNvSpPr>
+          <p:nvPr>
+            <p:ph type="sldNum" sz="quarter" idx="12"/>
+          </p:nvPr>
+        </p:nvSpPr>
+        <p:spPr/>
+        <p:txBody>
+          <a:bodyPr/>
+          <a:lstStyle/>
+          <a:p>
+            <a:fld id="{9C7CE217-4467-4B8D-A735-B008FA7C4816}" type="slidenum">
+              <a:rPr lang="LID4096" smtClean="0"/>
+              <a:t>30</a:t>
+            </a:fld>
+            <a:endParaRPr lang="LID4096"/>
+          </a:p>
+        </p:txBody>
+      </p:sp>
+      <p:grpSp>
+        <p:nvGrpSpPr>
+          <p:cNvPr id="5" name="Group 4">
+            <a:extLst>
+              <a:ext uri="{FF2B5EF4-FFF2-40B4-BE49-F238E27FC236}">
+                <a16:creationId xmlns:a16="http://schemas.microsoft.com/office/drawing/2014/main" id="{693BE78A-6140-8E7D-3907-B87F529AF76F}"/>
+              </a:ext>
+            </a:extLst>
+          </p:cNvPr>
+          <p:cNvGrpSpPr/>
+          <p:nvPr/>
+        </p:nvGrpSpPr>
+        <p:grpSpPr>
+          <a:xfrm>
+            <a:off x="369651" y="1497096"/>
+            <a:ext cx="11452697" cy="3139321"/>
+            <a:chOff x="1055914" y="2169659"/>
+            <a:chExt cx="8795657" cy="3139321"/>
+          </a:xfrm>
+        </p:grpSpPr>
+        <p:sp>
+          <p:nvSpPr>
+            <p:cNvPr id="6" name="TextBox 5">
+              <a:extLst>
+                <a:ext uri="{FF2B5EF4-FFF2-40B4-BE49-F238E27FC236}">
+                  <a16:creationId xmlns:a16="http://schemas.microsoft.com/office/drawing/2014/main" id="{892B1B67-91A4-DED1-502A-9D2369191DC0}"/>
+                </a:ext>
+              </a:extLst>
+            </p:cNvPr>
+            <p:cNvSpPr txBox="1"/>
+            <p:nvPr/>
+          </p:nvSpPr>
+          <p:spPr>
+            <a:xfrm>
+              <a:off x="1055914" y="2169659"/>
+              <a:ext cx="8795657" cy="3139321"/>
+            </a:xfrm>
+            <a:prstGeom prst="rect">
+              <a:avLst/>
+            </a:prstGeom>
+            <a:solidFill>
+              <a:schemeClr val="bg1">
+                <a:lumMod val="85000"/>
+              </a:schemeClr>
+            </a:solidFill>
+            <a:ln>
+              <a:solidFill>
+                <a:schemeClr val="tx1"/>
+              </a:solidFill>
+            </a:ln>
+          </p:spPr>
+          <p:txBody>
+            <a:bodyPr wrap="square" rtlCol="0">
+              <a:spAutoFit/>
+            </a:bodyPr>
+            <a:lstStyle/>
+            <a:p>
+              <a:pPr lvl="0">
+                <a:defRPr/>
+              </a:pPr>
+              <a:r>
+                <a:rPr lang="en-US" dirty="0">
+                  <a:solidFill>
+                    <a:prstClr val="black"/>
+                  </a:solidFill>
+                  <a:latin typeface="Courier New" pitchFamily="49" charset="0"/>
+                  <a:cs typeface="Courier New" pitchFamily="49" charset="0"/>
+                </a:rPr>
+                <a:t>#!/usr/bin/env -S bash -l</a:t>
+              </a:r>
+            </a:p>
+            <a:p>
+              <a:pPr lvl="0">
+                <a:defRPr/>
+              </a:pPr>
+              <a:r>
+                <a:rPr lang="en-US" dirty="0">
+                  <a:solidFill>
+                    <a:prstClr val="black"/>
+                  </a:solidFill>
+                  <a:latin typeface="Courier New" pitchFamily="49" charset="0"/>
+                  <a:cs typeface="Courier New" pitchFamily="49" charset="0"/>
+                </a:rPr>
+                <a:t>#SBATCH --account=&lt;</a:t>
+              </a:r>
+              <a:r>
+                <a:rPr lang="en-US" dirty="0" err="1">
+                  <a:solidFill>
+                    <a:prstClr val="black"/>
+                  </a:solidFill>
+                  <a:latin typeface="Courier New" pitchFamily="49" charset="0"/>
+                  <a:cs typeface="Courier New" pitchFamily="49" charset="0"/>
+                </a:rPr>
+                <a:t>your_account</a:t>
+              </a:r>
+              <a:r>
+                <a:rPr lang="en-US" dirty="0">
+                  <a:solidFill>
+                    <a:prstClr val="black"/>
+                  </a:solidFill>
+                  <a:latin typeface="Courier New" pitchFamily="49" charset="0"/>
+                  <a:cs typeface="Courier New" pitchFamily="49" charset="0"/>
+                </a:rPr>
+                <a:t>&gt;</a:t>
+              </a:r>
+            </a:p>
+            <a:p>
+              <a:pPr lvl="0">
+                <a:defRPr/>
+              </a:pPr>
+              <a:r>
+                <a:rPr lang="en-US" dirty="0">
+                  <a:solidFill>
+                    <a:prstClr val="black"/>
+                  </a:solidFill>
+                  <a:latin typeface="Courier New" pitchFamily="49" charset="0"/>
+                  <a:cs typeface="Courier New" pitchFamily="49" charset="0"/>
+                </a:rPr>
+                <a:t>#SBATCH --cluster=&lt;</a:t>
+              </a:r>
+              <a:r>
+                <a:rPr lang="en-US" dirty="0" err="1">
+                  <a:solidFill>
+                    <a:prstClr val="black"/>
+                  </a:solidFill>
+                  <a:latin typeface="Courier New" pitchFamily="49" charset="0"/>
+                  <a:cs typeface="Courier New" pitchFamily="49" charset="0"/>
+                </a:rPr>
+                <a:t>your_cluster</a:t>
+              </a:r>
+              <a:r>
+                <a:rPr lang="en-US" dirty="0">
+                  <a:solidFill>
+                    <a:prstClr val="black"/>
+                  </a:solidFill>
+                  <a:latin typeface="Courier New" pitchFamily="49" charset="0"/>
+                  <a:cs typeface="Courier New" pitchFamily="49" charset="0"/>
+                </a:rPr>
+                <a:t>&gt;</a:t>
+              </a:r>
+            </a:p>
+            <a:p>
+              <a:pPr lvl="0">
+                <a:defRPr/>
+              </a:pPr>
+              <a:r>
+                <a:rPr lang="en-US" dirty="0">
+                  <a:solidFill>
+                    <a:prstClr val="black"/>
+                  </a:solidFill>
+                  <a:latin typeface="Courier New" pitchFamily="49" charset="0"/>
+                  <a:cs typeface="Courier New" pitchFamily="49" charset="0"/>
+                </a:rPr>
+                <a:t>#SBATCH --time=00:05:00</a:t>
+              </a:r>
+            </a:p>
+            <a:p>
+              <a:pPr lvl="0">
+                <a:defRPr/>
+              </a:pPr>
+              <a:endParaRPr lang="en-US" dirty="0">
+                <a:solidFill>
+                  <a:prstClr val="black"/>
+                </a:solidFill>
+                <a:latin typeface="Courier New" pitchFamily="49" charset="0"/>
+                <a:cs typeface="Courier New" pitchFamily="49" charset="0"/>
+              </a:endParaRPr>
+            </a:p>
+            <a:p>
+              <a:pPr lvl="0">
+                <a:defRPr/>
+              </a:pPr>
+              <a:r>
+                <a:rPr lang="en-US" dirty="0">
+                  <a:solidFill>
+                    <a:prstClr val="black"/>
+                  </a:solidFill>
+                  <a:latin typeface="Courier New" pitchFamily="49" charset="0"/>
+                  <a:cs typeface="Courier New" pitchFamily="49" charset="0"/>
+                </a:rPr>
+                <a:t>module purge &amp;&gt; /dev/null</a:t>
+              </a:r>
+            </a:p>
+            <a:p>
+              <a:pPr lvl="0">
+                <a:defRPr/>
+              </a:pPr>
+              <a:r>
+                <a:rPr lang="en-US" dirty="0">
+                  <a:solidFill>
+                    <a:prstClr val="black"/>
+                  </a:solidFill>
+                  <a:latin typeface="Courier New" pitchFamily="49" charset="0"/>
+                  <a:cs typeface="Courier New" pitchFamily="49" charset="0"/>
+                </a:rPr>
+                <a:t>module load R-bundle-CRAN/2023.12-foss-2023a</a:t>
+              </a:r>
+            </a:p>
+            <a:p>
+              <a:pPr lvl="0">
+                <a:defRPr/>
+              </a:pPr>
+              <a:endParaRPr lang="en-US" dirty="0">
+                <a:solidFill>
+                  <a:prstClr val="black"/>
+                </a:solidFill>
+                <a:latin typeface="Courier New" pitchFamily="49" charset="0"/>
+                <a:cs typeface="Courier New" pitchFamily="49" charset="0"/>
+              </a:endParaRPr>
+            </a:p>
+            <a:p>
+              <a:pPr lvl="0">
+                <a:defRPr/>
+              </a:pPr>
+              <a:r>
+                <a:rPr lang="en-US" dirty="0">
+                  <a:solidFill>
+                    <a:prstClr val="black"/>
+                  </a:solidFill>
+                  <a:latin typeface="Courier New" pitchFamily="49" charset="0"/>
+                  <a:cs typeface="Courier New" pitchFamily="49" charset="0"/>
+                </a:rPr>
+                <a:t>export R_LIBS_USER="${VSC_DATA}/R/${VSC_OS_LOCAL}/${VSC_ARCH_LOCAL}/${EBVERSIONR}"</a:t>
+              </a:r>
+            </a:p>
+            <a:p>
+              <a:pPr lvl="0">
+                <a:defRPr/>
+              </a:pPr>
+              <a:endParaRPr lang="en-US" dirty="0">
+                <a:solidFill>
+                  <a:prstClr val="black"/>
+                </a:solidFill>
+                <a:latin typeface="Courier New" pitchFamily="49" charset="0"/>
+                <a:cs typeface="Courier New" pitchFamily="49" charset="0"/>
+              </a:endParaRPr>
+            </a:p>
+            <a:p>
+              <a:pPr lvl="0">
+                <a:defRPr/>
+              </a:pPr>
+              <a:r>
+                <a:rPr lang="en-US" dirty="0">
+                  <a:solidFill>
+                    <a:prstClr val="black"/>
+                  </a:solidFill>
+                  <a:latin typeface="Courier New" pitchFamily="49" charset="0"/>
+                  <a:cs typeface="Courier New" pitchFamily="49" charset="0"/>
+                </a:rPr>
+                <a:t>R_LIBS_USER=$R_LIBS_USER  </a:t>
+              </a:r>
+              <a:r>
+                <a:rPr lang="en-US" dirty="0" err="1">
+                  <a:solidFill>
+                    <a:prstClr val="black"/>
+                  </a:solidFill>
+                  <a:latin typeface="Courier New" pitchFamily="49" charset="0"/>
+                  <a:cs typeface="Courier New" pitchFamily="49" charset="0"/>
+                </a:rPr>
+                <a:t>Rscript</a:t>
+              </a:r>
+              <a:r>
+                <a:rPr lang="en-US" dirty="0">
+                  <a:solidFill>
+                    <a:prstClr val="black"/>
+                  </a:solidFill>
+                  <a:latin typeface="Courier New" pitchFamily="49" charset="0"/>
+                  <a:cs typeface="Courier New" pitchFamily="49" charset="0"/>
+                </a:rPr>
+                <a:t>  </a:t>
+              </a:r>
+              <a:r>
+                <a:rPr lang="en-US" dirty="0" err="1">
+                  <a:solidFill>
+                    <a:prstClr val="black"/>
+                  </a:solidFill>
+                  <a:latin typeface="Courier New" pitchFamily="49" charset="0"/>
+                  <a:cs typeface="Courier New" pitchFamily="49" charset="0"/>
+                </a:rPr>
+                <a:t>hello_world_cla.R</a:t>
+              </a:r>
+              <a:endParaRPr lang="en-US" dirty="0">
+                <a:solidFill>
+                  <a:prstClr val="black"/>
+                </a:solidFill>
+                <a:latin typeface="Courier New" pitchFamily="49" charset="0"/>
+                <a:cs typeface="Courier New" pitchFamily="49" charset="0"/>
+              </a:endParaRPr>
+            </a:p>
+          </p:txBody>
+        </p:sp>
+        <p:sp>
+          <p:nvSpPr>
+            <p:cNvPr id="7" name="TextBox 6">
+              <a:extLst>
+                <a:ext uri="{FF2B5EF4-FFF2-40B4-BE49-F238E27FC236}">
+                  <a16:creationId xmlns:a16="http://schemas.microsoft.com/office/drawing/2014/main" id="{B6E4DA4D-6C0C-34BF-58E2-4FF1DBA58E3F}"/>
+                </a:ext>
+              </a:extLst>
+            </p:cNvPr>
+            <p:cNvSpPr txBox="1"/>
+            <p:nvPr/>
+          </p:nvSpPr>
+          <p:spPr>
+            <a:xfrm>
+              <a:off x="8175026" y="2169659"/>
+              <a:ext cx="1665841" cy="338554"/>
+            </a:xfrm>
+            <a:prstGeom prst="rect">
+              <a:avLst/>
+            </a:prstGeom>
+            <a:solidFill>
+              <a:schemeClr val="bg1"/>
+            </a:solidFill>
+            <a:ln>
+              <a:solidFill>
+                <a:schemeClr val="tx1"/>
+              </a:solidFill>
+            </a:ln>
+          </p:spPr>
+          <p:txBody>
+            <a:bodyPr wrap="none" rtlCol="0">
+              <a:spAutoFit/>
+            </a:bodyPr>
+            <a:lstStyle/>
+            <a:p>
+              <a:r>
+                <a:rPr lang="en-US" sz="1600" dirty="0" err="1">
+                  <a:latin typeface="Courier New" panose="02070309020205020404" pitchFamily="49" charset="0"/>
+                  <a:cs typeface="Courier New" panose="02070309020205020404" pitchFamily="49" charset="0"/>
+                </a:rPr>
+                <a:t>cosine.slurm</a:t>
+              </a:r>
+              <a:endParaRPr lang="LID4096" sz="1600" dirty="0">
+                <a:latin typeface="Courier New" panose="02070309020205020404" pitchFamily="49" charset="0"/>
+                <a:cs typeface="Courier New" panose="02070309020205020404" pitchFamily="49" charset="0"/>
+              </a:endParaRPr>
+            </a:p>
+          </p:txBody>
+        </p:sp>
+      </p:grpSp>
+      <p:grpSp>
+        <p:nvGrpSpPr>
+          <p:cNvPr id="9" name="Group 8">
+            <a:extLst>
+              <a:ext uri="{FF2B5EF4-FFF2-40B4-BE49-F238E27FC236}">
+                <a16:creationId xmlns:a16="http://schemas.microsoft.com/office/drawing/2014/main" id="{5E8DDB9D-15BA-942E-A886-48775C904725}"/>
+              </a:ext>
+            </a:extLst>
+          </p:cNvPr>
+          <p:cNvGrpSpPr/>
+          <p:nvPr/>
+        </p:nvGrpSpPr>
+        <p:grpSpPr>
+          <a:xfrm>
+            <a:off x="2220686" y="4636417"/>
+            <a:ext cx="6948552" cy="891059"/>
+            <a:chOff x="-576521" y="5013679"/>
+            <a:chExt cx="6948552" cy="891059"/>
+          </a:xfrm>
+        </p:grpSpPr>
+        <p:sp>
+          <p:nvSpPr>
+            <p:cNvPr id="11" name="TextBox 10">
+              <a:extLst>
+                <a:ext uri="{FF2B5EF4-FFF2-40B4-BE49-F238E27FC236}">
+                  <a16:creationId xmlns:a16="http://schemas.microsoft.com/office/drawing/2014/main" id="{A544524E-04E2-85C0-369F-A20B16838235}"/>
+                </a:ext>
+              </a:extLst>
+            </p:cNvPr>
+            <p:cNvSpPr txBox="1"/>
+            <p:nvPr/>
+          </p:nvSpPr>
+          <p:spPr>
+            <a:xfrm>
+              <a:off x="3707904" y="5535406"/>
+              <a:ext cx="2664127" cy="369332"/>
+            </a:xfrm>
+            <a:prstGeom prst="rect">
+              <a:avLst/>
+            </a:prstGeom>
+            <a:solidFill>
+              <a:schemeClr val="bg1"/>
+            </a:solidFill>
+            <a:ln w="19050">
+              <a:solidFill>
+                <a:schemeClr val="tx1"/>
+              </a:solidFill>
+            </a:ln>
+          </p:spPr>
+          <p:txBody>
+            <a:bodyPr wrap="none" rtlCol="0">
+              <a:spAutoFit/>
+            </a:bodyPr>
+            <a:lstStyle/>
+            <a:p>
+              <a:pPr marL="0" marR="0" lvl="0" indent="0" algn="l" defTabSz="914400" rtl="0" eaLnBrk="1" fontAlgn="auto" latinLnBrk="0" hangingPunct="1">
+                <a:lnSpc>
+                  <a:spcPct val="100000"/>
+                </a:lnSpc>
+                <a:spcBef>
+                  <a:spcPts val="0"/>
+                </a:spcBef>
+                <a:spcAft>
+                  <a:spcPts val="0"/>
+                </a:spcAft>
+                <a:buClrTx/>
+                <a:buSzTx/>
+                <a:buFontTx/>
+                <a:buNone/>
+                <a:tabLst/>
+                <a:defRPr/>
+              </a:pPr>
+              <a:r>
+                <a:rPr kumimoji="0" lang="en-US" sz="1800" b="0" i="0" u="none" strike="noStrike" kern="1200" cap="none" spc="0" normalizeH="0" baseline="0" noProof="0" dirty="0">
+                  <a:ln>
+                    <a:noFill/>
+                  </a:ln>
+                  <a:solidFill>
+                    <a:prstClr val="black"/>
+                  </a:solidFill>
+                  <a:effectLst/>
+                  <a:uLnTx/>
+                  <a:uFillTx/>
+                  <a:latin typeface="Calibri" panose="020F0502020204030204"/>
+                  <a:ea typeface="+mn-ea"/>
+                  <a:cs typeface="+mn-cs"/>
+                </a:rPr>
+                <a:t>Ensures right environment</a:t>
+              </a:r>
+              <a:endParaRPr kumimoji="0" lang="nl-BE" sz="1800" b="0" i="0" u="none" strike="noStrike" kern="1200" cap="none" spc="0" normalizeH="0" baseline="0" noProof="0" dirty="0">
+                <a:ln>
+                  <a:noFill/>
+                </a:ln>
+                <a:solidFill>
+                  <a:prstClr val="black"/>
+                </a:solidFill>
+                <a:effectLst/>
+                <a:uLnTx/>
+                <a:uFillTx/>
+                <a:latin typeface="Calibri" panose="020F0502020204030204"/>
+                <a:ea typeface="+mn-ea"/>
+                <a:cs typeface="+mn-cs"/>
+              </a:endParaRPr>
+            </a:p>
+          </p:txBody>
+        </p:sp>
+        <p:cxnSp>
+          <p:nvCxnSpPr>
+            <p:cNvPr id="12" name="Straight Arrow Connector 11">
+              <a:extLst>
+                <a:ext uri="{FF2B5EF4-FFF2-40B4-BE49-F238E27FC236}">
+                  <a16:creationId xmlns:a16="http://schemas.microsoft.com/office/drawing/2014/main" id="{EE7FB160-A849-8898-9C78-D398DCB796E2}"/>
+                </a:ext>
+              </a:extLst>
+            </p:cNvPr>
+            <p:cNvCxnSpPr>
+              <a:cxnSpLocks/>
+              <a:stCxn id="11" idx="1"/>
+            </p:cNvCxnSpPr>
+            <p:nvPr/>
+          </p:nvCxnSpPr>
+          <p:spPr>
+            <a:xfrm flipH="1" flipV="1">
+              <a:off x="-576521" y="5013679"/>
+              <a:ext cx="4284425" cy="706393"/>
+            </a:xfrm>
+            <a:prstGeom prst="straightConnector1">
+              <a:avLst/>
+            </a:prstGeom>
+            <a:ln w="28575">
+              <a:solidFill>
+                <a:schemeClr val="tx1"/>
+              </a:solidFill>
+              <a:tailEnd type="stealth" w="lg" len="lg"/>
+            </a:ln>
+          </p:spPr>
+          <p:style>
+            <a:lnRef idx="1">
+              <a:schemeClr val="accent1"/>
+            </a:lnRef>
+            <a:fillRef idx="0">
+              <a:schemeClr val="accent1"/>
+            </a:fillRef>
+            <a:effectRef idx="0">
+              <a:schemeClr val="accent1"/>
+            </a:effectRef>
+            <a:fontRef idx="minor">
+              <a:schemeClr val="tx1"/>
+            </a:fontRef>
+          </p:style>
+        </p:cxnSp>
+      </p:grpSp>
+    </p:spTree>
+    <p:extLst>
+      <p:ext uri="{BB962C8B-B14F-4D97-AF65-F5344CB8AC3E}">
+        <p14:creationId xmlns:p14="http://schemas.microsoft.com/office/powerpoint/2010/main" val="1914026040"/>
       </p:ext>
     </p:extLst>
   </p:cSld>

</xml_diff>